<commit_message>
Snag some of Robert's slides for system calls.
</commit_message>
<xml_diff>
--- a/undergraduate/lectures/kernel-services.pptx
+++ b/undergraduate/lectures/kernel-services.pptx
@@ -2,21 +2,25 @@
 <file path=ppt/presentation.xml><?xml version="1.0" encoding="utf-8"?>
 <p:presentation xmlns:a="http://schemas.openxmlformats.org/drawingml/2006/main" xmlns:r="http://schemas.openxmlformats.org/officeDocument/2006/relationships" xmlns:p="http://schemas.openxmlformats.org/presentationml/2006/main" showSpecialPlsOnTitleSld="0" saveSubsetFonts="1" autoCompressPictures="0">
   <p:sldMasterIdLst>
-    <p:sldMasterId id="2147483786" r:id="rId1"/>
+    <p:sldMasterId id="2147483894" r:id="rId1"/>
   </p:sldMasterIdLst>
   <p:notesMasterIdLst>
-    <p:notesMasterId r:id="rId11"/>
+    <p:notesMasterId r:id="rId15"/>
   </p:notesMasterIdLst>
   <p:sldIdLst>
     <p:sldId id="256" r:id="rId2"/>
     <p:sldId id="257" r:id="rId3"/>
     <p:sldId id="258" r:id="rId4"/>
     <p:sldId id="259" r:id="rId5"/>
-    <p:sldId id="261" r:id="rId6"/>
-    <p:sldId id="262" r:id="rId7"/>
-    <p:sldId id="263" r:id="rId8"/>
-    <p:sldId id="264" r:id="rId9"/>
-    <p:sldId id="260" r:id="rId10"/>
+    <p:sldId id="265" r:id="rId6"/>
+    <p:sldId id="266" r:id="rId7"/>
+    <p:sldId id="267" r:id="rId8"/>
+    <p:sldId id="268" r:id="rId9"/>
+    <p:sldId id="261" r:id="rId10"/>
+    <p:sldId id="262" r:id="rId11"/>
+    <p:sldId id="263" r:id="rId12"/>
+    <p:sldId id="264" r:id="rId13"/>
+    <p:sldId id="260" r:id="rId14"/>
   </p:sldIdLst>
   <p:sldSz cx="12192000" cy="6858000"/>
   <p:notesSz cx="6858000" cy="9144000"/>
@@ -205,7 +209,7 @@
           <a:p>
             <a:fld id="{EC53E720-1243-6043-B4C4-6E31C619CC0A}" type="datetimeFigureOut">
               <a:rPr lang="en-US" smtClean="0"/>
-              <a:t>2/2/17</a:t>
+              <a:t>2/12/17</a:t>
             </a:fld>
             <a:endParaRPr lang="en-US"/>
           </a:p>
@@ -702,9 +706,9 @@
           <a:bodyPr/>
           <a:lstStyle/>
           <a:p>
-            <a:fld id="{6FD7C7D2-3843-074D-9A83-F18DE7D7DD8A}" type="datetime1">
-              <a:rPr lang="en-US" smtClean="0"/>
-              <a:t>2/2/17</a:t>
+            <a:fld id="{31E4796F-62B8-544E-AE8E-9C9E6E941932}" type="datetime1">
+              <a:rPr lang="en-US" smtClean="0"/>
+              <a:t>2/12/17</a:t>
             </a:fld>
             <a:endParaRPr lang="en-US"/>
           </a:p>
@@ -727,7 +731,7 @@
           <a:p>
             <a:r>
               <a:rPr lang="en-US" smtClean="0"/>
-              <a:t>Developing Products with FreeBSD</a:t>
+              <a:t>Introduction to Operating Systems</a:t>
             </a:r>
             <a:endParaRPr lang="en-US" dirty="0"/>
           </a:p>
@@ -981,9 +985,9 @@
           <a:bodyPr/>
           <a:lstStyle/>
           <a:p>
-            <a:fld id="{1845299F-DBA6-8144-8C5D-0535750AFB51}" type="datetime1">
-              <a:rPr lang="en-US" smtClean="0"/>
-              <a:t>2/2/17</a:t>
+            <a:fld id="{82157EDA-19C1-2A49-862B-D560FF94E319}" type="datetime1">
+              <a:rPr lang="en-US" smtClean="0"/>
+              <a:t>2/12/17</a:t>
             </a:fld>
             <a:endParaRPr lang="en-US"/>
           </a:p>
@@ -1006,7 +1010,7 @@
           <a:p>
             <a:r>
               <a:rPr lang="en-US" smtClean="0"/>
-              <a:t>Developing Products with FreeBSD</a:t>
+              <a:t>Introduction to Operating Systems</a:t>
             </a:r>
             <a:endParaRPr lang="en-US"/>
           </a:p>
@@ -1236,9 +1240,9 @@
           <a:bodyPr/>
           <a:lstStyle/>
           <a:p>
-            <a:fld id="{F317D0FE-1E91-D842-A8A8-8B23377F1877}" type="datetime1">
-              <a:rPr lang="en-US" smtClean="0"/>
-              <a:t>2/2/17</a:t>
+            <a:fld id="{771BC361-9320-DD42-9551-655E05852352}" type="datetime1">
+              <a:rPr lang="en-US" smtClean="0"/>
+              <a:t>2/12/17</a:t>
             </a:fld>
             <a:endParaRPr lang="en-US"/>
           </a:p>
@@ -1261,7 +1265,7 @@
           <a:p>
             <a:r>
               <a:rPr lang="en-US" smtClean="0"/>
-              <a:t>Developing Products with FreeBSD</a:t>
+              <a:t>Introduction to Operating Systems</a:t>
             </a:r>
             <a:endParaRPr lang="en-US"/>
           </a:p>
@@ -1414,9 +1418,9 @@
           <a:bodyPr/>
           <a:lstStyle/>
           <a:p>
-            <a:fld id="{BC4AE5AA-C6FF-5A4F-9D02-E3454F0B3602}" type="datetime1">
-              <a:rPr lang="en-US" smtClean="0"/>
-              <a:t>2/2/17</a:t>
+            <a:fld id="{16070590-A260-A04E-B755-A796BE6E3C9A}" type="datetime1">
+              <a:rPr lang="en-US" smtClean="0"/>
+              <a:t>2/12/17</a:t>
             </a:fld>
             <a:endParaRPr lang="en-US"/>
           </a:p>
@@ -1439,7 +1443,7 @@
           <a:p>
             <a:r>
               <a:rPr lang="en-US" smtClean="0"/>
-              <a:t>Developing Products with FreeBSD</a:t>
+              <a:t>Introduction to Operating Systems</a:t>
             </a:r>
             <a:endParaRPr lang="en-US" dirty="0"/>
           </a:p>
@@ -1763,9 +1767,9 @@
           <a:bodyPr/>
           <a:lstStyle/>
           <a:p>
-            <a:fld id="{3970F026-0185-804B-BF05-EA6EC33EA811}" type="datetime1">
-              <a:rPr lang="en-US" smtClean="0"/>
-              <a:t>2/2/17</a:t>
+            <a:fld id="{EAD5556A-9A6E-984A-993D-1C012E56F2D1}" type="datetime1">
+              <a:rPr lang="en-US" smtClean="0"/>
+              <a:t>2/12/17</a:t>
             </a:fld>
             <a:endParaRPr lang="en-US"/>
           </a:p>
@@ -1788,7 +1792,7 @@
           <a:p>
             <a:r>
               <a:rPr lang="en-US" smtClean="0"/>
-              <a:t>Developing Products with FreeBSD</a:t>
+              <a:t>Introduction to Operating Systems</a:t>
             </a:r>
             <a:endParaRPr lang="en-US"/>
           </a:p>
@@ -1905,7 +1909,7 @@
         <p:spPr>
           <a:xfrm>
             <a:off x="1097280" y="286604"/>
-            <a:ext cx="10058400" cy="1092492"/>
+            <a:ext cx="10058400" cy="872345"/>
           </a:xfrm>
         </p:spPr>
         <p:txBody>
@@ -2057,9 +2061,9 @@
           <a:bodyPr/>
           <a:lstStyle/>
           <a:p>
-            <a:fld id="{DE81AA58-E2C3-4F48-B04E-18D114E0E0D1}" type="datetime1">
-              <a:rPr lang="en-US" smtClean="0"/>
-              <a:t>2/2/17</a:t>
+            <a:fld id="{6A5B3172-FCD5-3B4D-B4AC-F19397DB0AAD}" type="datetime1">
+              <a:rPr lang="en-US" smtClean="0"/>
+              <a:t>2/12/17</a:t>
             </a:fld>
             <a:endParaRPr lang="en-US" dirty="0"/>
           </a:p>
@@ -2082,7 +2086,7 @@
           <a:p>
             <a:r>
               <a:rPr lang="en-US" smtClean="0"/>
-              <a:t>Developing Products with FreeBSD</a:t>
+              <a:t>Introduction to Operating Systems</a:t>
             </a:r>
             <a:endParaRPr lang="en-US" dirty="0"/>
           </a:p>
@@ -2158,7 +2162,7 @@
         <p:spPr>
           <a:xfrm>
             <a:off x="1097280" y="286603"/>
-            <a:ext cx="10058400" cy="1450757"/>
+            <a:ext cx="10058400" cy="893611"/>
           </a:xfrm>
         </p:spPr>
         <p:txBody>
@@ -2185,8 +2189,8 @@
         </p:nvSpPr>
         <p:spPr>
           <a:xfrm>
-            <a:off x="1097280" y="1846052"/>
-            <a:ext cx="4937760" cy="736282"/>
+            <a:off x="1097280" y="1364053"/>
+            <a:ext cx="4937760" cy="420870"/>
           </a:xfrm>
         </p:spPr>
         <p:txBody>
@@ -2256,8 +2260,8 @@
         </p:nvSpPr>
         <p:spPr>
           <a:xfrm>
-            <a:off x="1097280" y="2582334"/>
-            <a:ext cx="4937760" cy="3378200"/>
+            <a:off x="1097280" y="1968762"/>
+            <a:ext cx="4937760" cy="3991772"/>
           </a:xfrm>
         </p:spPr>
         <p:txBody>
@@ -2313,8 +2317,8 @@
         </p:nvSpPr>
         <p:spPr>
           <a:xfrm>
-            <a:off x="6217920" y="1846052"/>
-            <a:ext cx="4937760" cy="736282"/>
+            <a:off x="6217920" y="1364053"/>
+            <a:ext cx="4937760" cy="420870"/>
           </a:xfrm>
         </p:spPr>
         <p:txBody>
@@ -2384,8 +2388,8 @@
         </p:nvSpPr>
         <p:spPr>
           <a:xfrm>
-            <a:off x="6217920" y="2582334"/>
-            <a:ext cx="4937760" cy="3378200"/>
+            <a:off x="6217920" y="1968762"/>
+            <a:ext cx="4937760" cy="3991772"/>
           </a:xfrm>
         </p:spPr>
         <p:txBody>
@@ -2444,9 +2448,9 @@
           <a:bodyPr/>
           <a:lstStyle/>
           <a:p>
-            <a:fld id="{6EC7CDD8-D400-0544-8ADA-779D39154084}" type="datetime1">
-              <a:rPr lang="en-US" smtClean="0"/>
-              <a:t>2/2/17</a:t>
+            <a:fld id="{549D8CE9-C24E-FC4D-993F-4D538756E4A6}" type="datetime1">
+              <a:rPr lang="en-US" smtClean="0"/>
+              <a:t>2/12/17</a:t>
             </a:fld>
             <a:endParaRPr lang="en-US"/>
           </a:p>
@@ -2469,7 +2473,7 @@
           <a:p>
             <a:r>
               <a:rPr lang="en-US" smtClean="0"/>
-              <a:t>Developing Products with FreeBSD</a:t>
+              <a:t>Introduction to Operating Systems</a:t>
             </a:r>
             <a:endParaRPr lang="en-US"/>
           </a:p>
@@ -2568,9 +2572,9 @@
           <a:bodyPr/>
           <a:lstStyle/>
           <a:p>
-            <a:fld id="{9FC8F57C-E466-5D4A-8BA1-0F2DC96E6599}" type="datetime1">
-              <a:rPr lang="en-US" smtClean="0"/>
-              <a:t>2/2/17</a:t>
+            <a:fld id="{8079B3D1-428F-D840-BD7D-25616EC5CF74}" type="datetime1">
+              <a:rPr lang="en-US" smtClean="0"/>
+              <a:t>2/12/17</a:t>
             </a:fld>
             <a:endParaRPr lang="en-US"/>
           </a:p>
@@ -2593,7 +2597,7 @@
           <a:p>
             <a:r>
               <a:rPr lang="en-US" smtClean="0"/>
-              <a:t>Developing Products with FreeBSD</a:t>
+              <a:t>Introduction to Operating Systems</a:t>
             </a:r>
             <a:endParaRPr lang="en-US"/>
           </a:p>
@@ -2745,9 +2749,9 @@
           <a:bodyPr/>
           <a:lstStyle/>
           <a:p>
-            <a:fld id="{DBF46B55-EA12-F74C-9AED-0C94E9DB5CD6}" type="datetime1">
-              <a:rPr lang="en-US" smtClean="0"/>
-              <a:t>2/2/17</a:t>
+            <a:fld id="{93710EAA-21B4-7A4A-B453-7ECECB29584C}" type="datetime1">
+              <a:rPr lang="en-US" smtClean="0"/>
+              <a:t>2/12/17</a:t>
             </a:fld>
             <a:endParaRPr lang="en-US"/>
           </a:p>
@@ -2778,7 +2782,7 @@
           <a:p>
             <a:r>
               <a:rPr lang="en-US" smtClean="0"/>
-              <a:t>Developing Products with FreeBSD</a:t>
+              <a:t>Introduction to Operating Systems</a:t>
             </a:r>
             <a:endParaRPr lang="en-US"/>
           </a:p>
@@ -3105,9 +3109,9 @@
             </a:lvl1pPr>
           </a:lstStyle>
           <a:p>
-            <a:fld id="{E5E2A1D4-BDD0-AA4F-B33D-67E210B458F1}" type="datetime1">
-              <a:rPr lang="en-US" smtClean="0"/>
-              <a:t>2/2/17</a:t>
+            <a:fld id="{7BA2A73F-D53E-5E4A-BB5E-23F13E5F9E66}" type="datetime1">
+              <a:rPr lang="en-US" smtClean="0"/>
+              <a:t>2/12/17</a:t>
             </a:fld>
             <a:endParaRPr lang="en-US"/>
           </a:p>
@@ -3143,7 +3147,7 @@
           <a:p>
             <a:r>
               <a:rPr lang="en-US" smtClean="0"/>
-              <a:t>Developing Products with FreeBSD</a:t>
+              <a:t>Introduction to Operating Systems</a:t>
             </a:r>
             <a:endParaRPr lang="en-US"/>
           </a:p>
@@ -3490,9 +3494,9 @@
           <a:bodyPr/>
           <a:lstStyle/>
           <a:p>
-            <a:fld id="{D826F452-4A85-5248-B350-1D6DEB55B823}" type="datetime1">
-              <a:rPr lang="en-US" smtClean="0"/>
-              <a:t>2/2/17</a:t>
+            <a:fld id="{47A61D71-3628-F044-B991-0A65E5EA1BF7}" type="datetime1">
+              <a:rPr lang="en-US" smtClean="0"/>
+              <a:t>2/12/17</a:t>
             </a:fld>
             <a:endParaRPr lang="en-US"/>
           </a:p>
@@ -3515,7 +3519,7 @@
           <a:p>
             <a:r>
               <a:rPr lang="en-US" smtClean="0"/>
-              <a:t>Developing Products with FreeBSD</a:t>
+              <a:t>Introduction to Operating Systems</a:t>
             </a:r>
             <a:endParaRPr lang="en-US"/>
           </a:p>
@@ -3776,10 +3780,9 @@
             </a:lvl1pPr>
           </a:lstStyle>
           <a:p>
-            <a:fld id="{53287F0B-3DC9-8F47-B5AF-DFDDA54774AE}" type="datetime1">
-              <a:rPr lang="en-US" smtClean="0"/>
-              <a:pPr/>
-              <a:t>2/2/17</a:t>
+            <a:fld id="{1325AA48-8F73-9744-AD1E-61E4D0F964B4}" type="datetime1">
+              <a:rPr lang="en-US" smtClean="0"/>
+              <a:t>2/12/17</a:t>
             </a:fld>
             <a:endParaRPr lang="en-US" dirty="0"/>
           </a:p>
@@ -3817,8 +3820,8 @@
           </a:lstStyle>
           <a:p>
             <a:r>
-              <a:rPr lang="en-US" dirty="0" smtClean="0"/>
-              <a:t>(TITLE)</a:t>
+              <a:rPr lang="en-US" smtClean="0"/>
+              <a:t>Introduction to Operating Systems</a:t>
             </a:r>
             <a:endParaRPr lang="en-US" dirty="0"/>
           </a:p>
@@ -3937,6 +3940,36 @@
           <p:cNvPicPr>
             <a:picLocks noChangeAspect="1"/>
           </p:cNvPicPr>
+          <p:nvPr/>
+        </p:nvPicPr>
+        <p:blipFill>
+          <a:blip r:embed="rId14">
+            <a:extLst>
+              <a:ext uri="{28A0092B-C50C-407E-A947-70E740481C1C}">
+                <a14:useLocalDpi xmlns:a14="http://schemas.microsoft.com/office/drawing/2010/main" val="0"/>
+              </a:ext>
+            </a:extLst>
+          </a:blip>
+          <a:stretch>
+            <a:fillRect/>
+          </a:stretch>
+        </p:blipFill>
+        <p:spPr>
+          <a:xfrm>
+            <a:off x="10783565" y="5337415"/>
+            <a:ext cx="1723748" cy="1225406"/>
+          </a:xfrm>
+          <a:prstGeom prst="rect">
+            <a:avLst/>
+          </a:prstGeom>
+        </p:spPr>
+      </p:pic>
+      <p:pic>
+        <p:nvPicPr>
+          <p:cNvPr id="13" name="Picture 12" descr="FREEBSDF_Logo_Pos_CMYK.pdf"/>
+          <p:cNvPicPr>
+            <a:picLocks noChangeAspect="1"/>
+          </p:cNvPicPr>
           <p:nvPr userDrawn="1"/>
         </p:nvPicPr>
         <p:blipFill>
@@ -3964,23 +3997,23 @@
     </p:spTree>
     <p:extLst>
       <p:ext uri="{BB962C8B-B14F-4D97-AF65-F5344CB8AC3E}">
-        <p14:creationId xmlns:p14="http://schemas.microsoft.com/office/powerpoint/2010/main" val="1247989489"/>
+        <p14:creationId xmlns:p14="http://schemas.microsoft.com/office/powerpoint/2010/main" val="879440852"/>
       </p:ext>
     </p:extLst>
   </p:cSld>
   <p:clrMap bg1="lt1" tx1="dk1" bg2="lt2" tx2="dk2" accent1="accent1" accent2="accent2" accent3="accent3" accent4="accent4" accent5="accent5" accent6="accent6" hlink="hlink" folHlink="folHlink"/>
   <p:sldLayoutIdLst>
-    <p:sldLayoutId id="2147483787" r:id="rId1"/>
-    <p:sldLayoutId id="2147483788" r:id="rId2"/>
-    <p:sldLayoutId id="2147483789" r:id="rId3"/>
-    <p:sldLayoutId id="2147483790" r:id="rId4"/>
-    <p:sldLayoutId id="2147483791" r:id="rId5"/>
-    <p:sldLayoutId id="2147483792" r:id="rId6"/>
-    <p:sldLayoutId id="2147483793" r:id="rId7"/>
-    <p:sldLayoutId id="2147483794" r:id="rId8"/>
-    <p:sldLayoutId id="2147483795" r:id="rId9"/>
-    <p:sldLayoutId id="2147483796" r:id="rId10"/>
-    <p:sldLayoutId id="2147483797" r:id="rId11"/>
+    <p:sldLayoutId id="2147483895" r:id="rId1"/>
+    <p:sldLayoutId id="2147483896" r:id="rId2"/>
+    <p:sldLayoutId id="2147483897" r:id="rId3"/>
+    <p:sldLayoutId id="2147483898" r:id="rId4"/>
+    <p:sldLayoutId id="2147483899" r:id="rId5"/>
+    <p:sldLayoutId id="2147483900" r:id="rId6"/>
+    <p:sldLayoutId id="2147483901" r:id="rId7"/>
+    <p:sldLayoutId id="2147483902" r:id="rId8"/>
+    <p:sldLayoutId id="2147483903" r:id="rId9"/>
+    <p:sldLayoutId id="2147483904" r:id="rId10"/>
+    <p:sldLayoutId id="2147483905" r:id="rId11"/>
   </p:sldLayoutIdLst>
   <p:timing>
     <p:tnLst>
@@ -4399,7 +4432,6 @@
               <a:rPr lang="en-US" dirty="0"/>
               <a:t>Introduction to Operating Systems</a:t>
             </a:r>
-            <a:endParaRPr lang="en-US" dirty="0"/>
           </a:p>
         </p:txBody>
       </p:sp>
@@ -4432,7 +4464,6 @@
               <a:rPr lang="en-US" dirty="0" smtClean="0"/>
               <a:t>experimentation</a:t>
             </a:r>
-            <a:endParaRPr lang="en-US" dirty="0" smtClean="0"/>
           </a:p>
           <a:p>
             <a:r>
@@ -4467,6 +4498,582 @@
 </p:sld>
 </file>
 
+<file path=ppt/slides/slide10.xml><?xml version="1.0" encoding="utf-8"?>
+<p:sld xmlns:a="http://schemas.openxmlformats.org/drawingml/2006/main" xmlns:r="http://schemas.openxmlformats.org/officeDocument/2006/relationships" xmlns:p="http://schemas.openxmlformats.org/presentationml/2006/main">
+  <p:cSld>
+    <p:spTree>
+      <p:nvGrpSpPr>
+        <p:cNvPr id="1" name=""/>
+        <p:cNvGrpSpPr/>
+        <p:nvPr/>
+      </p:nvGrpSpPr>
+      <p:grpSpPr>
+        <a:xfrm>
+          <a:off x="0" y="0"/>
+          <a:ext cx="0" cy="0"/>
+          <a:chOff x="0" y="0"/>
+          <a:chExt cx="0" cy="0"/>
+        </a:xfrm>
+      </p:grpSpPr>
+      <p:sp>
+        <p:nvSpPr>
+          <p:cNvPr id="2" name="Title 1"/>
+          <p:cNvSpPr>
+            <a:spLocks noGrp="1"/>
+          </p:cNvSpPr>
+          <p:nvPr>
+            <p:ph type="title"/>
+          </p:nvPr>
+        </p:nvSpPr>
+        <p:spPr/>
+        <p:txBody>
+          <a:bodyPr/>
+          <a:lstStyle/>
+          <a:p>
+            <a:r>
+              <a:rPr lang="en-US" dirty="0" smtClean="0"/>
+              <a:t>Looking at read()</a:t>
+            </a:r>
+            <a:endParaRPr lang="en-US" dirty="0"/>
+          </a:p>
+        </p:txBody>
+      </p:sp>
+      <p:sp>
+        <p:nvSpPr>
+          <p:cNvPr id="3" name="Content Placeholder 2"/>
+          <p:cNvSpPr>
+            <a:spLocks noGrp="1"/>
+          </p:cNvSpPr>
+          <p:nvPr>
+            <p:ph idx="1"/>
+          </p:nvPr>
+        </p:nvSpPr>
+        <p:spPr/>
+        <p:txBody>
+          <a:bodyPr/>
+          <a:lstStyle/>
+          <a:p>
+            <a:r>
+              <a:rPr lang="en-US" dirty="0" smtClean="0"/>
+              <a:t>How do we get into the kernel?</a:t>
+            </a:r>
+          </a:p>
+          <a:p>
+            <a:r>
+              <a:rPr lang="en-US" dirty="0" smtClean="0"/>
+              <a:t>How do we get out of the kernel?</a:t>
+            </a:r>
+          </a:p>
+          <a:p>
+            <a:endParaRPr lang="en-US" dirty="0" smtClean="0"/>
+          </a:p>
+        </p:txBody>
+      </p:sp>
+      <p:sp>
+        <p:nvSpPr>
+          <p:cNvPr id="4" name="Date Placeholder 3"/>
+          <p:cNvSpPr>
+            <a:spLocks noGrp="1"/>
+          </p:cNvSpPr>
+          <p:nvPr>
+            <p:ph type="dt" sz="half" idx="10"/>
+          </p:nvPr>
+        </p:nvSpPr>
+        <p:spPr/>
+        <p:txBody>
+          <a:bodyPr/>
+          <a:lstStyle/>
+          <a:p>
+            <a:fld id="{99311E37-C315-3B4A-B201-9AB4597F7929}" type="datetime1">
+              <a:rPr lang="en-US" smtClean="0"/>
+              <a:t>2/12/17</a:t>
+            </a:fld>
+            <a:endParaRPr lang="en-US"/>
+          </a:p>
+        </p:txBody>
+      </p:sp>
+      <p:sp>
+        <p:nvSpPr>
+          <p:cNvPr id="5" name="Footer Placeholder 4"/>
+          <p:cNvSpPr>
+            <a:spLocks noGrp="1"/>
+          </p:cNvSpPr>
+          <p:nvPr>
+            <p:ph type="ftr" sz="quarter" idx="11"/>
+          </p:nvPr>
+        </p:nvSpPr>
+        <p:spPr/>
+        <p:txBody>
+          <a:bodyPr/>
+          <a:lstStyle/>
+          <a:p>
+            <a:r>
+              <a:rPr lang="en-US" smtClean="0"/>
+              <a:t>Introduction to Operating Systems</a:t>
+            </a:r>
+            <a:endParaRPr lang="en-US" dirty="0"/>
+          </a:p>
+        </p:txBody>
+      </p:sp>
+      <p:sp>
+        <p:nvSpPr>
+          <p:cNvPr id="6" name="Slide Number Placeholder 5"/>
+          <p:cNvSpPr>
+            <a:spLocks noGrp="1"/>
+          </p:cNvSpPr>
+          <p:nvPr>
+            <p:ph type="sldNum" sz="quarter" idx="12"/>
+          </p:nvPr>
+        </p:nvSpPr>
+        <p:spPr/>
+        <p:txBody>
+          <a:bodyPr/>
+          <a:lstStyle/>
+          <a:p>
+            <a:fld id="{699C44C4-0FAD-8046-A5C4-05AB318FA424}" type="slidenum">
+              <a:rPr lang="en-US" smtClean="0"/>
+              <a:t>10</a:t>
+            </a:fld>
+            <a:endParaRPr lang="en-US"/>
+          </a:p>
+        </p:txBody>
+      </p:sp>
+    </p:spTree>
+    <p:extLst>
+      <p:ext uri="{BB962C8B-B14F-4D97-AF65-F5344CB8AC3E}">
+        <p14:creationId xmlns:p14="http://schemas.microsoft.com/office/powerpoint/2010/main" val="1716288803"/>
+      </p:ext>
+    </p:extLst>
+  </p:cSld>
+  <p:clrMapOvr>
+    <a:masterClrMapping/>
+  </p:clrMapOvr>
+</p:sld>
+</file>
+
+<file path=ppt/slides/slide11.xml><?xml version="1.0" encoding="utf-8"?>
+<p:sld xmlns:a="http://schemas.openxmlformats.org/drawingml/2006/main" xmlns:r="http://schemas.openxmlformats.org/officeDocument/2006/relationships" xmlns:p="http://schemas.openxmlformats.org/presentationml/2006/main">
+  <p:cSld>
+    <p:spTree>
+      <p:nvGrpSpPr>
+        <p:cNvPr id="1" name=""/>
+        <p:cNvGrpSpPr/>
+        <p:nvPr/>
+      </p:nvGrpSpPr>
+      <p:grpSpPr>
+        <a:xfrm>
+          <a:off x="0" y="0"/>
+          <a:ext cx="0" cy="0"/>
+          <a:chOff x="0" y="0"/>
+          <a:chExt cx="0" cy="0"/>
+        </a:xfrm>
+      </p:grpSpPr>
+      <p:sp>
+        <p:nvSpPr>
+          <p:cNvPr id="2" name="Title 1"/>
+          <p:cNvSpPr>
+            <a:spLocks noGrp="1"/>
+          </p:cNvSpPr>
+          <p:nvPr>
+            <p:ph type="title"/>
+          </p:nvPr>
+        </p:nvSpPr>
+        <p:spPr/>
+        <p:txBody>
+          <a:bodyPr/>
+          <a:lstStyle/>
+          <a:p>
+            <a:r>
+              <a:rPr lang="en-US" dirty="0" smtClean="0"/>
+              <a:t>It’s a trap!</a:t>
+            </a:r>
+            <a:endParaRPr lang="en-US" dirty="0"/>
+          </a:p>
+        </p:txBody>
+      </p:sp>
+      <p:sp>
+        <p:nvSpPr>
+          <p:cNvPr id="3" name="Content Placeholder 2"/>
+          <p:cNvSpPr>
+            <a:spLocks noGrp="1"/>
+          </p:cNvSpPr>
+          <p:nvPr>
+            <p:ph idx="1"/>
+          </p:nvPr>
+        </p:nvSpPr>
+        <p:spPr/>
+        <p:txBody>
+          <a:bodyPr/>
+          <a:lstStyle/>
+          <a:p>
+            <a:endParaRPr lang="en-US"/>
+          </a:p>
+        </p:txBody>
+      </p:sp>
+      <p:sp>
+        <p:nvSpPr>
+          <p:cNvPr id="4" name="Date Placeholder 3"/>
+          <p:cNvSpPr>
+            <a:spLocks noGrp="1"/>
+          </p:cNvSpPr>
+          <p:nvPr>
+            <p:ph type="dt" sz="half" idx="10"/>
+          </p:nvPr>
+        </p:nvSpPr>
+        <p:spPr/>
+        <p:txBody>
+          <a:bodyPr/>
+          <a:lstStyle/>
+          <a:p>
+            <a:fld id="{AF8B7379-1718-C64B-92D7-035C49E880B4}" type="datetime1">
+              <a:rPr lang="en-US" smtClean="0"/>
+              <a:t>2/12/17</a:t>
+            </a:fld>
+            <a:endParaRPr lang="en-US"/>
+          </a:p>
+        </p:txBody>
+      </p:sp>
+      <p:sp>
+        <p:nvSpPr>
+          <p:cNvPr id="5" name="Footer Placeholder 4"/>
+          <p:cNvSpPr>
+            <a:spLocks noGrp="1"/>
+          </p:cNvSpPr>
+          <p:nvPr>
+            <p:ph type="ftr" sz="quarter" idx="11"/>
+          </p:nvPr>
+        </p:nvSpPr>
+        <p:spPr/>
+        <p:txBody>
+          <a:bodyPr/>
+          <a:lstStyle/>
+          <a:p>
+            <a:r>
+              <a:rPr lang="en-US" smtClean="0"/>
+              <a:t>Introduction to Operating Systems</a:t>
+            </a:r>
+            <a:endParaRPr lang="en-US" dirty="0"/>
+          </a:p>
+        </p:txBody>
+      </p:sp>
+      <p:sp>
+        <p:nvSpPr>
+          <p:cNvPr id="6" name="Slide Number Placeholder 5"/>
+          <p:cNvSpPr>
+            <a:spLocks noGrp="1"/>
+          </p:cNvSpPr>
+          <p:nvPr>
+            <p:ph type="sldNum" sz="quarter" idx="12"/>
+          </p:nvPr>
+        </p:nvSpPr>
+        <p:spPr/>
+        <p:txBody>
+          <a:bodyPr/>
+          <a:lstStyle/>
+          <a:p>
+            <a:fld id="{699C44C4-0FAD-8046-A5C4-05AB318FA424}" type="slidenum">
+              <a:rPr lang="en-US" smtClean="0"/>
+              <a:t>11</a:t>
+            </a:fld>
+            <a:endParaRPr lang="en-US"/>
+          </a:p>
+        </p:txBody>
+      </p:sp>
+    </p:spTree>
+    <p:extLst>
+      <p:ext uri="{BB962C8B-B14F-4D97-AF65-F5344CB8AC3E}">
+        <p14:creationId xmlns:p14="http://schemas.microsoft.com/office/powerpoint/2010/main" val="1335855769"/>
+      </p:ext>
+    </p:extLst>
+  </p:cSld>
+  <p:clrMapOvr>
+    <a:masterClrMapping/>
+  </p:clrMapOvr>
+</p:sld>
+</file>
+
+<file path=ppt/slides/slide12.xml><?xml version="1.0" encoding="utf-8"?>
+<p:sld xmlns:a="http://schemas.openxmlformats.org/drawingml/2006/main" xmlns:r="http://schemas.openxmlformats.org/officeDocument/2006/relationships" xmlns:p="http://schemas.openxmlformats.org/presentationml/2006/main">
+  <p:cSld>
+    <p:spTree>
+      <p:nvGrpSpPr>
+        <p:cNvPr id="1" name=""/>
+        <p:cNvGrpSpPr/>
+        <p:nvPr/>
+      </p:nvGrpSpPr>
+      <p:grpSpPr>
+        <a:xfrm>
+          <a:off x="0" y="0"/>
+          <a:ext cx="0" cy="0"/>
+          <a:chOff x="0" y="0"/>
+          <a:chExt cx="0" cy="0"/>
+        </a:xfrm>
+      </p:grpSpPr>
+      <p:sp>
+        <p:nvSpPr>
+          <p:cNvPr id="2" name="Title 1"/>
+          <p:cNvSpPr>
+            <a:spLocks noGrp="1"/>
+          </p:cNvSpPr>
+          <p:nvPr>
+            <p:ph type="title"/>
+          </p:nvPr>
+        </p:nvSpPr>
+        <p:spPr/>
+        <p:txBody>
+          <a:bodyPr/>
+          <a:lstStyle/>
+          <a:p>
+            <a:r>
+              <a:rPr lang="en-US" dirty="0" smtClean="0"/>
+              <a:t>Machine Dependent Code</a:t>
+            </a:r>
+            <a:endParaRPr lang="en-US" dirty="0"/>
+          </a:p>
+        </p:txBody>
+      </p:sp>
+      <p:sp>
+        <p:nvSpPr>
+          <p:cNvPr id="3" name="Content Placeholder 2"/>
+          <p:cNvSpPr>
+            <a:spLocks noGrp="1"/>
+          </p:cNvSpPr>
+          <p:nvPr>
+            <p:ph idx="1"/>
+          </p:nvPr>
+        </p:nvSpPr>
+        <p:spPr/>
+        <p:txBody>
+          <a:bodyPr/>
+          <a:lstStyle/>
+          <a:p>
+            <a:endParaRPr lang="en-US"/>
+          </a:p>
+        </p:txBody>
+      </p:sp>
+      <p:sp>
+        <p:nvSpPr>
+          <p:cNvPr id="4" name="Date Placeholder 3"/>
+          <p:cNvSpPr>
+            <a:spLocks noGrp="1"/>
+          </p:cNvSpPr>
+          <p:nvPr>
+            <p:ph type="dt" sz="half" idx="10"/>
+          </p:nvPr>
+        </p:nvSpPr>
+        <p:spPr/>
+        <p:txBody>
+          <a:bodyPr/>
+          <a:lstStyle/>
+          <a:p>
+            <a:fld id="{B93E4341-2643-1A46-841A-700BAAAF4B09}" type="datetime1">
+              <a:rPr lang="en-US" smtClean="0"/>
+              <a:t>2/12/17</a:t>
+            </a:fld>
+            <a:endParaRPr lang="en-US"/>
+          </a:p>
+        </p:txBody>
+      </p:sp>
+      <p:sp>
+        <p:nvSpPr>
+          <p:cNvPr id="5" name="Footer Placeholder 4"/>
+          <p:cNvSpPr>
+            <a:spLocks noGrp="1"/>
+          </p:cNvSpPr>
+          <p:nvPr>
+            <p:ph type="ftr" sz="quarter" idx="11"/>
+          </p:nvPr>
+        </p:nvSpPr>
+        <p:spPr/>
+        <p:txBody>
+          <a:bodyPr/>
+          <a:lstStyle/>
+          <a:p>
+            <a:r>
+              <a:rPr lang="en-US" smtClean="0"/>
+              <a:t>Introduction to Operating Systems</a:t>
+            </a:r>
+            <a:endParaRPr lang="en-US" dirty="0"/>
+          </a:p>
+        </p:txBody>
+      </p:sp>
+      <p:sp>
+        <p:nvSpPr>
+          <p:cNvPr id="6" name="Slide Number Placeholder 5"/>
+          <p:cNvSpPr>
+            <a:spLocks noGrp="1"/>
+          </p:cNvSpPr>
+          <p:nvPr>
+            <p:ph type="sldNum" sz="quarter" idx="12"/>
+          </p:nvPr>
+        </p:nvSpPr>
+        <p:spPr/>
+        <p:txBody>
+          <a:bodyPr/>
+          <a:lstStyle/>
+          <a:p>
+            <a:fld id="{699C44C4-0FAD-8046-A5C4-05AB318FA424}" type="slidenum">
+              <a:rPr lang="en-US" smtClean="0"/>
+              <a:t>12</a:t>
+            </a:fld>
+            <a:endParaRPr lang="en-US"/>
+          </a:p>
+        </p:txBody>
+      </p:sp>
+    </p:spTree>
+    <p:extLst>
+      <p:ext uri="{BB962C8B-B14F-4D97-AF65-F5344CB8AC3E}">
+        <p14:creationId xmlns:p14="http://schemas.microsoft.com/office/powerpoint/2010/main" val="1276467652"/>
+      </p:ext>
+    </p:extLst>
+  </p:cSld>
+  <p:clrMapOvr>
+    <a:masterClrMapping/>
+  </p:clrMapOvr>
+</p:sld>
+</file>
+
+<file path=ppt/slides/slide13.xml><?xml version="1.0" encoding="utf-8"?>
+<p:sld xmlns:a="http://schemas.openxmlformats.org/drawingml/2006/main" xmlns:r="http://schemas.openxmlformats.org/officeDocument/2006/relationships" xmlns:p="http://schemas.openxmlformats.org/presentationml/2006/main">
+  <p:cSld>
+    <p:spTree>
+      <p:nvGrpSpPr>
+        <p:cNvPr id="1" name=""/>
+        <p:cNvGrpSpPr/>
+        <p:nvPr/>
+      </p:nvGrpSpPr>
+      <p:grpSpPr>
+        <a:xfrm>
+          <a:off x="0" y="0"/>
+          <a:ext cx="0" cy="0"/>
+          <a:chOff x="0" y="0"/>
+          <a:chExt cx="0" cy="0"/>
+        </a:xfrm>
+      </p:grpSpPr>
+      <p:sp>
+        <p:nvSpPr>
+          <p:cNvPr id="2" name="Title 1"/>
+          <p:cNvSpPr>
+            <a:spLocks noGrp="1"/>
+          </p:cNvSpPr>
+          <p:nvPr>
+            <p:ph type="title"/>
+          </p:nvPr>
+        </p:nvSpPr>
+        <p:spPr/>
+        <p:txBody>
+          <a:bodyPr/>
+          <a:lstStyle/>
+          <a:p>
+            <a:r>
+              <a:rPr lang="en-US" dirty="0" smtClean="0"/>
+              <a:t>Return Values</a:t>
+            </a:r>
+            <a:endParaRPr lang="en-US" dirty="0"/>
+          </a:p>
+        </p:txBody>
+      </p:sp>
+      <p:sp>
+        <p:nvSpPr>
+          <p:cNvPr id="3" name="Content Placeholder 2"/>
+          <p:cNvSpPr>
+            <a:spLocks noGrp="1"/>
+          </p:cNvSpPr>
+          <p:nvPr>
+            <p:ph idx="1"/>
+          </p:nvPr>
+        </p:nvSpPr>
+        <p:spPr/>
+        <p:txBody>
+          <a:bodyPr/>
+          <a:lstStyle/>
+          <a:p>
+            <a:endParaRPr lang="en-US" dirty="0"/>
+          </a:p>
+        </p:txBody>
+      </p:sp>
+      <p:sp>
+        <p:nvSpPr>
+          <p:cNvPr id="4" name="Date Placeholder 3"/>
+          <p:cNvSpPr>
+            <a:spLocks noGrp="1"/>
+          </p:cNvSpPr>
+          <p:nvPr>
+            <p:ph type="dt" sz="half" idx="10"/>
+          </p:nvPr>
+        </p:nvSpPr>
+        <p:spPr/>
+        <p:txBody>
+          <a:bodyPr/>
+          <a:lstStyle/>
+          <a:p>
+            <a:fld id="{6ABBAAE6-49F2-8B41-B02F-F80914588232}" type="datetime1">
+              <a:rPr lang="en-US" smtClean="0"/>
+              <a:t>2/12/17</a:t>
+            </a:fld>
+            <a:endParaRPr lang="en-US"/>
+          </a:p>
+        </p:txBody>
+      </p:sp>
+      <p:sp>
+        <p:nvSpPr>
+          <p:cNvPr id="5" name="Footer Placeholder 4"/>
+          <p:cNvSpPr>
+            <a:spLocks noGrp="1"/>
+          </p:cNvSpPr>
+          <p:nvPr>
+            <p:ph type="ftr" sz="quarter" idx="11"/>
+          </p:nvPr>
+        </p:nvSpPr>
+        <p:spPr/>
+        <p:txBody>
+          <a:bodyPr/>
+          <a:lstStyle/>
+          <a:p>
+            <a:r>
+              <a:rPr lang="en-US" smtClean="0"/>
+              <a:t>Introduction to Operating Systems</a:t>
+            </a:r>
+            <a:endParaRPr lang="en-US" dirty="0"/>
+          </a:p>
+        </p:txBody>
+      </p:sp>
+      <p:sp>
+        <p:nvSpPr>
+          <p:cNvPr id="6" name="Slide Number Placeholder 5"/>
+          <p:cNvSpPr>
+            <a:spLocks noGrp="1"/>
+          </p:cNvSpPr>
+          <p:nvPr>
+            <p:ph type="sldNum" sz="quarter" idx="12"/>
+          </p:nvPr>
+        </p:nvSpPr>
+        <p:spPr/>
+        <p:txBody>
+          <a:bodyPr/>
+          <a:lstStyle/>
+          <a:p>
+            <a:fld id="{699C44C4-0FAD-8046-A5C4-05AB318FA424}" type="slidenum">
+              <a:rPr lang="en-US" smtClean="0"/>
+              <a:t>13</a:t>
+            </a:fld>
+            <a:endParaRPr lang="en-US"/>
+          </a:p>
+        </p:txBody>
+      </p:sp>
+    </p:spTree>
+    <p:extLst>
+      <p:ext uri="{BB962C8B-B14F-4D97-AF65-F5344CB8AC3E}">
+        <p14:creationId xmlns:p14="http://schemas.microsoft.com/office/powerpoint/2010/main" val="1098515382"/>
+      </p:ext>
+    </p:extLst>
+  </p:cSld>
+  <p:clrMapOvr>
+    <a:masterClrMapping/>
+  </p:clrMapOvr>
+</p:sld>
+</file>
+
 <file path=ppt/slides/slide2.xml><?xml version="1.0" encoding="utf-8"?>
 <p:sld xmlns:a="http://schemas.openxmlformats.org/drawingml/2006/main" xmlns:r="http://schemas.openxmlformats.org/officeDocument/2006/relationships" xmlns:p="http://schemas.openxmlformats.org/presentationml/2006/main">
   <p:cSld>
@@ -4541,9 +5148,9 @@
           <a:bodyPr/>
           <a:lstStyle/>
           <a:p>
-            <a:fld id="{BC4AE5AA-C6FF-5A4F-9D02-E3454F0B3602}" type="datetime1">
-              <a:rPr lang="en-US" smtClean="0"/>
-              <a:t>2/2/17</a:t>
+            <a:fld id="{E2C0EE0B-2D6D-114F-90A0-1A5ED23515E5}" type="datetime1">
+              <a:rPr lang="en-US" smtClean="0"/>
+              <a:t>2/12/17</a:t>
             </a:fld>
             <a:endParaRPr lang="en-US"/>
           </a:p>
@@ -4566,7 +5173,7 @@
           <a:p>
             <a:r>
               <a:rPr lang="en-US" smtClean="0"/>
-              <a:t>Developing Products with FreeBSD</a:t>
+              <a:t>Introduction to Operating Systems</a:t>
             </a:r>
             <a:endParaRPr lang="en-US" dirty="0"/>
           </a:p>
@@ -4704,9 +5311,9 @@
           <a:bodyPr/>
           <a:lstStyle/>
           <a:p>
-            <a:fld id="{BC4AE5AA-C6FF-5A4F-9D02-E3454F0B3602}" type="datetime1">
-              <a:rPr lang="en-US" smtClean="0"/>
-              <a:t>2/2/17</a:t>
+            <a:fld id="{A32CF29A-E5DE-AC4A-86A8-34EAC626459B}" type="datetime1">
+              <a:rPr lang="en-US" smtClean="0"/>
+              <a:t>2/12/17</a:t>
             </a:fld>
             <a:endParaRPr lang="en-US"/>
           </a:p>
@@ -4729,7 +5336,7 @@
           <a:p>
             <a:r>
               <a:rPr lang="en-US" smtClean="0"/>
-              <a:t>Developing Products with FreeBSD</a:t>
+              <a:t>Introduction to Operating Systems</a:t>
             </a:r>
             <a:endParaRPr lang="en-US" dirty="0"/>
           </a:p>
@@ -4845,9 +5452,9 @@
           <a:bodyPr/>
           <a:lstStyle/>
           <a:p>
-            <a:fld id="{BC4AE5AA-C6FF-5A4F-9D02-E3454F0B3602}" type="datetime1">
-              <a:rPr lang="en-US" smtClean="0"/>
-              <a:t>2/2/17</a:t>
+            <a:fld id="{5B2075ED-2BBF-F447-A78B-9507F923CB97}" type="datetime1">
+              <a:rPr lang="en-US" smtClean="0"/>
+              <a:t>2/12/17</a:t>
             </a:fld>
             <a:endParaRPr lang="en-US"/>
           </a:p>
@@ -4870,7 +5477,7 @@
           <a:p>
             <a:r>
               <a:rPr lang="en-US" smtClean="0"/>
-              <a:t>Developing Products with FreeBSD</a:t>
+              <a:t>Introduction to Operating Systems</a:t>
             </a:r>
             <a:endParaRPr lang="en-US" dirty="0"/>
           </a:p>
@@ -4946,7 +5553,7 @@
           <a:p>
             <a:r>
               <a:rPr lang="en-US" dirty="0" smtClean="0"/>
-              <a:t>Reading a File</a:t>
+              <a:t>System calls</a:t>
             </a:r>
             <a:endParaRPr lang="en-US" dirty="0"/>
           </a:p>
@@ -4964,48 +5571,220 @@
         </p:nvSpPr>
         <p:spPr/>
         <p:txBody>
-          <a:bodyPr/>
-          <a:lstStyle/>
-          <a:p>
-            <a:pPr marL="457200" indent="-457200">
+          <a:bodyPr>
+            <a:normAutofit fontScale="92500" lnSpcReduction="20000"/>
+          </a:bodyPr>
+          <a:lstStyle/>
+          <a:p>
+            <a:r>
+              <a:rPr lang="en-US" dirty="0" smtClean="0"/>
+              <a:t>User processes request kernel services via </a:t>
+            </a:r>
+            <a:r>
+              <a:rPr lang="en-US" b="1" dirty="0" smtClean="0"/>
+              <a:t>system calls</a:t>
+            </a:r>
+            <a:r>
+              <a:rPr lang="en-US" dirty="0" smtClean="0"/>
+              <a:t>:</a:t>
+            </a:r>
+          </a:p>
+          <a:p>
+            <a:pPr lvl="1"/>
+            <a:r>
+              <a:rPr lang="en-US" b="1" dirty="0" smtClean="0"/>
+              <a:t>Traps</a:t>
+            </a:r>
+            <a:r>
+              <a:rPr lang="en-US" dirty="0" smtClean="0"/>
+              <a:t> that model </a:t>
+            </a:r>
+            <a:r>
+              <a:rPr lang="en-US" b="1" dirty="0" smtClean="0"/>
+              <a:t>function-call semantics</a:t>
+            </a:r>
+            <a:endParaRPr lang="en-US" dirty="0"/>
+          </a:p>
+          <a:p>
+            <a:pPr lvl="1"/>
+            <a:r>
+              <a:rPr lang="en-US" dirty="0" smtClean="0"/>
+              <a:t>E.g.:</a:t>
+            </a:r>
+          </a:p>
+          <a:p>
+            <a:pPr lvl="2"/>
+            <a:r>
+              <a:rPr lang="en-US" dirty="0" smtClean="0">
+                <a:latin typeface="Source Code Pro" charset="0"/>
+                <a:ea typeface="Source Code Pro" charset="0"/>
+                <a:cs typeface="Source Code Pro" charset="0"/>
+              </a:rPr>
+              <a:t>open()</a:t>
+            </a:r>
+            <a:r>
+              <a:rPr lang="en-US" dirty="0" smtClean="0"/>
+              <a:t> opens a file and returns a file descriptor</a:t>
+            </a:r>
+          </a:p>
+          <a:p>
+            <a:pPr lvl="2"/>
+            <a:r>
+              <a:rPr lang="en-US" dirty="0" smtClean="0">
+                <a:latin typeface="Source Code Pro" charset="0"/>
+                <a:ea typeface="Source Code Pro" charset="0"/>
+                <a:cs typeface="Source Code Pro" charset="0"/>
+              </a:rPr>
+              <a:t>fork()</a:t>
+            </a:r>
+            <a:r>
+              <a:rPr lang="en-US" dirty="0" smtClean="0"/>
+              <a:t> creates a new process</a:t>
+            </a:r>
+          </a:p>
+          <a:p>
+            <a:r>
+              <a:rPr lang="en-US" dirty="0" smtClean="0"/>
+              <a:t>System calls appear to be library functions (e.g., </a:t>
+            </a:r>
+            <a:r>
+              <a:rPr lang="en-US" dirty="0" err="1" smtClean="0">
+                <a:latin typeface="Source Code Pro" charset="0"/>
+                <a:ea typeface="Source Code Pro" charset="0"/>
+                <a:cs typeface="Source Code Pro" charset="0"/>
+              </a:rPr>
+              <a:t>libc</a:t>
+            </a:r>
+            <a:r>
+              <a:rPr lang="en-US" dirty="0" smtClean="0"/>
+              <a:t>)</a:t>
+            </a:r>
+          </a:p>
+          <a:p>
+            <a:pPr marL="914400" lvl="1" indent="-457200">
               <a:buFont typeface="+mj-lt"/>
               <a:buAutoNum type="arabicPeriod"/>
             </a:pPr>
             <a:r>
               <a:rPr lang="en-US" dirty="0" smtClean="0"/>
-              <a:t>open()</a:t>
-            </a:r>
-          </a:p>
-          <a:p>
-            <a:pPr marL="457200" indent="-457200">
+              <a:t>Function triggers trap to transfer control to the kernel</a:t>
+            </a:r>
+          </a:p>
+          <a:p>
+            <a:pPr marL="914400" lvl="1" indent="-457200">
               <a:buFont typeface="+mj-lt"/>
               <a:buAutoNum type="arabicPeriod"/>
             </a:pPr>
             <a:r>
               <a:rPr lang="en-US" dirty="0" smtClean="0"/>
-              <a:t>read()</a:t>
-            </a:r>
-          </a:p>
-          <a:p>
-            <a:pPr marL="457200" indent="-457200">
+              <a:t>System-call arguments copied into kernel</a:t>
+            </a:r>
+          </a:p>
+          <a:p>
+            <a:pPr marL="914400" lvl="1" indent="-457200">
               <a:buFont typeface="+mj-lt"/>
               <a:buAutoNum type="arabicPeriod"/>
             </a:pPr>
             <a:r>
               <a:rPr lang="en-US" dirty="0" smtClean="0"/>
-              <a:t>close()</a:t>
-            </a:r>
-          </a:p>
-        </p:txBody>
-      </p:sp>
-      <p:sp>
-        <p:nvSpPr>
-          <p:cNvPr id="4" name="Date Placeholder 3"/>
-          <p:cNvSpPr>
-            <a:spLocks noGrp="1"/>
-          </p:cNvSpPr>
-          <p:nvPr>
-            <p:ph type="dt" sz="half" idx="10"/>
+              <a:t>Kernel implements service</a:t>
+            </a:r>
+          </a:p>
+          <a:p>
+            <a:pPr marL="914400" lvl="1" indent="-457200">
+              <a:buFont typeface="+mj-lt"/>
+              <a:buAutoNum type="arabicPeriod"/>
+            </a:pPr>
+            <a:r>
+              <a:rPr lang="en-US" dirty="0" smtClean="0"/>
+              <a:t>System-call return values copied out of kernel</a:t>
+            </a:r>
+          </a:p>
+          <a:p>
+            <a:pPr marL="914400" lvl="1" indent="-457200">
+              <a:buFont typeface="+mj-lt"/>
+              <a:buAutoNum type="arabicPeriod"/>
+            </a:pPr>
+            <a:r>
+              <a:rPr lang="en-US" dirty="0" smtClean="0"/>
+              <a:t>Kernel returns from trap to next user instruction</a:t>
+            </a:r>
+            <a:endParaRPr lang="en-US" dirty="0"/>
+          </a:p>
+          <a:p>
+            <a:r>
+              <a:rPr lang="en-US" dirty="0" smtClean="0"/>
+              <a:t>Some quirks relative to normal APIs; e.g.,</a:t>
+            </a:r>
+          </a:p>
+          <a:p>
+            <a:pPr lvl="1"/>
+            <a:r>
+              <a:rPr lang="en-US" dirty="0" smtClean="0"/>
+              <a:t>C return values via normal ABI calling convention</a:t>
+            </a:r>
+            <a:r>
+              <a:rPr lang="is-IS" dirty="0" smtClean="0"/>
+              <a:t>…</a:t>
+            </a:r>
+          </a:p>
+          <a:p>
+            <a:pPr lvl="1"/>
+            <a:r>
+              <a:rPr lang="is-IS" dirty="0" smtClean="0"/>
+              <a:t>... </a:t>
+            </a:r>
+            <a:r>
+              <a:rPr lang="en-US" dirty="0" smtClean="0"/>
+              <a:t>B</a:t>
+            </a:r>
+            <a:r>
+              <a:rPr lang="is-IS" dirty="0" smtClean="0"/>
+              <a:t>ut also per-thread </a:t>
+            </a:r>
+            <a:r>
+              <a:rPr lang="is-IS" dirty="0" smtClean="0">
+                <a:latin typeface="Source Code Pro" charset="0"/>
+                <a:ea typeface="Source Code Pro" charset="0"/>
+                <a:cs typeface="Source Code Pro" charset="0"/>
+              </a:rPr>
+              <a:t>errno</a:t>
+            </a:r>
+            <a:r>
+              <a:rPr lang="is-IS" dirty="0" smtClean="0"/>
+              <a:t> to report error conditions</a:t>
+            </a:r>
+          </a:p>
+          <a:p>
+            <a:pPr lvl="1"/>
+            <a:r>
+              <a:rPr lang="is-IS" dirty="0" smtClean="0"/>
+              <a:t>... </a:t>
+            </a:r>
+            <a:r>
+              <a:rPr lang="is-IS" dirty="0" smtClean="0">
+                <a:latin typeface="Source Code Pro" charset="0"/>
+                <a:ea typeface="Source Code Pro" charset="0"/>
+                <a:cs typeface="Source Code Pro" charset="0"/>
+              </a:rPr>
+              <a:t>EINTR</a:t>
+            </a:r>
+            <a:r>
+              <a:rPr lang="is-IS" dirty="0" smtClean="0"/>
+              <a:t>: for some calls, work got interrupted, try again</a:t>
+            </a:r>
+            <a:endParaRPr lang="en-US" dirty="0" smtClean="0"/>
+          </a:p>
+        </p:txBody>
+      </p:sp>
+      <p:sp>
+        <p:nvSpPr>
+          <p:cNvPr id="4" name="Footer Placeholder 3"/>
+          <p:cNvSpPr>
+            <a:spLocks noGrp="1"/>
+          </p:cNvSpPr>
+          <p:nvPr>
+            <p:ph type="ftr" sz="quarter" idx="11"/>
           </p:nvPr>
         </p:nvSpPr>
         <p:spPr/>
@@ -5013,22 +5792,22 @@
           <a:bodyPr/>
           <a:lstStyle/>
           <a:p>
-            <a:fld id="{BC4AE5AA-C6FF-5A4F-9D02-E3454F0B3602}" type="datetime1">
-              <a:rPr lang="en-US" smtClean="0"/>
-              <a:t>2/2/17</a:t>
-            </a:fld>
+            <a:r>
+              <a:rPr lang="en-US" smtClean="0"/>
+              <a:t>L41 Lecture 4 - The Process Model (2)</a:t>
+            </a:r>
             <a:endParaRPr lang="en-US"/>
           </a:p>
         </p:txBody>
       </p:sp>
       <p:sp>
         <p:nvSpPr>
-          <p:cNvPr id="5" name="Footer Placeholder 4"/>
-          <p:cNvSpPr>
-            <a:spLocks noGrp="1"/>
-          </p:cNvSpPr>
-          <p:nvPr>
-            <p:ph type="ftr" sz="quarter" idx="11"/>
+          <p:cNvPr id="5" name="Slide Number Placeholder 4"/>
+          <p:cNvSpPr>
+            <a:spLocks noGrp="1"/>
+          </p:cNvSpPr>
+          <p:nvPr>
+            <p:ph type="sldNum" sz="quarter" idx="12"/>
           </p:nvPr>
         </p:nvSpPr>
         <p:spPr/>
@@ -5036,30 +5815,7 @@
           <a:bodyPr/>
           <a:lstStyle/>
           <a:p>
-            <a:r>
-              <a:rPr lang="en-US" smtClean="0"/>
-              <a:t>Developing Products with FreeBSD</a:t>
-            </a:r>
-            <a:endParaRPr lang="en-US" dirty="0"/>
-          </a:p>
-        </p:txBody>
-      </p:sp>
-      <p:sp>
-        <p:nvSpPr>
-          <p:cNvPr id="6" name="Slide Number Placeholder 5"/>
-          <p:cNvSpPr>
-            <a:spLocks noGrp="1"/>
-          </p:cNvSpPr>
-          <p:nvPr>
-            <p:ph type="sldNum" sz="quarter" idx="12"/>
-          </p:nvPr>
-        </p:nvSpPr>
-        <p:spPr/>
-        <p:txBody>
-          <a:bodyPr/>
-          <a:lstStyle/>
-          <a:p>
-            <a:fld id="{699C44C4-0FAD-8046-A5C4-05AB318FA424}" type="slidenum">
+            <a:fld id="{4451A708-1483-F44A-AC56-12F69CC7793D}" type="slidenum">
               <a:rPr lang="en-US" smtClean="0"/>
               <a:t>5</a:t>
             </a:fld>
@@ -5070,13 +5826,688 @@
     </p:spTree>
     <p:extLst>
       <p:ext uri="{BB962C8B-B14F-4D97-AF65-F5344CB8AC3E}">
-        <p14:creationId xmlns:p14="http://schemas.microsoft.com/office/powerpoint/2010/main" val="233612583"/>
+        <p14:creationId xmlns:p14="http://schemas.microsoft.com/office/powerpoint/2010/main" val="788013025"/>
       </p:ext>
     </p:extLst>
   </p:cSld>
   <p:clrMapOvr>
     <a:masterClrMapping/>
   </p:clrMapOvr>
+  <p:timing>
+    <p:tnLst>
+      <p:par>
+        <p:cTn id="1" dur="indefinite" restart="never" nodeType="tmRoot">
+          <p:childTnLst>
+            <p:seq concurrent="1" nextAc="seek">
+              <p:cTn id="2" dur="indefinite" nodeType="mainSeq">
+                <p:childTnLst>
+                  <p:par>
+                    <p:cTn id="3" fill="hold">
+                      <p:stCondLst>
+                        <p:cond delay="indefinite"/>
+                      </p:stCondLst>
+                      <p:childTnLst>
+                        <p:par>
+                          <p:cTn id="4" fill="hold">
+                            <p:stCondLst>
+                              <p:cond delay="0"/>
+                            </p:stCondLst>
+                            <p:childTnLst>
+                              <p:par>
+                                <p:cTn id="5" presetID="1" presetClass="entr" presetSubtype="0" fill="hold" nodeType="clickEffect">
+                                  <p:stCondLst>
+                                    <p:cond delay="0"/>
+                                  </p:stCondLst>
+                                  <p:childTnLst>
+                                    <p:set>
+                                      <p:cBhvr>
+                                        <p:cTn id="6" dur="1" fill="hold">
+                                          <p:stCondLst>
+                                            <p:cond delay="0"/>
+                                          </p:stCondLst>
+                                        </p:cTn>
+                                        <p:tgtEl>
+                                          <p:spTgt spid="3">
+                                            <p:txEl>
+                                              <p:pRg st="0" end="0"/>
+                                            </p:txEl>
+                                          </p:spTgt>
+                                        </p:tgtEl>
+                                        <p:attrNameLst>
+                                          <p:attrName>style.visibility</p:attrName>
+                                        </p:attrNameLst>
+                                      </p:cBhvr>
+                                      <p:to>
+                                        <p:strVal val="visible"/>
+                                      </p:to>
+                                    </p:set>
+                                  </p:childTnLst>
+                                </p:cTn>
+                              </p:par>
+                            </p:childTnLst>
+                          </p:cTn>
+                        </p:par>
+                      </p:childTnLst>
+                    </p:cTn>
+                  </p:par>
+                  <p:par>
+                    <p:cTn id="7" fill="hold">
+                      <p:stCondLst>
+                        <p:cond delay="indefinite"/>
+                      </p:stCondLst>
+                      <p:childTnLst>
+                        <p:par>
+                          <p:cTn id="8" fill="hold">
+                            <p:stCondLst>
+                              <p:cond delay="0"/>
+                            </p:stCondLst>
+                            <p:childTnLst>
+                              <p:par>
+                                <p:cTn id="9" presetID="1" presetClass="entr" presetSubtype="0" fill="hold" nodeType="clickEffect">
+                                  <p:stCondLst>
+                                    <p:cond delay="0"/>
+                                  </p:stCondLst>
+                                  <p:childTnLst>
+                                    <p:set>
+                                      <p:cBhvr>
+                                        <p:cTn id="10" dur="1" fill="hold">
+                                          <p:stCondLst>
+                                            <p:cond delay="0"/>
+                                          </p:stCondLst>
+                                        </p:cTn>
+                                        <p:tgtEl>
+                                          <p:spTgt spid="3">
+                                            <p:txEl>
+                                              <p:pRg st="1" end="1"/>
+                                            </p:txEl>
+                                          </p:spTgt>
+                                        </p:tgtEl>
+                                        <p:attrNameLst>
+                                          <p:attrName>style.visibility</p:attrName>
+                                        </p:attrNameLst>
+                                      </p:cBhvr>
+                                      <p:to>
+                                        <p:strVal val="visible"/>
+                                      </p:to>
+                                    </p:set>
+                                  </p:childTnLst>
+                                </p:cTn>
+                              </p:par>
+                            </p:childTnLst>
+                          </p:cTn>
+                        </p:par>
+                      </p:childTnLst>
+                    </p:cTn>
+                  </p:par>
+                  <p:par>
+                    <p:cTn id="11" fill="hold">
+                      <p:stCondLst>
+                        <p:cond delay="indefinite"/>
+                      </p:stCondLst>
+                      <p:childTnLst>
+                        <p:par>
+                          <p:cTn id="12" fill="hold">
+                            <p:stCondLst>
+                              <p:cond delay="0"/>
+                            </p:stCondLst>
+                            <p:childTnLst>
+                              <p:par>
+                                <p:cTn id="13" presetID="1" presetClass="entr" presetSubtype="0" fill="hold" nodeType="clickEffect">
+                                  <p:stCondLst>
+                                    <p:cond delay="0"/>
+                                  </p:stCondLst>
+                                  <p:childTnLst>
+                                    <p:set>
+                                      <p:cBhvr>
+                                        <p:cTn id="14" dur="1" fill="hold">
+                                          <p:stCondLst>
+                                            <p:cond delay="0"/>
+                                          </p:stCondLst>
+                                        </p:cTn>
+                                        <p:tgtEl>
+                                          <p:spTgt spid="3">
+                                            <p:txEl>
+                                              <p:pRg st="2" end="2"/>
+                                            </p:txEl>
+                                          </p:spTgt>
+                                        </p:tgtEl>
+                                        <p:attrNameLst>
+                                          <p:attrName>style.visibility</p:attrName>
+                                        </p:attrNameLst>
+                                      </p:cBhvr>
+                                      <p:to>
+                                        <p:strVal val="visible"/>
+                                      </p:to>
+                                    </p:set>
+                                  </p:childTnLst>
+                                </p:cTn>
+                              </p:par>
+                              <p:par>
+                                <p:cTn id="15" presetID="1" presetClass="entr" presetSubtype="0" fill="hold" nodeType="withEffect">
+                                  <p:stCondLst>
+                                    <p:cond delay="0"/>
+                                  </p:stCondLst>
+                                  <p:childTnLst>
+                                    <p:set>
+                                      <p:cBhvr>
+                                        <p:cTn id="16" dur="1" fill="hold">
+                                          <p:stCondLst>
+                                            <p:cond delay="0"/>
+                                          </p:stCondLst>
+                                        </p:cTn>
+                                        <p:tgtEl>
+                                          <p:spTgt spid="3">
+                                            <p:txEl>
+                                              <p:pRg st="3" end="3"/>
+                                            </p:txEl>
+                                          </p:spTgt>
+                                        </p:tgtEl>
+                                        <p:attrNameLst>
+                                          <p:attrName>style.visibility</p:attrName>
+                                        </p:attrNameLst>
+                                      </p:cBhvr>
+                                      <p:to>
+                                        <p:strVal val="visible"/>
+                                      </p:to>
+                                    </p:set>
+                                  </p:childTnLst>
+                                </p:cTn>
+                              </p:par>
+                              <p:par>
+                                <p:cTn id="17" presetID="1" presetClass="entr" presetSubtype="0" fill="hold" nodeType="withEffect">
+                                  <p:stCondLst>
+                                    <p:cond delay="0"/>
+                                  </p:stCondLst>
+                                  <p:childTnLst>
+                                    <p:set>
+                                      <p:cBhvr>
+                                        <p:cTn id="18" dur="1" fill="hold">
+                                          <p:stCondLst>
+                                            <p:cond delay="0"/>
+                                          </p:stCondLst>
+                                        </p:cTn>
+                                        <p:tgtEl>
+                                          <p:spTgt spid="3">
+                                            <p:txEl>
+                                              <p:pRg st="4" end="4"/>
+                                            </p:txEl>
+                                          </p:spTgt>
+                                        </p:tgtEl>
+                                        <p:attrNameLst>
+                                          <p:attrName>style.visibility</p:attrName>
+                                        </p:attrNameLst>
+                                      </p:cBhvr>
+                                      <p:to>
+                                        <p:strVal val="visible"/>
+                                      </p:to>
+                                    </p:set>
+                                  </p:childTnLst>
+                                </p:cTn>
+                              </p:par>
+                            </p:childTnLst>
+                          </p:cTn>
+                        </p:par>
+                      </p:childTnLst>
+                    </p:cTn>
+                  </p:par>
+                  <p:par>
+                    <p:cTn id="19" fill="hold">
+                      <p:stCondLst>
+                        <p:cond delay="indefinite"/>
+                      </p:stCondLst>
+                      <p:childTnLst>
+                        <p:par>
+                          <p:cTn id="20" fill="hold">
+                            <p:stCondLst>
+                              <p:cond delay="0"/>
+                            </p:stCondLst>
+                            <p:childTnLst>
+                              <p:par>
+                                <p:cTn id="21" presetID="1" presetClass="entr" presetSubtype="0" fill="hold" nodeType="clickEffect">
+                                  <p:stCondLst>
+                                    <p:cond delay="0"/>
+                                  </p:stCondLst>
+                                  <p:childTnLst>
+                                    <p:set>
+                                      <p:cBhvr>
+                                        <p:cTn id="22" dur="1" fill="hold">
+                                          <p:stCondLst>
+                                            <p:cond delay="0"/>
+                                          </p:stCondLst>
+                                        </p:cTn>
+                                        <p:tgtEl>
+                                          <p:spTgt spid="3">
+                                            <p:txEl>
+                                              <p:pRg st="5" end="5"/>
+                                            </p:txEl>
+                                          </p:spTgt>
+                                        </p:tgtEl>
+                                        <p:attrNameLst>
+                                          <p:attrName>style.visibility</p:attrName>
+                                        </p:attrNameLst>
+                                      </p:cBhvr>
+                                      <p:to>
+                                        <p:strVal val="visible"/>
+                                      </p:to>
+                                    </p:set>
+                                  </p:childTnLst>
+                                </p:cTn>
+                              </p:par>
+                            </p:childTnLst>
+                          </p:cTn>
+                        </p:par>
+                      </p:childTnLst>
+                    </p:cTn>
+                  </p:par>
+                  <p:par>
+                    <p:cTn id="23" fill="hold">
+                      <p:stCondLst>
+                        <p:cond delay="indefinite"/>
+                      </p:stCondLst>
+                      <p:childTnLst>
+                        <p:par>
+                          <p:cTn id="24" fill="hold">
+                            <p:stCondLst>
+                              <p:cond delay="0"/>
+                            </p:stCondLst>
+                            <p:childTnLst>
+                              <p:par>
+                                <p:cTn id="25" presetID="1" presetClass="entr" presetSubtype="0" fill="hold" nodeType="clickEffect">
+                                  <p:stCondLst>
+                                    <p:cond delay="0"/>
+                                  </p:stCondLst>
+                                  <p:childTnLst>
+                                    <p:set>
+                                      <p:cBhvr>
+                                        <p:cTn id="26" dur="1" fill="hold">
+                                          <p:stCondLst>
+                                            <p:cond delay="0"/>
+                                          </p:stCondLst>
+                                        </p:cTn>
+                                        <p:tgtEl>
+                                          <p:spTgt spid="3">
+                                            <p:txEl>
+                                              <p:pRg st="6" end="6"/>
+                                            </p:txEl>
+                                          </p:spTgt>
+                                        </p:tgtEl>
+                                        <p:attrNameLst>
+                                          <p:attrName>style.visibility</p:attrName>
+                                        </p:attrNameLst>
+                                      </p:cBhvr>
+                                      <p:to>
+                                        <p:strVal val="visible"/>
+                                      </p:to>
+                                    </p:set>
+                                  </p:childTnLst>
+                                </p:cTn>
+                              </p:par>
+                            </p:childTnLst>
+                          </p:cTn>
+                        </p:par>
+                      </p:childTnLst>
+                    </p:cTn>
+                  </p:par>
+                  <p:par>
+                    <p:cTn id="27" fill="hold">
+                      <p:stCondLst>
+                        <p:cond delay="indefinite"/>
+                      </p:stCondLst>
+                      <p:childTnLst>
+                        <p:par>
+                          <p:cTn id="28" fill="hold">
+                            <p:stCondLst>
+                              <p:cond delay="0"/>
+                            </p:stCondLst>
+                            <p:childTnLst>
+                              <p:par>
+                                <p:cTn id="29" presetID="1" presetClass="entr" presetSubtype="0" fill="hold" nodeType="clickEffect">
+                                  <p:stCondLst>
+                                    <p:cond delay="0"/>
+                                  </p:stCondLst>
+                                  <p:childTnLst>
+                                    <p:set>
+                                      <p:cBhvr>
+                                        <p:cTn id="30" dur="1" fill="hold">
+                                          <p:stCondLst>
+                                            <p:cond delay="0"/>
+                                          </p:stCondLst>
+                                        </p:cTn>
+                                        <p:tgtEl>
+                                          <p:spTgt spid="3">
+                                            <p:txEl>
+                                              <p:pRg st="7" end="7"/>
+                                            </p:txEl>
+                                          </p:spTgt>
+                                        </p:tgtEl>
+                                        <p:attrNameLst>
+                                          <p:attrName>style.visibility</p:attrName>
+                                        </p:attrNameLst>
+                                      </p:cBhvr>
+                                      <p:to>
+                                        <p:strVal val="visible"/>
+                                      </p:to>
+                                    </p:set>
+                                  </p:childTnLst>
+                                </p:cTn>
+                              </p:par>
+                            </p:childTnLst>
+                          </p:cTn>
+                        </p:par>
+                      </p:childTnLst>
+                    </p:cTn>
+                  </p:par>
+                  <p:par>
+                    <p:cTn id="31" fill="hold">
+                      <p:stCondLst>
+                        <p:cond delay="indefinite"/>
+                      </p:stCondLst>
+                      <p:childTnLst>
+                        <p:par>
+                          <p:cTn id="32" fill="hold">
+                            <p:stCondLst>
+                              <p:cond delay="0"/>
+                            </p:stCondLst>
+                            <p:childTnLst>
+                              <p:par>
+                                <p:cTn id="33" presetID="1" presetClass="entr" presetSubtype="0" fill="hold" nodeType="clickEffect">
+                                  <p:stCondLst>
+                                    <p:cond delay="0"/>
+                                  </p:stCondLst>
+                                  <p:childTnLst>
+                                    <p:set>
+                                      <p:cBhvr>
+                                        <p:cTn id="34" dur="1" fill="hold">
+                                          <p:stCondLst>
+                                            <p:cond delay="0"/>
+                                          </p:stCondLst>
+                                        </p:cTn>
+                                        <p:tgtEl>
+                                          <p:spTgt spid="3">
+                                            <p:txEl>
+                                              <p:pRg st="8" end="8"/>
+                                            </p:txEl>
+                                          </p:spTgt>
+                                        </p:tgtEl>
+                                        <p:attrNameLst>
+                                          <p:attrName>style.visibility</p:attrName>
+                                        </p:attrNameLst>
+                                      </p:cBhvr>
+                                      <p:to>
+                                        <p:strVal val="visible"/>
+                                      </p:to>
+                                    </p:set>
+                                  </p:childTnLst>
+                                </p:cTn>
+                              </p:par>
+                            </p:childTnLst>
+                          </p:cTn>
+                        </p:par>
+                      </p:childTnLst>
+                    </p:cTn>
+                  </p:par>
+                  <p:par>
+                    <p:cTn id="35" fill="hold">
+                      <p:stCondLst>
+                        <p:cond delay="indefinite"/>
+                      </p:stCondLst>
+                      <p:childTnLst>
+                        <p:par>
+                          <p:cTn id="36" fill="hold">
+                            <p:stCondLst>
+                              <p:cond delay="0"/>
+                            </p:stCondLst>
+                            <p:childTnLst>
+                              <p:par>
+                                <p:cTn id="37" presetID="1" presetClass="entr" presetSubtype="0" fill="hold" nodeType="clickEffect">
+                                  <p:stCondLst>
+                                    <p:cond delay="0"/>
+                                  </p:stCondLst>
+                                  <p:childTnLst>
+                                    <p:set>
+                                      <p:cBhvr>
+                                        <p:cTn id="38" dur="1" fill="hold">
+                                          <p:stCondLst>
+                                            <p:cond delay="0"/>
+                                          </p:stCondLst>
+                                        </p:cTn>
+                                        <p:tgtEl>
+                                          <p:spTgt spid="3">
+                                            <p:txEl>
+                                              <p:pRg st="9" end="9"/>
+                                            </p:txEl>
+                                          </p:spTgt>
+                                        </p:tgtEl>
+                                        <p:attrNameLst>
+                                          <p:attrName>style.visibility</p:attrName>
+                                        </p:attrNameLst>
+                                      </p:cBhvr>
+                                      <p:to>
+                                        <p:strVal val="visible"/>
+                                      </p:to>
+                                    </p:set>
+                                  </p:childTnLst>
+                                </p:cTn>
+                              </p:par>
+                            </p:childTnLst>
+                          </p:cTn>
+                        </p:par>
+                      </p:childTnLst>
+                    </p:cTn>
+                  </p:par>
+                  <p:par>
+                    <p:cTn id="39" fill="hold">
+                      <p:stCondLst>
+                        <p:cond delay="indefinite"/>
+                      </p:stCondLst>
+                      <p:childTnLst>
+                        <p:par>
+                          <p:cTn id="40" fill="hold">
+                            <p:stCondLst>
+                              <p:cond delay="0"/>
+                            </p:stCondLst>
+                            <p:childTnLst>
+                              <p:par>
+                                <p:cTn id="41" presetID="1" presetClass="entr" presetSubtype="0" fill="hold" nodeType="clickEffect">
+                                  <p:stCondLst>
+                                    <p:cond delay="0"/>
+                                  </p:stCondLst>
+                                  <p:childTnLst>
+                                    <p:set>
+                                      <p:cBhvr>
+                                        <p:cTn id="42" dur="1" fill="hold">
+                                          <p:stCondLst>
+                                            <p:cond delay="0"/>
+                                          </p:stCondLst>
+                                        </p:cTn>
+                                        <p:tgtEl>
+                                          <p:spTgt spid="3">
+                                            <p:txEl>
+                                              <p:pRg st="10" end="10"/>
+                                            </p:txEl>
+                                          </p:spTgt>
+                                        </p:tgtEl>
+                                        <p:attrNameLst>
+                                          <p:attrName>style.visibility</p:attrName>
+                                        </p:attrNameLst>
+                                      </p:cBhvr>
+                                      <p:to>
+                                        <p:strVal val="visible"/>
+                                      </p:to>
+                                    </p:set>
+                                  </p:childTnLst>
+                                </p:cTn>
+                              </p:par>
+                            </p:childTnLst>
+                          </p:cTn>
+                        </p:par>
+                      </p:childTnLst>
+                    </p:cTn>
+                  </p:par>
+                  <p:par>
+                    <p:cTn id="43" fill="hold">
+                      <p:stCondLst>
+                        <p:cond delay="indefinite"/>
+                      </p:stCondLst>
+                      <p:childTnLst>
+                        <p:par>
+                          <p:cTn id="44" fill="hold">
+                            <p:stCondLst>
+                              <p:cond delay="0"/>
+                            </p:stCondLst>
+                            <p:childTnLst>
+                              <p:par>
+                                <p:cTn id="45" presetID="1" presetClass="entr" presetSubtype="0" fill="hold" nodeType="clickEffect">
+                                  <p:stCondLst>
+                                    <p:cond delay="0"/>
+                                  </p:stCondLst>
+                                  <p:childTnLst>
+                                    <p:set>
+                                      <p:cBhvr>
+                                        <p:cTn id="46" dur="1" fill="hold">
+                                          <p:stCondLst>
+                                            <p:cond delay="0"/>
+                                          </p:stCondLst>
+                                        </p:cTn>
+                                        <p:tgtEl>
+                                          <p:spTgt spid="3">
+                                            <p:txEl>
+                                              <p:pRg st="11" end="11"/>
+                                            </p:txEl>
+                                          </p:spTgt>
+                                        </p:tgtEl>
+                                        <p:attrNameLst>
+                                          <p:attrName>style.visibility</p:attrName>
+                                        </p:attrNameLst>
+                                      </p:cBhvr>
+                                      <p:to>
+                                        <p:strVal val="visible"/>
+                                      </p:to>
+                                    </p:set>
+                                  </p:childTnLst>
+                                </p:cTn>
+                              </p:par>
+                              <p:par>
+                                <p:cTn id="47" presetID="1" presetClass="entr" presetSubtype="0" fill="hold" nodeType="withEffect">
+                                  <p:stCondLst>
+                                    <p:cond delay="0"/>
+                                  </p:stCondLst>
+                                  <p:childTnLst>
+                                    <p:set>
+                                      <p:cBhvr>
+                                        <p:cTn id="48" dur="1" fill="hold">
+                                          <p:stCondLst>
+                                            <p:cond delay="0"/>
+                                          </p:stCondLst>
+                                        </p:cTn>
+                                        <p:tgtEl>
+                                          <p:spTgt spid="3">
+                                            <p:txEl>
+                                              <p:pRg st="12" end="12"/>
+                                            </p:txEl>
+                                          </p:spTgt>
+                                        </p:tgtEl>
+                                        <p:attrNameLst>
+                                          <p:attrName>style.visibility</p:attrName>
+                                        </p:attrNameLst>
+                                      </p:cBhvr>
+                                      <p:to>
+                                        <p:strVal val="visible"/>
+                                      </p:to>
+                                    </p:set>
+                                  </p:childTnLst>
+                                </p:cTn>
+                              </p:par>
+                              <p:par>
+                                <p:cTn id="49" presetID="1" presetClass="entr" presetSubtype="0" fill="hold" nodeType="withEffect">
+                                  <p:stCondLst>
+                                    <p:cond delay="0"/>
+                                  </p:stCondLst>
+                                  <p:childTnLst>
+                                    <p:set>
+                                      <p:cBhvr>
+                                        <p:cTn id="50" dur="1" fill="hold">
+                                          <p:stCondLst>
+                                            <p:cond delay="0"/>
+                                          </p:stCondLst>
+                                        </p:cTn>
+                                        <p:tgtEl>
+                                          <p:spTgt spid="3">
+                                            <p:txEl>
+                                              <p:pRg st="13" end="13"/>
+                                            </p:txEl>
+                                          </p:spTgt>
+                                        </p:tgtEl>
+                                        <p:attrNameLst>
+                                          <p:attrName>style.visibility</p:attrName>
+                                        </p:attrNameLst>
+                                      </p:cBhvr>
+                                      <p:to>
+                                        <p:strVal val="visible"/>
+                                      </p:to>
+                                    </p:set>
+                                  </p:childTnLst>
+                                </p:cTn>
+                              </p:par>
+                              <p:par>
+                                <p:cTn id="51" presetID="1" presetClass="entr" presetSubtype="0" fill="hold" nodeType="withEffect">
+                                  <p:stCondLst>
+                                    <p:cond delay="0"/>
+                                  </p:stCondLst>
+                                  <p:childTnLst>
+                                    <p:set>
+                                      <p:cBhvr>
+                                        <p:cTn id="52" dur="1" fill="hold">
+                                          <p:stCondLst>
+                                            <p:cond delay="0"/>
+                                          </p:stCondLst>
+                                        </p:cTn>
+                                        <p:tgtEl>
+                                          <p:spTgt spid="3">
+                                            <p:txEl>
+                                              <p:pRg st="14" end="14"/>
+                                            </p:txEl>
+                                          </p:spTgt>
+                                        </p:tgtEl>
+                                        <p:attrNameLst>
+                                          <p:attrName>style.visibility</p:attrName>
+                                        </p:attrNameLst>
+                                      </p:cBhvr>
+                                      <p:to>
+                                        <p:strVal val="visible"/>
+                                      </p:to>
+                                    </p:set>
+                                  </p:childTnLst>
+                                </p:cTn>
+                              </p:par>
+                            </p:childTnLst>
+                          </p:cTn>
+                        </p:par>
+                      </p:childTnLst>
+                    </p:cTn>
+                  </p:par>
+                </p:childTnLst>
+              </p:cTn>
+              <p:prevCondLst>
+                <p:cond evt="onPrev" delay="0">
+                  <p:tgtEl>
+                    <p:sldTgt/>
+                  </p:tgtEl>
+                </p:cond>
+              </p:prevCondLst>
+              <p:nextCondLst>
+                <p:cond evt="onNext" delay="0">
+                  <p:tgtEl>
+                    <p:sldTgt/>
+                  </p:tgtEl>
+                </p:cond>
+              </p:nextCondLst>
+            </p:seq>
+          </p:childTnLst>
+        </p:cTn>
+      </p:par>
+    </p:tnLst>
+  </p:timing>
 </p:sld>
 </file>
 
@@ -5114,7 +6545,7 @@
           <a:p>
             <a:r>
               <a:rPr lang="en-US" dirty="0" smtClean="0"/>
-              <a:t>Looking at read()</a:t>
+              <a:t>System-call synchrony</a:t>
             </a:r>
             <a:endParaRPr lang="en-US" dirty="0"/>
           </a:p>
@@ -5132,33 +6563,300 @@
         </p:nvSpPr>
         <p:spPr/>
         <p:txBody>
+          <a:bodyPr>
+            <a:normAutofit/>
+          </a:bodyPr>
+          <a:lstStyle/>
+          <a:p>
+            <a:r>
+              <a:rPr lang="en-US" dirty="0"/>
+              <a:t>M</a:t>
+            </a:r>
+            <a:r>
+              <a:rPr lang="en-US" dirty="0" smtClean="0"/>
+              <a:t>ost </a:t>
+            </a:r>
+            <a:r>
+              <a:rPr lang="en-US" dirty="0" err="1"/>
+              <a:t>syscalls</a:t>
+            </a:r>
+            <a:r>
+              <a:rPr lang="en-US" dirty="0"/>
+              <a:t> behave like </a:t>
+            </a:r>
+            <a:r>
+              <a:rPr lang="en-US" b="1" dirty="0" smtClean="0"/>
+              <a:t>synchronous</a:t>
+            </a:r>
+            <a:r>
+              <a:rPr lang="en-US" dirty="0" smtClean="0"/>
+              <a:t> C functions</a:t>
+            </a:r>
+            <a:endParaRPr lang="en-US" i="1" dirty="0"/>
+          </a:p>
+          <a:p>
+            <a:pPr lvl="1"/>
+            <a:r>
+              <a:rPr lang="en-US" dirty="0"/>
+              <a:t>Calls with arguments </a:t>
+            </a:r>
+            <a:r>
+              <a:rPr lang="en-US" dirty="0" smtClean="0"/>
+              <a:t>(</a:t>
+            </a:r>
+            <a:r>
+              <a:rPr lang="en-US" b="1" dirty="0" smtClean="0"/>
+              <a:t>by value </a:t>
+            </a:r>
+            <a:r>
+              <a:rPr lang="en-US" dirty="0" smtClean="0"/>
+              <a:t>or </a:t>
+            </a:r>
+            <a:r>
+              <a:rPr lang="en-US" b="1" dirty="0"/>
+              <a:t>by reference</a:t>
+            </a:r>
+            <a:r>
+              <a:rPr lang="en-US" dirty="0"/>
+              <a:t>)</a:t>
+            </a:r>
+          </a:p>
+          <a:p>
+            <a:pPr lvl="1"/>
+            <a:r>
+              <a:rPr lang="en-US" dirty="0"/>
+              <a:t>Return values (an </a:t>
+            </a:r>
+            <a:r>
+              <a:rPr lang="en-US" dirty="0" smtClean="0"/>
+              <a:t>integer/pointer or by </a:t>
+            </a:r>
+            <a:r>
+              <a:rPr lang="en-US" dirty="0"/>
+              <a:t>reference)</a:t>
+            </a:r>
+          </a:p>
+          <a:p>
+            <a:pPr lvl="1"/>
+            <a:r>
+              <a:rPr lang="en-US" dirty="0"/>
+              <a:t>When the caller regains control, the work is </a:t>
+            </a:r>
+            <a:r>
+              <a:rPr lang="en-US" dirty="0" smtClean="0"/>
+              <a:t>complete</a:t>
+            </a:r>
+          </a:p>
+          <a:p>
+            <a:pPr lvl="1"/>
+            <a:r>
+              <a:rPr lang="en-US" dirty="0" smtClean="0"/>
+              <a:t>E.g.:</a:t>
+            </a:r>
+            <a:endParaRPr lang="en-US" dirty="0"/>
+          </a:p>
+          <a:p>
+            <a:pPr lvl="2"/>
+            <a:r>
+              <a:rPr lang="en-US" dirty="0" err="1" smtClean="0">
+                <a:latin typeface="Source Code Pro" charset="0"/>
+                <a:ea typeface="Source Code Pro" charset="0"/>
+                <a:cs typeface="Source Code Pro" charset="0"/>
+              </a:rPr>
+              <a:t>getpid</a:t>
+            </a:r>
+            <a:r>
+              <a:rPr lang="en-US" dirty="0">
+                <a:latin typeface="Source Code Pro" charset="0"/>
+                <a:ea typeface="Source Code Pro" charset="0"/>
+                <a:cs typeface="Source Code Pro" charset="0"/>
+              </a:rPr>
+              <a:t>()</a:t>
+            </a:r>
+            <a:r>
+              <a:rPr lang="en-US" dirty="0"/>
+              <a:t> retrieves the </a:t>
+            </a:r>
+            <a:r>
+              <a:rPr lang="en-US" b="1" dirty="0"/>
+              <a:t>process ID</a:t>
+            </a:r>
+            <a:r>
+              <a:rPr lang="en-US" i="1" dirty="0"/>
+              <a:t> </a:t>
+            </a:r>
+            <a:r>
+              <a:rPr lang="en-US" dirty="0"/>
+              <a:t>via a return value</a:t>
+            </a:r>
+          </a:p>
+          <a:p>
+            <a:pPr lvl="2"/>
+            <a:r>
+              <a:rPr lang="en-US" dirty="0" smtClean="0">
+                <a:latin typeface="Source Code Pro" charset="0"/>
+                <a:ea typeface="Source Code Pro" charset="0"/>
+                <a:cs typeface="Source Code Pro" charset="0"/>
+              </a:rPr>
+              <a:t>read</a:t>
+            </a:r>
+            <a:r>
+              <a:rPr lang="en-US" dirty="0">
+                <a:latin typeface="Source Code Pro" charset="0"/>
+                <a:ea typeface="Source Code Pro" charset="0"/>
+                <a:cs typeface="Source Code Pro" charset="0"/>
+              </a:rPr>
+              <a:t>()</a:t>
+            </a:r>
+            <a:r>
+              <a:rPr lang="en-US" dirty="0"/>
+              <a:t> reads data from a file: on return, data in </a:t>
+            </a:r>
+            <a:r>
+              <a:rPr lang="en-US" dirty="0" smtClean="0"/>
+              <a:t>buffer</a:t>
+            </a:r>
+            <a:endParaRPr lang="en-US" dirty="0"/>
+          </a:p>
+          <a:p>
+            <a:r>
+              <a:rPr lang="en-US" dirty="0" smtClean="0"/>
+              <a:t>Some </a:t>
+            </a:r>
+            <a:r>
+              <a:rPr lang="en-US" dirty="0" err="1" smtClean="0"/>
+              <a:t>syscalls</a:t>
+            </a:r>
+            <a:r>
+              <a:rPr lang="en-US" dirty="0" smtClean="0"/>
+              <a:t> manipulate </a:t>
+            </a:r>
+            <a:r>
+              <a:rPr lang="en-US" b="1" dirty="0" smtClean="0"/>
+              <a:t>control flow </a:t>
+            </a:r>
+            <a:r>
+              <a:rPr lang="en-US" dirty="0" smtClean="0"/>
+              <a:t>or </a:t>
+            </a:r>
+            <a:r>
+              <a:rPr lang="en-US" b="1" dirty="0" smtClean="0"/>
+              <a:t>process thread/life cycle</a:t>
+            </a:r>
+            <a:r>
+              <a:rPr lang="en-US" dirty="0" smtClean="0"/>
+              <a:t>; e.g.:</a:t>
+            </a:r>
+          </a:p>
+          <a:p>
+            <a:pPr lvl="1"/>
+            <a:r>
+              <a:rPr lang="en-US" dirty="0" smtClean="0">
+                <a:latin typeface="Source Code Pro" charset="0"/>
+                <a:ea typeface="Source Code Pro" charset="0"/>
+                <a:cs typeface="Source Code Pro" charset="0"/>
+              </a:rPr>
+              <a:t>_exit()</a:t>
+            </a:r>
+            <a:r>
+              <a:rPr lang="en-US" dirty="0" smtClean="0"/>
+              <a:t> never returns</a:t>
+            </a:r>
+          </a:p>
+          <a:p>
+            <a:pPr lvl="1"/>
+            <a:r>
+              <a:rPr lang="en-US" dirty="0" smtClean="0">
+                <a:latin typeface="Source Code Pro" charset="0"/>
+                <a:ea typeface="Source Code Pro" charset="0"/>
+                <a:cs typeface="Source Code Pro" charset="0"/>
+              </a:rPr>
+              <a:t>fork()</a:t>
+            </a:r>
+            <a:r>
+              <a:rPr lang="en-US" dirty="0" smtClean="0"/>
+              <a:t> returns </a:t>
+            </a:r>
+            <a:r>
+              <a:rPr lang="is-IS" dirty="0" smtClean="0"/>
+              <a:t>… twice</a:t>
+            </a:r>
+          </a:p>
+          <a:p>
+            <a:pPr lvl="1"/>
+            <a:r>
+              <a:rPr lang="en-US" dirty="0" err="1" smtClean="0">
+                <a:latin typeface="Source Code Pro" charset="0"/>
+                <a:ea typeface="Source Code Pro" charset="0"/>
+                <a:cs typeface="Source Code Pro" charset="0"/>
+              </a:rPr>
+              <a:t>pthread</a:t>
+            </a:r>
+            <a:r>
+              <a:rPr lang="is-IS" dirty="0" smtClean="0">
+                <a:latin typeface="Source Code Pro" charset="0"/>
+                <a:ea typeface="Source Code Pro" charset="0"/>
+                <a:cs typeface="Source Code Pro" charset="0"/>
+              </a:rPr>
+              <a:t>_create()</a:t>
+            </a:r>
+            <a:r>
+              <a:rPr lang="is-IS" dirty="0" smtClean="0"/>
+              <a:t> creates a new thread</a:t>
+            </a:r>
+          </a:p>
+          <a:p>
+            <a:pPr lvl="1"/>
+            <a:r>
+              <a:rPr lang="is-IS" dirty="0" smtClean="0">
+                <a:latin typeface="Source Code Pro" charset="0"/>
+                <a:ea typeface="Source Code Pro" charset="0"/>
+                <a:cs typeface="Source Code Pro" charset="0"/>
+              </a:rPr>
+              <a:t>setucontext() </a:t>
+            </a:r>
+            <a:r>
+              <a:rPr lang="is-IS" dirty="0" smtClean="0"/>
+              <a:t>manipulates thread state</a:t>
+            </a:r>
+          </a:p>
+          <a:p>
+            <a:pPr lvl="1"/>
+            <a:endParaRPr lang="en-US" dirty="0" smtClean="0"/>
+          </a:p>
+        </p:txBody>
+      </p:sp>
+      <p:sp>
+        <p:nvSpPr>
+          <p:cNvPr id="4" name="Footer Placeholder 3"/>
+          <p:cNvSpPr>
+            <a:spLocks noGrp="1"/>
+          </p:cNvSpPr>
+          <p:nvPr>
+            <p:ph type="ftr" sz="quarter" idx="11"/>
+          </p:nvPr>
+        </p:nvSpPr>
+        <p:spPr/>
+        <p:txBody>
           <a:bodyPr/>
           <a:lstStyle/>
           <a:p>
             <a:r>
-              <a:rPr lang="en-US" dirty="0" smtClean="0"/>
-              <a:t>How do we get into the kernel?</a:t>
-            </a:r>
-          </a:p>
-          <a:p>
-            <a:r>
-              <a:rPr lang="en-US" dirty="0" smtClean="0"/>
-              <a:t>How do we get out of the kernel?</a:t>
-            </a:r>
-          </a:p>
-          <a:p>
-            <a:endParaRPr lang="en-US" dirty="0" smtClean="0"/>
-          </a:p>
-        </p:txBody>
-      </p:sp>
-      <p:sp>
-        <p:nvSpPr>
-          <p:cNvPr id="4" name="Date Placeholder 3"/>
-          <p:cNvSpPr>
-            <a:spLocks noGrp="1"/>
-          </p:cNvSpPr>
-          <p:nvPr>
-            <p:ph type="dt" sz="half" idx="10"/>
+              <a:rPr lang="en-US" smtClean="0"/>
+              <a:t>L41 Lecture 4 - The Process Model (2)</a:t>
+            </a:r>
+            <a:endParaRPr lang="en-US"/>
+          </a:p>
+        </p:txBody>
+      </p:sp>
+      <p:sp>
+        <p:nvSpPr>
+          <p:cNvPr id="5" name="Slide Number Placeholder 4"/>
+          <p:cNvSpPr>
+            <a:spLocks noGrp="1"/>
+          </p:cNvSpPr>
+          <p:nvPr>
+            <p:ph type="sldNum" sz="quarter" idx="12"/>
           </p:nvPr>
         </p:nvSpPr>
         <p:spPr/>
@@ -5166,53 +6864,7 @@
           <a:bodyPr/>
           <a:lstStyle/>
           <a:p>
-            <a:fld id="{BC4AE5AA-C6FF-5A4F-9D02-E3454F0B3602}" type="datetime1">
-              <a:rPr lang="en-US" smtClean="0"/>
-              <a:t>2/2/17</a:t>
-            </a:fld>
-            <a:endParaRPr lang="en-US"/>
-          </a:p>
-        </p:txBody>
-      </p:sp>
-      <p:sp>
-        <p:nvSpPr>
-          <p:cNvPr id="5" name="Footer Placeholder 4"/>
-          <p:cNvSpPr>
-            <a:spLocks noGrp="1"/>
-          </p:cNvSpPr>
-          <p:nvPr>
-            <p:ph type="ftr" sz="quarter" idx="11"/>
-          </p:nvPr>
-        </p:nvSpPr>
-        <p:spPr/>
-        <p:txBody>
-          <a:bodyPr/>
-          <a:lstStyle/>
-          <a:p>
-            <a:r>
-              <a:rPr lang="en-US" smtClean="0"/>
-              <a:t>Developing Products with FreeBSD</a:t>
-            </a:r>
-            <a:endParaRPr lang="en-US" dirty="0"/>
-          </a:p>
-        </p:txBody>
-      </p:sp>
-      <p:sp>
-        <p:nvSpPr>
-          <p:cNvPr id="6" name="Slide Number Placeholder 5"/>
-          <p:cNvSpPr>
-            <a:spLocks noGrp="1"/>
-          </p:cNvSpPr>
-          <p:nvPr>
-            <p:ph type="sldNum" sz="quarter" idx="12"/>
-          </p:nvPr>
-        </p:nvSpPr>
-        <p:spPr/>
-        <p:txBody>
-          <a:bodyPr/>
-          <a:lstStyle/>
-          <a:p>
-            <a:fld id="{699C44C4-0FAD-8046-A5C4-05AB318FA424}" type="slidenum">
+            <a:fld id="{4451A708-1483-F44A-AC56-12F69CC7793D}" type="slidenum">
               <a:rPr lang="en-US" smtClean="0"/>
               <a:t>6</a:t>
             </a:fld>
@@ -5223,13 +6875,469 @@
     </p:spTree>
     <p:extLst>
       <p:ext uri="{BB962C8B-B14F-4D97-AF65-F5344CB8AC3E}">
-        <p14:creationId xmlns:p14="http://schemas.microsoft.com/office/powerpoint/2010/main" val="1716288803"/>
+        <p14:creationId xmlns:p14="http://schemas.microsoft.com/office/powerpoint/2010/main" val="603260126"/>
       </p:ext>
     </p:extLst>
   </p:cSld>
   <p:clrMapOvr>
     <a:masterClrMapping/>
   </p:clrMapOvr>
+  <p:timing>
+    <p:tnLst>
+      <p:par>
+        <p:cTn id="1" dur="indefinite" restart="never" nodeType="tmRoot">
+          <p:childTnLst>
+            <p:seq concurrent="1" nextAc="seek">
+              <p:cTn id="2" dur="indefinite" nodeType="mainSeq">
+                <p:childTnLst>
+                  <p:par>
+                    <p:cTn id="3" fill="hold">
+                      <p:stCondLst>
+                        <p:cond delay="indefinite"/>
+                      </p:stCondLst>
+                      <p:childTnLst>
+                        <p:par>
+                          <p:cTn id="4" fill="hold">
+                            <p:stCondLst>
+                              <p:cond delay="0"/>
+                            </p:stCondLst>
+                            <p:childTnLst>
+                              <p:par>
+                                <p:cTn id="5" presetID="1" presetClass="entr" presetSubtype="0" fill="hold" nodeType="clickEffect">
+                                  <p:stCondLst>
+                                    <p:cond delay="0"/>
+                                  </p:stCondLst>
+                                  <p:childTnLst>
+                                    <p:set>
+                                      <p:cBhvr>
+                                        <p:cTn id="6" dur="1" fill="hold">
+                                          <p:stCondLst>
+                                            <p:cond delay="0"/>
+                                          </p:stCondLst>
+                                        </p:cTn>
+                                        <p:tgtEl>
+                                          <p:spTgt spid="3">
+                                            <p:txEl>
+                                              <p:pRg st="0" end="0"/>
+                                            </p:txEl>
+                                          </p:spTgt>
+                                        </p:tgtEl>
+                                        <p:attrNameLst>
+                                          <p:attrName>style.visibility</p:attrName>
+                                        </p:attrNameLst>
+                                      </p:cBhvr>
+                                      <p:to>
+                                        <p:strVal val="visible"/>
+                                      </p:to>
+                                    </p:set>
+                                  </p:childTnLst>
+                                </p:cTn>
+                              </p:par>
+                              <p:par>
+                                <p:cTn id="7" presetID="1" presetClass="entr" presetSubtype="0" fill="hold" nodeType="withEffect">
+                                  <p:stCondLst>
+                                    <p:cond delay="0"/>
+                                  </p:stCondLst>
+                                  <p:childTnLst>
+                                    <p:set>
+                                      <p:cBhvr>
+                                        <p:cTn id="8" dur="1" fill="hold">
+                                          <p:stCondLst>
+                                            <p:cond delay="0"/>
+                                          </p:stCondLst>
+                                        </p:cTn>
+                                        <p:tgtEl>
+                                          <p:spTgt spid="3">
+                                            <p:txEl>
+                                              <p:pRg st="1" end="1"/>
+                                            </p:txEl>
+                                          </p:spTgt>
+                                        </p:tgtEl>
+                                        <p:attrNameLst>
+                                          <p:attrName>style.visibility</p:attrName>
+                                        </p:attrNameLst>
+                                      </p:cBhvr>
+                                      <p:to>
+                                        <p:strVal val="visible"/>
+                                      </p:to>
+                                    </p:set>
+                                  </p:childTnLst>
+                                </p:cTn>
+                              </p:par>
+                              <p:par>
+                                <p:cTn id="9" presetID="1" presetClass="entr" presetSubtype="0" fill="hold" nodeType="withEffect">
+                                  <p:stCondLst>
+                                    <p:cond delay="0"/>
+                                  </p:stCondLst>
+                                  <p:childTnLst>
+                                    <p:set>
+                                      <p:cBhvr>
+                                        <p:cTn id="10" dur="1" fill="hold">
+                                          <p:stCondLst>
+                                            <p:cond delay="0"/>
+                                          </p:stCondLst>
+                                        </p:cTn>
+                                        <p:tgtEl>
+                                          <p:spTgt spid="3">
+                                            <p:txEl>
+                                              <p:pRg st="2" end="2"/>
+                                            </p:txEl>
+                                          </p:spTgt>
+                                        </p:tgtEl>
+                                        <p:attrNameLst>
+                                          <p:attrName>style.visibility</p:attrName>
+                                        </p:attrNameLst>
+                                      </p:cBhvr>
+                                      <p:to>
+                                        <p:strVal val="visible"/>
+                                      </p:to>
+                                    </p:set>
+                                  </p:childTnLst>
+                                </p:cTn>
+                              </p:par>
+                              <p:par>
+                                <p:cTn id="11" presetID="1" presetClass="entr" presetSubtype="0" fill="hold" nodeType="withEffect">
+                                  <p:stCondLst>
+                                    <p:cond delay="0"/>
+                                  </p:stCondLst>
+                                  <p:childTnLst>
+                                    <p:set>
+                                      <p:cBhvr>
+                                        <p:cTn id="12" dur="1" fill="hold">
+                                          <p:stCondLst>
+                                            <p:cond delay="0"/>
+                                          </p:stCondLst>
+                                        </p:cTn>
+                                        <p:tgtEl>
+                                          <p:spTgt spid="3">
+                                            <p:txEl>
+                                              <p:pRg st="3" end="3"/>
+                                            </p:txEl>
+                                          </p:spTgt>
+                                        </p:tgtEl>
+                                        <p:attrNameLst>
+                                          <p:attrName>style.visibility</p:attrName>
+                                        </p:attrNameLst>
+                                      </p:cBhvr>
+                                      <p:to>
+                                        <p:strVal val="visible"/>
+                                      </p:to>
+                                    </p:set>
+                                  </p:childTnLst>
+                                </p:cTn>
+                              </p:par>
+                            </p:childTnLst>
+                          </p:cTn>
+                        </p:par>
+                      </p:childTnLst>
+                    </p:cTn>
+                  </p:par>
+                  <p:par>
+                    <p:cTn id="13" fill="hold">
+                      <p:stCondLst>
+                        <p:cond delay="indefinite"/>
+                      </p:stCondLst>
+                      <p:childTnLst>
+                        <p:par>
+                          <p:cTn id="14" fill="hold">
+                            <p:stCondLst>
+                              <p:cond delay="0"/>
+                            </p:stCondLst>
+                            <p:childTnLst>
+                              <p:par>
+                                <p:cTn id="15" presetID="1" presetClass="entr" presetSubtype="0" fill="hold" nodeType="clickEffect">
+                                  <p:stCondLst>
+                                    <p:cond delay="0"/>
+                                  </p:stCondLst>
+                                  <p:childTnLst>
+                                    <p:set>
+                                      <p:cBhvr>
+                                        <p:cTn id="16" dur="1" fill="hold">
+                                          <p:stCondLst>
+                                            <p:cond delay="0"/>
+                                          </p:stCondLst>
+                                        </p:cTn>
+                                        <p:tgtEl>
+                                          <p:spTgt spid="3">
+                                            <p:txEl>
+                                              <p:pRg st="4" end="4"/>
+                                            </p:txEl>
+                                          </p:spTgt>
+                                        </p:tgtEl>
+                                        <p:attrNameLst>
+                                          <p:attrName>style.visibility</p:attrName>
+                                        </p:attrNameLst>
+                                      </p:cBhvr>
+                                      <p:to>
+                                        <p:strVal val="visible"/>
+                                      </p:to>
+                                    </p:set>
+                                  </p:childTnLst>
+                                </p:cTn>
+                              </p:par>
+                              <p:par>
+                                <p:cTn id="17" presetID="1" presetClass="entr" presetSubtype="0" fill="hold" nodeType="withEffect">
+                                  <p:stCondLst>
+                                    <p:cond delay="0"/>
+                                  </p:stCondLst>
+                                  <p:childTnLst>
+                                    <p:set>
+                                      <p:cBhvr>
+                                        <p:cTn id="18" dur="1" fill="hold">
+                                          <p:stCondLst>
+                                            <p:cond delay="0"/>
+                                          </p:stCondLst>
+                                        </p:cTn>
+                                        <p:tgtEl>
+                                          <p:spTgt spid="3">
+                                            <p:txEl>
+                                              <p:pRg st="5" end="5"/>
+                                            </p:txEl>
+                                          </p:spTgt>
+                                        </p:tgtEl>
+                                        <p:attrNameLst>
+                                          <p:attrName>style.visibility</p:attrName>
+                                        </p:attrNameLst>
+                                      </p:cBhvr>
+                                      <p:to>
+                                        <p:strVal val="visible"/>
+                                      </p:to>
+                                    </p:set>
+                                  </p:childTnLst>
+                                </p:cTn>
+                              </p:par>
+                              <p:par>
+                                <p:cTn id="19" presetID="1" presetClass="entr" presetSubtype="0" fill="hold" nodeType="withEffect">
+                                  <p:stCondLst>
+                                    <p:cond delay="0"/>
+                                  </p:stCondLst>
+                                  <p:childTnLst>
+                                    <p:set>
+                                      <p:cBhvr>
+                                        <p:cTn id="20" dur="1" fill="hold">
+                                          <p:stCondLst>
+                                            <p:cond delay="0"/>
+                                          </p:stCondLst>
+                                        </p:cTn>
+                                        <p:tgtEl>
+                                          <p:spTgt spid="3">
+                                            <p:txEl>
+                                              <p:pRg st="6" end="6"/>
+                                            </p:txEl>
+                                          </p:spTgt>
+                                        </p:tgtEl>
+                                        <p:attrNameLst>
+                                          <p:attrName>style.visibility</p:attrName>
+                                        </p:attrNameLst>
+                                      </p:cBhvr>
+                                      <p:to>
+                                        <p:strVal val="visible"/>
+                                      </p:to>
+                                    </p:set>
+                                  </p:childTnLst>
+                                </p:cTn>
+                              </p:par>
+                            </p:childTnLst>
+                          </p:cTn>
+                        </p:par>
+                      </p:childTnLst>
+                    </p:cTn>
+                  </p:par>
+                  <p:par>
+                    <p:cTn id="21" fill="hold">
+                      <p:stCondLst>
+                        <p:cond delay="indefinite"/>
+                      </p:stCondLst>
+                      <p:childTnLst>
+                        <p:par>
+                          <p:cTn id="22" fill="hold">
+                            <p:stCondLst>
+                              <p:cond delay="0"/>
+                            </p:stCondLst>
+                            <p:childTnLst>
+                              <p:par>
+                                <p:cTn id="23" presetID="1" presetClass="entr" presetSubtype="0" fill="hold" nodeType="clickEffect">
+                                  <p:stCondLst>
+                                    <p:cond delay="0"/>
+                                  </p:stCondLst>
+                                  <p:childTnLst>
+                                    <p:set>
+                                      <p:cBhvr>
+                                        <p:cTn id="24" dur="1" fill="hold">
+                                          <p:stCondLst>
+                                            <p:cond delay="0"/>
+                                          </p:stCondLst>
+                                        </p:cTn>
+                                        <p:tgtEl>
+                                          <p:spTgt spid="3">
+                                            <p:txEl>
+                                              <p:pRg st="7" end="7"/>
+                                            </p:txEl>
+                                          </p:spTgt>
+                                        </p:tgtEl>
+                                        <p:attrNameLst>
+                                          <p:attrName>style.visibility</p:attrName>
+                                        </p:attrNameLst>
+                                      </p:cBhvr>
+                                      <p:to>
+                                        <p:strVal val="visible"/>
+                                      </p:to>
+                                    </p:set>
+                                  </p:childTnLst>
+                                </p:cTn>
+                              </p:par>
+                              <p:par>
+                                <p:cTn id="25" presetID="1" presetClass="entr" presetSubtype="0" fill="hold" nodeType="withEffect">
+                                  <p:stCondLst>
+                                    <p:cond delay="0"/>
+                                  </p:stCondLst>
+                                  <p:childTnLst>
+                                    <p:set>
+                                      <p:cBhvr>
+                                        <p:cTn id="26" dur="1" fill="hold">
+                                          <p:stCondLst>
+                                            <p:cond delay="0"/>
+                                          </p:stCondLst>
+                                        </p:cTn>
+                                        <p:tgtEl>
+                                          <p:spTgt spid="3">
+                                            <p:txEl>
+                                              <p:pRg st="8" end="8"/>
+                                            </p:txEl>
+                                          </p:spTgt>
+                                        </p:tgtEl>
+                                        <p:attrNameLst>
+                                          <p:attrName>style.visibility</p:attrName>
+                                        </p:attrNameLst>
+                                      </p:cBhvr>
+                                      <p:to>
+                                        <p:strVal val="visible"/>
+                                      </p:to>
+                                    </p:set>
+                                  </p:childTnLst>
+                                </p:cTn>
+                              </p:par>
+                              <p:par>
+                                <p:cTn id="27" presetID="1" presetClass="entr" presetSubtype="0" fill="hold" nodeType="withEffect">
+                                  <p:stCondLst>
+                                    <p:cond delay="0"/>
+                                  </p:stCondLst>
+                                  <p:childTnLst>
+                                    <p:set>
+                                      <p:cBhvr>
+                                        <p:cTn id="28" dur="1" fill="hold">
+                                          <p:stCondLst>
+                                            <p:cond delay="0"/>
+                                          </p:stCondLst>
+                                        </p:cTn>
+                                        <p:tgtEl>
+                                          <p:spTgt spid="3">
+                                            <p:txEl>
+                                              <p:pRg st="9" end="9"/>
+                                            </p:txEl>
+                                          </p:spTgt>
+                                        </p:tgtEl>
+                                        <p:attrNameLst>
+                                          <p:attrName>style.visibility</p:attrName>
+                                        </p:attrNameLst>
+                                      </p:cBhvr>
+                                      <p:to>
+                                        <p:strVal val="visible"/>
+                                      </p:to>
+                                    </p:set>
+                                  </p:childTnLst>
+                                </p:cTn>
+                              </p:par>
+                              <p:par>
+                                <p:cTn id="29" presetID="1" presetClass="entr" presetSubtype="0" fill="hold" nodeType="withEffect">
+                                  <p:stCondLst>
+                                    <p:cond delay="0"/>
+                                  </p:stCondLst>
+                                  <p:childTnLst>
+                                    <p:set>
+                                      <p:cBhvr>
+                                        <p:cTn id="30" dur="1" fill="hold">
+                                          <p:stCondLst>
+                                            <p:cond delay="0"/>
+                                          </p:stCondLst>
+                                        </p:cTn>
+                                        <p:tgtEl>
+                                          <p:spTgt spid="3">
+                                            <p:txEl>
+                                              <p:pRg st="10" end="10"/>
+                                            </p:txEl>
+                                          </p:spTgt>
+                                        </p:tgtEl>
+                                        <p:attrNameLst>
+                                          <p:attrName>style.visibility</p:attrName>
+                                        </p:attrNameLst>
+                                      </p:cBhvr>
+                                      <p:to>
+                                        <p:strVal val="visible"/>
+                                      </p:to>
+                                    </p:set>
+                                  </p:childTnLst>
+                                </p:cTn>
+                              </p:par>
+                              <p:par>
+                                <p:cTn id="31" presetID="1" presetClass="entr" presetSubtype="0" fill="hold" nodeType="withEffect">
+                                  <p:stCondLst>
+                                    <p:cond delay="0"/>
+                                  </p:stCondLst>
+                                  <p:childTnLst>
+                                    <p:set>
+                                      <p:cBhvr>
+                                        <p:cTn id="32" dur="1" fill="hold">
+                                          <p:stCondLst>
+                                            <p:cond delay="0"/>
+                                          </p:stCondLst>
+                                        </p:cTn>
+                                        <p:tgtEl>
+                                          <p:spTgt spid="3">
+                                            <p:txEl>
+                                              <p:pRg st="11" end="11"/>
+                                            </p:txEl>
+                                          </p:spTgt>
+                                        </p:tgtEl>
+                                        <p:attrNameLst>
+                                          <p:attrName>style.visibility</p:attrName>
+                                        </p:attrNameLst>
+                                      </p:cBhvr>
+                                      <p:to>
+                                        <p:strVal val="visible"/>
+                                      </p:to>
+                                    </p:set>
+                                  </p:childTnLst>
+                                </p:cTn>
+                              </p:par>
+                            </p:childTnLst>
+                          </p:cTn>
+                        </p:par>
+                      </p:childTnLst>
+                    </p:cTn>
+                  </p:par>
+                </p:childTnLst>
+              </p:cTn>
+              <p:prevCondLst>
+                <p:cond evt="onPrev" delay="0">
+                  <p:tgtEl>
+                    <p:sldTgt/>
+                  </p:tgtEl>
+                </p:cond>
+              </p:prevCondLst>
+              <p:nextCondLst>
+                <p:cond evt="onNext" delay="0">
+                  <p:tgtEl>
+                    <p:sldTgt/>
+                  </p:tgtEl>
+                </p:cond>
+              </p:nextCondLst>
+            </p:seq>
+          </p:childTnLst>
+        </p:cTn>
+      </p:par>
+    </p:tnLst>
+  </p:timing>
 </p:sld>
 </file>
 
@@ -5267,7 +7375,7 @@
           <a:p>
             <a:r>
               <a:rPr lang="en-US" dirty="0" smtClean="0"/>
-              <a:t>It’s a trap!</a:t>
+              <a:t>System-call asynchrony</a:t>
             </a:r>
             <a:endParaRPr lang="en-US" dirty="0"/>
           </a:p>
@@ -5285,21 +7393,261 @@
         </p:nvSpPr>
         <p:spPr/>
         <p:txBody>
+          <a:bodyPr>
+            <a:normAutofit/>
+          </a:bodyPr>
+          <a:lstStyle/>
+          <a:p>
+            <a:r>
+              <a:rPr lang="en-US" dirty="0"/>
+              <a:t>S</a:t>
+            </a:r>
+            <a:r>
+              <a:rPr lang="en-US" dirty="0" smtClean="0"/>
+              <a:t>ynchronous calls can perform </a:t>
+            </a:r>
+            <a:r>
+              <a:rPr lang="en-US" b="1" dirty="0" smtClean="0"/>
+              <a:t>asynchronous</a:t>
+            </a:r>
+            <a:r>
+              <a:rPr lang="en-US" dirty="0" smtClean="0"/>
+              <a:t> work</a:t>
+            </a:r>
+          </a:p>
+          <a:p>
+            <a:pPr lvl="1"/>
+            <a:r>
+              <a:rPr lang="en-US" dirty="0" smtClean="0"/>
+              <a:t>Some types of work may not be complete on return</a:t>
+            </a:r>
+          </a:p>
+          <a:p>
+            <a:pPr lvl="1"/>
+            <a:r>
+              <a:rPr lang="en-US" dirty="0" err="1" smtClean="0"/>
+              <a:t>E.g</a:t>
+            </a:r>
+            <a:r>
+              <a:rPr lang="en-US" dirty="0" smtClean="0"/>
+              <a:t>:</a:t>
+            </a:r>
+            <a:endParaRPr lang="en-US" dirty="0" smtClean="0">
+              <a:latin typeface="Source Code Pro" charset="0"/>
+              <a:ea typeface="Source Code Pro" charset="0"/>
+              <a:cs typeface="Source Code Pro" charset="0"/>
+            </a:endParaRPr>
+          </a:p>
+          <a:p>
+            <a:pPr lvl="2"/>
+            <a:r>
+              <a:rPr lang="en-US" dirty="0" smtClean="0">
+                <a:latin typeface="Source Code Pro" charset="0"/>
+                <a:ea typeface="Source Code Pro" charset="0"/>
+                <a:cs typeface="Source Code Pro" charset="0"/>
+              </a:rPr>
+              <a:t>write()</a:t>
+            </a:r>
+            <a:r>
+              <a:rPr lang="en-US" dirty="0" smtClean="0"/>
+              <a:t> writes data to a file .. to disk eventually .. maybe</a:t>
+            </a:r>
+          </a:p>
+          <a:p>
+            <a:pPr lvl="2"/>
+            <a:r>
+              <a:rPr lang="en-US" dirty="0" smtClean="0"/>
+              <a:t>Caller can re-use buffer immediately (</a:t>
+            </a:r>
+            <a:r>
+              <a:rPr lang="en-US" b="1" dirty="0" smtClean="0"/>
+              <a:t>copy semantics</a:t>
+            </a:r>
+            <a:r>
+              <a:rPr lang="en-US" dirty="0" smtClean="0"/>
+              <a:t>)</a:t>
+            </a:r>
+            <a:endParaRPr lang="en-US" dirty="0" smtClean="0">
+              <a:latin typeface="Source Code Pro" charset="0"/>
+              <a:ea typeface="Source Code Pro" charset="0"/>
+              <a:cs typeface="Source Code Pro" charset="0"/>
+            </a:endParaRPr>
+          </a:p>
+          <a:p>
+            <a:pPr lvl="2"/>
+            <a:r>
+              <a:rPr lang="en-US" dirty="0" err="1" smtClean="0">
+                <a:latin typeface="Source Code Pro" charset="0"/>
+                <a:ea typeface="Source Code Pro" charset="0"/>
+                <a:cs typeface="Source Code Pro" charset="0"/>
+              </a:rPr>
+              <a:t>mmap</a:t>
+            </a:r>
+            <a:r>
+              <a:rPr lang="en-US" dirty="0" smtClean="0">
+                <a:latin typeface="Source Code Pro" charset="0"/>
+                <a:ea typeface="Source Code Pro" charset="0"/>
+                <a:cs typeface="Source Code Pro" charset="0"/>
+              </a:rPr>
+              <a:t>()</a:t>
+            </a:r>
+            <a:r>
+              <a:rPr lang="en-US" dirty="0" smtClean="0"/>
+              <a:t> maps a file but doesn’t load data</a:t>
+            </a:r>
+          </a:p>
+          <a:p>
+            <a:pPr lvl="2"/>
+            <a:r>
+              <a:rPr lang="en-US" dirty="0" smtClean="0"/>
+              <a:t>Caller traps on access, triggering I/O (</a:t>
+            </a:r>
+            <a:r>
+              <a:rPr lang="en-US" b="1" dirty="0" smtClean="0"/>
+              <a:t>demand paging)</a:t>
+            </a:r>
+          </a:p>
+          <a:p>
+            <a:pPr lvl="1"/>
+            <a:r>
+              <a:rPr lang="en-US" dirty="0" smtClean="0"/>
+              <a:t>Copy semantics mean that user program can be unaware of asynchrony (</a:t>
+            </a:r>
+            <a:r>
+              <a:rPr lang="is-IS" dirty="0" smtClean="0"/>
+              <a:t>… sort of)</a:t>
+            </a:r>
+            <a:endParaRPr lang="en-US" dirty="0"/>
+          </a:p>
+          <a:p>
+            <a:r>
+              <a:rPr lang="en-US" dirty="0" smtClean="0"/>
+              <a:t>Some </a:t>
+            </a:r>
+            <a:r>
+              <a:rPr lang="en-US" dirty="0" err="1" smtClean="0"/>
+              <a:t>syscalls</a:t>
+            </a:r>
+            <a:r>
+              <a:rPr lang="en-US" dirty="0" smtClean="0"/>
+              <a:t> are explicitly asynchronous</a:t>
+            </a:r>
+          </a:p>
+          <a:p>
+            <a:pPr lvl="1"/>
+            <a:r>
+              <a:rPr lang="en-US" dirty="0" err="1" smtClean="0">
+                <a:latin typeface="Source Code Pro" charset="0"/>
+                <a:ea typeface="Source Code Pro" charset="0"/>
+                <a:cs typeface="Source Code Pro" charset="0"/>
+              </a:rPr>
+              <a:t>aio_write</a:t>
+            </a:r>
+            <a:r>
+              <a:rPr lang="en-US" dirty="0" smtClean="0">
+                <a:latin typeface="Source Code Pro" charset="0"/>
+                <a:ea typeface="Source Code Pro" charset="0"/>
+                <a:cs typeface="Source Code Pro" charset="0"/>
+              </a:rPr>
+              <a:t>()</a:t>
+            </a:r>
+            <a:r>
+              <a:rPr lang="en-US" dirty="0" smtClean="0"/>
+              <a:t> requests an asynchronous write</a:t>
+            </a:r>
+          </a:p>
+          <a:p>
+            <a:pPr lvl="1"/>
+            <a:r>
+              <a:rPr lang="en-US" dirty="0" err="1" smtClean="0">
+                <a:latin typeface="Source Code Pro" charset="0"/>
+                <a:ea typeface="Source Code Pro" charset="0"/>
+                <a:cs typeface="Source Code Pro" charset="0"/>
+              </a:rPr>
+              <a:t>aio_return</a:t>
+            </a:r>
+            <a:r>
+              <a:rPr lang="en-US" dirty="0" smtClean="0">
+                <a:latin typeface="Source Code Pro" charset="0"/>
+                <a:ea typeface="Source Code Pro" charset="0"/>
+                <a:cs typeface="Source Code Pro" charset="0"/>
+              </a:rPr>
+              <a:t>()</a:t>
+            </a:r>
+            <a:r>
+              <a:rPr lang="en-US" dirty="0" smtClean="0"/>
+              <a:t>/</a:t>
+            </a:r>
+            <a:r>
+              <a:rPr lang="en-US" dirty="0" err="1" smtClean="0">
+                <a:latin typeface="Source Code Pro" charset="0"/>
+                <a:ea typeface="Source Code Pro" charset="0"/>
+                <a:cs typeface="Source Code Pro" charset="0"/>
+              </a:rPr>
+              <a:t>aio_error</a:t>
+            </a:r>
+            <a:r>
+              <a:rPr lang="en-US" dirty="0" smtClean="0">
+                <a:latin typeface="Source Code Pro" charset="0"/>
+                <a:ea typeface="Source Code Pro" charset="0"/>
+                <a:cs typeface="Source Code Pro" charset="0"/>
+              </a:rPr>
+              <a:t>()</a:t>
+            </a:r>
+            <a:r>
+              <a:rPr lang="en-US" dirty="0" smtClean="0"/>
+              <a:t> collect results later</a:t>
+            </a:r>
+          </a:p>
+          <a:p>
+            <a:pPr lvl="1"/>
+            <a:r>
+              <a:rPr lang="en-US" dirty="0" smtClean="0"/>
+              <a:t>Caller must wait to re-use buffer (</a:t>
+            </a:r>
+            <a:r>
+              <a:rPr lang="en-US" b="1" dirty="0" smtClean="0"/>
+              <a:t>shared semantics</a:t>
+            </a:r>
+            <a:r>
+              <a:rPr lang="en-US" dirty="0" smtClean="0"/>
+              <a:t>)</a:t>
+            </a:r>
+            <a:endParaRPr lang="en-US" dirty="0"/>
+          </a:p>
+        </p:txBody>
+      </p:sp>
+      <p:sp>
+        <p:nvSpPr>
+          <p:cNvPr id="4" name="Footer Placeholder 3"/>
+          <p:cNvSpPr>
+            <a:spLocks noGrp="1"/>
+          </p:cNvSpPr>
+          <p:nvPr>
+            <p:ph type="ftr" sz="quarter" idx="11"/>
+          </p:nvPr>
+        </p:nvSpPr>
+        <p:spPr/>
+        <p:txBody>
           <a:bodyPr/>
           <a:lstStyle/>
           <a:p>
+            <a:r>
+              <a:rPr lang="en-US" smtClean="0"/>
+              <a:t>L41 Lecture 4 - The Process Model (2)</a:t>
+            </a:r>
             <a:endParaRPr lang="en-US"/>
           </a:p>
         </p:txBody>
       </p:sp>
       <p:sp>
         <p:nvSpPr>
-          <p:cNvPr id="4" name="Date Placeholder 3"/>
-          <p:cNvSpPr>
-            <a:spLocks noGrp="1"/>
-          </p:cNvSpPr>
-          <p:nvPr>
-            <p:ph type="dt" sz="half" idx="10"/>
+          <p:cNvPr id="5" name="Slide Number Placeholder 4"/>
+          <p:cNvSpPr>
+            <a:spLocks noGrp="1"/>
+          </p:cNvSpPr>
+          <p:nvPr>
+            <p:ph type="sldNum" sz="quarter" idx="12"/>
           </p:nvPr>
         </p:nvSpPr>
         <p:spPr/>
@@ -5307,53 +7655,7 @@
           <a:bodyPr/>
           <a:lstStyle/>
           <a:p>
-            <a:fld id="{BC4AE5AA-C6FF-5A4F-9D02-E3454F0B3602}" type="datetime1">
-              <a:rPr lang="en-US" smtClean="0"/>
-              <a:t>2/2/17</a:t>
-            </a:fld>
-            <a:endParaRPr lang="en-US"/>
-          </a:p>
-        </p:txBody>
-      </p:sp>
-      <p:sp>
-        <p:nvSpPr>
-          <p:cNvPr id="5" name="Footer Placeholder 4"/>
-          <p:cNvSpPr>
-            <a:spLocks noGrp="1"/>
-          </p:cNvSpPr>
-          <p:nvPr>
-            <p:ph type="ftr" sz="quarter" idx="11"/>
-          </p:nvPr>
-        </p:nvSpPr>
-        <p:spPr/>
-        <p:txBody>
-          <a:bodyPr/>
-          <a:lstStyle/>
-          <a:p>
-            <a:r>
-              <a:rPr lang="en-US" smtClean="0"/>
-              <a:t>Developing Products with FreeBSD</a:t>
-            </a:r>
-            <a:endParaRPr lang="en-US" dirty="0"/>
-          </a:p>
-        </p:txBody>
-      </p:sp>
-      <p:sp>
-        <p:nvSpPr>
-          <p:cNvPr id="6" name="Slide Number Placeholder 5"/>
-          <p:cNvSpPr>
-            <a:spLocks noGrp="1"/>
-          </p:cNvSpPr>
-          <p:nvPr>
-            <p:ph type="sldNum" sz="quarter" idx="12"/>
-          </p:nvPr>
-        </p:nvSpPr>
-        <p:spPr/>
-        <p:txBody>
-          <a:bodyPr/>
-          <a:lstStyle/>
-          <a:p>
-            <a:fld id="{699C44C4-0FAD-8046-A5C4-05AB318FA424}" type="slidenum">
+            <a:fld id="{4451A708-1483-F44A-AC56-12F69CC7793D}" type="slidenum">
               <a:rPr lang="en-US" smtClean="0"/>
               <a:t>7</a:t>
             </a:fld>
@@ -5364,13 +7666,505 @@
     </p:spTree>
     <p:extLst>
       <p:ext uri="{BB962C8B-B14F-4D97-AF65-F5344CB8AC3E}">
-        <p14:creationId xmlns:p14="http://schemas.microsoft.com/office/powerpoint/2010/main" val="1335855769"/>
+        <p14:creationId xmlns:p14="http://schemas.microsoft.com/office/powerpoint/2010/main" val="722640195"/>
       </p:ext>
     </p:extLst>
   </p:cSld>
   <p:clrMapOvr>
     <a:masterClrMapping/>
   </p:clrMapOvr>
+  <p:timing>
+    <p:tnLst>
+      <p:par>
+        <p:cTn id="1" dur="indefinite" restart="never" nodeType="tmRoot">
+          <p:childTnLst>
+            <p:seq concurrent="1" nextAc="seek">
+              <p:cTn id="2" dur="indefinite" nodeType="mainSeq">
+                <p:childTnLst>
+                  <p:par>
+                    <p:cTn id="3" fill="hold">
+                      <p:stCondLst>
+                        <p:cond delay="indefinite"/>
+                      </p:stCondLst>
+                      <p:childTnLst>
+                        <p:par>
+                          <p:cTn id="4" fill="hold">
+                            <p:stCondLst>
+                              <p:cond delay="0"/>
+                            </p:stCondLst>
+                            <p:childTnLst>
+                              <p:par>
+                                <p:cTn id="5" presetID="1" presetClass="entr" presetSubtype="0" fill="hold" nodeType="clickEffect">
+                                  <p:stCondLst>
+                                    <p:cond delay="0"/>
+                                  </p:stCondLst>
+                                  <p:childTnLst>
+                                    <p:set>
+                                      <p:cBhvr>
+                                        <p:cTn id="6" dur="1" fill="hold">
+                                          <p:stCondLst>
+                                            <p:cond delay="0"/>
+                                          </p:stCondLst>
+                                        </p:cTn>
+                                        <p:tgtEl>
+                                          <p:spTgt spid="3">
+                                            <p:txEl>
+                                              <p:pRg st="0" end="0"/>
+                                            </p:txEl>
+                                          </p:spTgt>
+                                        </p:tgtEl>
+                                        <p:attrNameLst>
+                                          <p:attrName>style.visibility</p:attrName>
+                                        </p:attrNameLst>
+                                      </p:cBhvr>
+                                      <p:to>
+                                        <p:strVal val="visible"/>
+                                      </p:to>
+                                    </p:set>
+                                  </p:childTnLst>
+                                </p:cTn>
+                              </p:par>
+                              <p:par>
+                                <p:cTn id="7" presetID="1" presetClass="entr" presetSubtype="0" fill="hold" nodeType="withEffect">
+                                  <p:stCondLst>
+                                    <p:cond delay="0"/>
+                                  </p:stCondLst>
+                                  <p:childTnLst>
+                                    <p:set>
+                                      <p:cBhvr>
+                                        <p:cTn id="8" dur="1" fill="hold">
+                                          <p:stCondLst>
+                                            <p:cond delay="0"/>
+                                          </p:stCondLst>
+                                        </p:cTn>
+                                        <p:tgtEl>
+                                          <p:spTgt spid="3">
+                                            <p:txEl>
+                                              <p:pRg st="1" end="1"/>
+                                            </p:txEl>
+                                          </p:spTgt>
+                                        </p:tgtEl>
+                                        <p:attrNameLst>
+                                          <p:attrName>style.visibility</p:attrName>
+                                        </p:attrNameLst>
+                                      </p:cBhvr>
+                                      <p:to>
+                                        <p:strVal val="visible"/>
+                                      </p:to>
+                                    </p:set>
+                                  </p:childTnLst>
+                                </p:cTn>
+                              </p:par>
+                            </p:childTnLst>
+                          </p:cTn>
+                        </p:par>
+                      </p:childTnLst>
+                    </p:cTn>
+                  </p:par>
+                  <p:par>
+                    <p:cTn id="9" fill="hold">
+                      <p:stCondLst>
+                        <p:cond delay="indefinite"/>
+                      </p:stCondLst>
+                      <p:childTnLst>
+                        <p:par>
+                          <p:cTn id="10" fill="hold">
+                            <p:stCondLst>
+                              <p:cond delay="0"/>
+                            </p:stCondLst>
+                            <p:childTnLst>
+                              <p:par>
+                                <p:cTn id="11" presetID="1" presetClass="entr" presetSubtype="0" fill="hold" nodeType="clickEffect">
+                                  <p:stCondLst>
+                                    <p:cond delay="0"/>
+                                  </p:stCondLst>
+                                  <p:childTnLst>
+                                    <p:set>
+                                      <p:cBhvr>
+                                        <p:cTn id="12" dur="1" fill="hold">
+                                          <p:stCondLst>
+                                            <p:cond delay="0"/>
+                                          </p:stCondLst>
+                                        </p:cTn>
+                                        <p:tgtEl>
+                                          <p:spTgt spid="3">
+                                            <p:txEl>
+                                              <p:pRg st="2" end="2"/>
+                                            </p:txEl>
+                                          </p:spTgt>
+                                        </p:tgtEl>
+                                        <p:attrNameLst>
+                                          <p:attrName>style.visibility</p:attrName>
+                                        </p:attrNameLst>
+                                      </p:cBhvr>
+                                      <p:to>
+                                        <p:strVal val="visible"/>
+                                      </p:to>
+                                    </p:set>
+                                  </p:childTnLst>
+                                </p:cTn>
+                              </p:par>
+                              <p:par>
+                                <p:cTn id="13" presetID="1" presetClass="entr" presetSubtype="0" fill="hold" nodeType="withEffect">
+                                  <p:stCondLst>
+                                    <p:cond delay="0"/>
+                                  </p:stCondLst>
+                                  <p:childTnLst>
+                                    <p:set>
+                                      <p:cBhvr>
+                                        <p:cTn id="14" dur="1" fill="hold">
+                                          <p:stCondLst>
+                                            <p:cond delay="0"/>
+                                          </p:stCondLst>
+                                        </p:cTn>
+                                        <p:tgtEl>
+                                          <p:spTgt spid="3">
+                                            <p:txEl>
+                                              <p:pRg st="3" end="3"/>
+                                            </p:txEl>
+                                          </p:spTgt>
+                                        </p:tgtEl>
+                                        <p:attrNameLst>
+                                          <p:attrName>style.visibility</p:attrName>
+                                        </p:attrNameLst>
+                                      </p:cBhvr>
+                                      <p:to>
+                                        <p:strVal val="visible"/>
+                                      </p:to>
+                                    </p:set>
+                                  </p:childTnLst>
+                                </p:cTn>
+                              </p:par>
+                              <p:par>
+                                <p:cTn id="15" presetID="1" presetClass="entr" presetSubtype="0" fill="hold" nodeType="withEffect">
+                                  <p:stCondLst>
+                                    <p:cond delay="0"/>
+                                  </p:stCondLst>
+                                  <p:childTnLst>
+                                    <p:set>
+                                      <p:cBhvr>
+                                        <p:cTn id="16" dur="1" fill="hold">
+                                          <p:stCondLst>
+                                            <p:cond delay="0"/>
+                                          </p:stCondLst>
+                                        </p:cTn>
+                                        <p:tgtEl>
+                                          <p:spTgt spid="3">
+                                            <p:txEl>
+                                              <p:pRg st="4" end="4"/>
+                                            </p:txEl>
+                                          </p:spTgt>
+                                        </p:tgtEl>
+                                        <p:attrNameLst>
+                                          <p:attrName>style.visibility</p:attrName>
+                                        </p:attrNameLst>
+                                      </p:cBhvr>
+                                      <p:to>
+                                        <p:strVal val="visible"/>
+                                      </p:to>
+                                    </p:set>
+                                  </p:childTnLst>
+                                </p:cTn>
+                              </p:par>
+                            </p:childTnLst>
+                          </p:cTn>
+                        </p:par>
+                      </p:childTnLst>
+                    </p:cTn>
+                  </p:par>
+                  <p:par>
+                    <p:cTn id="17" fill="hold">
+                      <p:stCondLst>
+                        <p:cond delay="indefinite"/>
+                      </p:stCondLst>
+                      <p:childTnLst>
+                        <p:par>
+                          <p:cTn id="18" fill="hold">
+                            <p:stCondLst>
+                              <p:cond delay="0"/>
+                            </p:stCondLst>
+                            <p:childTnLst>
+                              <p:par>
+                                <p:cTn id="19" presetID="1" presetClass="entr" presetSubtype="0" fill="hold" nodeType="clickEffect">
+                                  <p:stCondLst>
+                                    <p:cond delay="0"/>
+                                  </p:stCondLst>
+                                  <p:childTnLst>
+                                    <p:set>
+                                      <p:cBhvr>
+                                        <p:cTn id="20" dur="1" fill="hold">
+                                          <p:stCondLst>
+                                            <p:cond delay="0"/>
+                                          </p:stCondLst>
+                                        </p:cTn>
+                                        <p:tgtEl>
+                                          <p:spTgt spid="3">
+                                            <p:txEl>
+                                              <p:pRg st="5" end="5"/>
+                                            </p:txEl>
+                                          </p:spTgt>
+                                        </p:tgtEl>
+                                        <p:attrNameLst>
+                                          <p:attrName>style.visibility</p:attrName>
+                                        </p:attrNameLst>
+                                      </p:cBhvr>
+                                      <p:to>
+                                        <p:strVal val="visible"/>
+                                      </p:to>
+                                    </p:set>
+                                  </p:childTnLst>
+                                </p:cTn>
+                              </p:par>
+                              <p:par>
+                                <p:cTn id="21" presetID="1" presetClass="entr" presetSubtype="0" fill="hold" nodeType="withEffect">
+                                  <p:stCondLst>
+                                    <p:cond delay="0"/>
+                                  </p:stCondLst>
+                                  <p:childTnLst>
+                                    <p:set>
+                                      <p:cBhvr>
+                                        <p:cTn id="22" dur="1" fill="hold">
+                                          <p:stCondLst>
+                                            <p:cond delay="0"/>
+                                          </p:stCondLst>
+                                        </p:cTn>
+                                        <p:tgtEl>
+                                          <p:spTgt spid="3">
+                                            <p:txEl>
+                                              <p:pRg st="6" end="6"/>
+                                            </p:txEl>
+                                          </p:spTgt>
+                                        </p:tgtEl>
+                                        <p:attrNameLst>
+                                          <p:attrName>style.visibility</p:attrName>
+                                        </p:attrNameLst>
+                                      </p:cBhvr>
+                                      <p:to>
+                                        <p:strVal val="visible"/>
+                                      </p:to>
+                                    </p:set>
+                                  </p:childTnLst>
+                                </p:cTn>
+                              </p:par>
+                            </p:childTnLst>
+                          </p:cTn>
+                        </p:par>
+                      </p:childTnLst>
+                    </p:cTn>
+                  </p:par>
+                  <p:par>
+                    <p:cTn id="23" fill="hold">
+                      <p:stCondLst>
+                        <p:cond delay="indefinite"/>
+                      </p:stCondLst>
+                      <p:childTnLst>
+                        <p:par>
+                          <p:cTn id="24" fill="hold">
+                            <p:stCondLst>
+                              <p:cond delay="0"/>
+                            </p:stCondLst>
+                            <p:childTnLst>
+                              <p:par>
+                                <p:cTn id="25" presetID="1" presetClass="entr" presetSubtype="0" fill="hold" nodeType="clickEffect">
+                                  <p:stCondLst>
+                                    <p:cond delay="0"/>
+                                  </p:stCondLst>
+                                  <p:childTnLst>
+                                    <p:set>
+                                      <p:cBhvr>
+                                        <p:cTn id="26" dur="1" fill="hold">
+                                          <p:stCondLst>
+                                            <p:cond delay="0"/>
+                                          </p:stCondLst>
+                                        </p:cTn>
+                                        <p:tgtEl>
+                                          <p:spTgt spid="3">
+                                            <p:txEl>
+                                              <p:pRg st="7" end="7"/>
+                                            </p:txEl>
+                                          </p:spTgt>
+                                        </p:tgtEl>
+                                        <p:attrNameLst>
+                                          <p:attrName>style.visibility</p:attrName>
+                                        </p:attrNameLst>
+                                      </p:cBhvr>
+                                      <p:to>
+                                        <p:strVal val="visible"/>
+                                      </p:to>
+                                    </p:set>
+                                  </p:childTnLst>
+                                </p:cTn>
+                              </p:par>
+                            </p:childTnLst>
+                          </p:cTn>
+                        </p:par>
+                      </p:childTnLst>
+                    </p:cTn>
+                  </p:par>
+                  <p:par>
+                    <p:cTn id="27" fill="hold">
+                      <p:stCondLst>
+                        <p:cond delay="indefinite"/>
+                      </p:stCondLst>
+                      <p:childTnLst>
+                        <p:par>
+                          <p:cTn id="28" fill="hold">
+                            <p:stCondLst>
+                              <p:cond delay="0"/>
+                            </p:stCondLst>
+                            <p:childTnLst>
+                              <p:par>
+                                <p:cTn id="29" presetID="1" presetClass="entr" presetSubtype="0" fill="hold" nodeType="clickEffect">
+                                  <p:stCondLst>
+                                    <p:cond delay="0"/>
+                                  </p:stCondLst>
+                                  <p:childTnLst>
+                                    <p:set>
+                                      <p:cBhvr>
+                                        <p:cTn id="30" dur="1" fill="hold">
+                                          <p:stCondLst>
+                                            <p:cond delay="0"/>
+                                          </p:stCondLst>
+                                        </p:cTn>
+                                        <p:tgtEl>
+                                          <p:spTgt spid="3">
+                                            <p:txEl>
+                                              <p:pRg st="8" end="8"/>
+                                            </p:txEl>
+                                          </p:spTgt>
+                                        </p:tgtEl>
+                                        <p:attrNameLst>
+                                          <p:attrName>style.visibility</p:attrName>
+                                        </p:attrNameLst>
+                                      </p:cBhvr>
+                                      <p:to>
+                                        <p:strVal val="visible"/>
+                                      </p:to>
+                                    </p:set>
+                                  </p:childTnLst>
+                                </p:cTn>
+                              </p:par>
+                              <p:par>
+                                <p:cTn id="31" presetID="1" presetClass="entr" presetSubtype="0" fill="hold" nodeType="withEffect">
+                                  <p:stCondLst>
+                                    <p:cond delay="0"/>
+                                  </p:stCondLst>
+                                  <p:childTnLst>
+                                    <p:set>
+                                      <p:cBhvr>
+                                        <p:cTn id="32" dur="1" fill="hold">
+                                          <p:stCondLst>
+                                            <p:cond delay="0"/>
+                                          </p:stCondLst>
+                                        </p:cTn>
+                                        <p:tgtEl>
+                                          <p:spTgt spid="3">
+                                            <p:txEl>
+                                              <p:pRg st="9" end="9"/>
+                                            </p:txEl>
+                                          </p:spTgt>
+                                        </p:tgtEl>
+                                        <p:attrNameLst>
+                                          <p:attrName>style.visibility</p:attrName>
+                                        </p:attrNameLst>
+                                      </p:cBhvr>
+                                      <p:to>
+                                        <p:strVal val="visible"/>
+                                      </p:to>
+                                    </p:set>
+                                  </p:childTnLst>
+                                </p:cTn>
+                              </p:par>
+                              <p:par>
+                                <p:cTn id="33" presetID="1" presetClass="entr" presetSubtype="0" fill="hold" nodeType="withEffect">
+                                  <p:stCondLst>
+                                    <p:cond delay="0"/>
+                                  </p:stCondLst>
+                                  <p:childTnLst>
+                                    <p:set>
+                                      <p:cBhvr>
+                                        <p:cTn id="34" dur="1" fill="hold">
+                                          <p:stCondLst>
+                                            <p:cond delay="0"/>
+                                          </p:stCondLst>
+                                        </p:cTn>
+                                        <p:tgtEl>
+                                          <p:spTgt spid="3">
+                                            <p:txEl>
+                                              <p:pRg st="10" end="10"/>
+                                            </p:txEl>
+                                          </p:spTgt>
+                                        </p:tgtEl>
+                                        <p:attrNameLst>
+                                          <p:attrName>style.visibility</p:attrName>
+                                        </p:attrNameLst>
+                                      </p:cBhvr>
+                                      <p:to>
+                                        <p:strVal val="visible"/>
+                                      </p:to>
+                                    </p:set>
+                                  </p:childTnLst>
+                                </p:cTn>
+                              </p:par>
+                              <p:par>
+                                <p:cTn id="35" presetID="1" presetClass="entr" presetSubtype="0" fill="hold" nodeType="withEffect">
+                                  <p:stCondLst>
+                                    <p:cond delay="0"/>
+                                  </p:stCondLst>
+                                  <p:childTnLst>
+                                    <p:set>
+                                      <p:cBhvr>
+                                        <p:cTn id="36" dur="1" fill="hold">
+                                          <p:stCondLst>
+                                            <p:cond delay="0"/>
+                                          </p:stCondLst>
+                                        </p:cTn>
+                                        <p:tgtEl>
+                                          <p:spTgt spid="3">
+                                            <p:txEl>
+                                              <p:pRg st="11" end="11"/>
+                                            </p:txEl>
+                                          </p:spTgt>
+                                        </p:tgtEl>
+                                        <p:attrNameLst>
+                                          <p:attrName>style.visibility</p:attrName>
+                                        </p:attrNameLst>
+                                      </p:cBhvr>
+                                      <p:to>
+                                        <p:strVal val="visible"/>
+                                      </p:to>
+                                    </p:set>
+                                  </p:childTnLst>
+                                </p:cTn>
+                              </p:par>
+                            </p:childTnLst>
+                          </p:cTn>
+                        </p:par>
+                      </p:childTnLst>
+                    </p:cTn>
+                  </p:par>
+                </p:childTnLst>
+              </p:cTn>
+              <p:prevCondLst>
+                <p:cond evt="onPrev" delay="0">
+                  <p:tgtEl>
+                    <p:sldTgt/>
+                  </p:tgtEl>
+                </p:cond>
+              </p:prevCondLst>
+              <p:nextCondLst>
+                <p:cond evt="onNext" delay="0">
+                  <p:tgtEl>
+                    <p:sldTgt/>
+                  </p:tgtEl>
+                </p:cond>
+              </p:nextCondLst>
+            </p:seq>
+          </p:childTnLst>
+        </p:cTn>
+      </p:par>
+    </p:tnLst>
+  </p:timing>
 </p:sld>
 </file>
 
@@ -5393,7 +8187,7 @@
       </p:grpSpPr>
       <p:sp>
         <p:nvSpPr>
-          <p:cNvPr id="2" name="Title 1"/>
+          <p:cNvPr id="6" name="Title 5"/>
           <p:cNvSpPr>
             <a:spLocks noGrp="1"/>
           </p:cNvSpPr>
@@ -5403,12 +8197,214 @@
         </p:nvSpPr>
         <p:spPr/>
         <p:txBody>
+          <a:bodyPr>
+            <a:normAutofit/>
+          </a:bodyPr>
+          <a:lstStyle/>
+          <a:p>
+            <a:r>
+              <a:rPr lang="en-US" dirty="0" smtClean="0"/>
+              <a:t>System-call invocation</a:t>
+            </a:r>
+            <a:endParaRPr lang="en-US" dirty="0"/>
+          </a:p>
+        </p:txBody>
+      </p:sp>
+      <p:pic>
+        <p:nvPicPr>
+          <p:cNvPr id="9" name="Content Placeholder 8"/>
+          <p:cNvPicPr>
+            <a:picLocks noGrp="1" noChangeAspect="1"/>
+          </p:cNvPicPr>
+          <p:nvPr>
+            <p:ph sz="half" idx="1"/>
+          </p:nvPr>
+        </p:nvPicPr>
+        <p:blipFill>
+          <a:blip r:embed="rId2">
+            <a:extLst>
+              <a:ext uri="{28A0092B-C50C-407E-A947-70E740481C1C}">
+                <a14:useLocalDpi xmlns:a14="http://schemas.microsoft.com/office/drawing/2010/main" val="0"/>
+              </a:ext>
+            </a:extLst>
+          </a:blip>
+          <a:stretch>
+            <a:fillRect/>
+          </a:stretch>
+        </p:blipFill>
+        <p:spPr>
+          <a:xfrm>
+            <a:off x="2152651" y="1352551"/>
+            <a:ext cx="3460777" cy="5003800"/>
+          </a:xfrm>
+        </p:spPr>
+      </p:pic>
+      <p:sp>
+        <p:nvSpPr>
+          <p:cNvPr id="8" name="Content Placeholder 7"/>
+          <p:cNvSpPr>
+            <a:spLocks noGrp="1"/>
+          </p:cNvSpPr>
+          <p:nvPr>
+            <p:ph sz="half" idx="2"/>
+          </p:nvPr>
+        </p:nvSpPr>
+        <p:spPr>
+          <a:xfrm>
+            <a:off x="5876926" y="1352551"/>
+            <a:ext cx="4162425" cy="5003800"/>
+          </a:xfrm>
+        </p:spPr>
+        <p:txBody>
+          <a:bodyPr>
+            <a:normAutofit/>
+          </a:bodyPr>
+          <a:lstStyle/>
+          <a:p>
+            <a:r>
+              <a:rPr lang="en-US" dirty="0" err="1" smtClean="0">
+                <a:latin typeface="Source Code Pro" charset="0"/>
+                <a:ea typeface="Source Code Pro" charset="0"/>
+                <a:cs typeface="Source Code Pro" charset="0"/>
+              </a:rPr>
+              <a:t>libc</a:t>
+            </a:r>
+            <a:r>
+              <a:rPr lang="en-US" dirty="0" smtClean="0"/>
+              <a:t> system-call stubs provide linkable symbols</a:t>
+            </a:r>
+          </a:p>
+          <a:p>
+            <a:r>
+              <a:rPr lang="en-US" dirty="0"/>
+              <a:t>I</a:t>
+            </a:r>
+            <a:r>
+              <a:rPr lang="en-US" dirty="0" smtClean="0"/>
+              <a:t>nline system-call instructions or dynamic implementations</a:t>
+            </a:r>
+          </a:p>
+          <a:p>
+            <a:pPr lvl="1"/>
+            <a:r>
+              <a:rPr lang="en-US" dirty="0" smtClean="0"/>
+              <a:t>Linux </a:t>
+            </a:r>
+            <a:r>
+              <a:rPr lang="en-US" dirty="0" err="1" smtClean="0">
+                <a:latin typeface="Source Code Pro" charset="0"/>
+                <a:ea typeface="Source Code Pro" charset="0"/>
+                <a:cs typeface="Source Code Pro" charset="0"/>
+              </a:rPr>
+              <a:t>vdso</a:t>
+            </a:r>
+            <a:endParaRPr lang="en-US" dirty="0" smtClean="0">
+              <a:latin typeface="Source Code Pro" charset="0"/>
+              <a:ea typeface="Source Code Pro" charset="0"/>
+              <a:cs typeface="Source Code Pro" charset="0"/>
+            </a:endParaRPr>
+          </a:p>
+          <a:p>
+            <a:pPr lvl="1"/>
+            <a:r>
+              <a:rPr lang="en-US" dirty="0" smtClean="0"/>
+              <a:t>Xen </a:t>
+            </a:r>
+            <a:r>
+              <a:rPr lang="en-US" b="1" dirty="0" err="1" smtClean="0"/>
+              <a:t>hypercall</a:t>
+            </a:r>
+            <a:r>
+              <a:rPr lang="en-US" b="1" dirty="0" smtClean="0"/>
+              <a:t> page</a:t>
+            </a:r>
+          </a:p>
+          <a:p>
+            <a:r>
+              <a:rPr lang="en-US" b="1" dirty="0"/>
+              <a:t>M</a:t>
+            </a:r>
+            <a:r>
+              <a:rPr lang="en-US" b="1" dirty="0" smtClean="0"/>
+              <a:t>achine-dependent trap vector</a:t>
+            </a:r>
+          </a:p>
+          <a:p>
+            <a:r>
+              <a:rPr lang="en-US" b="1" dirty="0" smtClean="0"/>
+              <a:t>Machine-independent </a:t>
+            </a:r>
+            <a:r>
+              <a:rPr lang="en-US" dirty="0" smtClean="0"/>
+              <a:t>function</a:t>
+            </a:r>
+            <a:r>
+              <a:rPr lang="en-US" b="1" dirty="0" smtClean="0"/>
+              <a:t>  </a:t>
+            </a:r>
+            <a:r>
+              <a:rPr lang="en-US" dirty="0" err="1" smtClean="0">
+                <a:latin typeface="Source Code Pro" charset="0"/>
+                <a:ea typeface="Source Code Pro" charset="0"/>
+                <a:cs typeface="Source Code Pro" charset="0"/>
+              </a:rPr>
+              <a:t>syscall</a:t>
+            </a:r>
+            <a:r>
+              <a:rPr lang="en-US" dirty="0" smtClean="0">
+                <a:latin typeface="Source Code Pro" charset="0"/>
+                <a:ea typeface="Source Code Pro" charset="0"/>
+                <a:cs typeface="Source Code Pro" charset="0"/>
+              </a:rPr>
+              <a:t>()</a:t>
+            </a:r>
+            <a:endParaRPr lang="en-US" dirty="0" smtClean="0"/>
+          </a:p>
+          <a:p>
+            <a:pPr lvl="1"/>
+            <a:r>
+              <a:rPr lang="en-US" dirty="0" smtClean="0"/>
+              <a:t>Prologue (e.g., breakpoints, tracing)</a:t>
+            </a:r>
+          </a:p>
+          <a:p>
+            <a:pPr lvl="1"/>
+            <a:r>
+              <a:rPr lang="en-US" dirty="0" smtClean="0"/>
+              <a:t>Actual service invoked</a:t>
+            </a:r>
+          </a:p>
+          <a:p>
+            <a:pPr lvl="1"/>
+            <a:r>
+              <a:rPr lang="en-US" dirty="0"/>
+              <a:t>E</a:t>
+            </a:r>
+            <a:r>
+              <a:rPr lang="en-US" dirty="0" smtClean="0"/>
+              <a:t>pilogue (e.g., tracing, signal delivery)</a:t>
+            </a:r>
+          </a:p>
+        </p:txBody>
+      </p:sp>
+      <p:sp>
+        <p:nvSpPr>
+          <p:cNvPr id="4" name="Footer Placeholder 3"/>
+          <p:cNvSpPr>
+            <a:spLocks noGrp="1"/>
+          </p:cNvSpPr>
+          <p:nvPr>
+            <p:ph type="ftr" sz="quarter" idx="11"/>
+          </p:nvPr>
+        </p:nvSpPr>
+        <p:spPr/>
+        <p:txBody>
           <a:bodyPr/>
           <a:lstStyle/>
           <a:p>
             <a:r>
               <a:rPr lang="en-US" smtClean="0"/>
-              <a:t>Machine Dependent Code</a:t>
+              <a:t>L41 Lecture 4 - The Process Model (2)</a:t>
             </a:r>
             <a:endParaRPr lang="en-US"/>
           </a:p>
@@ -5416,12 +8412,12 @@
       </p:sp>
       <p:sp>
         <p:nvSpPr>
-          <p:cNvPr id="3" name="Content Placeholder 2"/>
-          <p:cNvSpPr>
-            <a:spLocks noGrp="1"/>
-          </p:cNvSpPr>
-          <p:nvPr>
-            <p:ph idx="1"/>
+          <p:cNvPr id="5" name="Slide Number Placeholder 4"/>
+          <p:cNvSpPr>
+            <a:spLocks noGrp="1"/>
+          </p:cNvSpPr>
+          <p:nvPr>
+            <p:ph type="sldNum" sz="quarter" idx="12"/>
           </p:nvPr>
         </p:nvSpPr>
         <p:spPr/>
@@ -5429,72 +8425,7 @@
           <a:bodyPr/>
           <a:lstStyle/>
           <a:p>
-            <a:endParaRPr lang="en-US"/>
-          </a:p>
-        </p:txBody>
-      </p:sp>
-      <p:sp>
-        <p:nvSpPr>
-          <p:cNvPr id="4" name="Date Placeholder 3"/>
-          <p:cNvSpPr>
-            <a:spLocks noGrp="1"/>
-          </p:cNvSpPr>
-          <p:nvPr>
-            <p:ph type="dt" sz="half" idx="10"/>
-          </p:nvPr>
-        </p:nvSpPr>
-        <p:spPr/>
-        <p:txBody>
-          <a:bodyPr/>
-          <a:lstStyle/>
-          <a:p>
-            <a:fld id="{BC4AE5AA-C6FF-5A4F-9D02-E3454F0B3602}" type="datetime1">
-              <a:rPr lang="en-US" smtClean="0"/>
-              <a:t>2/2/17</a:t>
-            </a:fld>
-            <a:endParaRPr lang="en-US"/>
-          </a:p>
-        </p:txBody>
-      </p:sp>
-      <p:sp>
-        <p:nvSpPr>
-          <p:cNvPr id="5" name="Footer Placeholder 4"/>
-          <p:cNvSpPr>
-            <a:spLocks noGrp="1"/>
-          </p:cNvSpPr>
-          <p:nvPr>
-            <p:ph type="ftr" sz="quarter" idx="11"/>
-          </p:nvPr>
-        </p:nvSpPr>
-        <p:spPr/>
-        <p:txBody>
-          <a:bodyPr/>
-          <a:lstStyle/>
-          <a:p>
-            <a:r>
-              <a:rPr lang="en-US" smtClean="0"/>
-              <a:t>Developing Products with FreeBSD</a:t>
-            </a:r>
-            <a:endParaRPr lang="en-US" dirty="0"/>
-          </a:p>
-        </p:txBody>
-      </p:sp>
-      <p:sp>
-        <p:nvSpPr>
-          <p:cNvPr id="6" name="Slide Number Placeholder 5"/>
-          <p:cNvSpPr>
-            <a:spLocks noGrp="1"/>
-          </p:cNvSpPr>
-          <p:nvPr>
-            <p:ph type="sldNum" sz="quarter" idx="12"/>
-          </p:nvPr>
-        </p:nvSpPr>
-        <p:spPr/>
-        <p:txBody>
-          <a:bodyPr/>
-          <a:lstStyle/>
-          <a:p>
-            <a:fld id="{699C44C4-0FAD-8046-A5C4-05AB318FA424}" type="slidenum">
+            <a:fld id="{4451A708-1483-F44A-AC56-12F69CC7793D}" type="slidenum">
               <a:rPr lang="en-US" smtClean="0"/>
               <a:t>8</a:t>
             </a:fld>
@@ -5505,13 +8436,394 @@
     </p:spTree>
     <p:extLst>
       <p:ext uri="{BB962C8B-B14F-4D97-AF65-F5344CB8AC3E}">
-        <p14:creationId xmlns:p14="http://schemas.microsoft.com/office/powerpoint/2010/main" val="1276467652"/>
+        <p14:creationId xmlns:p14="http://schemas.microsoft.com/office/powerpoint/2010/main" val="1393733580"/>
       </p:ext>
     </p:extLst>
   </p:cSld>
   <p:clrMapOvr>
     <a:masterClrMapping/>
   </p:clrMapOvr>
+  <p:timing>
+    <p:tnLst>
+      <p:par>
+        <p:cTn id="1" dur="indefinite" restart="never" nodeType="tmRoot">
+          <p:childTnLst>
+            <p:seq concurrent="1" nextAc="seek">
+              <p:cTn id="2" dur="indefinite" nodeType="mainSeq">
+                <p:childTnLst>
+                  <p:par>
+                    <p:cTn id="3" fill="hold">
+                      <p:stCondLst>
+                        <p:cond delay="indefinite"/>
+                      </p:stCondLst>
+                      <p:childTnLst>
+                        <p:par>
+                          <p:cTn id="4" fill="hold">
+                            <p:stCondLst>
+                              <p:cond delay="0"/>
+                            </p:stCondLst>
+                            <p:childTnLst>
+                              <p:par>
+                                <p:cTn id="5" presetID="1" presetClass="entr" presetSubtype="0" fill="hold" nodeType="clickEffect">
+                                  <p:stCondLst>
+                                    <p:cond delay="0"/>
+                                  </p:stCondLst>
+                                  <p:childTnLst>
+                                    <p:set>
+                                      <p:cBhvr>
+                                        <p:cTn id="6" dur="1" fill="hold">
+                                          <p:stCondLst>
+                                            <p:cond delay="0"/>
+                                          </p:stCondLst>
+                                        </p:cTn>
+                                        <p:tgtEl>
+                                          <p:spTgt spid="8">
+                                            <p:txEl>
+                                              <p:pRg st="0" end="0"/>
+                                            </p:txEl>
+                                          </p:spTgt>
+                                        </p:tgtEl>
+                                        <p:attrNameLst>
+                                          <p:attrName>style.visibility</p:attrName>
+                                        </p:attrNameLst>
+                                      </p:cBhvr>
+                                      <p:to>
+                                        <p:strVal val="visible"/>
+                                      </p:to>
+                                    </p:set>
+                                  </p:childTnLst>
+                                </p:cTn>
+                              </p:par>
+                            </p:childTnLst>
+                          </p:cTn>
+                        </p:par>
+                      </p:childTnLst>
+                    </p:cTn>
+                  </p:par>
+                  <p:par>
+                    <p:cTn id="7" fill="hold">
+                      <p:stCondLst>
+                        <p:cond delay="indefinite"/>
+                      </p:stCondLst>
+                      <p:childTnLst>
+                        <p:par>
+                          <p:cTn id="8" fill="hold">
+                            <p:stCondLst>
+                              <p:cond delay="0"/>
+                            </p:stCondLst>
+                            <p:childTnLst>
+                              <p:par>
+                                <p:cTn id="9" presetID="1" presetClass="entr" presetSubtype="0" fill="hold" nodeType="clickEffect">
+                                  <p:stCondLst>
+                                    <p:cond delay="0"/>
+                                  </p:stCondLst>
+                                  <p:childTnLst>
+                                    <p:set>
+                                      <p:cBhvr>
+                                        <p:cTn id="10" dur="1" fill="hold">
+                                          <p:stCondLst>
+                                            <p:cond delay="0"/>
+                                          </p:stCondLst>
+                                        </p:cTn>
+                                        <p:tgtEl>
+                                          <p:spTgt spid="8">
+                                            <p:txEl>
+                                              <p:pRg st="1" end="1"/>
+                                            </p:txEl>
+                                          </p:spTgt>
+                                        </p:tgtEl>
+                                        <p:attrNameLst>
+                                          <p:attrName>style.visibility</p:attrName>
+                                        </p:attrNameLst>
+                                      </p:cBhvr>
+                                      <p:to>
+                                        <p:strVal val="visible"/>
+                                      </p:to>
+                                    </p:set>
+                                  </p:childTnLst>
+                                </p:cTn>
+                              </p:par>
+                              <p:par>
+                                <p:cTn id="11" presetID="1" presetClass="entr" presetSubtype="0" fill="hold" nodeType="withEffect">
+                                  <p:stCondLst>
+                                    <p:cond delay="0"/>
+                                  </p:stCondLst>
+                                  <p:childTnLst>
+                                    <p:set>
+                                      <p:cBhvr>
+                                        <p:cTn id="12" dur="1" fill="hold">
+                                          <p:stCondLst>
+                                            <p:cond delay="0"/>
+                                          </p:stCondLst>
+                                        </p:cTn>
+                                        <p:tgtEl>
+                                          <p:spTgt spid="8">
+                                            <p:txEl>
+                                              <p:pRg st="2" end="2"/>
+                                            </p:txEl>
+                                          </p:spTgt>
+                                        </p:tgtEl>
+                                        <p:attrNameLst>
+                                          <p:attrName>style.visibility</p:attrName>
+                                        </p:attrNameLst>
+                                      </p:cBhvr>
+                                      <p:to>
+                                        <p:strVal val="visible"/>
+                                      </p:to>
+                                    </p:set>
+                                  </p:childTnLst>
+                                </p:cTn>
+                              </p:par>
+                              <p:par>
+                                <p:cTn id="13" presetID="1" presetClass="entr" presetSubtype="0" fill="hold" nodeType="withEffect">
+                                  <p:stCondLst>
+                                    <p:cond delay="0"/>
+                                  </p:stCondLst>
+                                  <p:childTnLst>
+                                    <p:set>
+                                      <p:cBhvr>
+                                        <p:cTn id="14" dur="1" fill="hold">
+                                          <p:stCondLst>
+                                            <p:cond delay="0"/>
+                                          </p:stCondLst>
+                                        </p:cTn>
+                                        <p:tgtEl>
+                                          <p:spTgt spid="8">
+                                            <p:txEl>
+                                              <p:pRg st="3" end="3"/>
+                                            </p:txEl>
+                                          </p:spTgt>
+                                        </p:tgtEl>
+                                        <p:attrNameLst>
+                                          <p:attrName>style.visibility</p:attrName>
+                                        </p:attrNameLst>
+                                      </p:cBhvr>
+                                      <p:to>
+                                        <p:strVal val="visible"/>
+                                      </p:to>
+                                    </p:set>
+                                  </p:childTnLst>
+                                </p:cTn>
+                              </p:par>
+                            </p:childTnLst>
+                          </p:cTn>
+                        </p:par>
+                      </p:childTnLst>
+                    </p:cTn>
+                  </p:par>
+                  <p:par>
+                    <p:cTn id="15" fill="hold">
+                      <p:stCondLst>
+                        <p:cond delay="indefinite"/>
+                      </p:stCondLst>
+                      <p:childTnLst>
+                        <p:par>
+                          <p:cTn id="16" fill="hold">
+                            <p:stCondLst>
+                              <p:cond delay="0"/>
+                            </p:stCondLst>
+                            <p:childTnLst>
+                              <p:par>
+                                <p:cTn id="17" presetID="1" presetClass="entr" presetSubtype="0" fill="hold" nodeType="clickEffect">
+                                  <p:stCondLst>
+                                    <p:cond delay="0"/>
+                                  </p:stCondLst>
+                                  <p:childTnLst>
+                                    <p:set>
+                                      <p:cBhvr>
+                                        <p:cTn id="18" dur="1" fill="hold">
+                                          <p:stCondLst>
+                                            <p:cond delay="0"/>
+                                          </p:stCondLst>
+                                        </p:cTn>
+                                        <p:tgtEl>
+                                          <p:spTgt spid="8">
+                                            <p:txEl>
+                                              <p:pRg st="4" end="4"/>
+                                            </p:txEl>
+                                          </p:spTgt>
+                                        </p:tgtEl>
+                                        <p:attrNameLst>
+                                          <p:attrName>style.visibility</p:attrName>
+                                        </p:attrNameLst>
+                                      </p:cBhvr>
+                                      <p:to>
+                                        <p:strVal val="visible"/>
+                                      </p:to>
+                                    </p:set>
+                                  </p:childTnLst>
+                                </p:cTn>
+                              </p:par>
+                            </p:childTnLst>
+                          </p:cTn>
+                        </p:par>
+                      </p:childTnLst>
+                    </p:cTn>
+                  </p:par>
+                  <p:par>
+                    <p:cTn id="19" fill="hold">
+                      <p:stCondLst>
+                        <p:cond delay="indefinite"/>
+                      </p:stCondLst>
+                      <p:childTnLst>
+                        <p:par>
+                          <p:cTn id="20" fill="hold">
+                            <p:stCondLst>
+                              <p:cond delay="0"/>
+                            </p:stCondLst>
+                            <p:childTnLst>
+                              <p:par>
+                                <p:cTn id="21" presetID="1" presetClass="entr" presetSubtype="0" fill="hold" nodeType="clickEffect">
+                                  <p:stCondLst>
+                                    <p:cond delay="0"/>
+                                  </p:stCondLst>
+                                  <p:childTnLst>
+                                    <p:set>
+                                      <p:cBhvr>
+                                        <p:cTn id="22" dur="1" fill="hold">
+                                          <p:stCondLst>
+                                            <p:cond delay="0"/>
+                                          </p:stCondLst>
+                                        </p:cTn>
+                                        <p:tgtEl>
+                                          <p:spTgt spid="8">
+                                            <p:txEl>
+                                              <p:pRg st="5" end="5"/>
+                                            </p:txEl>
+                                          </p:spTgt>
+                                        </p:tgtEl>
+                                        <p:attrNameLst>
+                                          <p:attrName>style.visibility</p:attrName>
+                                        </p:attrNameLst>
+                                      </p:cBhvr>
+                                      <p:to>
+                                        <p:strVal val="visible"/>
+                                      </p:to>
+                                    </p:set>
+                                  </p:childTnLst>
+                                </p:cTn>
+                              </p:par>
+                              <p:par>
+                                <p:cTn id="23" presetID="1" presetClass="entr" presetSubtype="0" fill="hold" nodeType="withEffect">
+                                  <p:stCondLst>
+                                    <p:cond delay="0"/>
+                                  </p:stCondLst>
+                                  <p:childTnLst>
+                                    <p:set>
+                                      <p:cBhvr>
+                                        <p:cTn id="24" dur="1" fill="hold">
+                                          <p:stCondLst>
+                                            <p:cond delay="0"/>
+                                          </p:stCondLst>
+                                        </p:cTn>
+                                        <p:tgtEl>
+                                          <p:spTgt spid="8">
+                                            <p:txEl>
+                                              <p:pRg st="6" end="6"/>
+                                            </p:txEl>
+                                          </p:spTgt>
+                                        </p:tgtEl>
+                                        <p:attrNameLst>
+                                          <p:attrName>style.visibility</p:attrName>
+                                        </p:attrNameLst>
+                                      </p:cBhvr>
+                                      <p:to>
+                                        <p:strVal val="visible"/>
+                                      </p:to>
+                                    </p:set>
+                                  </p:childTnLst>
+                                </p:cTn>
+                              </p:par>
+                              <p:par>
+                                <p:cTn id="25" presetID="1" presetClass="entr" presetSubtype="0" fill="hold" nodeType="withEffect">
+                                  <p:stCondLst>
+                                    <p:cond delay="0"/>
+                                  </p:stCondLst>
+                                  <p:childTnLst>
+                                    <p:set>
+                                      <p:cBhvr>
+                                        <p:cTn id="26" dur="1" fill="hold">
+                                          <p:stCondLst>
+                                            <p:cond delay="0"/>
+                                          </p:stCondLst>
+                                        </p:cTn>
+                                        <p:tgtEl>
+                                          <p:spTgt spid="8">
+                                            <p:txEl>
+                                              <p:pRg st="7" end="7"/>
+                                            </p:txEl>
+                                          </p:spTgt>
+                                        </p:tgtEl>
+                                        <p:attrNameLst>
+                                          <p:attrName>style.visibility</p:attrName>
+                                        </p:attrNameLst>
+                                      </p:cBhvr>
+                                      <p:to>
+                                        <p:strVal val="visible"/>
+                                      </p:to>
+                                    </p:set>
+                                  </p:childTnLst>
+                                </p:cTn>
+                              </p:par>
+                              <p:par>
+                                <p:cTn id="27" presetID="1" presetClass="entr" presetSubtype="0" fill="hold" nodeType="withEffect">
+                                  <p:stCondLst>
+                                    <p:cond delay="0"/>
+                                  </p:stCondLst>
+                                  <p:childTnLst>
+                                    <p:set>
+                                      <p:cBhvr>
+                                        <p:cTn id="28" dur="1" fill="hold">
+                                          <p:stCondLst>
+                                            <p:cond delay="0"/>
+                                          </p:stCondLst>
+                                        </p:cTn>
+                                        <p:tgtEl>
+                                          <p:spTgt spid="8">
+                                            <p:txEl>
+                                              <p:pRg st="8" end="8"/>
+                                            </p:txEl>
+                                          </p:spTgt>
+                                        </p:tgtEl>
+                                        <p:attrNameLst>
+                                          <p:attrName>style.visibility</p:attrName>
+                                        </p:attrNameLst>
+                                      </p:cBhvr>
+                                      <p:to>
+                                        <p:strVal val="visible"/>
+                                      </p:to>
+                                    </p:set>
+                                  </p:childTnLst>
+                                </p:cTn>
+                              </p:par>
+                            </p:childTnLst>
+                          </p:cTn>
+                        </p:par>
+                      </p:childTnLst>
+                    </p:cTn>
+                  </p:par>
+                </p:childTnLst>
+              </p:cTn>
+              <p:prevCondLst>
+                <p:cond evt="onPrev" delay="0">
+                  <p:tgtEl>
+                    <p:sldTgt/>
+                  </p:tgtEl>
+                </p:cond>
+              </p:prevCondLst>
+              <p:nextCondLst>
+                <p:cond evt="onNext" delay="0">
+                  <p:tgtEl>
+                    <p:sldTgt/>
+                  </p:tgtEl>
+                </p:cond>
+              </p:nextCondLst>
+            </p:seq>
+          </p:childTnLst>
+        </p:cTn>
+      </p:par>
+    </p:tnLst>
+  </p:timing>
 </p:sld>
 </file>
 
@@ -5549,7 +8861,7 @@
           <a:p>
             <a:r>
               <a:rPr lang="en-US" dirty="0" smtClean="0"/>
-              <a:t>Return Values</a:t>
+              <a:t>Reading a File</a:t>
             </a:r>
             <a:endParaRPr lang="en-US" dirty="0"/>
           </a:p>
@@ -5570,7 +8882,34 @@
           <a:bodyPr/>
           <a:lstStyle/>
           <a:p>
-            <a:endParaRPr lang="en-US"/>
+            <a:pPr marL="457200" indent="-457200">
+              <a:buFont typeface="+mj-lt"/>
+              <a:buAutoNum type="arabicPeriod"/>
+            </a:pPr>
+            <a:r>
+              <a:rPr lang="en-US" dirty="0" smtClean="0"/>
+              <a:t>open()</a:t>
+            </a:r>
+          </a:p>
+          <a:p>
+            <a:pPr marL="457200" indent="-457200">
+              <a:buFont typeface="+mj-lt"/>
+              <a:buAutoNum type="arabicPeriod"/>
+            </a:pPr>
+            <a:r>
+              <a:rPr lang="en-US" dirty="0" smtClean="0"/>
+              <a:t>read()</a:t>
+            </a:r>
+          </a:p>
+          <a:p>
+            <a:pPr marL="457200" indent="-457200">
+              <a:buFont typeface="+mj-lt"/>
+              <a:buAutoNum type="arabicPeriod"/>
+            </a:pPr>
+            <a:r>
+              <a:rPr lang="en-US" dirty="0" smtClean="0"/>
+              <a:t>close()</a:t>
+            </a:r>
           </a:p>
         </p:txBody>
       </p:sp>
@@ -5589,9 +8928,9 @@
           <a:bodyPr/>
           <a:lstStyle/>
           <a:p>
-            <a:fld id="{BC4AE5AA-C6FF-5A4F-9D02-E3454F0B3602}" type="datetime1">
-              <a:rPr lang="en-US" smtClean="0"/>
-              <a:t>2/2/17</a:t>
+            <a:fld id="{D32C3957-18D7-B540-A8D2-2385B4B94035}" type="datetime1">
+              <a:rPr lang="en-US" smtClean="0"/>
+              <a:t>2/12/17</a:t>
             </a:fld>
             <a:endParaRPr lang="en-US"/>
           </a:p>
@@ -5614,7 +8953,7 @@
           <a:p>
             <a:r>
               <a:rPr lang="en-US" smtClean="0"/>
-              <a:t>Developing Products with FreeBSD</a:t>
+              <a:t>Introduction to Operating Systems</a:t>
             </a:r>
             <a:endParaRPr lang="en-US" dirty="0"/>
           </a:p>
@@ -5646,7 +8985,7 @@
     </p:spTree>
     <p:extLst>
       <p:ext uri="{BB962C8B-B14F-4D97-AF65-F5344CB8AC3E}">
-        <p14:creationId xmlns:p14="http://schemas.microsoft.com/office/powerpoint/2010/main" val="1098515382"/>
+        <p14:creationId xmlns:p14="http://schemas.microsoft.com/office/powerpoint/2010/main" val="233612583"/>
       </p:ext>
     </p:extLst>
   </p:cSld>
@@ -5937,7 +9276,7 @@
   <a:extraClrSchemeLst/>
   <a:extLst>
     <a:ext uri="{05A4C25C-085E-4340-85A3-A5531E510DB2}">
-      <thm15:themeFamily xmlns:thm15="http://schemas.microsoft.com/office/thememl/2012/main" name="DevelopingProducts" id="{28646FCF-FD46-FE45-A494-C6992658BE9D}" vid="{B09EF6B8-633F-DF4C-AED2-758DE03AE5D9}"/>
+      <thm15:themeFamily xmlns:thm15="http://schemas.microsoft.com/office/thememl/2012/main" name="FreeBSDFoundation" id="{7A57A405-F67A-8C4A-969C-4FE43956E1DF}" vid="{F50254DD-EAD6-E044-9BA6-27263CE2B76A}"/>
     </a:ext>
   </a:extLst>
 </a:theme>

</xml_diff>

<commit_message>
Flesh out with discussions of:
Timekeeping and clocks
Resource tracking and limiting
System processes
</commit_message>
<xml_diff>
--- a/undergraduate/lectures/kernel-services.pptx
+++ b/undergraduate/lectures/kernel-services.pptx
@@ -5,22 +5,33 @@
     <p:sldMasterId id="2147483894" r:id="rId1"/>
   </p:sldMasterIdLst>
   <p:notesMasterIdLst>
-    <p:notesMasterId r:id="rId15"/>
+    <p:notesMasterId r:id="rId26"/>
   </p:notesMasterIdLst>
   <p:sldIdLst>
     <p:sldId id="256" r:id="rId2"/>
     <p:sldId id="257" r:id="rId3"/>
     <p:sldId id="258" r:id="rId4"/>
-    <p:sldId id="259" r:id="rId5"/>
-    <p:sldId id="265" r:id="rId6"/>
-    <p:sldId id="266" r:id="rId7"/>
-    <p:sldId id="267" r:id="rId8"/>
-    <p:sldId id="268" r:id="rId9"/>
-    <p:sldId id="261" r:id="rId10"/>
-    <p:sldId id="262" r:id="rId11"/>
-    <p:sldId id="263" r:id="rId12"/>
-    <p:sldId id="264" r:id="rId13"/>
-    <p:sldId id="260" r:id="rId14"/>
+    <p:sldId id="265" r:id="rId5"/>
+    <p:sldId id="266" r:id="rId6"/>
+    <p:sldId id="267" r:id="rId7"/>
+    <p:sldId id="268" r:id="rId8"/>
+    <p:sldId id="261" r:id="rId9"/>
+    <p:sldId id="262" r:id="rId10"/>
+    <p:sldId id="263" r:id="rId11"/>
+    <p:sldId id="264" r:id="rId12"/>
+    <p:sldId id="260" r:id="rId13"/>
+    <p:sldId id="276" r:id="rId14"/>
+    <p:sldId id="269" r:id="rId15"/>
+    <p:sldId id="270" r:id="rId16"/>
+    <p:sldId id="271" r:id="rId17"/>
+    <p:sldId id="275" r:id="rId18"/>
+    <p:sldId id="273" r:id="rId19"/>
+    <p:sldId id="279" r:id="rId20"/>
+    <p:sldId id="281" r:id="rId21"/>
+    <p:sldId id="280" r:id="rId22"/>
+    <p:sldId id="274" r:id="rId23"/>
+    <p:sldId id="277" r:id="rId24"/>
+    <p:sldId id="278" r:id="rId25"/>
   </p:sldIdLst>
   <p:sldSz cx="12192000" cy="6858000"/>
   <p:notesSz cx="6858000" cy="9144000"/>
@@ -209,7 +220,7 @@
           <a:p>
             <a:fld id="{EC53E720-1243-6043-B4C4-6E31C619CC0A}" type="datetimeFigureOut">
               <a:rPr lang="en-US" smtClean="0"/>
-              <a:t>2/12/17</a:t>
+              <a:t>2/14/17</a:t>
             </a:fld>
             <a:endParaRPr lang="en-US"/>
           </a:p>
@@ -477,6 +488,107 @@
 </p:notesMaster>
 </file>
 
+<file path=ppt/notesSlides/notesSlide1.xml><?xml version="1.0" encoding="utf-8"?>
+<p:notes xmlns:a="http://schemas.openxmlformats.org/drawingml/2006/main" xmlns:r="http://schemas.openxmlformats.org/officeDocument/2006/relationships" xmlns:p="http://schemas.openxmlformats.org/presentationml/2006/main">
+  <p:cSld>
+    <p:spTree>
+      <p:nvGrpSpPr>
+        <p:cNvPr id="1" name=""/>
+        <p:cNvGrpSpPr/>
+        <p:nvPr/>
+      </p:nvGrpSpPr>
+      <p:grpSpPr>
+        <a:xfrm>
+          <a:off x="0" y="0"/>
+          <a:ext cx="0" cy="0"/>
+          <a:chOff x="0" y="0"/>
+          <a:chExt cx="0" cy="0"/>
+        </a:xfrm>
+      </p:grpSpPr>
+      <p:sp>
+        <p:nvSpPr>
+          <p:cNvPr id="53" name="Shape 53"/>
+          <p:cNvSpPr>
+            <a:spLocks noGrp="1" noRot="1" noChangeAspect="1"/>
+          </p:cNvSpPr>
+          <p:nvPr>
+            <p:ph type="sldImg"/>
+          </p:nvPr>
+        </p:nvSpPr>
+        <p:spPr>
+          <a:prstGeom prst="rect">
+            <a:avLst/>
+          </a:prstGeom>
+        </p:spPr>
+        <p:txBody>
+          <a:bodyPr/>
+          <a:lstStyle/>
+          <a:p>
+            <a:pPr lvl="0"/>
+            <a:endParaRPr/>
+          </a:p>
+        </p:txBody>
+      </p:sp>
+      <p:sp>
+        <p:nvSpPr>
+          <p:cNvPr id="54" name="Shape 54"/>
+          <p:cNvSpPr>
+            <a:spLocks noGrp="1"/>
+          </p:cNvSpPr>
+          <p:nvPr>
+            <p:ph type="body" sz="quarter" idx="1"/>
+          </p:nvPr>
+        </p:nvSpPr>
+        <p:spPr>
+          <a:prstGeom prst="rect">
+            <a:avLst/>
+          </a:prstGeom>
+        </p:spPr>
+        <p:txBody>
+          <a:bodyPr/>
+          <a:lstStyle/>
+          <a:p>
+            <a:pPr lvl="0">
+              <a:defRPr sz="1800"/>
+            </a:pPr>
+            <a:r>
+              <a:rPr sz="2200"/>
+              <a:t>Expensive to cross the kernel boundary for time.</a:t>
+            </a:r>
+          </a:p>
+          <a:p>
+            <a:pPr lvl="0">
+              <a:defRPr sz="1800"/>
+            </a:pPr>
+            <a:r>
+              <a:rPr sz="2200"/>
+              <a:t>Using a cached, but slightly less accurate, value may be OK.</a:t>
+            </a:r>
+          </a:p>
+          <a:p>
+            <a:pPr lvl="0">
+              <a:defRPr sz="1800"/>
+            </a:pPr>
+            <a:r>
+              <a:rPr sz="2200"/>
+              <a:t>Tradeoff of speed vs. accuracy</a:t>
+            </a:r>
+          </a:p>
+        </p:txBody>
+      </p:sp>
+    </p:spTree>
+    <p:extLst>
+      <p:ext uri="{BB962C8B-B14F-4D97-AF65-F5344CB8AC3E}">
+        <p14:creationId xmlns:p14="http://schemas.microsoft.com/office/powerpoint/2010/main" val="938610235"/>
+      </p:ext>
+    </p:extLst>
+  </p:cSld>
+  <p:clrMapOvr>
+    <a:masterClrMapping/>
+  </p:clrMapOvr>
+</p:notes>
+</file>
+
 <file path=ppt/slideLayouts/slideLayout1.xml><?xml version="1.0" encoding="utf-8"?>
 <p:sldLayout xmlns:a="http://schemas.openxmlformats.org/drawingml/2006/main" xmlns:r="http://schemas.openxmlformats.org/officeDocument/2006/relationships" xmlns:p="http://schemas.openxmlformats.org/presentationml/2006/main" showMasterSp="0" type="title" preserve="1">
   <p:cSld name="Title Slide">
@@ -706,9 +818,9 @@
           <a:bodyPr/>
           <a:lstStyle/>
           <a:p>
-            <a:fld id="{31E4796F-62B8-544E-AE8E-9C9E6E941932}" type="datetime1">
-              <a:rPr lang="en-US" smtClean="0"/>
-              <a:t>2/12/17</a:t>
+            <a:fld id="{C6EBF977-F615-524C-A6D9-2C46D1FD12A6}" type="datetime1">
+              <a:rPr lang="en-US" smtClean="0"/>
+              <a:t>2/14/17</a:t>
             </a:fld>
             <a:endParaRPr lang="en-US"/>
           </a:p>
@@ -985,9 +1097,9 @@
           <a:bodyPr/>
           <a:lstStyle/>
           <a:p>
-            <a:fld id="{82157EDA-19C1-2A49-862B-D560FF94E319}" type="datetime1">
-              <a:rPr lang="en-US" smtClean="0"/>
-              <a:t>2/12/17</a:t>
+            <a:fld id="{73246C93-1BD6-EA45-BF14-F7F81B9EE764}" type="datetime1">
+              <a:rPr lang="en-US" smtClean="0"/>
+              <a:t>2/14/17</a:t>
             </a:fld>
             <a:endParaRPr lang="en-US"/>
           </a:p>
@@ -1240,9 +1352,9 @@
           <a:bodyPr/>
           <a:lstStyle/>
           <a:p>
-            <a:fld id="{771BC361-9320-DD42-9551-655E05852352}" type="datetime1">
-              <a:rPr lang="en-US" smtClean="0"/>
-              <a:t>2/12/17</a:t>
+            <a:fld id="{A677A501-C4F0-4D44-B08D-07E21878F57F}" type="datetime1">
+              <a:rPr lang="en-US" smtClean="0"/>
+              <a:t>2/14/17</a:t>
             </a:fld>
             <a:endParaRPr lang="en-US"/>
           </a:p>
@@ -1304,6 +1416,179 @@
       <p15:sldGuideLst xmlns:p15="http://schemas.microsoft.com/office/powerpoint/2012/main"/>
     </p:ext>
   </p:extLst>
+</p:sldLayout>
+</file>
+
+<file path=ppt/slideLayouts/slideLayout12.xml><?xml version="1.0" encoding="utf-8"?>
+<p:sldLayout xmlns:a="http://schemas.openxmlformats.org/drawingml/2006/main" xmlns:r="http://schemas.openxmlformats.org/officeDocument/2006/relationships" xmlns:p="http://schemas.openxmlformats.org/presentationml/2006/main" type="tx">
+  <p:cSld name="Title &amp; Bullets">
+    <p:spTree>
+      <p:nvGrpSpPr>
+        <p:cNvPr id="1" name=""/>
+        <p:cNvGrpSpPr/>
+        <p:nvPr/>
+      </p:nvGrpSpPr>
+      <p:grpSpPr>
+        <a:xfrm>
+          <a:off x="0" y="0"/>
+          <a:ext cx="0" cy="0"/>
+          <a:chOff x="0" y="0"/>
+          <a:chExt cx="0" cy="0"/>
+        </a:xfrm>
+      </p:grpSpPr>
+      <p:sp>
+        <p:nvSpPr>
+          <p:cNvPr id="18" name="Shape 18"/>
+          <p:cNvSpPr>
+            <a:spLocks noGrp="1"/>
+          </p:cNvSpPr>
+          <p:nvPr>
+            <p:ph type="title"/>
+          </p:nvPr>
+        </p:nvSpPr>
+        <p:spPr>
+          <a:prstGeom prst="rect">
+            <a:avLst/>
+          </a:prstGeom>
+        </p:spPr>
+        <p:txBody>
+          <a:bodyPr/>
+          <a:lstStyle/>
+          <a:p>
+            <a:pPr lvl="0">
+              <a:defRPr sz="1800">
+                <a:solidFill>
+                  <a:srgbClr val="000000"/>
+                </a:solidFill>
+              </a:defRPr>
+            </a:pPr>
+            <a:r>
+              <a:rPr sz="5625">
+                <a:solidFill>
+                  <a:srgbClr val="FFFFFF"/>
+                </a:solidFill>
+              </a:rPr>
+              <a:t>Title Text</a:t>
+            </a:r>
+          </a:p>
+        </p:txBody>
+      </p:sp>
+      <p:sp>
+        <p:nvSpPr>
+          <p:cNvPr id="19" name="Shape 19"/>
+          <p:cNvSpPr>
+            <a:spLocks noGrp="1"/>
+          </p:cNvSpPr>
+          <p:nvPr>
+            <p:ph type="body" idx="1"/>
+          </p:nvPr>
+        </p:nvSpPr>
+        <p:spPr>
+          <a:prstGeom prst="rect">
+            <a:avLst/>
+          </a:prstGeom>
+        </p:spPr>
+        <p:txBody>
+          <a:bodyPr/>
+          <a:lstStyle/>
+          <a:p>
+            <a:pPr lvl="0">
+              <a:defRPr sz="1800">
+                <a:solidFill>
+                  <a:srgbClr val="000000"/>
+                </a:solidFill>
+              </a:defRPr>
+            </a:pPr>
+            <a:r>
+              <a:rPr sz="2672">
+                <a:solidFill>
+                  <a:srgbClr val="FFFFFF"/>
+                </a:solidFill>
+              </a:rPr>
+              <a:t>Body Level One</a:t>
+            </a:r>
+          </a:p>
+          <a:p>
+            <a:pPr lvl="1">
+              <a:defRPr sz="1800">
+                <a:solidFill>
+                  <a:srgbClr val="000000"/>
+                </a:solidFill>
+              </a:defRPr>
+            </a:pPr>
+            <a:r>
+              <a:rPr sz="2672">
+                <a:solidFill>
+                  <a:srgbClr val="FFFFFF"/>
+                </a:solidFill>
+              </a:rPr>
+              <a:t>Body Level Two</a:t>
+            </a:r>
+          </a:p>
+          <a:p>
+            <a:pPr lvl="2">
+              <a:defRPr sz="1800">
+                <a:solidFill>
+                  <a:srgbClr val="000000"/>
+                </a:solidFill>
+              </a:defRPr>
+            </a:pPr>
+            <a:r>
+              <a:rPr sz="2672">
+                <a:solidFill>
+                  <a:srgbClr val="FFFFFF"/>
+                </a:solidFill>
+              </a:rPr>
+              <a:t>Body Level Three</a:t>
+            </a:r>
+          </a:p>
+          <a:p>
+            <a:pPr lvl="3">
+              <a:defRPr sz="1800">
+                <a:solidFill>
+                  <a:srgbClr val="000000"/>
+                </a:solidFill>
+              </a:defRPr>
+            </a:pPr>
+            <a:r>
+              <a:rPr sz="2672">
+                <a:solidFill>
+                  <a:srgbClr val="FFFFFF"/>
+                </a:solidFill>
+              </a:rPr>
+              <a:t>Body Level Four</a:t>
+            </a:r>
+          </a:p>
+          <a:p>
+            <a:pPr lvl="4">
+              <a:defRPr sz="1800">
+                <a:solidFill>
+                  <a:srgbClr val="000000"/>
+                </a:solidFill>
+              </a:defRPr>
+            </a:pPr>
+            <a:r>
+              <a:rPr sz="2672">
+                <a:solidFill>
+                  <a:srgbClr val="FFFFFF"/>
+                </a:solidFill>
+              </a:rPr>
+              <a:t>Body Level Five</a:t>
+            </a:r>
+          </a:p>
+        </p:txBody>
+      </p:sp>
+    </p:spTree>
+    <p:extLst>
+      <p:ext uri="{BB962C8B-B14F-4D97-AF65-F5344CB8AC3E}">
+        <p14:creationId xmlns:p14="http://schemas.microsoft.com/office/powerpoint/2010/main" val="843465950"/>
+      </p:ext>
+    </p:extLst>
+  </p:cSld>
+  <p:clrMapOvr>
+    <a:masterClrMapping/>
+  </p:clrMapOvr>
+  <p:transition spd="med"/>
 </p:sldLayout>
 </file>
 
@@ -1418,9 +1703,9 @@
           <a:bodyPr/>
           <a:lstStyle/>
           <a:p>
-            <a:fld id="{16070590-A260-A04E-B755-A796BE6E3C9A}" type="datetime1">
-              <a:rPr lang="en-US" smtClean="0"/>
-              <a:t>2/12/17</a:t>
+            <a:fld id="{49017221-95F1-A547-955D-7B046F2E09F0}" type="datetime1">
+              <a:rPr lang="en-US" smtClean="0"/>
+              <a:t>2/14/17</a:t>
             </a:fld>
             <a:endParaRPr lang="en-US"/>
           </a:p>
@@ -1767,9 +2052,9 @@
           <a:bodyPr/>
           <a:lstStyle/>
           <a:p>
-            <a:fld id="{EAD5556A-9A6E-984A-993D-1C012E56F2D1}" type="datetime1">
-              <a:rPr lang="en-US" smtClean="0"/>
-              <a:t>2/12/17</a:t>
+            <a:fld id="{39B7C2E0-6A56-CF4B-AF8A-0D3E9740C2A0}" type="datetime1">
+              <a:rPr lang="en-US" smtClean="0"/>
+              <a:t>2/14/17</a:t>
             </a:fld>
             <a:endParaRPr lang="en-US"/>
           </a:p>
@@ -2061,9 +2346,9 @@
           <a:bodyPr/>
           <a:lstStyle/>
           <a:p>
-            <a:fld id="{6A5B3172-FCD5-3B4D-B4AC-F19397DB0AAD}" type="datetime1">
-              <a:rPr lang="en-US" smtClean="0"/>
-              <a:t>2/12/17</a:t>
+            <a:fld id="{153D3B1D-1294-5C40-8941-A41867FA5104}" type="datetime1">
+              <a:rPr lang="en-US" smtClean="0"/>
+              <a:t>2/14/17</a:t>
             </a:fld>
             <a:endParaRPr lang="en-US" dirty="0"/>
           </a:p>
@@ -2448,9 +2733,9 @@
           <a:bodyPr/>
           <a:lstStyle/>
           <a:p>
-            <a:fld id="{549D8CE9-C24E-FC4D-993F-4D538756E4A6}" type="datetime1">
-              <a:rPr lang="en-US" smtClean="0"/>
-              <a:t>2/12/17</a:t>
+            <a:fld id="{B1259037-4653-634A-8C7E-33C2E296917B}" type="datetime1">
+              <a:rPr lang="en-US" smtClean="0"/>
+              <a:t>2/14/17</a:t>
             </a:fld>
             <a:endParaRPr lang="en-US"/>
           </a:p>
@@ -2572,9 +2857,9 @@
           <a:bodyPr/>
           <a:lstStyle/>
           <a:p>
-            <a:fld id="{8079B3D1-428F-D840-BD7D-25616EC5CF74}" type="datetime1">
-              <a:rPr lang="en-US" smtClean="0"/>
-              <a:t>2/12/17</a:t>
+            <a:fld id="{E46E02CB-773A-6147-ACF5-12C4359768FD}" type="datetime1">
+              <a:rPr lang="en-US" smtClean="0"/>
+              <a:t>2/14/17</a:t>
             </a:fld>
             <a:endParaRPr lang="en-US"/>
           </a:p>
@@ -2749,9 +3034,9 @@
           <a:bodyPr/>
           <a:lstStyle/>
           <a:p>
-            <a:fld id="{93710EAA-21B4-7A4A-B453-7ECECB29584C}" type="datetime1">
-              <a:rPr lang="en-US" smtClean="0"/>
-              <a:t>2/12/17</a:t>
+            <a:fld id="{2474F1B2-365A-1648-8A26-720D6DAEA9A9}" type="datetime1">
+              <a:rPr lang="en-US" smtClean="0"/>
+              <a:t>2/14/17</a:t>
             </a:fld>
             <a:endParaRPr lang="en-US"/>
           </a:p>
@@ -3109,9 +3394,9 @@
             </a:lvl1pPr>
           </a:lstStyle>
           <a:p>
-            <a:fld id="{7BA2A73F-D53E-5E4A-BB5E-23F13E5F9E66}" type="datetime1">
-              <a:rPr lang="en-US" smtClean="0"/>
-              <a:t>2/12/17</a:t>
+            <a:fld id="{A0CCAC93-2951-9A46-8E99-6B75F2EBF316}" type="datetime1">
+              <a:rPr lang="en-US" smtClean="0"/>
+              <a:t>2/14/17</a:t>
             </a:fld>
             <a:endParaRPr lang="en-US"/>
           </a:p>
@@ -3494,9 +3779,9 @@
           <a:bodyPr/>
           <a:lstStyle/>
           <a:p>
-            <a:fld id="{47A61D71-3628-F044-B991-0A65E5EA1BF7}" type="datetime1">
-              <a:rPr lang="en-US" smtClean="0"/>
-              <a:t>2/12/17</a:t>
+            <a:fld id="{46BBF970-EC0F-4241-8773-DDB337706B02}" type="datetime1">
+              <a:rPr lang="en-US" smtClean="0"/>
+              <a:t>2/14/17</a:t>
             </a:fld>
             <a:endParaRPr lang="en-US"/>
           </a:p>
@@ -3780,9 +4065,9 @@
             </a:lvl1pPr>
           </a:lstStyle>
           <a:p>
-            <a:fld id="{1325AA48-8F73-9744-AD1E-61E4D0F964B4}" type="datetime1">
-              <a:rPr lang="en-US" smtClean="0"/>
-              <a:t>2/12/17</a:t>
+            <a:fld id="{3713B524-A21C-AE4D-9B36-5B3D1EDF76BB}" type="datetime1">
+              <a:rPr lang="en-US" smtClean="0"/>
+              <a:t>2/14/17</a:t>
             </a:fld>
             <a:endParaRPr lang="en-US" dirty="0"/>
           </a:p>
@@ -3913,7 +4198,7 @@
           <p:nvPr/>
         </p:nvPicPr>
         <p:blipFill>
-          <a:blip r:embed="rId13">
+          <a:blip r:embed="rId14">
             <a:extLst>
               <a:ext uri="{28A0092B-C50C-407E-A947-70E740481C1C}">
                 <a14:useLocalDpi xmlns:a14="http://schemas.microsoft.com/office/drawing/2010/main" val="0"/>
@@ -3943,7 +4228,7 @@
           <p:nvPr/>
         </p:nvPicPr>
         <p:blipFill>
-          <a:blip r:embed="rId14">
+          <a:blip r:embed="rId15">
             <a:extLst>
               <a:ext uri="{28A0092B-C50C-407E-A947-70E740481C1C}">
                 <a14:useLocalDpi xmlns:a14="http://schemas.microsoft.com/office/drawing/2010/main" val="0"/>
@@ -3973,7 +4258,7 @@
           <p:nvPr userDrawn="1"/>
         </p:nvPicPr>
         <p:blipFill>
-          <a:blip r:embed="rId14">
+          <a:blip r:embed="rId15">
             <a:extLst>
               <a:ext uri="{28A0092B-C50C-407E-A947-70E740481C1C}">
                 <a14:useLocalDpi xmlns:a14="http://schemas.microsoft.com/office/drawing/2010/main" val="0"/>
@@ -4014,6 +4299,7 @@
     <p:sldLayoutId id="2147483903" r:id="rId9"/>
     <p:sldLayoutId id="2147483904" r:id="rId10"/>
     <p:sldLayoutId id="2147483905" r:id="rId11"/>
+    <p:sldLayoutId id="2147483906" r:id="rId12"/>
   </p:sldLayoutIdLst>
   <p:timing>
     <p:tnLst>
@@ -4532,7 +4818,7 @@
           <a:p>
             <a:r>
               <a:rPr lang="en-US" dirty="0" smtClean="0"/>
-              <a:t>Looking at read()</a:t>
+              <a:t>It’s a trap!</a:t>
             </a:r>
             <a:endParaRPr lang="en-US" dirty="0"/>
           </a:p>
@@ -4553,19 +4839,7 @@
           <a:bodyPr/>
           <a:lstStyle/>
           <a:p>
-            <a:r>
-              <a:rPr lang="en-US" dirty="0" smtClean="0"/>
-              <a:t>How do we get into the kernel?</a:t>
-            </a:r>
-          </a:p>
-          <a:p>
-            <a:r>
-              <a:rPr lang="en-US" dirty="0" smtClean="0"/>
-              <a:t>How do we get out of the kernel?</a:t>
-            </a:r>
-          </a:p>
-          <a:p>
-            <a:endParaRPr lang="en-US" dirty="0" smtClean="0"/>
+            <a:endParaRPr lang="en-US"/>
           </a:p>
         </p:txBody>
       </p:sp>
@@ -4584,9 +4858,9 @@
           <a:bodyPr/>
           <a:lstStyle/>
           <a:p>
-            <a:fld id="{99311E37-C315-3B4A-B201-9AB4597F7929}" type="datetime1">
-              <a:rPr lang="en-US" smtClean="0"/>
-              <a:t>2/12/17</a:t>
+            <a:fld id="{21AA2D93-07FE-1B40-B6F1-F8AD65299FF6}" type="datetime1">
+              <a:rPr lang="en-US" smtClean="0"/>
+              <a:t>2/14/17</a:t>
             </a:fld>
             <a:endParaRPr lang="en-US"/>
           </a:p>
@@ -4641,7 +4915,7 @@
     </p:spTree>
     <p:extLst>
       <p:ext uri="{BB962C8B-B14F-4D97-AF65-F5344CB8AC3E}">
-        <p14:creationId xmlns:p14="http://schemas.microsoft.com/office/powerpoint/2010/main" val="1716288803"/>
+        <p14:creationId xmlns:p14="http://schemas.microsoft.com/office/powerpoint/2010/main" val="1335855769"/>
       </p:ext>
     </p:extLst>
   </p:cSld>
@@ -4685,7 +4959,7 @@
           <a:p>
             <a:r>
               <a:rPr lang="en-US" dirty="0" smtClean="0"/>
-              <a:t>It’s a trap!</a:t>
+              <a:t>Machine Dependent Code</a:t>
             </a:r>
             <a:endParaRPr lang="en-US" dirty="0"/>
           </a:p>
@@ -4725,9 +4999,9 @@
           <a:bodyPr/>
           <a:lstStyle/>
           <a:p>
-            <a:fld id="{AF8B7379-1718-C64B-92D7-035C49E880B4}" type="datetime1">
-              <a:rPr lang="en-US" smtClean="0"/>
-              <a:t>2/12/17</a:t>
+            <a:fld id="{EA627C64-5B79-A943-A4C7-EC0455F1C2C5}" type="datetime1">
+              <a:rPr lang="en-US" smtClean="0"/>
+              <a:t>2/14/17</a:t>
             </a:fld>
             <a:endParaRPr lang="en-US"/>
           </a:p>
@@ -4782,7 +5056,7 @@
     </p:spTree>
     <p:extLst>
       <p:ext uri="{BB962C8B-B14F-4D97-AF65-F5344CB8AC3E}">
-        <p14:creationId xmlns:p14="http://schemas.microsoft.com/office/powerpoint/2010/main" val="1335855769"/>
+        <p14:creationId xmlns:p14="http://schemas.microsoft.com/office/powerpoint/2010/main" val="1276467652"/>
       </p:ext>
     </p:extLst>
   </p:cSld>
@@ -4826,7 +5100,7 @@
           <a:p>
             <a:r>
               <a:rPr lang="en-US" dirty="0" smtClean="0"/>
-              <a:t>Machine Dependent Code</a:t>
+              <a:t>Return Values</a:t>
             </a:r>
             <a:endParaRPr lang="en-US" dirty="0"/>
           </a:p>
@@ -4847,7 +5121,7 @@
           <a:bodyPr/>
           <a:lstStyle/>
           <a:p>
-            <a:endParaRPr lang="en-US"/>
+            <a:endParaRPr lang="en-US" dirty="0"/>
           </a:p>
         </p:txBody>
       </p:sp>
@@ -4866,9 +5140,9 @@
           <a:bodyPr/>
           <a:lstStyle/>
           <a:p>
-            <a:fld id="{B93E4341-2643-1A46-841A-700BAAAF4B09}" type="datetime1">
-              <a:rPr lang="en-US" smtClean="0"/>
-              <a:t>2/12/17</a:t>
+            <a:fld id="{9F38F6E2-8DD3-E743-856A-641D1E7059C1}" type="datetime1">
+              <a:rPr lang="en-US" smtClean="0"/>
+              <a:t>2/14/17</a:t>
             </a:fld>
             <a:endParaRPr lang="en-US"/>
           </a:p>
@@ -4923,7 +5197,7 @@
     </p:spTree>
     <p:extLst>
       <p:ext uri="{BB962C8B-B14F-4D97-AF65-F5344CB8AC3E}">
-        <p14:creationId xmlns:p14="http://schemas.microsoft.com/office/powerpoint/2010/main" val="1276467652"/>
+        <p14:creationId xmlns:p14="http://schemas.microsoft.com/office/powerpoint/2010/main" val="1098515382"/>
       </p:ext>
     </p:extLst>
   </p:cSld>
@@ -4962,12 +5236,14 @@
         </p:nvSpPr>
         <p:spPr/>
         <p:txBody>
-          <a:bodyPr/>
-          <a:lstStyle/>
-          <a:p>
-            <a:r>
-              <a:rPr lang="en-US" dirty="0" smtClean="0"/>
-              <a:t>Return Values</a:t>
+          <a:bodyPr>
+            <a:normAutofit fontScale="90000"/>
+          </a:bodyPr>
+          <a:lstStyle/>
+          <a:p>
+            <a:r>
+              <a:rPr lang="en-US" dirty="0" smtClean="0"/>
+              <a:t>Computers, Time and Operating Systems</a:t>
             </a:r>
             <a:endParaRPr lang="en-US" dirty="0"/>
           </a:p>
@@ -4988,7 +5264,68 @@
           <a:bodyPr/>
           <a:lstStyle/>
           <a:p>
-            <a:endParaRPr lang="en-US" dirty="0"/>
+            <a:r>
+              <a:rPr lang="en-US" dirty="0" smtClean="0"/>
+              <a:t>Time of Day</a:t>
+            </a:r>
+          </a:p>
+          <a:p>
+            <a:pPr lvl="1"/>
+            <a:r>
+              <a:rPr lang="en-US" dirty="0" smtClean="0"/>
+              <a:t>When did this happen?</a:t>
+            </a:r>
+          </a:p>
+          <a:p>
+            <a:r>
+              <a:rPr lang="en-US" dirty="0" smtClean="0"/>
+              <a:t>Length of Time</a:t>
+            </a:r>
+          </a:p>
+          <a:p>
+            <a:pPr lvl="1"/>
+            <a:r>
+              <a:rPr lang="en-US" dirty="0" smtClean="0"/>
+              <a:t>Interval time</a:t>
+            </a:r>
+          </a:p>
+          <a:p>
+            <a:pPr lvl="1"/>
+            <a:r>
+              <a:rPr lang="en-US" dirty="0" smtClean="0"/>
+              <a:t>How long did this take?</a:t>
+            </a:r>
+          </a:p>
+          <a:p>
+            <a:pPr lvl="1"/>
+            <a:r>
+              <a:rPr lang="en-US" dirty="0" smtClean="0"/>
+              <a:t>Let me know when X time has passed</a:t>
+            </a:r>
+          </a:p>
+          <a:p>
+            <a:r>
+              <a:rPr lang="en-US" dirty="0" smtClean="0"/>
+              <a:t>Order of operations</a:t>
+            </a:r>
+          </a:p>
+          <a:p>
+            <a:pPr lvl="1"/>
+            <a:r>
+              <a:rPr lang="en-US" dirty="0" smtClean="0"/>
+              <a:t>A happens before B</a:t>
+            </a:r>
+          </a:p>
+          <a:p>
+            <a:pPr lvl="1"/>
+            <a:r>
+              <a:rPr lang="en-US" dirty="0" err="1" smtClean="0"/>
+              <a:t>Lamport</a:t>
+            </a:r>
+            <a:r>
+              <a:rPr lang="en-US" dirty="0" smtClean="0"/>
+              <a:t> 1978</a:t>
+            </a:r>
           </a:p>
         </p:txBody>
       </p:sp>
@@ -5007,9 +5344,9 @@
           <a:bodyPr/>
           <a:lstStyle/>
           <a:p>
-            <a:fld id="{6ABBAAE6-49F2-8B41-B02F-F80914588232}" type="datetime1">
-              <a:rPr lang="en-US" smtClean="0"/>
-              <a:t>2/12/17</a:t>
+            <a:fld id="{49017221-95F1-A547-955D-7B046F2E09F0}" type="datetime1">
+              <a:rPr lang="en-US" smtClean="0"/>
+              <a:t>2/14/17</a:t>
             </a:fld>
             <a:endParaRPr lang="en-US"/>
           </a:p>
@@ -5064,13 +5401,1055 @@
     </p:spTree>
     <p:extLst>
       <p:ext uri="{BB962C8B-B14F-4D97-AF65-F5344CB8AC3E}">
-        <p14:creationId xmlns:p14="http://schemas.microsoft.com/office/powerpoint/2010/main" val="1098515382"/>
+        <p14:creationId xmlns:p14="http://schemas.microsoft.com/office/powerpoint/2010/main" val="118830003"/>
       </p:ext>
     </p:extLst>
   </p:cSld>
   <p:clrMapOvr>
     <a:masterClrMapping/>
   </p:clrMapOvr>
+</p:sld>
+</file>
+
+<file path=ppt/slides/slide14.xml><?xml version="1.0" encoding="utf-8"?>
+<p:sld xmlns:a="http://schemas.openxmlformats.org/drawingml/2006/main" xmlns:r="http://schemas.openxmlformats.org/officeDocument/2006/relationships" xmlns:p="http://schemas.openxmlformats.org/presentationml/2006/main">
+  <p:cSld>
+    <p:spTree>
+      <p:nvGrpSpPr>
+        <p:cNvPr id="1" name=""/>
+        <p:cNvGrpSpPr/>
+        <p:nvPr/>
+      </p:nvGrpSpPr>
+      <p:grpSpPr>
+        <a:xfrm>
+          <a:off x="0" y="0"/>
+          <a:ext cx="0" cy="0"/>
+          <a:chOff x="0" y="0"/>
+          <a:chExt cx="0" cy="0"/>
+        </a:xfrm>
+      </p:grpSpPr>
+      <p:sp>
+        <p:nvSpPr>
+          <p:cNvPr id="2" name="Title 1"/>
+          <p:cNvSpPr>
+            <a:spLocks noGrp="1"/>
+          </p:cNvSpPr>
+          <p:nvPr>
+            <p:ph type="title"/>
+          </p:nvPr>
+        </p:nvSpPr>
+        <p:spPr/>
+        <p:txBody>
+          <a:bodyPr/>
+          <a:lstStyle/>
+          <a:p>
+            <a:r>
+              <a:rPr lang="en-US" dirty="0" smtClean="0"/>
+              <a:t>The Kernel Clock</a:t>
+            </a:r>
+            <a:endParaRPr lang="en-US" dirty="0"/>
+          </a:p>
+        </p:txBody>
+      </p:sp>
+      <p:sp>
+        <p:nvSpPr>
+          <p:cNvPr id="3" name="Content Placeholder 2"/>
+          <p:cNvSpPr>
+            <a:spLocks noGrp="1"/>
+          </p:cNvSpPr>
+          <p:nvPr>
+            <p:ph idx="1"/>
+          </p:nvPr>
+        </p:nvSpPr>
+        <p:spPr/>
+        <p:txBody>
+          <a:bodyPr/>
+          <a:lstStyle/>
+          <a:p>
+            <a:r>
+              <a:rPr lang="en-US" dirty="0" smtClean="0"/>
+              <a:t>Drives the everything forwards in time</a:t>
+            </a:r>
+          </a:p>
+          <a:p>
+            <a:r>
+              <a:rPr lang="en-US" dirty="0" smtClean="0"/>
+              <a:t>Ticks at 1KHz</a:t>
+            </a:r>
+          </a:p>
+          <a:p>
+            <a:r>
+              <a:rPr lang="en-US" dirty="0" smtClean="0"/>
+              <a:t>Derived from the hardware</a:t>
+            </a:r>
+          </a:p>
+          <a:p>
+            <a:pPr lvl="1"/>
+            <a:r>
+              <a:rPr lang="en-US" dirty="0" smtClean="0"/>
+              <a:t>Also hardware dependent</a:t>
+            </a:r>
+          </a:p>
+          <a:p>
+            <a:pPr lvl="1"/>
+            <a:r>
+              <a:rPr lang="en-US" dirty="0" smtClean="0"/>
+              <a:t>Every clock is different</a:t>
+            </a:r>
+          </a:p>
+          <a:p>
+            <a:pPr lvl="1"/>
+            <a:r>
+              <a:rPr lang="en-US" dirty="0" smtClean="0"/>
+              <a:t>There may be several potential clock sources</a:t>
+            </a:r>
+          </a:p>
+          <a:p>
+            <a:r>
+              <a:rPr lang="en-US" dirty="0" smtClean="0"/>
+              <a:t>Nearly everything depends on the clock</a:t>
+            </a:r>
+          </a:p>
+          <a:p>
+            <a:r>
+              <a:rPr lang="en-US" dirty="0" smtClean="0"/>
+              <a:t>One of the first things that is setup by the kernel</a:t>
+            </a:r>
+          </a:p>
+        </p:txBody>
+      </p:sp>
+      <p:sp>
+        <p:nvSpPr>
+          <p:cNvPr id="4" name="Date Placeholder 3"/>
+          <p:cNvSpPr>
+            <a:spLocks noGrp="1"/>
+          </p:cNvSpPr>
+          <p:nvPr>
+            <p:ph type="dt" sz="half" idx="10"/>
+          </p:nvPr>
+        </p:nvSpPr>
+        <p:spPr/>
+        <p:txBody>
+          <a:bodyPr/>
+          <a:lstStyle/>
+          <a:p>
+            <a:fld id="{49017221-95F1-A547-955D-7B046F2E09F0}" type="datetime1">
+              <a:rPr lang="en-US" smtClean="0"/>
+              <a:t>2/14/17</a:t>
+            </a:fld>
+            <a:endParaRPr lang="en-US"/>
+          </a:p>
+        </p:txBody>
+      </p:sp>
+      <p:sp>
+        <p:nvSpPr>
+          <p:cNvPr id="5" name="Footer Placeholder 4"/>
+          <p:cNvSpPr>
+            <a:spLocks noGrp="1"/>
+          </p:cNvSpPr>
+          <p:nvPr>
+            <p:ph type="ftr" sz="quarter" idx="11"/>
+          </p:nvPr>
+        </p:nvSpPr>
+        <p:spPr/>
+        <p:txBody>
+          <a:bodyPr/>
+          <a:lstStyle/>
+          <a:p>
+            <a:r>
+              <a:rPr lang="en-US" smtClean="0"/>
+              <a:t>Introduction to Operating Systems</a:t>
+            </a:r>
+            <a:endParaRPr lang="en-US" dirty="0"/>
+          </a:p>
+        </p:txBody>
+      </p:sp>
+      <p:sp>
+        <p:nvSpPr>
+          <p:cNvPr id="6" name="Slide Number Placeholder 5"/>
+          <p:cNvSpPr>
+            <a:spLocks noGrp="1"/>
+          </p:cNvSpPr>
+          <p:nvPr>
+            <p:ph type="sldNum" sz="quarter" idx="12"/>
+          </p:nvPr>
+        </p:nvSpPr>
+        <p:spPr/>
+        <p:txBody>
+          <a:bodyPr/>
+          <a:lstStyle/>
+          <a:p>
+            <a:fld id="{699C44C4-0FAD-8046-A5C4-05AB318FA424}" type="slidenum">
+              <a:rPr lang="en-US" smtClean="0"/>
+              <a:t>14</a:t>
+            </a:fld>
+            <a:endParaRPr lang="en-US"/>
+          </a:p>
+        </p:txBody>
+      </p:sp>
+    </p:spTree>
+    <p:extLst>
+      <p:ext uri="{BB962C8B-B14F-4D97-AF65-F5344CB8AC3E}">
+        <p14:creationId xmlns:p14="http://schemas.microsoft.com/office/powerpoint/2010/main" val="1532841207"/>
+      </p:ext>
+    </p:extLst>
+  </p:cSld>
+  <p:clrMapOvr>
+    <a:masterClrMapping/>
+  </p:clrMapOvr>
+</p:sld>
+</file>
+
+<file path=ppt/slides/slide15.xml><?xml version="1.0" encoding="utf-8"?>
+<p:sld xmlns:a="http://schemas.openxmlformats.org/drawingml/2006/main" xmlns:r="http://schemas.openxmlformats.org/officeDocument/2006/relationships" xmlns:p="http://schemas.openxmlformats.org/presentationml/2006/main">
+  <p:cSld>
+    <p:spTree>
+      <p:nvGrpSpPr>
+        <p:cNvPr id="1" name=""/>
+        <p:cNvGrpSpPr/>
+        <p:nvPr/>
+      </p:nvGrpSpPr>
+      <p:grpSpPr>
+        <a:xfrm>
+          <a:off x="0" y="0"/>
+          <a:ext cx="0" cy="0"/>
+          <a:chOff x="0" y="0"/>
+          <a:chExt cx="0" cy="0"/>
+        </a:xfrm>
+      </p:grpSpPr>
+      <p:sp>
+        <p:nvSpPr>
+          <p:cNvPr id="2" name="Title 1"/>
+          <p:cNvSpPr>
+            <a:spLocks noGrp="1"/>
+          </p:cNvSpPr>
+          <p:nvPr>
+            <p:ph type="title"/>
+          </p:nvPr>
+        </p:nvSpPr>
+        <p:spPr/>
+        <p:txBody>
+          <a:bodyPr/>
+          <a:lstStyle/>
+          <a:p>
+            <a:r>
+              <a:rPr lang="en-US" dirty="0" smtClean="0"/>
+              <a:t>Where does the clock come from?</a:t>
+            </a:r>
+            <a:endParaRPr lang="en-US" dirty="0"/>
+          </a:p>
+        </p:txBody>
+      </p:sp>
+      <p:sp>
+        <p:nvSpPr>
+          <p:cNvPr id="3" name="Content Placeholder 2"/>
+          <p:cNvSpPr>
+            <a:spLocks noGrp="1"/>
+          </p:cNvSpPr>
+          <p:nvPr>
+            <p:ph idx="1"/>
+          </p:nvPr>
+        </p:nvSpPr>
+        <p:spPr/>
+        <p:txBody>
+          <a:bodyPr/>
+          <a:lstStyle/>
+          <a:p>
+            <a:r>
+              <a:rPr lang="en-US" dirty="0" smtClean="0"/>
+              <a:t>All computer</a:t>
+            </a:r>
+            <a:endParaRPr lang="en-US" dirty="0"/>
+          </a:p>
+        </p:txBody>
+      </p:sp>
+      <p:sp>
+        <p:nvSpPr>
+          <p:cNvPr id="4" name="Date Placeholder 3"/>
+          <p:cNvSpPr>
+            <a:spLocks noGrp="1"/>
+          </p:cNvSpPr>
+          <p:nvPr>
+            <p:ph type="dt" sz="half" idx="10"/>
+          </p:nvPr>
+        </p:nvSpPr>
+        <p:spPr/>
+        <p:txBody>
+          <a:bodyPr/>
+          <a:lstStyle/>
+          <a:p>
+            <a:fld id="{49017221-95F1-A547-955D-7B046F2E09F0}" type="datetime1">
+              <a:rPr lang="en-US" smtClean="0"/>
+              <a:t>2/14/17</a:t>
+            </a:fld>
+            <a:endParaRPr lang="en-US"/>
+          </a:p>
+        </p:txBody>
+      </p:sp>
+      <p:sp>
+        <p:nvSpPr>
+          <p:cNvPr id="5" name="Footer Placeholder 4"/>
+          <p:cNvSpPr>
+            <a:spLocks noGrp="1"/>
+          </p:cNvSpPr>
+          <p:nvPr>
+            <p:ph type="ftr" sz="quarter" idx="11"/>
+          </p:nvPr>
+        </p:nvSpPr>
+        <p:spPr/>
+        <p:txBody>
+          <a:bodyPr/>
+          <a:lstStyle/>
+          <a:p>
+            <a:r>
+              <a:rPr lang="en-US" smtClean="0"/>
+              <a:t>Introduction to Operating Systems</a:t>
+            </a:r>
+            <a:endParaRPr lang="en-US" dirty="0"/>
+          </a:p>
+        </p:txBody>
+      </p:sp>
+      <p:sp>
+        <p:nvSpPr>
+          <p:cNvPr id="6" name="Slide Number Placeholder 5"/>
+          <p:cNvSpPr>
+            <a:spLocks noGrp="1"/>
+          </p:cNvSpPr>
+          <p:nvPr>
+            <p:ph type="sldNum" sz="quarter" idx="12"/>
+          </p:nvPr>
+        </p:nvSpPr>
+        <p:spPr/>
+        <p:txBody>
+          <a:bodyPr/>
+          <a:lstStyle/>
+          <a:p>
+            <a:fld id="{699C44C4-0FAD-8046-A5C4-05AB318FA424}" type="slidenum">
+              <a:rPr lang="en-US" smtClean="0"/>
+              <a:t>15</a:t>
+            </a:fld>
+            <a:endParaRPr lang="en-US"/>
+          </a:p>
+        </p:txBody>
+      </p:sp>
+    </p:spTree>
+    <p:extLst>
+      <p:ext uri="{BB962C8B-B14F-4D97-AF65-F5344CB8AC3E}">
+        <p14:creationId xmlns:p14="http://schemas.microsoft.com/office/powerpoint/2010/main" val="1456211638"/>
+      </p:ext>
+    </p:extLst>
+  </p:cSld>
+  <p:clrMapOvr>
+    <a:masterClrMapping/>
+  </p:clrMapOvr>
+</p:sld>
+</file>
+
+<file path=ppt/slides/slide16.xml><?xml version="1.0" encoding="utf-8"?>
+<p:sld xmlns:a="http://schemas.openxmlformats.org/drawingml/2006/main" xmlns:r="http://schemas.openxmlformats.org/officeDocument/2006/relationships" xmlns:p="http://schemas.openxmlformats.org/presentationml/2006/main">
+  <p:cSld>
+    <p:spTree>
+      <p:nvGrpSpPr>
+        <p:cNvPr id="1" name=""/>
+        <p:cNvGrpSpPr/>
+        <p:nvPr/>
+      </p:nvGrpSpPr>
+      <p:grpSpPr>
+        <a:xfrm>
+          <a:off x="0" y="0"/>
+          <a:ext cx="0" cy="0"/>
+          <a:chOff x="0" y="0"/>
+          <a:chExt cx="0" cy="0"/>
+        </a:xfrm>
+      </p:grpSpPr>
+      <p:sp>
+        <p:nvSpPr>
+          <p:cNvPr id="51" name="Shape 51"/>
+          <p:cNvSpPr>
+            <a:spLocks noGrp="1"/>
+          </p:cNvSpPr>
+          <p:nvPr>
+            <p:ph type="title"/>
+          </p:nvPr>
+        </p:nvSpPr>
+        <p:spPr/>
+        <p:txBody>
+          <a:bodyPr/>
+          <a:lstStyle/>
+          <a:p>
+            <a:pPr lvl="0"/>
+            <a:r>
+              <a:rPr lang="en-US" dirty="0" smtClean="0"/>
+              <a:t>Getting and Setting the Time of Day</a:t>
+            </a:r>
+            <a:endParaRPr lang="en-US" dirty="0"/>
+          </a:p>
+        </p:txBody>
+      </p:sp>
+      <p:sp>
+        <p:nvSpPr>
+          <p:cNvPr id="52" name="Shape 52"/>
+          <p:cNvSpPr>
+            <a:spLocks noGrp="1"/>
+          </p:cNvSpPr>
+          <p:nvPr>
+            <p:ph type="body" idx="1"/>
+          </p:nvPr>
+        </p:nvSpPr>
+        <p:spPr/>
+        <p:txBody>
+          <a:bodyPr>
+            <a:normAutofit/>
+          </a:bodyPr>
+          <a:lstStyle/>
+          <a:p>
+            <a:pPr lvl="0"/>
+            <a:r>
+              <a:rPr lang="en-US" dirty="0" smtClean="0"/>
+              <a:t>Get</a:t>
+            </a:r>
+            <a:endParaRPr lang="en-US" dirty="0"/>
+          </a:p>
+        </p:txBody>
+      </p:sp>
+      <p:sp>
+        <p:nvSpPr>
+          <p:cNvPr id="4" name="Content Placeholder 3"/>
+          <p:cNvSpPr>
+            <a:spLocks noGrp="1"/>
+          </p:cNvSpPr>
+          <p:nvPr>
+            <p:ph sz="half" idx="2"/>
+          </p:nvPr>
+        </p:nvSpPr>
+        <p:spPr/>
+        <p:txBody>
+          <a:bodyPr/>
+          <a:lstStyle/>
+          <a:p>
+            <a:pPr lvl="0"/>
+            <a:r>
+              <a:rPr lang="en-US" dirty="0" err="1"/>
+              <a:t>gettimeofday</a:t>
+            </a:r>
+            <a:r>
+              <a:rPr lang="en-US" dirty="0"/>
+              <a:t>(2)</a:t>
+            </a:r>
+          </a:p>
+          <a:p>
+            <a:pPr lvl="1"/>
+            <a:r>
+              <a:rPr lang="en-US" dirty="0"/>
+              <a:t>Traditional</a:t>
+            </a:r>
+          </a:p>
+          <a:p>
+            <a:pPr lvl="0"/>
+            <a:r>
+              <a:rPr lang="en-US" dirty="0" err="1"/>
+              <a:t>clock_gettime</a:t>
+            </a:r>
+            <a:r>
+              <a:rPr lang="en-US" dirty="0"/>
+              <a:t>(2)</a:t>
+            </a:r>
+          </a:p>
+          <a:p>
+            <a:pPr lvl="1"/>
+            <a:r>
+              <a:rPr lang="en-US" dirty="0"/>
+              <a:t>Finer grained controls</a:t>
+            </a:r>
+          </a:p>
+          <a:p>
+            <a:endParaRPr lang="en-US" dirty="0"/>
+          </a:p>
+        </p:txBody>
+      </p:sp>
+      <p:sp>
+        <p:nvSpPr>
+          <p:cNvPr id="5" name="Text Placeholder 4"/>
+          <p:cNvSpPr>
+            <a:spLocks noGrp="1"/>
+          </p:cNvSpPr>
+          <p:nvPr>
+            <p:ph type="body" sz="quarter" idx="3"/>
+          </p:nvPr>
+        </p:nvSpPr>
+        <p:spPr/>
+        <p:txBody>
+          <a:bodyPr/>
+          <a:lstStyle/>
+          <a:p>
+            <a:r>
+              <a:rPr lang="en-US" dirty="0" smtClean="0"/>
+              <a:t>Set</a:t>
+            </a:r>
+            <a:endParaRPr lang="en-US" dirty="0"/>
+          </a:p>
+        </p:txBody>
+      </p:sp>
+      <p:sp>
+        <p:nvSpPr>
+          <p:cNvPr id="6" name="Content Placeholder 5"/>
+          <p:cNvSpPr>
+            <a:spLocks noGrp="1"/>
+          </p:cNvSpPr>
+          <p:nvPr>
+            <p:ph sz="quarter" idx="4"/>
+          </p:nvPr>
+        </p:nvSpPr>
+        <p:spPr/>
+        <p:txBody>
+          <a:bodyPr/>
+          <a:lstStyle/>
+          <a:p>
+            <a:r>
+              <a:rPr lang="en-US" dirty="0" err="1" smtClean="0"/>
+              <a:t>adjtime</a:t>
+            </a:r>
+            <a:r>
+              <a:rPr lang="en-US" dirty="0" smtClean="0"/>
+              <a:t>(2)</a:t>
+            </a:r>
+          </a:p>
+          <a:p>
+            <a:pPr lvl="1"/>
+            <a:r>
+              <a:rPr lang="en-US" dirty="0" smtClean="0"/>
+              <a:t>Traditional</a:t>
+            </a:r>
+          </a:p>
+          <a:p>
+            <a:r>
+              <a:rPr lang="en-US" dirty="0" err="1" smtClean="0"/>
+              <a:t>ntp_adjtime</a:t>
+            </a:r>
+            <a:r>
+              <a:rPr lang="en-US" dirty="0" smtClean="0"/>
+              <a:t>(2)</a:t>
+            </a:r>
+          </a:p>
+          <a:p>
+            <a:pPr lvl="1"/>
+            <a:r>
+              <a:rPr lang="en-US" dirty="0" smtClean="0"/>
+              <a:t>Discussion</a:t>
+            </a:r>
+            <a:endParaRPr lang="en-US" dirty="0"/>
+          </a:p>
+        </p:txBody>
+      </p:sp>
+    </p:spTree>
+    <p:extLst>
+      <p:ext uri="{BB962C8B-B14F-4D97-AF65-F5344CB8AC3E}">
+        <p14:creationId xmlns:p14="http://schemas.microsoft.com/office/powerpoint/2010/main" val="592667803"/>
+      </p:ext>
+    </p:extLst>
+  </p:cSld>
+  <p:clrMapOvr>
+    <a:masterClrMapping/>
+  </p:clrMapOvr>
+  <mc:AlternateContent xmlns:mc="http://schemas.openxmlformats.org/markup-compatibility/2006">
+    <mc:Choice xmlns:p14="http://schemas.microsoft.com/office/powerpoint/2010/main" Requires="p14">
+      <p:transition spd="slow" p14:dur="2000"/>
+    </mc:Choice>
+    <mc:Fallback>
+      <p:transition spd="slow"/>
+    </mc:Fallback>
+  </mc:AlternateContent>
+  <p:timing>
+    <p:tnLst>
+      <p:par>
+        <p:cTn id="1" dur="indefinite" restart="never" nodeType="tmRoot"/>
+      </p:par>
+    </p:tnLst>
+  </p:timing>
+</p:sld>
+</file>
+
+<file path=ppt/slides/slide17.xml><?xml version="1.0" encoding="utf-8"?>
+<p:sld xmlns:a="http://schemas.openxmlformats.org/drawingml/2006/main" xmlns:r="http://schemas.openxmlformats.org/officeDocument/2006/relationships" xmlns:p="http://schemas.openxmlformats.org/presentationml/2006/main">
+  <p:cSld>
+    <p:spTree>
+      <p:nvGrpSpPr>
+        <p:cNvPr id="1" name=""/>
+        <p:cNvGrpSpPr/>
+        <p:nvPr/>
+      </p:nvGrpSpPr>
+      <p:grpSpPr>
+        <a:xfrm>
+          <a:off x="0" y="0"/>
+          <a:ext cx="0" cy="0"/>
+          <a:chOff x="0" y="0"/>
+          <a:chExt cx="0" cy="0"/>
+        </a:xfrm>
+      </p:grpSpPr>
+      <p:sp>
+        <p:nvSpPr>
+          <p:cNvPr id="10" name="Title 9"/>
+          <p:cNvSpPr>
+            <a:spLocks noGrp="1"/>
+          </p:cNvSpPr>
+          <p:nvPr>
+            <p:ph type="title"/>
+          </p:nvPr>
+        </p:nvSpPr>
+        <p:spPr/>
+        <p:txBody>
+          <a:bodyPr/>
+          <a:lstStyle/>
+          <a:p>
+            <a:r>
+              <a:rPr lang="en-US" dirty="0" smtClean="0"/>
+              <a:t>Why do we set the time?</a:t>
+            </a:r>
+            <a:endParaRPr lang="en-US" dirty="0"/>
+          </a:p>
+        </p:txBody>
+      </p:sp>
+      <p:sp>
+        <p:nvSpPr>
+          <p:cNvPr id="11" name="Content Placeholder 10"/>
+          <p:cNvSpPr>
+            <a:spLocks noGrp="1"/>
+          </p:cNvSpPr>
+          <p:nvPr>
+            <p:ph idx="1"/>
+          </p:nvPr>
+        </p:nvSpPr>
+        <p:spPr/>
+        <p:txBody>
+          <a:bodyPr/>
+          <a:lstStyle/>
+          <a:p>
+            <a:r>
+              <a:rPr lang="en-US" dirty="0" smtClean="0"/>
+              <a:t>Who can set the time?</a:t>
+            </a:r>
+          </a:p>
+          <a:p>
+            <a:r>
+              <a:rPr lang="en-US" dirty="0" smtClean="0"/>
+              <a:t>Why?</a:t>
+            </a:r>
+          </a:p>
+          <a:p>
+            <a:r>
+              <a:rPr lang="en-US" dirty="0" smtClean="0"/>
+              <a:t>How?</a:t>
+            </a:r>
+            <a:endParaRPr lang="en-US" dirty="0"/>
+          </a:p>
+        </p:txBody>
+      </p:sp>
+      <p:sp>
+        <p:nvSpPr>
+          <p:cNvPr id="7" name="Date Placeholder 6"/>
+          <p:cNvSpPr>
+            <a:spLocks noGrp="1"/>
+          </p:cNvSpPr>
+          <p:nvPr>
+            <p:ph type="dt" sz="half" idx="10"/>
+          </p:nvPr>
+        </p:nvSpPr>
+        <p:spPr/>
+        <p:txBody>
+          <a:bodyPr/>
+          <a:lstStyle/>
+          <a:p>
+            <a:fld id="{B1259037-4653-634A-8C7E-33C2E296917B}" type="datetime1">
+              <a:rPr lang="en-US" smtClean="0"/>
+              <a:t>2/14/17</a:t>
+            </a:fld>
+            <a:endParaRPr lang="en-US"/>
+          </a:p>
+        </p:txBody>
+      </p:sp>
+      <p:sp>
+        <p:nvSpPr>
+          <p:cNvPr id="8" name="Footer Placeholder 7"/>
+          <p:cNvSpPr>
+            <a:spLocks noGrp="1"/>
+          </p:cNvSpPr>
+          <p:nvPr>
+            <p:ph type="ftr" sz="quarter" idx="11"/>
+          </p:nvPr>
+        </p:nvSpPr>
+        <p:spPr/>
+        <p:txBody>
+          <a:bodyPr/>
+          <a:lstStyle/>
+          <a:p>
+            <a:r>
+              <a:rPr lang="en-US" smtClean="0"/>
+              <a:t>Introduction to Operating Systems</a:t>
+            </a:r>
+            <a:endParaRPr lang="en-US"/>
+          </a:p>
+        </p:txBody>
+      </p:sp>
+      <p:sp>
+        <p:nvSpPr>
+          <p:cNvPr id="9" name="Slide Number Placeholder 8"/>
+          <p:cNvSpPr>
+            <a:spLocks noGrp="1"/>
+          </p:cNvSpPr>
+          <p:nvPr>
+            <p:ph type="sldNum" sz="quarter" idx="12"/>
+          </p:nvPr>
+        </p:nvSpPr>
+        <p:spPr/>
+        <p:txBody>
+          <a:bodyPr/>
+          <a:lstStyle/>
+          <a:p>
+            <a:fld id="{699C44C4-0FAD-8046-A5C4-05AB318FA424}" type="slidenum">
+              <a:rPr lang="en-US" smtClean="0"/>
+              <a:t>17</a:t>
+            </a:fld>
+            <a:endParaRPr lang="en-US"/>
+          </a:p>
+        </p:txBody>
+      </p:sp>
+    </p:spTree>
+    <p:extLst>
+      <p:ext uri="{BB962C8B-B14F-4D97-AF65-F5344CB8AC3E}">
+        <p14:creationId xmlns:p14="http://schemas.microsoft.com/office/powerpoint/2010/main" val="962690970"/>
+      </p:ext>
+    </p:extLst>
+  </p:cSld>
+  <p:clrMapOvr>
+    <a:masterClrMapping/>
+  </p:clrMapOvr>
+</p:sld>
+</file>
+
+<file path=ppt/slides/slide18.xml><?xml version="1.0" encoding="utf-8"?>
+<p:sld xmlns:a="http://schemas.openxmlformats.org/drawingml/2006/main" xmlns:r="http://schemas.openxmlformats.org/officeDocument/2006/relationships" xmlns:p="http://schemas.openxmlformats.org/presentationml/2006/main">
+  <p:cSld>
+    <p:spTree>
+      <p:nvGrpSpPr>
+        <p:cNvPr id="1" name=""/>
+        <p:cNvGrpSpPr/>
+        <p:nvPr/>
+      </p:nvGrpSpPr>
+      <p:grpSpPr>
+        <a:xfrm>
+          <a:off x="0" y="0"/>
+          <a:ext cx="0" cy="0"/>
+          <a:chOff x="0" y="0"/>
+          <a:chExt cx="0" cy="0"/>
+        </a:xfrm>
+      </p:grpSpPr>
+      <p:sp>
+        <p:nvSpPr>
+          <p:cNvPr id="2" name="Title 1"/>
+          <p:cNvSpPr>
+            <a:spLocks noGrp="1"/>
+          </p:cNvSpPr>
+          <p:nvPr>
+            <p:ph type="title"/>
+          </p:nvPr>
+        </p:nvSpPr>
+        <p:spPr/>
+        <p:txBody>
+          <a:bodyPr/>
+          <a:lstStyle/>
+          <a:p>
+            <a:r>
+              <a:rPr lang="en-US" dirty="0" smtClean="0"/>
+              <a:t>Resource Tracking</a:t>
+            </a:r>
+            <a:endParaRPr lang="en-US" dirty="0"/>
+          </a:p>
+        </p:txBody>
+      </p:sp>
+      <p:sp>
+        <p:nvSpPr>
+          <p:cNvPr id="3" name="Text Placeholder 2"/>
+          <p:cNvSpPr>
+            <a:spLocks noGrp="1"/>
+          </p:cNvSpPr>
+          <p:nvPr>
+            <p:ph type="body" idx="1"/>
+          </p:nvPr>
+        </p:nvSpPr>
+        <p:spPr/>
+        <p:txBody>
+          <a:bodyPr/>
+          <a:lstStyle/>
+          <a:p>
+            <a:pPr>
+              <a:lnSpc>
+                <a:spcPct val="100000"/>
+              </a:lnSpc>
+              <a:spcBef>
+                <a:spcPts val="0"/>
+              </a:spcBef>
+              <a:spcAft>
+                <a:spcPts val="0"/>
+              </a:spcAft>
+              <a:buClrTx/>
+              <a:buSzTx/>
+              <a:buFont typeface="Arial" charset="0"/>
+              <a:buChar char="•"/>
+            </a:pPr>
+            <a:r>
+              <a:rPr lang="en-US" dirty="0" smtClean="0"/>
+              <a:t>Managing scarce resources</a:t>
+            </a:r>
+          </a:p>
+          <a:p>
+            <a:pPr lvl="1">
+              <a:lnSpc>
+                <a:spcPct val="100000"/>
+              </a:lnSpc>
+              <a:spcBef>
+                <a:spcPts val="0"/>
+              </a:spcBef>
+              <a:spcAft>
+                <a:spcPts val="0"/>
+              </a:spcAft>
+              <a:buClrTx/>
+              <a:buFont typeface="Arial" charset="0"/>
+              <a:buChar char="•"/>
+            </a:pPr>
+            <a:r>
+              <a:rPr lang="en-US" dirty="0" smtClean="0"/>
+              <a:t>Memory</a:t>
+            </a:r>
+          </a:p>
+          <a:p>
+            <a:pPr lvl="1">
+              <a:lnSpc>
+                <a:spcPct val="100000"/>
+              </a:lnSpc>
+              <a:spcBef>
+                <a:spcPts val="0"/>
+              </a:spcBef>
+              <a:spcAft>
+                <a:spcPts val="0"/>
+              </a:spcAft>
+              <a:buClrTx/>
+              <a:buFont typeface="Arial" charset="0"/>
+              <a:buChar char="•"/>
+            </a:pPr>
+            <a:r>
+              <a:rPr lang="en-US" dirty="0" smtClean="0"/>
+              <a:t>CPU Time (Processing)</a:t>
+            </a:r>
+          </a:p>
+          <a:p>
+            <a:pPr lvl="1">
+              <a:lnSpc>
+                <a:spcPct val="100000"/>
+              </a:lnSpc>
+              <a:spcBef>
+                <a:spcPts val="0"/>
+              </a:spcBef>
+              <a:spcAft>
+                <a:spcPts val="0"/>
+              </a:spcAft>
+              <a:buClrTx/>
+              <a:buFont typeface="Arial" charset="0"/>
+              <a:buChar char="•"/>
+            </a:pPr>
+            <a:r>
+              <a:rPr lang="en-US" dirty="0" smtClean="0"/>
+              <a:t>Disk Space (Storage)</a:t>
+            </a:r>
+          </a:p>
+          <a:p>
+            <a:pPr lvl="1">
+              <a:lnSpc>
+                <a:spcPct val="100000"/>
+              </a:lnSpc>
+              <a:spcBef>
+                <a:spcPts val="0"/>
+              </a:spcBef>
+              <a:spcAft>
+                <a:spcPts val="0"/>
+              </a:spcAft>
+              <a:buClrTx/>
+              <a:buFont typeface="Arial" charset="0"/>
+              <a:buChar char="•"/>
+            </a:pPr>
+            <a:r>
+              <a:rPr lang="en-US" dirty="0" smtClean="0"/>
+              <a:t>Bandwidth (Communication)</a:t>
+            </a:r>
+            <a:endParaRPr lang="en-US" dirty="0"/>
+          </a:p>
+          <a:p>
+            <a:pPr>
+              <a:lnSpc>
+                <a:spcPct val="100000"/>
+              </a:lnSpc>
+              <a:spcBef>
+                <a:spcPts val="0"/>
+              </a:spcBef>
+              <a:spcAft>
+                <a:spcPts val="0"/>
+              </a:spcAft>
+              <a:buClrTx/>
+              <a:buSzTx/>
+              <a:buFont typeface="Arial" charset="0"/>
+              <a:buChar char="•"/>
+            </a:pPr>
+            <a:r>
+              <a:rPr lang="en-US" dirty="0" smtClean="0"/>
+              <a:t>Used to be a charge to your department</a:t>
+            </a:r>
+          </a:p>
+          <a:p>
+            <a:pPr>
+              <a:lnSpc>
+                <a:spcPct val="100000"/>
+              </a:lnSpc>
+              <a:spcBef>
+                <a:spcPts val="0"/>
+              </a:spcBef>
+              <a:spcAft>
+                <a:spcPts val="0"/>
+              </a:spcAft>
+              <a:buClrTx/>
+              <a:buSzTx/>
+              <a:buFont typeface="Arial" charset="0"/>
+              <a:buChar char="•"/>
+            </a:pPr>
+            <a:r>
+              <a:rPr lang="en-US" dirty="0" smtClean="0"/>
+              <a:t>Security implications?</a:t>
+            </a:r>
+          </a:p>
+          <a:p>
+            <a:pPr>
+              <a:lnSpc>
+                <a:spcPct val="100000"/>
+              </a:lnSpc>
+              <a:spcBef>
+                <a:spcPts val="0"/>
+              </a:spcBef>
+              <a:spcAft>
+                <a:spcPts val="0"/>
+              </a:spcAft>
+              <a:buClrTx/>
+              <a:buSzTx/>
+              <a:buFont typeface="Arial" charset="0"/>
+              <a:buChar char="•"/>
+            </a:pPr>
+            <a:endParaRPr lang="en-US" dirty="0"/>
+          </a:p>
+        </p:txBody>
+      </p:sp>
+    </p:spTree>
+    <p:extLst>
+      <p:ext uri="{BB962C8B-B14F-4D97-AF65-F5344CB8AC3E}">
+        <p14:creationId xmlns:p14="http://schemas.microsoft.com/office/powerpoint/2010/main" val="1577295793"/>
+      </p:ext>
+    </p:extLst>
+  </p:cSld>
+  <p:clrMapOvr>
+    <a:masterClrMapping/>
+  </p:clrMapOvr>
+  <p:transition spd="med"/>
+</p:sld>
+</file>
+
+<file path=ppt/slides/slide19.xml><?xml version="1.0" encoding="utf-8"?>
+<p:sld xmlns:a="http://schemas.openxmlformats.org/drawingml/2006/main" xmlns:r="http://schemas.openxmlformats.org/officeDocument/2006/relationships" xmlns:p="http://schemas.openxmlformats.org/presentationml/2006/main">
+  <p:cSld>
+    <p:spTree>
+      <p:nvGrpSpPr>
+        <p:cNvPr id="1" name=""/>
+        <p:cNvGrpSpPr/>
+        <p:nvPr/>
+      </p:nvGrpSpPr>
+      <p:grpSpPr>
+        <a:xfrm>
+          <a:off x="0" y="0"/>
+          <a:ext cx="0" cy="0"/>
+          <a:chOff x="0" y="0"/>
+          <a:chExt cx="0" cy="0"/>
+        </a:xfrm>
+      </p:grpSpPr>
+      <p:sp>
+        <p:nvSpPr>
+          <p:cNvPr id="2" name="Title 1"/>
+          <p:cNvSpPr>
+            <a:spLocks noGrp="1"/>
+          </p:cNvSpPr>
+          <p:nvPr>
+            <p:ph type="title"/>
+          </p:nvPr>
+        </p:nvSpPr>
+        <p:spPr/>
+        <p:txBody>
+          <a:bodyPr/>
+          <a:lstStyle/>
+          <a:p>
+            <a:r>
+              <a:rPr lang="en-US" dirty="0" smtClean="0"/>
+              <a:t>System Processes</a:t>
+            </a:r>
+            <a:endParaRPr lang="en-US" dirty="0"/>
+          </a:p>
+        </p:txBody>
+      </p:sp>
+      <p:sp>
+        <p:nvSpPr>
+          <p:cNvPr id="3" name="Text Placeholder 2"/>
+          <p:cNvSpPr>
+            <a:spLocks noGrp="1"/>
+          </p:cNvSpPr>
+          <p:nvPr>
+            <p:ph type="body" idx="1"/>
+          </p:nvPr>
+        </p:nvSpPr>
+        <p:spPr/>
+        <p:txBody>
+          <a:bodyPr/>
+          <a:lstStyle/>
+          <a:p>
+            <a:r>
+              <a:rPr lang="en-US" dirty="0" smtClean="0"/>
+              <a:t>An operating system is a collection of programs</a:t>
+            </a:r>
+          </a:p>
+          <a:p>
+            <a:r>
+              <a:rPr lang="en-US" dirty="0" smtClean="0"/>
+              <a:t>Bookkeeping</a:t>
+            </a:r>
+          </a:p>
+          <a:p>
+            <a:r>
+              <a:rPr lang="en-US" dirty="0" smtClean="0"/>
+              <a:t>Cleanup</a:t>
+            </a:r>
+          </a:p>
+          <a:p>
+            <a:r>
+              <a:rPr lang="en-US" dirty="0" smtClean="0"/>
+              <a:t>Resource Management</a:t>
+            </a:r>
+            <a:endParaRPr lang="en-US" dirty="0"/>
+          </a:p>
+        </p:txBody>
+      </p:sp>
+    </p:spTree>
+    <p:extLst>
+      <p:ext uri="{BB962C8B-B14F-4D97-AF65-F5344CB8AC3E}">
+        <p14:creationId xmlns:p14="http://schemas.microsoft.com/office/powerpoint/2010/main" val="927577276"/>
+      </p:ext>
+    </p:extLst>
+  </p:cSld>
+  <p:clrMapOvr>
+    <a:masterClrMapping/>
+  </p:clrMapOvr>
+  <p:transition spd="med"/>
 </p:sld>
 </file>
 
@@ -5129,7 +6508,54 @@
           <a:bodyPr/>
           <a:lstStyle/>
           <a:p>
-            <a:endParaRPr lang="en-US"/>
+            <a:r>
+              <a:rPr lang="en-US" dirty="0" smtClean="0"/>
+              <a:t>System Processes</a:t>
+            </a:r>
+          </a:p>
+          <a:p>
+            <a:r>
+              <a:rPr lang="en-US" dirty="0" smtClean="0"/>
+              <a:t>System Call Interface</a:t>
+            </a:r>
+          </a:p>
+          <a:p>
+            <a:r>
+              <a:rPr lang="en-US" dirty="0" smtClean="0"/>
+              <a:t>Traps and Interrupts</a:t>
+            </a:r>
+          </a:p>
+          <a:p>
+            <a:r>
+              <a:rPr lang="en-US" dirty="0" smtClean="0"/>
+              <a:t>Memory Management</a:t>
+            </a:r>
+          </a:p>
+          <a:p>
+            <a:r>
+              <a:rPr lang="en-US" dirty="0" smtClean="0"/>
+              <a:t>Timing Services</a:t>
+            </a:r>
+          </a:p>
+          <a:p>
+            <a:r>
+              <a:rPr lang="en-US" dirty="0" smtClean="0"/>
+              <a:t>Resource Usage and Limits</a:t>
+            </a:r>
+          </a:p>
+          <a:p>
+            <a:r>
+              <a:rPr lang="en-US" dirty="0" smtClean="0"/>
+              <a:t>Tracing</a:t>
+            </a:r>
+          </a:p>
+          <a:p>
+            <a:pPr lvl="1"/>
+            <a:r>
+              <a:rPr lang="en-US" dirty="0" smtClean="0"/>
+              <a:t>Which we’ll discuss at length in the next section</a:t>
+            </a:r>
+            <a:endParaRPr lang="en-US" dirty="0" smtClean="0"/>
           </a:p>
         </p:txBody>
       </p:sp>
@@ -5148,9 +6574,9 @@
           <a:bodyPr/>
           <a:lstStyle/>
           <a:p>
-            <a:fld id="{E2C0EE0B-2D6D-114F-90A0-1A5ED23515E5}" type="datetime1">
-              <a:rPr lang="en-US" smtClean="0"/>
-              <a:t>2/12/17</a:t>
+            <a:fld id="{F2F85883-78DF-6843-8ADC-5371C1884CF2}" type="datetime1">
+              <a:rPr lang="en-US" smtClean="0"/>
+              <a:t>2/14/17</a:t>
             </a:fld>
             <a:endParaRPr lang="en-US"/>
           </a:p>
@@ -5206,6 +6632,912 @@
     <p:extLst>
       <p:ext uri="{BB962C8B-B14F-4D97-AF65-F5344CB8AC3E}">
         <p14:creationId xmlns:p14="http://schemas.microsoft.com/office/powerpoint/2010/main" val="1296378508"/>
+      </p:ext>
+    </p:extLst>
+  </p:cSld>
+  <p:clrMapOvr>
+    <a:masterClrMapping/>
+  </p:clrMapOvr>
+</p:sld>
+</file>
+
+<file path=ppt/slides/slide20.xml><?xml version="1.0" encoding="utf-8"?>
+<p:sld xmlns:a="http://schemas.openxmlformats.org/drawingml/2006/main" xmlns:r="http://schemas.openxmlformats.org/officeDocument/2006/relationships" xmlns:p="http://schemas.openxmlformats.org/presentationml/2006/main">
+  <p:cSld>
+    <p:spTree>
+      <p:nvGrpSpPr>
+        <p:cNvPr id="1" name=""/>
+        <p:cNvGrpSpPr/>
+        <p:nvPr/>
+      </p:nvGrpSpPr>
+      <p:grpSpPr>
+        <a:xfrm>
+          <a:off x="0" y="0"/>
+          <a:ext cx="0" cy="0"/>
+          <a:chOff x="0" y="0"/>
+          <a:chExt cx="0" cy="0"/>
+        </a:xfrm>
+      </p:grpSpPr>
+      <p:sp>
+        <p:nvSpPr>
+          <p:cNvPr id="2" name="Title 1"/>
+          <p:cNvSpPr>
+            <a:spLocks noGrp="1"/>
+          </p:cNvSpPr>
+          <p:nvPr>
+            <p:ph type="title"/>
+          </p:nvPr>
+        </p:nvSpPr>
+        <p:spPr/>
+        <p:txBody>
+          <a:bodyPr/>
+          <a:lstStyle/>
+          <a:p>
+            <a:r>
+              <a:rPr lang="en-US" dirty="0" smtClean="0"/>
+              <a:t>Kernel Processes</a:t>
+            </a:r>
+            <a:endParaRPr lang="en-US" dirty="0"/>
+          </a:p>
+        </p:txBody>
+      </p:sp>
+      <p:graphicFrame>
+        <p:nvGraphicFramePr>
+          <p:cNvPr id="4" name="Table 3"/>
+          <p:cNvGraphicFramePr>
+            <a:graphicFrameLocks noGrp="1"/>
+          </p:cNvGraphicFramePr>
+          <p:nvPr>
+            <p:extLst>
+              <p:ext uri="{D42A27DB-BD31-4B8C-83A1-F6EECF244321}">
+                <p14:modId xmlns:p14="http://schemas.microsoft.com/office/powerpoint/2010/main" val="151072566"/>
+              </p:ext>
+            </p:extLst>
+          </p:nvPr>
+        </p:nvGraphicFramePr>
+        <p:xfrm>
+          <a:off x="2062480" y="1622252"/>
+          <a:ext cx="8128000" cy="3703320"/>
+        </p:xfrm>
+        <a:graphic>
+          <a:graphicData uri="http://schemas.openxmlformats.org/drawingml/2006/table">
+            <a:tbl>
+              <a:tblPr firstRow="1" bandRow="1">
+                <a:tableStyleId>{5C22544A-7EE6-4342-B048-85BDC9FD1C3A}</a:tableStyleId>
+              </a:tblPr>
+              <a:tblGrid>
+                <a:gridCol w="4064000"/>
+                <a:gridCol w="4064000"/>
+              </a:tblGrid>
+              <a:tr h="0">
+                <a:tc>
+                  <a:txBody>
+                    <a:bodyPr/>
+                    <a:lstStyle/>
+                    <a:p>
+                      <a:r>
+                        <a:rPr lang="en-US" dirty="0" smtClean="0"/>
+                        <a:t>Name</a:t>
+                      </a:r>
+                      <a:endParaRPr lang="en-US" dirty="0"/>
+                    </a:p>
+                  </a:txBody>
+                  <a:tcPr/>
+                </a:tc>
+                <a:tc>
+                  <a:txBody>
+                    <a:bodyPr/>
+                    <a:lstStyle/>
+                    <a:p>
+                      <a:r>
+                        <a:rPr lang="en-US" dirty="0" err="1" smtClean="0"/>
+                        <a:t>Desciption</a:t>
+                      </a:r>
+                      <a:endParaRPr lang="en-US" dirty="0"/>
+                    </a:p>
+                  </a:txBody>
+                  <a:tcPr/>
+                </a:tc>
+              </a:tr>
+              <a:tr h="370840">
+                <a:tc>
+                  <a:txBody>
+                    <a:bodyPr/>
+                    <a:lstStyle/>
+                    <a:p>
+                      <a:r>
+                        <a:rPr lang="en-US" dirty="0" smtClean="0"/>
+                        <a:t>audit</a:t>
+                      </a:r>
+                      <a:endParaRPr lang="en-US" dirty="0"/>
+                    </a:p>
+                  </a:txBody>
+                  <a:tcPr/>
+                </a:tc>
+                <a:tc>
+                  <a:txBody>
+                    <a:bodyPr/>
+                    <a:lstStyle/>
+                    <a:p>
+                      <a:r>
+                        <a:rPr lang="en-US" dirty="0" smtClean="0"/>
+                        <a:t>security sub-system</a:t>
+                      </a:r>
+                      <a:endParaRPr lang="en-US" dirty="0"/>
+                    </a:p>
+                  </a:txBody>
+                  <a:tcPr/>
+                </a:tc>
+              </a:tr>
+              <a:tr h="370840">
+                <a:tc>
+                  <a:txBody>
+                    <a:bodyPr/>
+                    <a:lstStyle/>
+                    <a:p>
+                      <a:r>
+                        <a:rPr lang="en-US" dirty="0" err="1" smtClean="0"/>
+                        <a:t>bufdaemon</a:t>
+                      </a:r>
+                      <a:endParaRPr lang="en-US" dirty="0"/>
+                    </a:p>
+                  </a:txBody>
+                  <a:tcPr/>
+                </a:tc>
+                <a:tc>
+                  <a:txBody>
+                    <a:bodyPr/>
+                    <a:lstStyle/>
+                    <a:p>
+                      <a:r>
+                        <a:rPr lang="en-US" dirty="0" smtClean="0"/>
+                        <a:t>storage buffer management</a:t>
+                      </a:r>
+                      <a:endParaRPr lang="en-US" dirty="0"/>
+                    </a:p>
+                  </a:txBody>
+                  <a:tcPr/>
+                </a:tc>
+              </a:tr>
+              <a:tr h="370840">
+                <a:tc>
+                  <a:txBody>
+                    <a:bodyPr/>
+                    <a:lstStyle/>
+                    <a:p>
+                      <a:r>
+                        <a:rPr lang="en-US" dirty="0" smtClean="0"/>
+                        <a:t>crypto</a:t>
+                      </a:r>
+                      <a:endParaRPr lang="en-US" dirty="0"/>
+                    </a:p>
+                  </a:txBody>
+                  <a:tcPr/>
+                </a:tc>
+                <a:tc>
+                  <a:txBody>
+                    <a:bodyPr/>
+                    <a:lstStyle/>
+                    <a:p>
+                      <a:r>
+                        <a:rPr lang="en-US" dirty="0" smtClean="0"/>
+                        <a:t>cryptographic services</a:t>
+                      </a:r>
+                      <a:endParaRPr lang="en-US" dirty="0"/>
+                    </a:p>
+                  </a:txBody>
+                  <a:tcPr/>
+                </a:tc>
+              </a:tr>
+              <a:tr h="370840">
+                <a:tc>
+                  <a:txBody>
+                    <a:bodyPr/>
+                    <a:lstStyle/>
+                    <a:p>
+                      <a:r>
+                        <a:rPr lang="en-US" dirty="0" err="1" smtClean="0"/>
+                        <a:t>geom</a:t>
+                      </a:r>
+                      <a:endParaRPr lang="en-US" dirty="0"/>
+                    </a:p>
+                  </a:txBody>
+                  <a:tcPr/>
+                </a:tc>
+                <a:tc>
+                  <a:txBody>
+                    <a:bodyPr/>
+                    <a:lstStyle/>
+                    <a:p>
+                      <a:r>
+                        <a:rPr lang="en-US" dirty="0" smtClean="0"/>
+                        <a:t>storage system</a:t>
+                      </a:r>
+                      <a:endParaRPr lang="en-US" dirty="0"/>
+                    </a:p>
+                  </a:txBody>
+                  <a:tcPr/>
+                </a:tc>
+              </a:tr>
+              <a:tr h="370840">
+                <a:tc>
+                  <a:txBody>
+                    <a:bodyPr/>
+                    <a:lstStyle/>
+                    <a:p>
+                      <a:r>
+                        <a:rPr lang="en-US" dirty="0" smtClean="0"/>
+                        <a:t>idle</a:t>
+                      </a:r>
+                      <a:endParaRPr lang="en-US" dirty="0"/>
+                    </a:p>
+                  </a:txBody>
+                  <a:tcPr/>
+                </a:tc>
+                <a:tc>
+                  <a:txBody>
+                    <a:bodyPr/>
+                    <a:lstStyle/>
+                    <a:p>
+                      <a:r>
+                        <a:rPr lang="en-US" dirty="0" smtClean="0"/>
+                        <a:t>runs when nothing else is running</a:t>
+                      </a:r>
+                      <a:endParaRPr lang="en-US" dirty="0"/>
+                    </a:p>
+                  </a:txBody>
+                  <a:tcPr/>
+                </a:tc>
+              </a:tr>
+              <a:tr h="370840">
+                <a:tc>
+                  <a:txBody>
+                    <a:bodyPr/>
+                    <a:lstStyle/>
+                    <a:p>
+                      <a:r>
+                        <a:rPr lang="en-US" dirty="0" err="1" smtClean="0"/>
+                        <a:t>intr</a:t>
+                      </a:r>
+                      <a:endParaRPr lang="en-US" dirty="0"/>
+                    </a:p>
+                  </a:txBody>
+                  <a:tcPr/>
+                </a:tc>
+                <a:tc>
+                  <a:txBody>
+                    <a:bodyPr/>
+                    <a:lstStyle/>
+                    <a:p>
+                      <a:r>
+                        <a:rPr lang="en-US" dirty="0" smtClean="0"/>
+                        <a:t>device</a:t>
+                      </a:r>
+                      <a:r>
+                        <a:rPr lang="en-US" baseline="0" dirty="0" smtClean="0"/>
+                        <a:t> </a:t>
+                      </a:r>
+                      <a:r>
+                        <a:rPr lang="en-US" baseline="0" dirty="0" err="1" smtClean="0"/>
+                        <a:t>interrup</a:t>
+                      </a:r>
+                      <a:r>
+                        <a:rPr lang="en-US" baseline="0" dirty="0" smtClean="0"/>
+                        <a:t> handlers</a:t>
+                      </a:r>
+                      <a:endParaRPr lang="en-US" dirty="0"/>
+                    </a:p>
+                  </a:txBody>
+                  <a:tcPr/>
+                </a:tc>
+              </a:tr>
+              <a:tr h="370840">
+                <a:tc>
+                  <a:txBody>
+                    <a:bodyPr/>
+                    <a:lstStyle/>
+                    <a:p>
+                      <a:r>
+                        <a:rPr lang="en-US" dirty="0" err="1" smtClean="0"/>
+                        <a:t>syncer</a:t>
+                      </a:r>
+                      <a:endParaRPr lang="en-US" dirty="0"/>
+                    </a:p>
+                  </a:txBody>
+                  <a:tcPr/>
+                </a:tc>
+                <a:tc>
+                  <a:txBody>
+                    <a:bodyPr/>
+                    <a:lstStyle/>
+                    <a:p>
+                      <a:r>
+                        <a:rPr lang="en-US" dirty="0" smtClean="0"/>
+                        <a:t>moves</a:t>
+                      </a:r>
+                      <a:r>
+                        <a:rPr lang="en-US" baseline="0" dirty="0" smtClean="0"/>
+                        <a:t> data from memory to storage</a:t>
+                      </a:r>
+                      <a:endParaRPr lang="en-US" dirty="0"/>
+                    </a:p>
+                  </a:txBody>
+                  <a:tcPr/>
+                </a:tc>
+              </a:tr>
+              <a:tr h="370840">
+                <a:tc>
+                  <a:txBody>
+                    <a:bodyPr/>
+                    <a:lstStyle/>
+                    <a:p>
+                      <a:r>
+                        <a:rPr lang="en-US" dirty="0" err="1" smtClean="0"/>
+                        <a:t>vmdaemon</a:t>
+                      </a:r>
+                      <a:endParaRPr lang="en-US" dirty="0"/>
+                    </a:p>
+                  </a:txBody>
+                  <a:tcPr/>
+                </a:tc>
+                <a:tc>
+                  <a:txBody>
+                    <a:bodyPr/>
+                    <a:lstStyle/>
+                    <a:p>
+                      <a:r>
+                        <a:rPr lang="en-US" dirty="0" smtClean="0"/>
+                        <a:t>moves processes to storage</a:t>
+                      </a:r>
+                      <a:endParaRPr lang="en-US" dirty="0"/>
+                    </a:p>
+                  </a:txBody>
+                  <a:tcPr/>
+                </a:tc>
+              </a:tr>
+              <a:tr h="370840">
+                <a:tc>
+                  <a:txBody>
+                    <a:bodyPr/>
+                    <a:lstStyle/>
+                    <a:p>
+                      <a:r>
+                        <a:rPr lang="en-US" dirty="0" err="1" smtClean="0"/>
+                        <a:t>vnlru</a:t>
+                      </a:r>
+                      <a:endParaRPr lang="en-US" dirty="0"/>
+                    </a:p>
+                  </a:txBody>
+                  <a:tcPr/>
+                </a:tc>
+                <a:tc>
+                  <a:txBody>
+                    <a:bodyPr/>
+                    <a:lstStyle/>
+                    <a:p>
+                      <a:r>
+                        <a:rPr lang="en-US" dirty="0" smtClean="0"/>
+                        <a:t>storage system management</a:t>
+                      </a:r>
+                      <a:endParaRPr lang="en-US" dirty="0"/>
+                    </a:p>
+                  </a:txBody>
+                  <a:tcPr/>
+                </a:tc>
+              </a:tr>
+            </a:tbl>
+          </a:graphicData>
+        </a:graphic>
+      </p:graphicFrame>
+    </p:spTree>
+    <p:extLst>
+      <p:ext uri="{BB962C8B-B14F-4D97-AF65-F5344CB8AC3E}">
+        <p14:creationId xmlns:p14="http://schemas.microsoft.com/office/powerpoint/2010/main" val="96803432"/>
+      </p:ext>
+    </p:extLst>
+  </p:cSld>
+  <p:clrMapOvr>
+    <a:masterClrMapping/>
+  </p:clrMapOvr>
+  <mc:AlternateContent xmlns:mc="http://schemas.openxmlformats.org/markup-compatibility/2006">
+    <mc:Choice xmlns:p14="http://schemas.microsoft.com/office/powerpoint/2010/main" Requires="p14">
+      <p:transition spd="slow" p14:dur="2000"/>
+    </mc:Choice>
+    <mc:Fallback>
+      <p:transition spd="slow"/>
+    </mc:Fallback>
+  </mc:AlternateContent>
+</p:sld>
+</file>
+
+<file path=ppt/slides/slide21.xml><?xml version="1.0" encoding="utf-8"?>
+<p:sld xmlns:a="http://schemas.openxmlformats.org/drawingml/2006/main" xmlns:r="http://schemas.openxmlformats.org/officeDocument/2006/relationships" xmlns:p="http://schemas.openxmlformats.org/presentationml/2006/main">
+  <p:cSld>
+    <p:spTree>
+      <p:nvGrpSpPr>
+        <p:cNvPr id="1" name=""/>
+        <p:cNvGrpSpPr/>
+        <p:nvPr/>
+      </p:nvGrpSpPr>
+      <p:grpSpPr>
+        <a:xfrm>
+          <a:off x="0" y="0"/>
+          <a:ext cx="0" cy="0"/>
+          <a:chOff x="0" y="0"/>
+          <a:chExt cx="0" cy="0"/>
+        </a:xfrm>
+      </p:grpSpPr>
+      <p:sp>
+        <p:nvSpPr>
+          <p:cNvPr id="2" name="Title 1"/>
+          <p:cNvSpPr>
+            <a:spLocks noGrp="1"/>
+          </p:cNvSpPr>
+          <p:nvPr>
+            <p:ph type="title"/>
+          </p:nvPr>
+        </p:nvSpPr>
+        <p:spPr/>
+        <p:txBody>
+          <a:bodyPr/>
+          <a:lstStyle/>
+          <a:p>
+            <a:endParaRPr lang="en-US"/>
+          </a:p>
+        </p:txBody>
+      </p:sp>
+      <p:sp>
+        <p:nvSpPr>
+          <p:cNvPr id="3" name="Text Placeholder 2"/>
+          <p:cNvSpPr>
+            <a:spLocks noGrp="1"/>
+          </p:cNvSpPr>
+          <p:nvPr>
+            <p:ph type="body" idx="1"/>
+          </p:nvPr>
+        </p:nvSpPr>
+        <p:spPr/>
+        <p:txBody>
+          <a:bodyPr/>
+          <a:lstStyle/>
+          <a:p>
+            <a:endParaRPr lang="en-US"/>
+          </a:p>
+        </p:txBody>
+      </p:sp>
+    </p:spTree>
+    <p:extLst>
+      <p:ext uri="{BB962C8B-B14F-4D97-AF65-F5344CB8AC3E}">
+        <p14:creationId xmlns:p14="http://schemas.microsoft.com/office/powerpoint/2010/main" val="1012422953"/>
+      </p:ext>
+    </p:extLst>
+  </p:cSld>
+  <p:clrMapOvr>
+    <a:masterClrMapping/>
+  </p:clrMapOvr>
+  <p:transition spd="med"/>
+</p:sld>
+</file>
+
+<file path=ppt/slides/slide22.xml><?xml version="1.0" encoding="utf-8"?>
+<p:sld xmlns:a="http://schemas.openxmlformats.org/drawingml/2006/main" xmlns:r="http://schemas.openxmlformats.org/officeDocument/2006/relationships" xmlns:p="http://schemas.openxmlformats.org/presentationml/2006/main">
+  <p:cSld>
+    <p:spTree>
+      <p:nvGrpSpPr>
+        <p:cNvPr id="1" name=""/>
+        <p:cNvGrpSpPr/>
+        <p:nvPr/>
+      </p:nvGrpSpPr>
+      <p:grpSpPr>
+        <a:xfrm>
+          <a:off x="0" y="0"/>
+          <a:ext cx="0" cy="0"/>
+          <a:chOff x="0" y="0"/>
+          <a:chExt cx="0" cy="0"/>
+        </a:xfrm>
+      </p:grpSpPr>
+      <p:sp>
+        <p:nvSpPr>
+          <p:cNvPr id="2" name="Title 1"/>
+          <p:cNvSpPr>
+            <a:spLocks noGrp="1"/>
+          </p:cNvSpPr>
+          <p:nvPr>
+            <p:ph type="title"/>
+          </p:nvPr>
+        </p:nvSpPr>
+        <p:spPr/>
+        <p:txBody>
+          <a:bodyPr/>
+          <a:lstStyle/>
+          <a:p>
+            <a:r>
+              <a:rPr lang="en-US" smtClean="0"/>
+              <a:t>What is limited?</a:t>
+            </a:r>
+            <a:endParaRPr lang="en-US" dirty="0"/>
+          </a:p>
+        </p:txBody>
+      </p:sp>
+      <p:sp>
+        <p:nvSpPr>
+          <p:cNvPr id="3" name="Text Placeholder 2"/>
+          <p:cNvSpPr>
+            <a:spLocks noGrp="1"/>
+          </p:cNvSpPr>
+          <p:nvPr>
+            <p:ph sz="half" idx="1"/>
+          </p:nvPr>
+        </p:nvSpPr>
+        <p:spPr/>
+        <p:txBody>
+          <a:bodyPr>
+            <a:normAutofit fontScale="92500" lnSpcReduction="20000"/>
+          </a:bodyPr>
+          <a:lstStyle/>
+          <a:p>
+            <a:pPr marL="0" indent="0">
+              <a:buNone/>
+            </a:pPr>
+            <a:r>
+              <a:rPr lang="en-US" dirty="0" smtClean="0"/>
+              <a:t>Maximum amount of CPU time that can be accumulated</a:t>
+            </a:r>
+          </a:p>
+          <a:p>
+            <a:pPr marL="0" indent="0">
+              <a:buNone/>
+            </a:pPr>
+            <a:r>
+              <a:rPr lang="en-US" dirty="0" smtClean="0"/>
+              <a:t>Maximum bytes that a process can request be locked into memory</a:t>
+            </a:r>
+          </a:p>
+          <a:p>
+            <a:pPr marL="0" indent="0">
+              <a:buNone/>
+            </a:pPr>
+            <a:r>
+              <a:rPr lang="en-US" dirty="0" smtClean="0"/>
+              <a:t>Maximum size of a process’s data segment</a:t>
+            </a:r>
+          </a:p>
+          <a:p>
+            <a:pPr marL="0" indent="0">
+              <a:buNone/>
+            </a:pPr>
+            <a:r>
+              <a:rPr lang="en-US" dirty="0" smtClean="0"/>
+              <a:t>Maximum size of a process’s stack segment</a:t>
+            </a:r>
+          </a:p>
+          <a:p>
+            <a:pPr marL="0" indent="0">
+              <a:buNone/>
+            </a:pPr>
+            <a:r>
+              <a:rPr lang="en-US" dirty="0" smtClean="0"/>
+              <a:t>Maximum amount of private physical memory a process may have</a:t>
+            </a:r>
+          </a:p>
+          <a:p>
+            <a:pPr marL="0" indent="0">
+              <a:buNone/>
+            </a:pPr>
+            <a:r>
+              <a:rPr lang="en-US" dirty="0" smtClean="0"/>
+              <a:t>Maximum amount of private or shared physical memory</a:t>
+            </a:r>
+          </a:p>
+          <a:p>
+            <a:pPr marL="0" indent="0">
+              <a:buNone/>
+            </a:pPr>
+            <a:r>
+              <a:rPr lang="en-US" dirty="0" smtClean="0"/>
+              <a:t>Maximum amount of physical memory that a process may have dedicated to socket buffers</a:t>
+            </a:r>
+            <a:endParaRPr lang="en-US" dirty="0"/>
+          </a:p>
+        </p:txBody>
+      </p:sp>
+      <p:sp>
+        <p:nvSpPr>
+          <p:cNvPr id="4" name="Content Placeholder 3"/>
+          <p:cNvSpPr>
+            <a:spLocks noGrp="1"/>
+          </p:cNvSpPr>
+          <p:nvPr>
+            <p:ph sz="half" idx="2"/>
+          </p:nvPr>
+        </p:nvSpPr>
+        <p:spPr/>
+        <p:txBody>
+          <a:bodyPr>
+            <a:normAutofit fontScale="92500" lnSpcReduction="20000"/>
+          </a:bodyPr>
+          <a:lstStyle/>
+          <a:p>
+            <a:r>
+              <a:rPr lang="en-US" dirty="0" smtClean="0"/>
+              <a:t>Maximum size of a file that can be created by a process</a:t>
+            </a:r>
+          </a:p>
+          <a:p>
+            <a:r>
+              <a:rPr lang="en-US" dirty="0" smtClean="0"/>
+              <a:t>Maximum size of a core file that can be created by a process</a:t>
+            </a:r>
+          </a:p>
+          <a:p>
+            <a:r>
+              <a:rPr lang="en-US" dirty="0" smtClean="0"/>
+              <a:t>Maximum number of simultaneous open files for a process</a:t>
+            </a:r>
+          </a:p>
+          <a:p>
+            <a:r>
+              <a:rPr lang="en-US" dirty="0" smtClean="0"/>
+              <a:t>Maximum number of simultaneous processes allowed to a user</a:t>
+            </a:r>
+          </a:p>
+          <a:p>
+            <a:endParaRPr lang="en-US" dirty="0"/>
+          </a:p>
+        </p:txBody>
+      </p:sp>
+    </p:spTree>
+    <p:extLst>
+      <p:ext uri="{BB962C8B-B14F-4D97-AF65-F5344CB8AC3E}">
+        <p14:creationId xmlns:p14="http://schemas.microsoft.com/office/powerpoint/2010/main" val="654348778"/>
+      </p:ext>
+    </p:extLst>
+  </p:cSld>
+  <p:clrMapOvr>
+    <a:masterClrMapping/>
+  </p:clrMapOvr>
+  <mc:AlternateContent xmlns:mc="http://schemas.openxmlformats.org/markup-compatibility/2006">
+    <mc:Choice xmlns:p14="http://schemas.microsoft.com/office/powerpoint/2010/main" Requires="p14">
+      <p:transition spd="slow" p14:dur="2000"/>
+    </mc:Choice>
+    <mc:Fallback>
+      <p:transition spd="slow"/>
+    </mc:Fallback>
+  </mc:AlternateContent>
+</p:sld>
+</file>
+
+<file path=ppt/slides/slide23.xml><?xml version="1.0" encoding="utf-8"?>
+<p:sld xmlns:a="http://schemas.openxmlformats.org/drawingml/2006/main" xmlns:r="http://schemas.openxmlformats.org/officeDocument/2006/relationships" xmlns:p="http://schemas.openxmlformats.org/presentationml/2006/main">
+  <p:cSld>
+    <p:spTree>
+      <p:nvGrpSpPr>
+        <p:cNvPr id="1" name=""/>
+        <p:cNvGrpSpPr/>
+        <p:nvPr/>
+      </p:nvGrpSpPr>
+      <p:grpSpPr>
+        <a:xfrm>
+          <a:off x="0" y="0"/>
+          <a:ext cx="0" cy="0"/>
+          <a:chOff x="0" y="0"/>
+          <a:chExt cx="0" cy="0"/>
+        </a:xfrm>
+      </p:grpSpPr>
+      <p:sp>
+        <p:nvSpPr>
+          <p:cNvPr id="8" name="Title 7"/>
+          <p:cNvSpPr>
+            <a:spLocks noGrp="1"/>
+          </p:cNvSpPr>
+          <p:nvPr>
+            <p:ph type="title"/>
+          </p:nvPr>
+        </p:nvSpPr>
+        <p:spPr/>
+        <p:txBody>
+          <a:bodyPr/>
+          <a:lstStyle/>
+          <a:p>
+            <a:r>
+              <a:rPr lang="en-US" dirty="0" smtClean="0"/>
+              <a:t>Resource Limit Discussion</a:t>
+            </a:r>
+            <a:endParaRPr lang="en-US" dirty="0"/>
+          </a:p>
+        </p:txBody>
+      </p:sp>
+      <p:sp>
+        <p:nvSpPr>
+          <p:cNvPr id="5" name="Date Placeholder 4"/>
+          <p:cNvSpPr>
+            <a:spLocks noGrp="1"/>
+          </p:cNvSpPr>
+          <p:nvPr>
+            <p:ph type="dt" sz="half" idx="10"/>
+          </p:nvPr>
+        </p:nvSpPr>
+        <p:spPr/>
+        <p:txBody>
+          <a:bodyPr/>
+          <a:lstStyle/>
+          <a:p>
+            <a:fld id="{153D3B1D-1294-5C40-8941-A41867FA5104}" type="datetime1">
+              <a:rPr lang="en-US" smtClean="0"/>
+              <a:t>2/14/17</a:t>
+            </a:fld>
+            <a:endParaRPr lang="en-US" dirty="0"/>
+          </a:p>
+        </p:txBody>
+      </p:sp>
+      <p:sp>
+        <p:nvSpPr>
+          <p:cNvPr id="6" name="Footer Placeholder 5"/>
+          <p:cNvSpPr>
+            <a:spLocks noGrp="1"/>
+          </p:cNvSpPr>
+          <p:nvPr>
+            <p:ph type="ftr" sz="quarter" idx="11"/>
+          </p:nvPr>
+        </p:nvSpPr>
+        <p:spPr/>
+        <p:txBody>
+          <a:bodyPr/>
+          <a:lstStyle/>
+          <a:p>
+            <a:r>
+              <a:rPr lang="en-US" smtClean="0"/>
+              <a:t>Introduction to Operating Systems</a:t>
+            </a:r>
+            <a:endParaRPr lang="en-US" dirty="0"/>
+          </a:p>
+        </p:txBody>
+      </p:sp>
+      <p:sp>
+        <p:nvSpPr>
+          <p:cNvPr id="7" name="Slide Number Placeholder 6"/>
+          <p:cNvSpPr>
+            <a:spLocks noGrp="1"/>
+          </p:cNvSpPr>
+          <p:nvPr>
+            <p:ph type="sldNum" sz="quarter" idx="12"/>
+          </p:nvPr>
+        </p:nvSpPr>
+        <p:spPr/>
+        <p:txBody>
+          <a:bodyPr/>
+          <a:lstStyle/>
+          <a:p>
+            <a:fld id="{699C44C4-0FAD-8046-A5C4-05AB318FA424}" type="slidenum">
+              <a:rPr lang="en-US" smtClean="0"/>
+              <a:t>23</a:t>
+            </a:fld>
+            <a:endParaRPr lang="en-US" dirty="0"/>
+          </a:p>
+        </p:txBody>
+      </p:sp>
+    </p:spTree>
+    <p:extLst>
+      <p:ext uri="{BB962C8B-B14F-4D97-AF65-F5344CB8AC3E}">
+        <p14:creationId xmlns:p14="http://schemas.microsoft.com/office/powerpoint/2010/main" val="1417948857"/>
+      </p:ext>
+    </p:extLst>
+  </p:cSld>
+  <p:clrMapOvr>
+    <a:masterClrMapping/>
+  </p:clrMapOvr>
+</p:sld>
+</file>
+
+<file path=ppt/slides/slide24.xml><?xml version="1.0" encoding="utf-8"?>
+<p:sld xmlns:a="http://schemas.openxmlformats.org/drawingml/2006/main" xmlns:r="http://schemas.openxmlformats.org/officeDocument/2006/relationships" xmlns:p="http://schemas.openxmlformats.org/presentationml/2006/main">
+  <p:cSld>
+    <p:spTree>
+      <p:nvGrpSpPr>
+        <p:cNvPr id="1" name=""/>
+        <p:cNvGrpSpPr/>
+        <p:nvPr/>
+      </p:nvGrpSpPr>
+      <p:grpSpPr>
+        <a:xfrm>
+          <a:off x="0" y="0"/>
+          <a:ext cx="0" cy="0"/>
+          <a:chOff x="0" y="0"/>
+          <a:chExt cx="0" cy="0"/>
+        </a:xfrm>
+      </p:grpSpPr>
+      <p:sp>
+        <p:nvSpPr>
+          <p:cNvPr id="2" name="Title 1"/>
+          <p:cNvSpPr>
+            <a:spLocks noGrp="1"/>
+          </p:cNvSpPr>
+          <p:nvPr>
+            <p:ph type="title"/>
+          </p:nvPr>
+        </p:nvSpPr>
+        <p:spPr/>
+        <p:txBody>
+          <a:bodyPr/>
+          <a:lstStyle/>
+          <a:p>
+            <a:endParaRPr lang="en-US" dirty="0"/>
+          </a:p>
+        </p:txBody>
+      </p:sp>
+      <p:sp>
+        <p:nvSpPr>
+          <p:cNvPr id="3" name="Date Placeholder 2"/>
+          <p:cNvSpPr>
+            <a:spLocks noGrp="1"/>
+          </p:cNvSpPr>
+          <p:nvPr>
+            <p:ph type="dt" sz="half" idx="10"/>
+          </p:nvPr>
+        </p:nvSpPr>
+        <p:spPr/>
+        <p:txBody>
+          <a:bodyPr/>
+          <a:lstStyle/>
+          <a:p>
+            <a:fld id="{E46E02CB-773A-6147-ACF5-12C4359768FD}" type="datetime1">
+              <a:rPr lang="en-US" smtClean="0"/>
+              <a:t>2/14/17</a:t>
+            </a:fld>
+            <a:endParaRPr lang="en-US"/>
+          </a:p>
+        </p:txBody>
+      </p:sp>
+      <p:sp>
+        <p:nvSpPr>
+          <p:cNvPr id="4" name="Footer Placeholder 3"/>
+          <p:cNvSpPr>
+            <a:spLocks noGrp="1"/>
+          </p:cNvSpPr>
+          <p:nvPr>
+            <p:ph type="ftr" sz="quarter" idx="11"/>
+          </p:nvPr>
+        </p:nvSpPr>
+        <p:spPr/>
+        <p:txBody>
+          <a:bodyPr/>
+          <a:lstStyle/>
+          <a:p>
+            <a:r>
+              <a:rPr lang="en-US" smtClean="0"/>
+              <a:t>Introduction to Operating Systems</a:t>
+            </a:r>
+            <a:endParaRPr lang="en-US"/>
+          </a:p>
+        </p:txBody>
+      </p:sp>
+      <p:sp>
+        <p:nvSpPr>
+          <p:cNvPr id="5" name="Slide Number Placeholder 4"/>
+          <p:cNvSpPr>
+            <a:spLocks noGrp="1"/>
+          </p:cNvSpPr>
+          <p:nvPr>
+            <p:ph type="sldNum" sz="quarter" idx="12"/>
+          </p:nvPr>
+        </p:nvSpPr>
+        <p:spPr/>
+        <p:txBody>
+          <a:bodyPr/>
+          <a:lstStyle/>
+          <a:p>
+            <a:fld id="{699C44C4-0FAD-8046-A5C4-05AB318FA424}" type="slidenum">
+              <a:rPr lang="en-US" smtClean="0"/>
+              <a:t>24</a:t>
+            </a:fld>
+            <a:endParaRPr lang="en-US"/>
+          </a:p>
+        </p:txBody>
+      </p:sp>
+    </p:spTree>
+    <p:extLst>
+      <p:ext uri="{BB962C8B-B14F-4D97-AF65-F5344CB8AC3E}">
+        <p14:creationId xmlns:p14="http://schemas.microsoft.com/office/powerpoint/2010/main" val="1203501909"/>
       </p:ext>
     </p:extLst>
   </p:cSld>
@@ -5311,9 +7643,9 @@
           <a:bodyPr/>
           <a:lstStyle/>
           <a:p>
-            <a:fld id="{A32CF29A-E5DE-AC4A-86A8-34EAC626459B}" type="datetime1">
-              <a:rPr lang="en-US" smtClean="0"/>
-              <a:t>2/12/17</a:t>
+            <a:fld id="{545C0006-7105-1E42-8E5E-ECC2AEB9F592}" type="datetime1">
+              <a:rPr lang="en-US" smtClean="0"/>
+              <a:t>2/14/17</a:t>
             </a:fld>
             <a:endParaRPr lang="en-US"/>
           </a:p>
@@ -5412,147 +7744,6 @@
           <a:p>
             <a:r>
               <a:rPr lang="en-US" dirty="0" smtClean="0"/>
-              <a:t>Libraries vs. System Calls</a:t>
-            </a:r>
-            <a:endParaRPr lang="en-US" dirty="0"/>
-          </a:p>
-        </p:txBody>
-      </p:sp>
-      <p:sp>
-        <p:nvSpPr>
-          <p:cNvPr id="3" name="Content Placeholder 2"/>
-          <p:cNvSpPr>
-            <a:spLocks noGrp="1"/>
-          </p:cNvSpPr>
-          <p:nvPr>
-            <p:ph idx="1"/>
-          </p:nvPr>
-        </p:nvSpPr>
-        <p:spPr/>
-        <p:txBody>
-          <a:bodyPr/>
-          <a:lstStyle/>
-          <a:p>
-            <a:endParaRPr lang="en-US"/>
-          </a:p>
-        </p:txBody>
-      </p:sp>
-      <p:sp>
-        <p:nvSpPr>
-          <p:cNvPr id="4" name="Date Placeholder 3"/>
-          <p:cNvSpPr>
-            <a:spLocks noGrp="1"/>
-          </p:cNvSpPr>
-          <p:nvPr>
-            <p:ph type="dt" sz="half" idx="10"/>
-          </p:nvPr>
-        </p:nvSpPr>
-        <p:spPr/>
-        <p:txBody>
-          <a:bodyPr/>
-          <a:lstStyle/>
-          <a:p>
-            <a:fld id="{5B2075ED-2BBF-F447-A78B-9507F923CB97}" type="datetime1">
-              <a:rPr lang="en-US" smtClean="0"/>
-              <a:t>2/12/17</a:t>
-            </a:fld>
-            <a:endParaRPr lang="en-US"/>
-          </a:p>
-        </p:txBody>
-      </p:sp>
-      <p:sp>
-        <p:nvSpPr>
-          <p:cNvPr id="5" name="Footer Placeholder 4"/>
-          <p:cNvSpPr>
-            <a:spLocks noGrp="1"/>
-          </p:cNvSpPr>
-          <p:nvPr>
-            <p:ph type="ftr" sz="quarter" idx="11"/>
-          </p:nvPr>
-        </p:nvSpPr>
-        <p:spPr/>
-        <p:txBody>
-          <a:bodyPr/>
-          <a:lstStyle/>
-          <a:p>
-            <a:r>
-              <a:rPr lang="en-US" smtClean="0"/>
-              <a:t>Introduction to Operating Systems</a:t>
-            </a:r>
-            <a:endParaRPr lang="en-US" dirty="0"/>
-          </a:p>
-        </p:txBody>
-      </p:sp>
-      <p:sp>
-        <p:nvSpPr>
-          <p:cNvPr id="6" name="Slide Number Placeholder 5"/>
-          <p:cNvSpPr>
-            <a:spLocks noGrp="1"/>
-          </p:cNvSpPr>
-          <p:nvPr>
-            <p:ph type="sldNum" sz="quarter" idx="12"/>
-          </p:nvPr>
-        </p:nvSpPr>
-        <p:spPr/>
-        <p:txBody>
-          <a:bodyPr/>
-          <a:lstStyle/>
-          <a:p>
-            <a:fld id="{699C44C4-0FAD-8046-A5C4-05AB318FA424}" type="slidenum">
-              <a:rPr lang="en-US" smtClean="0"/>
-              <a:t>4</a:t>
-            </a:fld>
-            <a:endParaRPr lang="en-US"/>
-          </a:p>
-        </p:txBody>
-      </p:sp>
-    </p:spTree>
-    <p:extLst>
-      <p:ext uri="{BB962C8B-B14F-4D97-AF65-F5344CB8AC3E}">
-        <p14:creationId xmlns:p14="http://schemas.microsoft.com/office/powerpoint/2010/main" val="378413065"/>
-      </p:ext>
-    </p:extLst>
-  </p:cSld>
-  <p:clrMapOvr>
-    <a:masterClrMapping/>
-  </p:clrMapOvr>
-</p:sld>
-</file>
-
-<file path=ppt/slides/slide5.xml><?xml version="1.0" encoding="utf-8"?>
-<p:sld xmlns:a="http://schemas.openxmlformats.org/drawingml/2006/main" xmlns:r="http://schemas.openxmlformats.org/officeDocument/2006/relationships" xmlns:p="http://schemas.openxmlformats.org/presentationml/2006/main">
-  <p:cSld>
-    <p:spTree>
-      <p:nvGrpSpPr>
-        <p:cNvPr id="1" name=""/>
-        <p:cNvGrpSpPr/>
-        <p:nvPr/>
-      </p:nvGrpSpPr>
-      <p:grpSpPr>
-        <a:xfrm>
-          <a:off x="0" y="0"/>
-          <a:ext cx="0" cy="0"/>
-          <a:chOff x="0" y="0"/>
-          <a:chExt cx="0" cy="0"/>
-        </a:xfrm>
-      </p:grpSpPr>
-      <p:sp>
-        <p:nvSpPr>
-          <p:cNvPr id="2" name="Title 1"/>
-          <p:cNvSpPr>
-            <a:spLocks noGrp="1"/>
-          </p:cNvSpPr>
-          <p:nvPr>
-            <p:ph type="title"/>
-          </p:nvPr>
-        </p:nvSpPr>
-        <p:spPr/>
-        <p:txBody>
-          <a:bodyPr/>
-          <a:lstStyle/>
-          <a:p>
-            <a:r>
-              <a:rPr lang="en-US" dirty="0" smtClean="0"/>
               <a:t>System calls</a:t>
             </a:r>
             <a:endParaRPr lang="en-US" dirty="0"/>
@@ -5794,7 +7985,7 @@
           <a:p>
             <a:r>
               <a:rPr lang="en-US" smtClean="0"/>
-              <a:t>L41 Lecture 4 - The Process Model (2)</a:t>
+              <a:t>Introduction to Operating Systems</a:t>
             </a:r>
             <a:endParaRPr lang="en-US"/>
           </a:p>
@@ -5817,7 +8008,30 @@
           <a:p>
             <a:fld id="{4451A708-1483-F44A-AC56-12F69CC7793D}" type="slidenum">
               <a:rPr lang="en-US" smtClean="0"/>
-              <a:t>5</a:t>
+              <a:t>4</a:t>
+            </a:fld>
+            <a:endParaRPr lang="en-US"/>
+          </a:p>
+        </p:txBody>
+      </p:sp>
+      <p:sp>
+        <p:nvSpPr>
+          <p:cNvPr id="6" name="Date Placeholder 5"/>
+          <p:cNvSpPr>
+            <a:spLocks noGrp="1"/>
+          </p:cNvSpPr>
+          <p:nvPr>
+            <p:ph type="dt" sz="half" idx="10"/>
+          </p:nvPr>
+        </p:nvSpPr>
+        <p:spPr/>
+        <p:txBody>
+          <a:bodyPr/>
+          <a:lstStyle/>
+          <a:p>
+            <a:fld id="{A3735830-6FA2-6F46-92F5-52ED2345815E}" type="datetime1">
+              <a:rPr lang="en-US" smtClean="0"/>
+              <a:t>2/14/17</a:t>
             </a:fld>
             <a:endParaRPr lang="en-US"/>
           </a:p>
@@ -6511,7 +8725,7 @@
 </p:sld>
 </file>
 
-<file path=ppt/slides/slide6.xml><?xml version="1.0" encoding="utf-8"?>
+<file path=ppt/slides/slide5.xml><?xml version="1.0" encoding="utf-8"?>
 <p:sld xmlns:a="http://schemas.openxmlformats.org/drawingml/2006/main" xmlns:r="http://schemas.openxmlformats.org/officeDocument/2006/relationships" xmlns:p="http://schemas.openxmlformats.org/presentationml/2006/main">
   <p:cSld>
     <p:spTree>
@@ -6843,7 +9057,7 @@
           <a:p>
             <a:r>
               <a:rPr lang="en-US" smtClean="0"/>
-              <a:t>L41 Lecture 4 - The Process Model (2)</a:t>
+              <a:t>Introduction to Operating Systems</a:t>
             </a:r>
             <a:endParaRPr lang="en-US"/>
           </a:p>
@@ -6866,7 +9080,30 @@
           <a:p>
             <a:fld id="{4451A708-1483-F44A-AC56-12F69CC7793D}" type="slidenum">
               <a:rPr lang="en-US" smtClean="0"/>
-              <a:t>6</a:t>
+              <a:t>5</a:t>
+            </a:fld>
+            <a:endParaRPr lang="en-US"/>
+          </a:p>
+        </p:txBody>
+      </p:sp>
+      <p:sp>
+        <p:nvSpPr>
+          <p:cNvPr id="6" name="Date Placeholder 5"/>
+          <p:cNvSpPr>
+            <a:spLocks noGrp="1"/>
+          </p:cNvSpPr>
+          <p:nvPr>
+            <p:ph type="dt" sz="half" idx="10"/>
+          </p:nvPr>
+        </p:nvSpPr>
+        <p:spPr/>
+        <p:txBody>
+          <a:bodyPr/>
+          <a:lstStyle/>
+          <a:p>
+            <a:fld id="{29E1EE9D-2CAB-794A-AAAD-728FC8283A98}" type="datetime1">
+              <a:rPr lang="en-US" smtClean="0"/>
+              <a:t>2/14/17</a:t>
             </a:fld>
             <a:endParaRPr lang="en-US"/>
           </a:p>
@@ -7341,7 +9578,7 @@
 </p:sld>
 </file>
 
-<file path=ppt/slides/slide7.xml><?xml version="1.0" encoding="utf-8"?>
+<file path=ppt/slides/slide6.xml><?xml version="1.0" encoding="utf-8"?>
 <p:sld xmlns:a="http://schemas.openxmlformats.org/drawingml/2006/main" xmlns:r="http://schemas.openxmlformats.org/officeDocument/2006/relationships" xmlns:p="http://schemas.openxmlformats.org/presentationml/2006/main">
   <p:cSld>
     <p:spTree>
@@ -7634,7 +9871,7 @@
           <a:p>
             <a:r>
               <a:rPr lang="en-US" smtClean="0"/>
-              <a:t>L41 Lecture 4 - The Process Model (2)</a:t>
+              <a:t>Introduction to Operating Systems</a:t>
             </a:r>
             <a:endParaRPr lang="en-US"/>
           </a:p>
@@ -7657,7 +9894,30 @@
           <a:p>
             <a:fld id="{4451A708-1483-F44A-AC56-12F69CC7793D}" type="slidenum">
               <a:rPr lang="en-US" smtClean="0"/>
-              <a:t>7</a:t>
+              <a:t>6</a:t>
+            </a:fld>
+            <a:endParaRPr lang="en-US"/>
+          </a:p>
+        </p:txBody>
+      </p:sp>
+      <p:sp>
+        <p:nvSpPr>
+          <p:cNvPr id="6" name="Date Placeholder 5"/>
+          <p:cNvSpPr>
+            <a:spLocks noGrp="1"/>
+          </p:cNvSpPr>
+          <p:nvPr>
+            <p:ph type="dt" sz="half" idx="10"/>
+          </p:nvPr>
+        </p:nvSpPr>
+        <p:spPr/>
+        <p:txBody>
+          <a:bodyPr/>
+          <a:lstStyle/>
+          <a:p>
+            <a:fld id="{55D3C5CD-FD55-1943-AF2F-C2C18CF7D063}" type="datetime1">
+              <a:rPr lang="en-US" smtClean="0"/>
+              <a:t>2/14/17</a:t>
             </a:fld>
             <a:endParaRPr lang="en-US"/>
           </a:p>
@@ -8168,7 +10428,7 @@
 </p:sld>
 </file>
 
-<file path=ppt/slides/slide8.xml><?xml version="1.0" encoding="utf-8"?>
+<file path=ppt/slides/slide7.xml><?xml version="1.0" encoding="utf-8"?>
 <p:sld xmlns:a="http://schemas.openxmlformats.org/drawingml/2006/main" xmlns:r="http://schemas.openxmlformats.org/officeDocument/2006/relationships" xmlns:p="http://schemas.openxmlformats.org/presentationml/2006/main">
   <p:cSld>
     <p:spTree>
@@ -8404,7 +10664,7 @@
           <a:p>
             <a:r>
               <a:rPr lang="en-US" smtClean="0"/>
-              <a:t>L41 Lecture 4 - The Process Model (2)</a:t>
+              <a:t>Introduction to Operating Systems</a:t>
             </a:r>
             <a:endParaRPr lang="en-US"/>
           </a:p>
@@ -8427,9 +10687,32 @@
           <a:p>
             <a:fld id="{4451A708-1483-F44A-AC56-12F69CC7793D}" type="slidenum">
               <a:rPr lang="en-US" smtClean="0"/>
-              <a:t>8</a:t>
+              <a:t>7</a:t>
             </a:fld>
             <a:endParaRPr lang="en-US"/>
+          </a:p>
+        </p:txBody>
+      </p:sp>
+      <p:sp>
+        <p:nvSpPr>
+          <p:cNvPr id="2" name="Date Placeholder 1"/>
+          <p:cNvSpPr>
+            <a:spLocks noGrp="1"/>
+          </p:cNvSpPr>
+          <p:nvPr>
+            <p:ph type="dt" sz="half" idx="10"/>
+          </p:nvPr>
+        </p:nvSpPr>
+        <p:spPr/>
+        <p:txBody>
+          <a:bodyPr/>
+          <a:lstStyle/>
+          <a:p>
+            <a:fld id="{83EF77C3-B9D2-1444-80EE-9F36EF754064}" type="datetime1">
+              <a:rPr lang="en-US" smtClean="0"/>
+              <a:t>2/14/17</a:t>
+            </a:fld>
+            <a:endParaRPr lang="en-US" dirty="0"/>
           </a:p>
         </p:txBody>
       </p:sp>
@@ -8827,6 +11110,174 @@
 </p:sld>
 </file>
 
+<file path=ppt/slides/slide8.xml><?xml version="1.0" encoding="utf-8"?>
+<p:sld xmlns:a="http://schemas.openxmlformats.org/drawingml/2006/main" xmlns:r="http://schemas.openxmlformats.org/officeDocument/2006/relationships" xmlns:p="http://schemas.openxmlformats.org/presentationml/2006/main">
+  <p:cSld>
+    <p:spTree>
+      <p:nvGrpSpPr>
+        <p:cNvPr id="1" name=""/>
+        <p:cNvGrpSpPr/>
+        <p:nvPr/>
+      </p:nvGrpSpPr>
+      <p:grpSpPr>
+        <a:xfrm>
+          <a:off x="0" y="0"/>
+          <a:ext cx="0" cy="0"/>
+          <a:chOff x="0" y="0"/>
+          <a:chExt cx="0" cy="0"/>
+        </a:xfrm>
+      </p:grpSpPr>
+      <p:sp>
+        <p:nvSpPr>
+          <p:cNvPr id="2" name="Title 1"/>
+          <p:cNvSpPr>
+            <a:spLocks noGrp="1"/>
+          </p:cNvSpPr>
+          <p:nvPr>
+            <p:ph type="title"/>
+          </p:nvPr>
+        </p:nvSpPr>
+        <p:spPr/>
+        <p:txBody>
+          <a:bodyPr/>
+          <a:lstStyle/>
+          <a:p>
+            <a:r>
+              <a:rPr lang="en-US" dirty="0" smtClean="0"/>
+              <a:t>Reading a File</a:t>
+            </a:r>
+            <a:endParaRPr lang="en-US" dirty="0"/>
+          </a:p>
+        </p:txBody>
+      </p:sp>
+      <p:sp>
+        <p:nvSpPr>
+          <p:cNvPr id="3" name="Content Placeholder 2"/>
+          <p:cNvSpPr>
+            <a:spLocks noGrp="1"/>
+          </p:cNvSpPr>
+          <p:nvPr>
+            <p:ph idx="1"/>
+          </p:nvPr>
+        </p:nvSpPr>
+        <p:spPr/>
+        <p:txBody>
+          <a:bodyPr/>
+          <a:lstStyle/>
+          <a:p>
+            <a:pPr marL="457200" indent="-457200">
+              <a:buFont typeface="+mj-lt"/>
+              <a:buAutoNum type="arabicPeriod"/>
+            </a:pPr>
+            <a:r>
+              <a:rPr lang="en-US" dirty="0" smtClean="0"/>
+              <a:t>open()</a:t>
+            </a:r>
+          </a:p>
+          <a:p>
+            <a:pPr marL="457200" indent="-457200">
+              <a:buFont typeface="+mj-lt"/>
+              <a:buAutoNum type="arabicPeriod"/>
+            </a:pPr>
+            <a:r>
+              <a:rPr lang="en-US" dirty="0" smtClean="0"/>
+              <a:t>read()</a:t>
+            </a:r>
+          </a:p>
+          <a:p>
+            <a:pPr marL="457200" indent="-457200">
+              <a:buFont typeface="+mj-lt"/>
+              <a:buAutoNum type="arabicPeriod"/>
+            </a:pPr>
+            <a:r>
+              <a:rPr lang="en-US" dirty="0" smtClean="0"/>
+              <a:t>close()</a:t>
+            </a:r>
+          </a:p>
+        </p:txBody>
+      </p:sp>
+      <p:sp>
+        <p:nvSpPr>
+          <p:cNvPr id="4" name="Date Placeholder 3"/>
+          <p:cNvSpPr>
+            <a:spLocks noGrp="1"/>
+          </p:cNvSpPr>
+          <p:nvPr>
+            <p:ph type="dt" sz="half" idx="10"/>
+          </p:nvPr>
+        </p:nvSpPr>
+        <p:spPr/>
+        <p:txBody>
+          <a:bodyPr/>
+          <a:lstStyle/>
+          <a:p>
+            <a:fld id="{B587B557-3419-484A-8754-ACE5FA5F372A}" type="datetime1">
+              <a:rPr lang="en-US" smtClean="0"/>
+              <a:t>2/14/17</a:t>
+            </a:fld>
+            <a:endParaRPr lang="en-US"/>
+          </a:p>
+        </p:txBody>
+      </p:sp>
+      <p:sp>
+        <p:nvSpPr>
+          <p:cNvPr id="5" name="Footer Placeholder 4"/>
+          <p:cNvSpPr>
+            <a:spLocks noGrp="1"/>
+          </p:cNvSpPr>
+          <p:nvPr>
+            <p:ph type="ftr" sz="quarter" idx="11"/>
+          </p:nvPr>
+        </p:nvSpPr>
+        <p:spPr/>
+        <p:txBody>
+          <a:bodyPr/>
+          <a:lstStyle/>
+          <a:p>
+            <a:r>
+              <a:rPr lang="en-US" smtClean="0"/>
+              <a:t>Introduction to Operating Systems</a:t>
+            </a:r>
+            <a:endParaRPr lang="en-US" dirty="0"/>
+          </a:p>
+        </p:txBody>
+      </p:sp>
+      <p:sp>
+        <p:nvSpPr>
+          <p:cNvPr id="6" name="Slide Number Placeholder 5"/>
+          <p:cNvSpPr>
+            <a:spLocks noGrp="1"/>
+          </p:cNvSpPr>
+          <p:nvPr>
+            <p:ph type="sldNum" sz="quarter" idx="12"/>
+          </p:nvPr>
+        </p:nvSpPr>
+        <p:spPr/>
+        <p:txBody>
+          <a:bodyPr/>
+          <a:lstStyle/>
+          <a:p>
+            <a:fld id="{699C44C4-0FAD-8046-A5C4-05AB318FA424}" type="slidenum">
+              <a:rPr lang="en-US" smtClean="0"/>
+              <a:t>8</a:t>
+            </a:fld>
+            <a:endParaRPr lang="en-US"/>
+          </a:p>
+        </p:txBody>
+      </p:sp>
+    </p:spTree>
+    <p:extLst>
+      <p:ext uri="{BB962C8B-B14F-4D97-AF65-F5344CB8AC3E}">
+        <p14:creationId xmlns:p14="http://schemas.microsoft.com/office/powerpoint/2010/main" val="233612583"/>
+      </p:ext>
+    </p:extLst>
+  </p:cSld>
+  <p:clrMapOvr>
+    <a:masterClrMapping/>
+  </p:clrMapOvr>
+</p:sld>
+</file>
+
 <file path=ppt/slides/slide9.xml><?xml version="1.0" encoding="utf-8"?>
 <p:sld xmlns:a="http://schemas.openxmlformats.org/drawingml/2006/main" xmlns:r="http://schemas.openxmlformats.org/officeDocument/2006/relationships" xmlns:p="http://schemas.openxmlformats.org/presentationml/2006/main">
   <p:cSld>
@@ -8861,7 +11312,7 @@
           <a:p>
             <a:r>
               <a:rPr lang="en-US" dirty="0" smtClean="0"/>
-              <a:t>Reading a File</a:t>
+              <a:t>Looking at read()</a:t>
             </a:r>
             <a:endParaRPr lang="en-US" dirty="0"/>
           </a:p>
@@ -8882,34 +11333,19 @@
           <a:bodyPr/>
           <a:lstStyle/>
           <a:p>
-            <a:pPr marL="457200" indent="-457200">
-              <a:buFont typeface="+mj-lt"/>
-              <a:buAutoNum type="arabicPeriod"/>
-            </a:pPr>
-            <a:r>
-              <a:rPr lang="en-US" dirty="0" smtClean="0"/>
-              <a:t>open()</a:t>
-            </a:r>
-          </a:p>
-          <a:p>
-            <a:pPr marL="457200" indent="-457200">
-              <a:buFont typeface="+mj-lt"/>
-              <a:buAutoNum type="arabicPeriod"/>
-            </a:pPr>
-            <a:r>
-              <a:rPr lang="en-US" dirty="0" smtClean="0"/>
-              <a:t>read()</a:t>
-            </a:r>
-          </a:p>
-          <a:p>
-            <a:pPr marL="457200" indent="-457200">
-              <a:buFont typeface="+mj-lt"/>
-              <a:buAutoNum type="arabicPeriod"/>
-            </a:pPr>
-            <a:r>
-              <a:rPr lang="en-US" dirty="0" smtClean="0"/>
-              <a:t>close()</a:t>
-            </a:r>
+            <a:r>
+              <a:rPr lang="en-US" dirty="0" smtClean="0"/>
+              <a:t>How do we get into the kernel?</a:t>
+            </a:r>
+          </a:p>
+          <a:p>
+            <a:r>
+              <a:rPr lang="en-US" dirty="0" smtClean="0"/>
+              <a:t>How do we get out of the kernel?</a:t>
+            </a:r>
+          </a:p>
+          <a:p>
+            <a:endParaRPr lang="en-US" dirty="0" smtClean="0"/>
           </a:p>
         </p:txBody>
       </p:sp>
@@ -8928,9 +11364,9 @@
           <a:bodyPr/>
           <a:lstStyle/>
           <a:p>
-            <a:fld id="{D32C3957-18D7-B540-A8D2-2385B4B94035}" type="datetime1">
-              <a:rPr lang="en-US" smtClean="0"/>
-              <a:t>2/12/17</a:t>
+            <a:fld id="{F9C7E722-6D52-F848-8DF6-96E061F4DC0F}" type="datetime1">
+              <a:rPr lang="en-US" smtClean="0"/>
+              <a:t>2/14/17</a:t>
             </a:fld>
             <a:endParaRPr lang="en-US"/>
           </a:p>
@@ -8985,7 +11421,7 @@
     </p:spTree>
     <p:extLst>
       <p:ext uri="{BB962C8B-B14F-4D97-AF65-F5344CB8AC3E}">
-        <p14:creationId xmlns:p14="http://schemas.microsoft.com/office/powerpoint/2010/main" val="233612583"/>
+        <p14:creationId xmlns:p14="http://schemas.microsoft.com/office/powerpoint/2010/main" val="1716288803"/>
       </p:ext>
     </p:extLst>
   </p:cSld>

</xml_diff>

<commit_message>
Add discussion of software and building architecture
</commit_message>
<xml_diff>
--- a/undergraduate/lectures/kernel-services.pptx
+++ b/undergraduate/lectures/kernel-services.pptx
@@ -5,33 +5,36 @@
     <p:sldMasterId id="2147483894" r:id="rId1"/>
   </p:sldMasterIdLst>
   <p:notesMasterIdLst>
-    <p:notesMasterId r:id="rId26"/>
+    <p:notesMasterId r:id="rId29"/>
   </p:notesMasterIdLst>
   <p:sldIdLst>
     <p:sldId id="256" r:id="rId2"/>
-    <p:sldId id="257" r:id="rId3"/>
-    <p:sldId id="258" r:id="rId4"/>
-    <p:sldId id="265" r:id="rId5"/>
-    <p:sldId id="266" r:id="rId6"/>
-    <p:sldId id="267" r:id="rId7"/>
-    <p:sldId id="268" r:id="rId8"/>
-    <p:sldId id="261" r:id="rId9"/>
-    <p:sldId id="262" r:id="rId10"/>
-    <p:sldId id="263" r:id="rId11"/>
-    <p:sldId id="264" r:id="rId12"/>
-    <p:sldId id="260" r:id="rId13"/>
-    <p:sldId id="276" r:id="rId14"/>
-    <p:sldId id="269" r:id="rId15"/>
-    <p:sldId id="270" r:id="rId16"/>
-    <p:sldId id="271" r:id="rId17"/>
-    <p:sldId id="275" r:id="rId18"/>
-    <p:sldId id="273" r:id="rId19"/>
-    <p:sldId id="279" r:id="rId20"/>
-    <p:sldId id="281" r:id="rId21"/>
-    <p:sldId id="280" r:id="rId22"/>
-    <p:sldId id="274" r:id="rId23"/>
-    <p:sldId id="277" r:id="rId24"/>
-    <p:sldId id="278" r:id="rId25"/>
+    <p:sldId id="282" r:id="rId3"/>
+    <p:sldId id="283" r:id="rId4"/>
+    <p:sldId id="284" r:id="rId5"/>
+    <p:sldId id="257" r:id="rId6"/>
+    <p:sldId id="258" r:id="rId7"/>
+    <p:sldId id="265" r:id="rId8"/>
+    <p:sldId id="266" r:id="rId9"/>
+    <p:sldId id="267" r:id="rId10"/>
+    <p:sldId id="268" r:id="rId11"/>
+    <p:sldId id="261" r:id="rId12"/>
+    <p:sldId id="262" r:id="rId13"/>
+    <p:sldId id="263" r:id="rId14"/>
+    <p:sldId id="264" r:id="rId15"/>
+    <p:sldId id="260" r:id="rId16"/>
+    <p:sldId id="276" r:id="rId17"/>
+    <p:sldId id="269" r:id="rId18"/>
+    <p:sldId id="270" r:id="rId19"/>
+    <p:sldId id="271" r:id="rId20"/>
+    <p:sldId id="275" r:id="rId21"/>
+    <p:sldId id="279" r:id="rId22"/>
+    <p:sldId id="281" r:id="rId23"/>
+    <p:sldId id="280" r:id="rId24"/>
+    <p:sldId id="273" r:id="rId25"/>
+    <p:sldId id="274" r:id="rId26"/>
+    <p:sldId id="277" r:id="rId27"/>
+    <p:sldId id="278" r:id="rId28"/>
   </p:sldIdLst>
   <p:sldSz cx="12192000" cy="6858000"/>
   <p:notesSz cx="6858000" cy="9144000"/>
@@ -4803,7 +4806,7 @@
       </p:grpSpPr>
       <p:sp>
         <p:nvSpPr>
-          <p:cNvPr id="2" name="Title 1"/>
+          <p:cNvPr id="6" name="Title 5"/>
           <p:cNvSpPr>
             <a:spLocks noGrp="1"/>
           </p:cNvSpPr>
@@ -4813,85 +4816,222 @@
         </p:nvSpPr>
         <p:spPr/>
         <p:txBody>
-          <a:bodyPr/>
-          <a:lstStyle/>
-          <a:p>
-            <a:r>
-              <a:rPr lang="en-US" dirty="0" smtClean="0"/>
-              <a:t>It’s a trap!</a:t>
+          <a:bodyPr>
+            <a:normAutofit/>
+          </a:bodyPr>
+          <a:lstStyle/>
+          <a:p>
+            <a:r>
+              <a:rPr lang="en-US" dirty="0" smtClean="0"/>
+              <a:t>System-call invocation</a:t>
             </a:r>
             <a:endParaRPr lang="en-US" dirty="0"/>
           </a:p>
         </p:txBody>
       </p:sp>
-      <p:sp>
-        <p:nvSpPr>
-          <p:cNvPr id="3" name="Content Placeholder 2"/>
-          <p:cNvSpPr>
-            <a:spLocks noGrp="1"/>
-          </p:cNvSpPr>
-          <p:nvPr>
-            <p:ph idx="1"/>
-          </p:nvPr>
-        </p:nvSpPr>
-        <p:spPr/>
-        <p:txBody>
-          <a:bodyPr/>
-          <a:lstStyle/>
-          <a:p>
+      <p:pic>
+        <p:nvPicPr>
+          <p:cNvPr id="9" name="Content Placeholder 8"/>
+          <p:cNvPicPr>
+            <a:picLocks noGrp="1" noChangeAspect="1"/>
+          </p:cNvPicPr>
+          <p:nvPr>
+            <p:ph sz="half" idx="1"/>
+          </p:nvPr>
+        </p:nvPicPr>
+        <p:blipFill>
+          <a:blip r:embed="rId2">
+            <a:extLst>
+              <a:ext uri="{28A0092B-C50C-407E-A947-70E740481C1C}">
+                <a14:useLocalDpi xmlns:a14="http://schemas.microsoft.com/office/drawing/2010/main" val="0"/>
+              </a:ext>
+            </a:extLst>
+          </a:blip>
+          <a:stretch>
+            <a:fillRect/>
+          </a:stretch>
+        </p:blipFill>
+        <p:spPr>
+          <a:xfrm>
+            <a:off x="2152651" y="1352551"/>
+            <a:ext cx="3460777" cy="5003800"/>
+          </a:xfrm>
+        </p:spPr>
+      </p:pic>
+      <p:sp>
+        <p:nvSpPr>
+          <p:cNvPr id="8" name="Content Placeholder 7"/>
+          <p:cNvSpPr>
+            <a:spLocks noGrp="1"/>
+          </p:cNvSpPr>
+          <p:nvPr>
+            <p:ph sz="half" idx="2"/>
+          </p:nvPr>
+        </p:nvSpPr>
+        <p:spPr>
+          <a:xfrm>
+            <a:off x="5876926" y="1352551"/>
+            <a:ext cx="4162425" cy="5003800"/>
+          </a:xfrm>
+        </p:spPr>
+        <p:txBody>
+          <a:bodyPr>
+            <a:normAutofit/>
+          </a:bodyPr>
+          <a:lstStyle/>
+          <a:p>
+            <a:r>
+              <a:rPr lang="en-US" dirty="0" err="1" smtClean="0">
+                <a:latin typeface="Source Code Pro" charset="0"/>
+                <a:ea typeface="Source Code Pro" charset="0"/>
+                <a:cs typeface="Source Code Pro" charset="0"/>
+              </a:rPr>
+              <a:t>libc</a:t>
+            </a:r>
+            <a:r>
+              <a:rPr lang="en-US" dirty="0" smtClean="0"/>
+              <a:t> system-call stubs provide linkable symbols</a:t>
+            </a:r>
+          </a:p>
+          <a:p>
+            <a:r>
+              <a:rPr lang="en-US" dirty="0"/>
+              <a:t>I</a:t>
+            </a:r>
+            <a:r>
+              <a:rPr lang="en-US" dirty="0" smtClean="0"/>
+              <a:t>nline system-call instructions or dynamic implementations</a:t>
+            </a:r>
+          </a:p>
+          <a:p>
+            <a:pPr lvl="1"/>
+            <a:r>
+              <a:rPr lang="en-US" dirty="0" smtClean="0"/>
+              <a:t>Linux </a:t>
+            </a:r>
+            <a:r>
+              <a:rPr lang="en-US" dirty="0" err="1" smtClean="0">
+                <a:latin typeface="Source Code Pro" charset="0"/>
+                <a:ea typeface="Source Code Pro" charset="0"/>
+                <a:cs typeface="Source Code Pro" charset="0"/>
+              </a:rPr>
+              <a:t>vdso</a:t>
+            </a:r>
+            <a:endParaRPr lang="en-US" dirty="0" smtClean="0">
+              <a:latin typeface="Source Code Pro" charset="0"/>
+              <a:ea typeface="Source Code Pro" charset="0"/>
+              <a:cs typeface="Source Code Pro" charset="0"/>
+            </a:endParaRPr>
+          </a:p>
+          <a:p>
+            <a:pPr lvl="1"/>
+            <a:r>
+              <a:rPr lang="en-US" dirty="0" smtClean="0"/>
+              <a:t>Xen </a:t>
+            </a:r>
+            <a:r>
+              <a:rPr lang="en-US" b="1" dirty="0" err="1" smtClean="0"/>
+              <a:t>hypercall</a:t>
+            </a:r>
+            <a:r>
+              <a:rPr lang="en-US" b="1" dirty="0" smtClean="0"/>
+              <a:t> page</a:t>
+            </a:r>
+          </a:p>
+          <a:p>
+            <a:r>
+              <a:rPr lang="en-US" b="1" dirty="0"/>
+              <a:t>M</a:t>
+            </a:r>
+            <a:r>
+              <a:rPr lang="en-US" b="1" dirty="0" smtClean="0"/>
+              <a:t>achine-dependent trap vector</a:t>
+            </a:r>
+          </a:p>
+          <a:p>
+            <a:r>
+              <a:rPr lang="en-US" b="1" dirty="0" smtClean="0"/>
+              <a:t>Machine-independent </a:t>
+            </a:r>
+            <a:r>
+              <a:rPr lang="en-US" dirty="0" smtClean="0"/>
+              <a:t>function</a:t>
+            </a:r>
+            <a:r>
+              <a:rPr lang="en-US" b="1" dirty="0" smtClean="0"/>
+              <a:t>  </a:t>
+            </a:r>
+            <a:r>
+              <a:rPr lang="en-US" dirty="0" err="1" smtClean="0">
+                <a:latin typeface="Source Code Pro" charset="0"/>
+                <a:ea typeface="Source Code Pro" charset="0"/>
+                <a:cs typeface="Source Code Pro" charset="0"/>
+              </a:rPr>
+              <a:t>syscall</a:t>
+            </a:r>
+            <a:r>
+              <a:rPr lang="en-US" dirty="0" smtClean="0">
+                <a:latin typeface="Source Code Pro" charset="0"/>
+                <a:ea typeface="Source Code Pro" charset="0"/>
+                <a:cs typeface="Source Code Pro" charset="0"/>
+              </a:rPr>
+              <a:t>()</a:t>
+            </a:r>
+            <a:endParaRPr lang="en-US" dirty="0" smtClean="0"/>
+          </a:p>
+          <a:p>
+            <a:pPr lvl="1"/>
+            <a:r>
+              <a:rPr lang="en-US" dirty="0" smtClean="0"/>
+              <a:t>Prologue (e.g., breakpoints, tracing)</a:t>
+            </a:r>
+          </a:p>
+          <a:p>
+            <a:pPr lvl="1"/>
+            <a:r>
+              <a:rPr lang="en-US" dirty="0" smtClean="0"/>
+              <a:t>Actual service invoked</a:t>
+            </a:r>
+          </a:p>
+          <a:p>
+            <a:pPr lvl="1"/>
+            <a:r>
+              <a:rPr lang="en-US" dirty="0"/>
+              <a:t>E</a:t>
+            </a:r>
+            <a:r>
+              <a:rPr lang="en-US" dirty="0" smtClean="0"/>
+              <a:t>pilogue (e.g., tracing, signal delivery)</a:t>
+            </a:r>
+          </a:p>
+        </p:txBody>
+      </p:sp>
+      <p:sp>
+        <p:nvSpPr>
+          <p:cNvPr id="4" name="Footer Placeholder 3"/>
+          <p:cNvSpPr>
+            <a:spLocks noGrp="1"/>
+          </p:cNvSpPr>
+          <p:nvPr>
+            <p:ph type="ftr" sz="quarter" idx="11"/>
+          </p:nvPr>
+        </p:nvSpPr>
+        <p:spPr/>
+        <p:txBody>
+          <a:bodyPr/>
+          <a:lstStyle/>
+          <a:p>
+            <a:r>
+              <a:rPr lang="en-US" smtClean="0"/>
+              <a:t>Introduction to Operating Systems</a:t>
+            </a:r>
             <a:endParaRPr lang="en-US"/>
           </a:p>
         </p:txBody>
       </p:sp>
       <p:sp>
         <p:nvSpPr>
-          <p:cNvPr id="4" name="Date Placeholder 3"/>
-          <p:cNvSpPr>
-            <a:spLocks noGrp="1"/>
-          </p:cNvSpPr>
-          <p:nvPr>
-            <p:ph type="dt" sz="half" idx="10"/>
-          </p:nvPr>
-        </p:nvSpPr>
-        <p:spPr/>
-        <p:txBody>
-          <a:bodyPr/>
-          <a:lstStyle/>
-          <a:p>
-            <a:fld id="{21AA2D93-07FE-1B40-B6F1-F8AD65299FF6}" type="datetime1">
-              <a:rPr lang="en-US" smtClean="0"/>
-              <a:t>2/14/17</a:t>
-            </a:fld>
-            <a:endParaRPr lang="en-US"/>
-          </a:p>
-        </p:txBody>
-      </p:sp>
-      <p:sp>
-        <p:nvSpPr>
-          <p:cNvPr id="5" name="Footer Placeholder 4"/>
-          <p:cNvSpPr>
-            <a:spLocks noGrp="1"/>
-          </p:cNvSpPr>
-          <p:nvPr>
-            <p:ph type="ftr" sz="quarter" idx="11"/>
-          </p:nvPr>
-        </p:nvSpPr>
-        <p:spPr/>
-        <p:txBody>
-          <a:bodyPr/>
-          <a:lstStyle/>
-          <a:p>
-            <a:r>
-              <a:rPr lang="en-US" smtClean="0"/>
-              <a:t>Introduction to Operating Systems</a:t>
-            </a:r>
-            <a:endParaRPr lang="en-US" dirty="0"/>
-          </a:p>
-        </p:txBody>
-      </p:sp>
-      <p:sp>
-        <p:nvSpPr>
-          <p:cNvPr id="6" name="Slide Number Placeholder 5"/>
+          <p:cNvPr id="5" name="Slide Number Placeholder 4"/>
           <p:cNvSpPr>
             <a:spLocks noGrp="1"/>
           </p:cNvSpPr>
@@ -4904,7 +5044,7 @@
           <a:bodyPr/>
           <a:lstStyle/>
           <a:p>
-            <a:fld id="{699C44C4-0FAD-8046-A5C4-05AB318FA424}" type="slidenum">
+            <a:fld id="{4451A708-1483-F44A-AC56-12F69CC7793D}" type="slidenum">
               <a:rPr lang="en-US" smtClean="0"/>
               <a:t>10</a:t>
             </a:fld>
@@ -4912,16 +5052,420 @@
           </a:p>
         </p:txBody>
       </p:sp>
+      <p:sp>
+        <p:nvSpPr>
+          <p:cNvPr id="2" name="Date Placeholder 1"/>
+          <p:cNvSpPr>
+            <a:spLocks noGrp="1"/>
+          </p:cNvSpPr>
+          <p:nvPr>
+            <p:ph type="dt" sz="half" idx="10"/>
+          </p:nvPr>
+        </p:nvSpPr>
+        <p:spPr/>
+        <p:txBody>
+          <a:bodyPr/>
+          <a:lstStyle/>
+          <a:p>
+            <a:fld id="{83EF77C3-B9D2-1444-80EE-9F36EF754064}" type="datetime1">
+              <a:rPr lang="en-US" smtClean="0"/>
+              <a:t>2/14/17</a:t>
+            </a:fld>
+            <a:endParaRPr lang="en-US" dirty="0"/>
+          </a:p>
+        </p:txBody>
+      </p:sp>
     </p:spTree>
     <p:extLst>
       <p:ext uri="{BB962C8B-B14F-4D97-AF65-F5344CB8AC3E}">
-        <p14:creationId xmlns:p14="http://schemas.microsoft.com/office/powerpoint/2010/main" val="1335855769"/>
+        <p14:creationId xmlns:p14="http://schemas.microsoft.com/office/powerpoint/2010/main" val="1393733580"/>
       </p:ext>
     </p:extLst>
   </p:cSld>
   <p:clrMapOvr>
     <a:masterClrMapping/>
   </p:clrMapOvr>
+  <p:timing>
+    <p:tnLst>
+      <p:par>
+        <p:cTn id="1" dur="indefinite" restart="never" nodeType="tmRoot">
+          <p:childTnLst>
+            <p:seq concurrent="1" nextAc="seek">
+              <p:cTn id="2" dur="indefinite" nodeType="mainSeq">
+                <p:childTnLst>
+                  <p:par>
+                    <p:cTn id="3" fill="hold">
+                      <p:stCondLst>
+                        <p:cond delay="indefinite"/>
+                      </p:stCondLst>
+                      <p:childTnLst>
+                        <p:par>
+                          <p:cTn id="4" fill="hold">
+                            <p:stCondLst>
+                              <p:cond delay="0"/>
+                            </p:stCondLst>
+                            <p:childTnLst>
+                              <p:par>
+                                <p:cTn id="5" presetID="1" presetClass="entr" presetSubtype="0" fill="hold" nodeType="clickEffect">
+                                  <p:stCondLst>
+                                    <p:cond delay="0"/>
+                                  </p:stCondLst>
+                                  <p:childTnLst>
+                                    <p:set>
+                                      <p:cBhvr>
+                                        <p:cTn id="6" dur="1" fill="hold">
+                                          <p:stCondLst>
+                                            <p:cond delay="0"/>
+                                          </p:stCondLst>
+                                        </p:cTn>
+                                        <p:tgtEl>
+                                          <p:spTgt spid="8">
+                                            <p:txEl>
+                                              <p:pRg st="0" end="0"/>
+                                            </p:txEl>
+                                          </p:spTgt>
+                                        </p:tgtEl>
+                                        <p:attrNameLst>
+                                          <p:attrName>style.visibility</p:attrName>
+                                        </p:attrNameLst>
+                                      </p:cBhvr>
+                                      <p:to>
+                                        <p:strVal val="visible"/>
+                                      </p:to>
+                                    </p:set>
+                                  </p:childTnLst>
+                                </p:cTn>
+                              </p:par>
+                            </p:childTnLst>
+                          </p:cTn>
+                        </p:par>
+                      </p:childTnLst>
+                    </p:cTn>
+                  </p:par>
+                  <p:par>
+                    <p:cTn id="7" fill="hold">
+                      <p:stCondLst>
+                        <p:cond delay="indefinite"/>
+                      </p:stCondLst>
+                      <p:childTnLst>
+                        <p:par>
+                          <p:cTn id="8" fill="hold">
+                            <p:stCondLst>
+                              <p:cond delay="0"/>
+                            </p:stCondLst>
+                            <p:childTnLst>
+                              <p:par>
+                                <p:cTn id="9" presetID="1" presetClass="entr" presetSubtype="0" fill="hold" nodeType="clickEffect">
+                                  <p:stCondLst>
+                                    <p:cond delay="0"/>
+                                  </p:stCondLst>
+                                  <p:childTnLst>
+                                    <p:set>
+                                      <p:cBhvr>
+                                        <p:cTn id="10" dur="1" fill="hold">
+                                          <p:stCondLst>
+                                            <p:cond delay="0"/>
+                                          </p:stCondLst>
+                                        </p:cTn>
+                                        <p:tgtEl>
+                                          <p:spTgt spid="8">
+                                            <p:txEl>
+                                              <p:pRg st="1" end="1"/>
+                                            </p:txEl>
+                                          </p:spTgt>
+                                        </p:tgtEl>
+                                        <p:attrNameLst>
+                                          <p:attrName>style.visibility</p:attrName>
+                                        </p:attrNameLst>
+                                      </p:cBhvr>
+                                      <p:to>
+                                        <p:strVal val="visible"/>
+                                      </p:to>
+                                    </p:set>
+                                  </p:childTnLst>
+                                </p:cTn>
+                              </p:par>
+                              <p:par>
+                                <p:cTn id="11" presetID="1" presetClass="entr" presetSubtype="0" fill="hold" nodeType="withEffect">
+                                  <p:stCondLst>
+                                    <p:cond delay="0"/>
+                                  </p:stCondLst>
+                                  <p:childTnLst>
+                                    <p:set>
+                                      <p:cBhvr>
+                                        <p:cTn id="12" dur="1" fill="hold">
+                                          <p:stCondLst>
+                                            <p:cond delay="0"/>
+                                          </p:stCondLst>
+                                        </p:cTn>
+                                        <p:tgtEl>
+                                          <p:spTgt spid="8">
+                                            <p:txEl>
+                                              <p:pRg st="2" end="2"/>
+                                            </p:txEl>
+                                          </p:spTgt>
+                                        </p:tgtEl>
+                                        <p:attrNameLst>
+                                          <p:attrName>style.visibility</p:attrName>
+                                        </p:attrNameLst>
+                                      </p:cBhvr>
+                                      <p:to>
+                                        <p:strVal val="visible"/>
+                                      </p:to>
+                                    </p:set>
+                                  </p:childTnLst>
+                                </p:cTn>
+                              </p:par>
+                              <p:par>
+                                <p:cTn id="13" presetID="1" presetClass="entr" presetSubtype="0" fill="hold" nodeType="withEffect">
+                                  <p:stCondLst>
+                                    <p:cond delay="0"/>
+                                  </p:stCondLst>
+                                  <p:childTnLst>
+                                    <p:set>
+                                      <p:cBhvr>
+                                        <p:cTn id="14" dur="1" fill="hold">
+                                          <p:stCondLst>
+                                            <p:cond delay="0"/>
+                                          </p:stCondLst>
+                                        </p:cTn>
+                                        <p:tgtEl>
+                                          <p:spTgt spid="8">
+                                            <p:txEl>
+                                              <p:pRg st="3" end="3"/>
+                                            </p:txEl>
+                                          </p:spTgt>
+                                        </p:tgtEl>
+                                        <p:attrNameLst>
+                                          <p:attrName>style.visibility</p:attrName>
+                                        </p:attrNameLst>
+                                      </p:cBhvr>
+                                      <p:to>
+                                        <p:strVal val="visible"/>
+                                      </p:to>
+                                    </p:set>
+                                  </p:childTnLst>
+                                </p:cTn>
+                              </p:par>
+                            </p:childTnLst>
+                          </p:cTn>
+                        </p:par>
+                      </p:childTnLst>
+                    </p:cTn>
+                  </p:par>
+                  <p:par>
+                    <p:cTn id="15" fill="hold">
+                      <p:stCondLst>
+                        <p:cond delay="indefinite"/>
+                      </p:stCondLst>
+                      <p:childTnLst>
+                        <p:par>
+                          <p:cTn id="16" fill="hold">
+                            <p:stCondLst>
+                              <p:cond delay="0"/>
+                            </p:stCondLst>
+                            <p:childTnLst>
+                              <p:par>
+                                <p:cTn id="17" presetID="1" presetClass="entr" presetSubtype="0" fill="hold" nodeType="clickEffect">
+                                  <p:stCondLst>
+                                    <p:cond delay="0"/>
+                                  </p:stCondLst>
+                                  <p:childTnLst>
+                                    <p:set>
+                                      <p:cBhvr>
+                                        <p:cTn id="18" dur="1" fill="hold">
+                                          <p:stCondLst>
+                                            <p:cond delay="0"/>
+                                          </p:stCondLst>
+                                        </p:cTn>
+                                        <p:tgtEl>
+                                          <p:spTgt spid="8">
+                                            <p:txEl>
+                                              <p:pRg st="4" end="4"/>
+                                            </p:txEl>
+                                          </p:spTgt>
+                                        </p:tgtEl>
+                                        <p:attrNameLst>
+                                          <p:attrName>style.visibility</p:attrName>
+                                        </p:attrNameLst>
+                                      </p:cBhvr>
+                                      <p:to>
+                                        <p:strVal val="visible"/>
+                                      </p:to>
+                                    </p:set>
+                                  </p:childTnLst>
+                                </p:cTn>
+                              </p:par>
+                            </p:childTnLst>
+                          </p:cTn>
+                        </p:par>
+                      </p:childTnLst>
+                    </p:cTn>
+                  </p:par>
+                  <p:par>
+                    <p:cTn id="19" fill="hold">
+                      <p:stCondLst>
+                        <p:cond delay="indefinite"/>
+                      </p:stCondLst>
+                      <p:childTnLst>
+                        <p:par>
+                          <p:cTn id="20" fill="hold">
+                            <p:stCondLst>
+                              <p:cond delay="0"/>
+                            </p:stCondLst>
+                            <p:childTnLst>
+                              <p:par>
+                                <p:cTn id="21" presetID="1" presetClass="entr" presetSubtype="0" fill="hold" nodeType="clickEffect">
+                                  <p:stCondLst>
+                                    <p:cond delay="0"/>
+                                  </p:stCondLst>
+                                  <p:childTnLst>
+                                    <p:set>
+                                      <p:cBhvr>
+                                        <p:cTn id="22" dur="1" fill="hold">
+                                          <p:stCondLst>
+                                            <p:cond delay="0"/>
+                                          </p:stCondLst>
+                                        </p:cTn>
+                                        <p:tgtEl>
+                                          <p:spTgt spid="8">
+                                            <p:txEl>
+                                              <p:pRg st="5" end="5"/>
+                                            </p:txEl>
+                                          </p:spTgt>
+                                        </p:tgtEl>
+                                        <p:attrNameLst>
+                                          <p:attrName>style.visibility</p:attrName>
+                                        </p:attrNameLst>
+                                      </p:cBhvr>
+                                      <p:to>
+                                        <p:strVal val="visible"/>
+                                      </p:to>
+                                    </p:set>
+                                  </p:childTnLst>
+                                </p:cTn>
+                              </p:par>
+                              <p:par>
+                                <p:cTn id="23" presetID="1" presetClass="entr" presetSubtype="0" fill="hold" nodeType="withEffect">
+                                  <p:stCondLst>
+                                    <p:cond delay="0"/>
+                                  </p:stCondLst>
+                                  <p:childTnLst>
+                                    <p:set>
+                                      <p:cBhvr>
+                                        <p:cTn id="24" dur="1" fill="hold">
+                                          <p:stCondLst>
+                                            <p:cond delay="0"/>
+                                          </p:stCondLst>
+                                        </p:cTn>
+                                        <p:tgtEl>
+                                          <p:spTgt spid="8">
+                                            <p:txEl>
+                                              <p:pRg st="6" end="6"/>
+                                            </p:txEl>
+                                          </p:spTgt>
+                                        </p:tgtEl>
+                                        <p:attrNameLst>
+                                          <p:attrName>style.visibility</p:attrName>
+                                        </p:attrNameLst>
+                                      </p:cBhvr>
+                                      <p:to>
+                                        <p:strVal val="visible"/>
+                                      </p:to>
+                                    </p:set>
+                                  </p:childTnLst>
+                                </p:cTn>
+                              </p:par>
+                              <p:par>
+                                <p:cTn id="25" presetID="1" presetClass="entr" presetSubtype="0" fill="hold" nodeType="withEffect">
+                                  <p:stCondLst>
+                                    <p:cond delay="0"/>
+                                  </p:stCondLst>
+                                  <p:childTnLst>
+                                    <p:set>
+                                      <p:cBhvr>
+                                        <p:cTn id="26" dur="1" fill="hold">
+                                          <p:stCondLst>
+                                            <p:cond delay="0"/>
+                                          </p:stCondLst>
+                                        </p:cTn>
+                                        <p:tgtEl>
+                                          <p:spTgt spid="8">
+                                            <p:txEl>
+                                              <p:pRg st="7" end="7"/>
+                                            </p:txEl>
+                                          </p:spTgt>
+                                        </p:tgtEl>
+                                        <p:attrNameLst>
+                                          <p:attrName>style.visibility</p:attrName>
+                                        </p:attrNameLst>
+                                      </p:cBhvr>
+                                      <p:to>
+                                        <p:strVal val="visible"/>
+                                      </p:to>
+                                    </p:set>
+                                  </p:childTnLst>
+                                </p:cTn>
+                              </p:par>
+                              <p:par>
+                                <p:cTn id="27" presetID="1" presetClass="entr" presetSubtype="0" fill="hold" nodeType="withEffect">
+                                  <p:stCondLst>
+                                    <p:cond delay="0"/>
+                                  </p:stCondLst>
+                                  <p:childTnLst>
+                                    <p:set>
+                                      <p:cBhvr>
+                                        <p:cTn id="28" dur="1" fill="hold">
+                                          <p:stCondLst>
+                                            <p:cond delay="0"/>
+                                          </p:stCondLst>
+                                        </p:cTn>
+                                        <p:tgtEl>
+                                          <p:spTgt spid="8">
+                                            <p:txEl>
+                                              <p:pRg st="8" end="8"/>
+                                            </p:txEl>
+                                          </p:spTgt>
+                                        </p:tgtEl>
+                                        <p:attrNameLst>
+                                          <p:attrName>style.visibility</p:attrName>
+                                        </p:attrNameLst>
+                                      </p:cBhvr>
+                                      <p:to>
+                                        <p:strVal val="visible"/>
+                                      </p:to>
+                                    </p:set>
+                                  </p:childTnLst>
+                                </p:cTn>
+                              </p:par>
+                            </p:childTnLst>
+                          </p:cTn>
+                        </p:par>
+                      </p:childTnLst>
+                    </p:cTn>
+                  </p:par>
+                </p:childTnLst>
+              </p:cTn>
+              <p:prevCondLst>
+                <p:cond evt="onPrev" delay="0">
+                  <p:tgtEl>
+                    <p:sldTgt/>
+                  </p:tgtEl>
+                </p:cond>
+              </p:prevCondLst>
+              <p:nextCondLst>
+                <p:cond evt="onNext" delay="0">
+                  <p:tgtEl>
+                    <p:sldTgt/>
+                  </p:tgtEl>
+                </p:cond>
+              </p:nextCondLst>
+            </p:seq>
+          </p:childTnLst>
+        </p:cTn>
+      </p:par>
+    </p:tnLst>
+  </p:timing>
 </p:sld>
 </file>
 
@@ -4959,7 +5503,7 @@
           <a:p>
             <a:r>
               <a:rPr lang="en-US" dirty="0" smtClean="0"/>
-              <a:t>Machine Dependent Code</a:t>
+              <a:t>Reading a File</a:t>
             </a:r>
             <a:endParaRPr lang="en-US" dirty="0"/>
           </a:p>
@@ -4980,7 +5524,34 @@
           <a:bodyPr/>
           <a:lstStyle/>
           <a:p>
-            <a:endParaRPr lang="en-US"/>
+            <a:pPr marL="457200" indent="-457200">
+              <a:buFont typeface="+mj-lt"/>
+              <a:buAutoNum type="arabicPeriod"/>
+            </a:pPr>
+            <a:r>
+              <a:rPr lang="en-US" dirty="0" smtClean="0"/>
+              <a:t>open()</a:t>
+            </a:r>
+          </a:p>
+          <a:p>
+            <a:pPr marL="457200" indent="-457200">
+              <a:buFont typeface="+mj-lt"/>
+              <a:buAutoNum type="arabicPeriod"/>
+            </a:pPr>
+            <a:r>
+              <a:rPr lang="en-US" dirty="0" smtClean="0"/>
+              <a:t>read()</a:t>
+            </a:r>
+          </a:p>
+          <a:p>
+            <a:pPr marL="457200" indent="-457200">
+              <a:buFont typeface="+mj-lt"/>
+              <a:buAutoNum type="arabicPeriod"/>
+            </a:pPr>
+            <a:r>
+              <a:rPr lang="en-US" dirty="0" smtClean="0"/>
+              <a:t>close()</a:t>
+            </a:r>
           </a:p>
         </p:txBody>
       </p:sp>
@@ -4999,7 +5570,7 @@
           <a:bodyPr/>
           <a:lstStyle/>
           <a:p>
-            <a:fld id="{EA627C64-5B79-A943-A4C7-EC0455F1C2C5}" type="datetime1">
+            <a:fld id="{B587B557-3419-484A-8754-ACE5FA5F372A}" type="datetime1">
               <a:rPr lang="en-US" smtClean="0"/>
               <a:t>2/14/17</a:t>
             </a:fld>
@@ -5056,7 +5627,7 @@
     </p:spTree>
     <p:extLst>
       <p:ext uri="{BB962C8B-B14F-4D97-AF65-F5344CB8AC3E}">
-        <p14:creationId xmlns:p14="http://schemas.microsoft.com/office/powerpoint/2010/main" val="1276467652"/>
+        <p14:creationId xmlns:p14="http://schemas.microsoft.com/office/powerpoint/2010/main" val="233612583"/>
       </p:ext>
     </p:extLst>
   </p:cSld>
@@ -5100,7 +5671,7 @@
           <a:p>
             <a:r>
               <a:rPr lang="en-US" dirty="0" smtClean="0"/>
-              <a:t>Return Values</a:t>
+              <a:t>Looking at read()</a:t>
             </a:r>
             <a:endParaRPr lang="en-US" dirty="0"/>
           </a:p>
@@ -5121,7 +5692,19 @@
           <a:bodyPr/>
           <a:lstStyle/>
           <a:p>
-            <a:endParaRPr lang="en-US" dirty="0"/>
+            <a:r>
+              <a:rPr lang="en-US" dirty="0" smtClean="0"/>
+              <a:t>How do we get into the kernel?</a:t>
+            </a:r>
+          </a:p>
+          <a:p>
+            <a:r>
+              <a:rPr lang="en-US" dirty="0" smtClean="0"/>
+              <a:t>How do we get out of the kernel?</a:t>
+            </a:r>
+          </a:p>
+          <a:p>
+            <a:endParaRPr lang="en-US" dirty="0" smtClean="0"/>
           </a:p>
         </p:txBody>
       </p:sp>
@@ -5140,7 +5723,7 @@
           <a:bodyPr/>
           <a:lstStyle/>
           <a:p>
-            <a:fld id="{9F38F6E2-8DD3-E743-856A-641D1E7059C1}" type="datetime1">
+            <a:fld id="{F9C7E722-6D52-F848-8DF6-96E061F4DC0F}" type="datetime1">
               <a:rPr lang="en-US" smtClean="0"/>
               <a:t>2/14/17</a:t>
             </a:fld>
@@ -5197,7 +5780,7 @@
     </p:spTree>
     <p:extLst>
       <p:ext uri="{BB962C8B-B14F-4D97-AF65-F5344CB8AC3E}">
-        <p14:creationId xmlns:p14="http://schemas.microsoft.com/office/powerpoint/2010/main" val="1098515382"/>
+        <p14:creationId xmlns:p14="http://schemas.microsoft.com/office/powerpoint/2010/main" val="1716288803"/>
       </p:ext>
     </p:extLst>
   </p:cSld>
@@ -5236,14 +5819,12 @@
         </p:nvSpPr>
         <p:spPr/>
         <p:txBody>
-          <a:bodyPr>
-            <a:normAutofit fontScale="90000"/>
-          </a:bodyPr>
-          <a:lstStyle/>
-          <a:p>
-            <a:r>
-              <a:rPr lang="en-US" dirty="0" smtClean="0"/>
-              <a:t>Computers, Time and Operating Systems</a:t>
+          <a:bodyPr/>
+          <a:lstStyle/>
+          <a:p>
+            <a:r>
+              <a:rPr lang="en-US" dirty="0" smtClean="0"/>
+              <a:t>It’s a trap!</a:t>
             </a:r>
             <a:endParaRPr lang="en-US" dirty="0"/>
           </a:p>
@@ -5264,68 +5845,7 @@
           <a:bodyPr/>
           <a:lstStyle/>
           <a:p>
-            <a:r>
-              <a:rPr lang="en-US" dirty="0" smtClean="0"/>
-              <a:t>Time of Day</a:t>
-            </a:r>
-          </a:p>
-          <a:p>
-            <a:pPr lvl="1"/>
-            <a:r>
-              <a:rPr lang="en-US" dirty="0" smtClean="0"/>
-              <a:t>When did this happen?</a:t>
-            </a:r>
-          </a:p>
-          <a:p>
-            <a:r>
-              <a:rPr lang="en-US" dirty="0" smtClean="0"/>
-              <a:t>Length of Time</a:t>
-            </a:r>
-          </a:p>
-          <a:p>
-            <a:pPr lvl="1"/>
-            <a:r>
-              <a:rPr lang="en-US" dirty="0" smtClean="0"/>
-              <a:t>Interval time</a:t>
-            </a:r>
-          </a:p>
-          <a:p>
-            <a:pPr lvl="1"/>
-            <a:r>
-              <a:rPr lang="en-US" dirty="0" smtClean="0"/>
-              <a:t>How long did this take?</a:t>
-            </a:r>
-          </a:p>
-          <a:p>
-            <a:pPr lvl="1"/>
-            <a:r>
-              <a:rPr lang="en-US" dirty="0" smtClean="0"/>
-              <a:t>Let me know when X time has passed</a:t>
-            </a:r>
-          </a:p>
-          <a:p>
-            <a:r>
-              <a:rPr lang="en-US" dirty="0" smtClean="0"/>
-              <a:t>Order of operations</a:t>
-            </a:r>
-          </a:p>
-          <a:p>
-            <a:pPr lvl="1"/>
-            <a:r>
-              <a:rPr lang="en-US" dirty="0" smtClean="0"/>
-              <a:t>A happens before B</a:t>
-            </a:r>
-          </a:p>
-          <a:p>
-            <a:pPr lvl="1"/>
-            <a:r>
-              <a:rPr lang="en-US" dirty="0" err="1" smtClean="0"/>
-              <a:t>Lamport</a:t>
-            </a:r>
-            <a:r>
-              <a:rPr lang="en-US" dirty="0" smtClean="0"/>
-              <a:t> 1978</a:t>
-            </a:r>
+            <a:endParaRPr lang="en-US"/>
           </a:p>
         </p:txBody>
       </p:sp>
@@ -5344,7 +5864,7 @@
           <a:bodyPr/>
           <a:lstStyle/>
           <a:p>
-            <a:fld id="{49017221-95F1-A547-955D-7B046F2E09F0}" type="datetime1">
+            <a:fld id="{21AA2D93-07FE-1B40-B6F1-F8AD65299FF6}" type="datetime1">
               <a:rPr lang="en-US" smtClean="0"/>
               <a:t>2/14/17</a:t>
             </a:fld>
@@ -5401,7 +5921,7 @@
     </p:spTree>
     <p:extLst>
       <p:ext uri="{BB962C8B-B14F-4D97-AF65-F5344CB8AC3E}">
-        <p14:creationId xmlns:p14="http://schemas.microsoft.com/office/powerpoint/2010/main" val="118830003"/>
+        <p14:creationId xmlns:p14="http://schemas.microsoft.com/office/powerpoint/2010/main" val="1335855769"/>
       </p:ext>
     </p:extLst>
   </p:cSld>
@@ -5445,7 +5965,7 @@
           <a:p>
             <a:r>
               <a:rPr lang="en-US" dirty="0" smtClean="0"/>
-              <a:t>The Kernel Clock</a:t>
+              <a:t>Machine Dependent Code</a:t>
             </a:r>
             <a:endParaRPr lang="en-US" dirty="0"/>
           </a:p>
@@ -5466,55 +5986,7 @@
           <a:bodyPr/>
           <a:lstStyle/>
           <a:p>
-            <a:r>
-              <a:rPr lang="en-US" dirty="0" smtClean="0"/>
-              <a:t>Drives the everything forwards in time</a:t>
-            </a:r>
-          </a:p>
-          <a:p>
-            <a:r>
-              <a:rPr lang="en-US" dirty="0" smtClean="0"/>
-              <a:t>Ticks at 1KHz</a:t>
-            </a:r>
-          </a:p>
-          <a:p>
-            <a:r>
-              <a:rPr lang="en-US" dirty="0" smtClean="0"/>
-              <a:t>Derived from the hardware</a:t>
-            </a:r>
-          </a:p>
-          <a:p>
-            <a:pPr lvl="1"/>
-            <a:r>
-              <a:rPr lang="en-US" dirty="0" smtClean="0"/>
-              <a:t>Also hardware dependent</a:t>
-            </a:r>
-          </a:p>
-          <a:p>
-            <a:pPr lvl="1"/>
-            <a:r>
-              <a:rPr lang="en-US" dirty="0" smtClean="0"/>
-              <a:t>Every clock is different</a:t>
-            </a:r>
-          </a:p>
-          <a:p>
-            <a:pPr lvl="1"/>
-            <a:r>
-              <a:rPr lang="en-US" dirty="0" smtClean="0"/>
-              <a:t>There may be several potential clock sources</a:t>
-            </a:r>
-          </a:p>
-          <a:p>
-            <a:r>
-              <a:rPr lang="en-US" dirty="0" smtClean="0"/>
-              <a:t>Nearly everything depends on the clock</a:t>
-            </a:r>
-          </a:p>
-          <a:p>
-            <a:r>
-              <a:rPr lang="en-US" dirty="0" smtClean="0"/>
-              <a:t>One of the first things that is setup by the kernel</a:t>
-            </a:r>
+            <a:endParaRPr lang="en-US"/>
           </a:p>
         </p:txBody>
       </p:sp>
@@ -5533,7 +6005,7 @@
           <a:bodyPr/>
           <a:lstStyle/>
           <a:p>
-            <a:fld id="{49017221-95F1-A547-955D-7B046F2E09F0}" type="datetime1">
+            <a:fld id="{EA627C64-5B79-A943-A4C7-EC0455F1C2C5}" type="datetime1">
               <a:rPr lang="en-US" smtClean="0"/>
               <a:t>2/14/17</a:t>
             </a:fld>
@@ -5590,7 +6062,7 @@
     </p:spTree>
     <p:extLst>
       <p:ext uri="{BB962C8B-B14F-4D97-AF65-F5344CB8AC3E}">
-        <p14:creationId xmlns:p14="http://schemas.microsoft.com/office/powerpoint/2010/main" val="1532841207"/>
+        <p14:creationId xmlns:p14="http://schemas.microsoft.com/office/powerpoint/2010/main" val="1276467652"/>
       </p:ext>
     </p:extLst>
   </p:cSld>
@@ -5634,7 +6106,7 @@
           <a:p>
             <a:r>
               <a:rPr lang="en-US" dirty="0" smtClean="0"/>
-              <a:t>Where does the clock come from?</a:t>
+              <a:t>Return Values</a:t>
             </a:r>
             <a:endParaRPr lang="en-US" dirty="0"/>
           </a:p>
@@ -5655,10 +6127,6 @@
           <a:bodyPr/>
           <a:lstStyle/>
           <a:p>
-            <a:r>
-              <a:rPr lang="en-US" dirty="0" smtClean="0"/>
-              <a:t>All computer</a:t>
-            </a:r>
             <a:endParaRPr lang="en-US" dirty="0"/>
           </a:p>
         </p:txBody>
@@ -5678,7 +6146,7 @@
           <a:bodyPr/>
           <a:lstStyle/>
           <a:p>
-            <a:fld id="{49017221-95F1-A547-955D-7B046F2E09F0}" type="datetime1">
+            <a:fld id="{9F38F6E2-8DD3-E743-856A-641D1E7059C1}" type="datetime1">
               <a:rPr lang="en-US" smtClean="0"/>
               <a:t>2/14/17</a:t>
             </a:fld>
@@ -5727,6 +6195,544 @@
             <a:fld id="{699C44C4-0FAD-8046-A5C4-05AB318FA424}" type="slidenum">
               <a:rPr lang="en-US" smtClean="0"/>
               <a:t>15</a:t>
+            </a:fld>
+            <a:endParaRPr lang="en-US"/>
+          </a:p>
+        </p:txBody>
+      </p:sp>
+    </p:spTree>
+    <p:extLst>
+      <p:ext uri="{BB962C8B-B14F-4D97-AF65-F5344CB8AC3E}">
+        <p14:creationId xmlns:p14="http://schemas.microsoft.com/office/powerpoint/2010/main" val="1098515382"/>
+      </p:ext>
+    </p:extLst>
+  </p:cSld>
+  <p:clrMapOvr>
+    <a:masterClrMapping/>
+  </p:clrMapOvr>
+</p:sld>
+</file>
+
+<file path=ppt/slides/slide16.xml><?xml version="1.0" encoding="utf-8"?>
+<p:sld xmlns:a="http://schemas.openxmlformats.org/drawingml/2006/main" xmlns:r="http://schemas.openxmlformats.org/officeDocument/2006/relationships" xmlns:p="http://schemas.openxmlformats.org/presentationml/2006/main">
+  <p:cSld>
+    <p:spTree>
+      <p:nvGrpSpPr>
+        <p:cNvPr id="1" name=""/>
+        <p:cNvGrpSpPr/>
+        <p:nvPr/>
+      </p:nvGrpSpPr>
+      <p:grpSpPr>
+        <a:xfrm>
+          <a:off x="0" y="0"/>
+          <a:ext cx="0" cy="0"/>
+          <a:chOff x="0" y="0"/>
+          <a:chExt cx="0" cy="0"/>
+        </a:xfrm>
+      </p:grpSpPr>
+      <p:sp>
+        <p:nvSpPr>
+          <p:cNvPr id="2" name="Title 1"/>
+          <p:cNvSpPr>
+            <a:spLocks noGrp="1"/>
+          </p:cNvSpPr>
+          <p:nvPr>
+            <p:ph type="title"/>
+          </p:nvPr>
+        </p:nvSpPr>
+        <p:spPr/>
+        <p:txBody>
+          <a:bodyPr>
+            <a:normAutofit fontScale="90000"/>
+          </a:bodyPr>
+          <a:lstStyle/>
+          <a:p>
+            <a:r>
+              <a:rPr lang="en-US" dirty="0" smtClean="0"/>
+              <a:t>Computers, Time and Operating Systems</a:t>
+            </a:r>
+            <a:endParaRPr lang="en-US" dirty="0"/>
+          </a:p>
+        </p:txBody>
+      </p:sp>
+      <p:sp>
+        <p:nvSpPr>
+          <p:cNvPr id="3" name="Content Placeholder 2"/>
+          <p:cNvSpPr>
+            <a:spLocks noGrp="1"/>
+          </p:cNvSpPr>
+          <p:nvPr>
+            <p:ph idx="1"/>
+          </p:nvPr>
+        </p:nvSpPr>
+        <p:spPr/>
+        <p:txBody>
+          <a:bodyPr/>
+          <a:lstStyle/>
+          <a:p>
+            <a:r>
+              <a:rPr lang="en-US" dirty="0" smtClean="0"/>
+              <a:t>Time of Day</a:t>
+            </a:r>
+          </a:p>
+          <a:p>
+            <a:pPr lvl="1"/>
+            <a:r>
+              <a:rPr lang="en-US" dirty="0" smtClean="0"/>
+              <a:t>When did this happen?</a:t>
+            </a:r>
+          </a:p>
+          <a:p>
+            <a:r>
+              <a:rPr lang="en-US" dirty="0" smtClean="0"/>
+              <a:t>Length of Time</a:t>
+            </a:r>
+          </a:p>
+          <a:p>
+            <a:pPr lvl="1"/>
+            <a:r>
+              <a:rPr lang="en-US" dirty="0" smtClean="0"/>
+              <a:t>Interval time</a:t>
+            </a:r>
+          </a:p>
+          <a:p>
+            <a:pPr lvl="1"/>
+            <a:r>
+              <a:rPr lang="en-US" dirty="0" smtClean="0"/>
+              <a:t>How long did this take?</a:t>
+            </a:r>
+          </a:p>
+          <a:p>
+            <a:pPr lvl="1"/>
+            <a:r>
+              <a:rPr lang="en-US" dirty="0" smtClean="0"/>
+              <a:t>Let me know when X time has passed</a:t>
+            </a:r>
+          </a:p>
+          <a:p>
+            <a:r>
+              <a:rPr lang="en-US" dirty="0" smtClean="0"/>
+              <a:t>Order of operations</a:t>
+            </a:r>
+          </a:p>
+          <a:p>
+            <a:pPr lvl="1"/>
+            <a:r>
+              <a:rPr lang="en-US" dirty="0" smtClean="0"/>
+              <a:t>A happens before B</a:t>
+            </a:r>
+          </a:p>
+          <a:p>
+            <a:pPr lvl="1"/>
+            <a:r>
+              <a:rPr lang="en-US" dirty="0" err="1" smtClean="0"/>
+              <a:t>Lamport</a:t>
+            </a:r>
+            <a:r>
+              <a:rPr lang="en-US" dirty="0" smtClean="0"/>
+              <a:t> 1978</a:t>
+            </a:r>
+          </a:p>
+        </p:txBody>
+      </p:sp>
+      <p:sp>
+        <p:nvSpPr>
+          <p:cNvPr id="4" name="Date Placeholder 3"/>
+          <p:cNvSpPr>
+            <a:spLocks noGrp="1"/>
+          </p:cNvSpPr>
+          <p:nvPr>
+            <p:ph type="dt" sz="half" idx="10"/>
+          </p:nvPr>
+        </p:nvSpPr>
+        <p:spPr/>
+        <p:txBody>
+          <a:bodyPr/>
+          <a:lstStyle/>
+          <a:p>
+            <a:fld id="{49017221-95F1-A547-955D-7B046F2E09F0}" type="datetime1">
+              <a:rPr lang="en-US" smtClean="0"/>
+              <a:t>2/14/17</a:t>
+            </a:fld>
+            <a:endParaRPr lang="en-US"/>
+          </a:p>
+        </p:txBody>
+      </p:sp>
+      <p:sp>
+        <p:nvSpPr>
+          <p:cNvPr id="5" name="Footer Placeholder 4"/>
+          <p:cNvSpPr>
+            <a:spLocks noGrp="1"/>
+          </p:cNvSpPr>
+          <p:nvPr>
+            <p:ph type="ftr" sz="quarter" idx="11"/>
+          </p:nvPr>
+        </p:nvSpPr>
+        <p:spPr/>
+        <p:txBody>
+          <a:bodyPr/>
+          <a:lstStyle/>
+          <a:p>
+            <a:r>
+              <a:rPr lang="en-US" smtClean="0"/>
+              <a:t>Introduction to Operating Systems</a:t>
+            </a:r>
+            <a:endParaRPr lang="en-US" dirty="0"/>
+          </a:p>
+        </p:txBody>
+      </p:sp>
+      <p:sp>
+        <p:nvSpPr>
+          <p:cNvPr id="6" name="Slide Number Placeholder 5"/>
+          <p:cNvSpPr>
+            <a:spLocks noGrp="1"/>
+          </p:cNvSpPr>
+          <p:nvPr>
+            <p:ph type="sldNum" sz="quarter" idx="12"/>
+          </p:nvPr>
+        </p:nvSpPr>
+        <p:spPr/>
+        <p:txBody>
+          <a:bodyPr/>
+          <a:lstStyle/>
+          <a:p>
+            <a:fld id="{699C44C4-0FAD-8046-A5C4-05AB318FA424}" type="slidenum">
+              <a:rPr lang="en-US" smtClean="0"/>
+              <a:t>16</a:t>
+            </a:fld>
+            <a:endParaRPr lang="en-US"/>
+          </a:p>
+        </p:txBody>
+      </p:sp>
+    </p:spTree>
+    <p:extLst>
+      <p:ext uri="{BB962C8B-B14F-4D97-AF65-F5344CB8AC3E}">
+        <p14:creationId xmlns:p14="http://schemas.microsoft.com/office/powerpoint/2010/main" val="118830003"/>
+      </p:ext>
+    </p:extLst>
+  </p:cSld>
+  <p:clrMapOvr>
+    <a:masterClrMapping/>
+  </p:clrMapOvr>
+</p:sld>
+</file>
+
+<file path=ppt/slides/slide17.xml><?xml version="1.0" encoding="utf-8"?>
+<p:sld xmlns:a="http://schemas.openxmlformats.org/drawingml/2006/main" xmlns:r="http://schemas.openxmlformats.org/officeDocument/2006/relationships" xmlns:p="http://schemas.openxmlformats.org/presentationml/2006/main">
+  <p:cSld>
+    <p:spTree>
+      <p:nvGrpSpPr>
+        <p:cNvPr id="1" name=""/>
+        <p:cNvGrpSpPr/>
+        <p:nvPr/>
+      </p:nvGrpSpPr>
+      <p:grpSpPr>
+        <a:xfrm>
+          <a:off x="0" y="0"/>
+          <a:ext cx="0" cy="0"/>
+          <a:chOff x="0" y="0"/>
+          <a:chExt cx="0" cy="0"/>
+        </a:xfrm>
+      </p:grpSpPr>
+      <p:sp>
+        <p:nvSpPr>
+          <p:cNvPr id="2" name="Title 1"/>
+          <p:cNvSpPr>
+            <a:spLocks noGrp="1"/>
+          </p:cNvSpPr>
+          <p:nvPr>
+            <p:ph type="title"/>
+          </p:nvPr>
+        </p:nvSpPr>
+        <p:spPr/>
+        <p:txBody>
+          <a:bodyPr/>
+          <a:lstStyle/>
+          <a:p>
+            <a:r>
+              <a:rPr lang="en-US" dirty="0" smtClean="0"/>
+              <a:t>The Kernel Clock</a:t>
+            </a:r>
+            <a:endParaRPr lang="en-US" dirty="0"/>
+          </a:p>
+        </p:txBody>
+      </p:sp>
+      <p:sp>
+        <p:nvSpPr>
+          <p:cNvPr id="3" name="Content Placeholder 2"/>
+          <p:cNvSpPr>
+            <a:spLocks noGrp="1"/>
+          </p:cNvSpPr>
+          <p:nvPr>
+            <p:ph idx="1"/>
+          </p:nvPr>
+        </p:nvSpPr>
+        <p:spPr/>
+        <p:txBody>
+          <a:bodyPr/>
+          <a:lstStyle/>
+          <a:p>
+            <a:r>
+              <a:rPr lang="en-US" dirty="0" smtClean="0"/>
+              <a:t>Drives the everything forwards in time</a:t>
+            </a:r>
+          </a:p>
+          <a:p>
+            <a:r>
+              <a:rPr lang="en-US" dirty="0" smtClean="0"/>
+              <a:t>Ticks at 1KHz</a:t>
+            </a:r>
+          </a:p>
+          <a:p>
+            <a:r>
+              <a:rPr lang="en-US" dirty="0" smtClean="0"/>
+              <a:t>Derived from the hardware</a:t>
+            </a:r>
+          </a:p>
+          <a:p>
+            <a:pPr lvl="1"/>
+            <a:r>
+              <a:rPr lang="en-US" dirty="0" smtClean="0"/>
+              <a:t>Also hardware dependent</a:t>
+            </a:r>
+          </a:p>
+          <a:p>
+            <a:pPr lvl="1"/>
+            <a:r>
+              <a:rPr lang="en-US" dirty="0" smtClean="0"/>
+              <a:t>Every clock is different</a:t>
+            </a:r>
+          </a:p>
+          <a:p>
+            <a:pPr lvl="1"/>
+            <a:r>
+              <a:rPr lang="en-US" dirty="0" smtClean="0"/>
+              <a:t>There may be several potential clock sources</a:t>
+            </a:r>
+          </a:p>
+          <a:p>
+            <a:r>
+              <a:rPr lang="en-US" dirty="0" smtClean="0"/>
+              <a:t>Nearly everything depends on the clock</a:t>
+            </a:r>
+          </a:p>
+          <a:p>
+            <a:r>
+              <a:rPr lang="en-US" dirty="0" smtClean="0"/>
+              <a:t>One of the first things that is setup by the kernel</a:t>
+            </a:r>
+          </a:p>
+        </p:txBody>
+      </p:sp>
+      <p:sp>
+        <p:nvSpPr>
+          <p:cNvPr id="4" name="Date Placeholder 3"/>
+          <p:cNvSpPr>
+            <a:spLocks noGrp="1"/>
+          </p:cNvSpPr>
+          <p:nvPr>
+            <p:ph type="dt" sz="half" idx="10"/>
+          </p:nvPr>
+        </p:nvSpPr>
+        <p:spPr/>
+        <p:txBody>
+          <a:bodyPr/>
+          <a:lstStyle/>
+          <a:p>
+            <a:fld id="{49017221-95F1-A547-955D-7B046F2E09F0}" type="datetime1">
+              <a:rPr lang="en-US" smtClean="0"/>
+              <a:t>2/14/17</a:t>
+            </a:fld>
+            <a:endParaRPr lang="en-US"/>
+          </a:p>
+        </p:txBody>
+      </p:sp>
+      <p:sp>
+        <p:nvSpPr>
+          <p:cNvPr id="5" name="Footer Placeholder 4"/>
+          <p:cNvSpPr>
+            <a:spLocks noGrp="1"/>
+          </p:cNvSpPr>
+          <p:nvPr>
+            <p:ph type="ftr" sz="quarter" idx="11"/>
+          </p:nvPr>
+        </p:nvSpPr>
+        <p:spPr/>
+        <p:txBody>
+          <a:bodyPr/>
+          <a:lstStyle/>
+          <a:p>
+            <a:r>
+              <a:rPr lang="en-US" smtClean="0"/>
+              <a:t>Introduction to Operating Systems</a:t>
+            </a:r>
+            <a:endParaRPr lang="en-US" dirty="0"/>
+          </a:p>
+        </p:txBody>
+      </p:sp>
+      <p:sp>
+        <p:nvSpPr>
+          <p:cNvPr id="6" name="Slide Number Placeholder 5"/>
+          <p:cNvSpPr>
+            <a:spLocks noGrp="1"/>
+          </p:cNvSpPr>
+          <p:nvPr>
+            <p:ph type="sldNum" sz="quarter" idx="12"/>
+          </p:nvPr>
+        </p:nvSpPr>
+        <p:spPr/>
+        <p:txBody>
+          <a:bodyPr/>
+          <a:lstStyle/>
+          <a:p>
+            <a:fld id="{699C44C4-0FAD-8046-A5C4-05AB318FA424}" type="slidenum">
+              <a:rPr lang="en-US" smtClean="0"/>
+              <a:t>17</a:t>
+            </a:fld>
+            <a:endParaRPr lang="en-US"/>
+          </a:p>
+        </p:txBody>
+      </p:sp>
+    </p:spTree>
+    <p:extLst>
+      <p:ext uri="{BB962C8B-B14F-4D97-AF65-F5344CB8AC3E}">
+        <p14:creationId xmlns:p14="http://schemas.microsoft.com/office/powerpoint/2010/main" val="1532841207"/>
+      </p:ext>
+    </p:extLst>
+  </p:cSld>
+  <p:clrMapOvr>
+    <a:masterClrMapping/>
+  </p:clrMapOvr>
+</p:sld>
+</file>
+
+<file path=ppt/slides/slide18.xml><?xml version="1.0" encoding="utf-8"?>
+<p:sld xmlns:a="http://schemas.openxmlformats.org/drawingml/2006/main" xmlns:r="http://schemas.openxmlformats.org/officeDocument/2006/relationships" xmlns:p="http://schemas.openxmlformats.org/presentationml/2006/main">
+  <p:cSld>
+    <p:spTree>
+      <p:nvGrpSpPr>
+        <p:cNvPr id="1" name=""/>
+        <p:cNvGrpSpPr/>
+        <p:nvPr/>
+      </p:nvGrpSpPr>
+      <p:grpSpPr>
+        <a:xfrm>
+          <a:off x="0" y="0"/>
+          <a:ext cx="0" cy="0"/>
+          <a:chOff x="0" y="0"/>
+          <a:chExt cx="0" cy="0"/>
+        </a:xfrm>
+      </p:grpSpPr>
+      <p:sp>
+        <p:nvSpPr>
+          <p:cNvPr id="2" name="Title 1"/>
+          <p:cNvSpPr>
+            <a:spLocks noGrp="1"/>
+          </p:cNvSpPr>
+          <p:nvPr>
+            <p:ph type="title"/>
+          </p:nvPr>
+        </p:nvSpPr>
+        <p:spPr/>
+        <p:txBody>
+          <a:bodyPr/>
+          <a:lstStyle/>
+          <a:p>
+            <a:r>
+              <a:rPr lang="en-US" dirty="0" smtClean="0"/>
+              <a:t>Where does the clock come from?</a:t>
+            </a:r>
+            <a:endParaRPr lang="en-US" dirty="0"/>
+          </a:p>
+        </p:txBody>
+      </p:sp>
+      <p:sp>
+        <p:nvSpPr>
+          <p:cNvPr id="3" name="Content Placeholder 2"/>
+          <p:cNvSpPr>
+            <a:spLocks noGrp="1"/>
+          </p:cNvSpPr>
+          <p:nvPr>
+            <p:ph idx="1"/>
+          </p:nvPr>
+        </p:nvSpPr>
+        <p:spPr/>
+        <p:txBody>
+          <a:bodyPr/>
+          <a:lstStyle/>
+          <a:p>
+            <a:r>
+              <a:rPr lang="en-US" dirty="0" smtClean="0"/>
+              <a:t>All computer</a:t>
+            </a:r>
+            <a:endParaRPr lang="en-US" dirty="0"/>
+          </a:p>
+        </p:txBody>
+      </p:sp>
+      <p:sp>
+        <p:nvSpPr>
+          <p:cNvPr id="4" name="Date Placeholder 3"/>
+          <p:cNvSpPr>
+            <a:spLocks noGrp="1"/>
+          </p:cNvSpPr>
+          <p:nvPr>
+            <p:ph type="dt" sz="half" idx="10"/>
+          </p:nvPr>
+        </p:nvSpPr>
+        <p:spPr/>
+        <p:txBody>
+          <a:bodyPr/>
+          <a:lstStyle/>
+          <a:p>
+            <a:fld id="{49017221-95F1-A547-955D-7B046F2E09F0}" type="datetime1">
+              <a:rPr lang="en-US" smtClean="0"/>
+              <a:t>2/14/17</a:t>
+            </a:fld>
+            <a:endParaRPr lang="en-US"/>
+          </a:p>
+        </p:txBody>
+      </p:sp>
+      <p:sp>
+        <p:nvSpPr>
+          <p:cNvPr id="5" name="Footer Placeholder 4"/>
+          <p:cNvSpPr>
+            <a:spLocks noGrp="1"/>
+          </p:cNvSpPr>
+          <p:nvPr>
+            <p:ph type="ftr" sz="quarter" idx="11"/>
+          </p:nvPr>
+        </p:nvSpPr>
+        <p:spPr/>
+        <p:txBody>
+          <a:bodyPr/>
+          <a:lstStyle/>
+          <a:p>
+            <a:r>
+              <a:rPr lang="en-US" smtClean="0"/>
+              <a:t>Introduction to Operating Systems</a:t>
+            </a:r>
+            <a:endParaRPr lang="en-US" dirty="0"/>
+          </a:p>
+        </p:txBody>
+      </p:sp>
+      <p:sp>
+        <p:nvSpPr>
+          <p:cNvPr id="6" name="Slide Number Placeholder 5"/>
+          <p:cNvSpPr>
+            <a:spLocks noGrp="1"/>
+          </p:cNvSpPr>
+          <p:nvPr>
+            <p:ph type="sldNum" sz="quarter" idx="12"/>
+          </p:nvPr>
+        </p:nvSpPr>
+        <p:spPr/>
+        <p:txBody>
+          <a:bodyPr/>
+          <a:lstStyle/>
+          <a:p>
+            <a:fld id="{699C44C4-0FAD-8046-A5C4-05AB318FA424}" type="slidenum">
+              <a:rPr lang="en-US" smtClean="0"/>
+              <a:t>18</a:t>
             </a:fld>
             <a:endParaRPr lang="en-US"/>
           </a:p>
@@ -5745,7 +6751,7 @@
 </p:sld>
 </file>
 
-<file path=ppt/slides/slide16.xml><?xml version="1.0" encoding="utf-8"?>
+<file path=ppt/slides/slide19.xml><?xml version="1.0" encoding="utf-8"?>
 <p:sld xmlns:a="http://schemas.openxmlformats.org/drawingml/2006/main" xmlns:r="http://schemas.openxmlformats.org/officeDocument/2006/relationships" xmlns:p="http://schemas.openxmlformats.org/presentationml/2006/main">
   <p:cSld>
     <p:spTree>
@@ -5969,490 +6975,6 @@
 </p:sld>
 </file>
 
-<file path=ppt/slides/slide17.xml><?xml version="1.0" encoding="utf-8"?>
-<p:sld xmlns:a="http://schemas.openxmlformats.org/drawingml/2006/main" xmlns:r="http://schemas.openxmlformats.org/officeDocument/2006/relationships" xmlns:p="http://schemas.openxmlformats.org/presentationml/2006/main">
-  <p:cSld>
-    <p:spTree>
-      <p:nvGrpSpPr>
-        <p:cNvPr id="1" name=""/>
-        <p:cNvGrpSpPr/>
-        <p:nvPr/>
-      </p:nvGrpSpPr>
-      <p:grpSpPr>
-        <a:xfrm>
-          <a:off x="0" y="0"/>
-          <a:ext cx="0" cy="0"/>
-          <a:chOff x="0" y="0"/>
-          <a:chExt cx="0" cy="0"/>
-        </a:xfrm>
-      </p:grpSpPr>
-      <p:sp>
-        <p:nvSpPr>
-          <p:cNvPr id="10" name="Title 9"/>
-          <p:cNvSpPr>
-            <a:spLocks noGrp="1"/>
-          </p:cNvSpPr>
-          <p:nvPr>
-            <p:ph type="title"/>
-          </p:nvPr>
-        </p:nvSpPr>
-        <p:spPr/>
-        <p:txBody>
-          <a:bodyPr/>
-          <a:lstStyle/>
-          <a:p>
-            <a:r>
-              <a:rPr lang="en-US" dirty="0" smtClean="0"/>
-              <a:t>Why do we set the time?</a:t>
-            </a:r>
-            <a:endParaRPr lang="en-US" dirty="0"/>
-          </a:p>
-        </p:txBody>
-      </p:sp>
-      <p:sp>
-        <p:nvSpPr>
-          <p:cNvPr id="11" name="Content Placeholder 10"/>
-          <p:cNvSpPr>
-            <a:spLocks noGrp="1"/>
-          </p:cNvSpPr>
-          <p:nvPr>
-            <p:ph idx="1"/>
-          </p:nvPr>
-        </p:nvSpPr>
-        <p:spPr/>
-        <p:txBody>
-          <a:bodyPr/>
-          <a:lstStyle/>
-          <a:p>
-            <a:r>
-              <a:rPr lang="en-US" dirty="0" smtClean="0"/>
-              <a:t>Who can set the time?</a:t>
-            </a:r>
-          </a:p>
-          <a:p>
-            <a:r>
-              <a:rPr lang="en-US" dirty="0" smtClean="0"/>
-              <a:t>Why?</a:t>
-            </a:r>
-          </a:p>
-          <a:p>
-            <a:r>
-              <a:rPr lang="en-US" dirty="0" smtClean="0"/>
-              <a:t>How?</a:t>
-            </a:r>
-            <a:endParaRPr lang="en-US" dirty="0"/>
-          </a:p>
-        </p:txBody>
-      </p:sp>
-      <p:sp>
-        <p:nvSpPr>
-          <p:cNvPr id="7" name="Date Placeholder 6"/>
-          <p:cNvSpPr>
-            <a:spLocks noGrp="1"/>
-          </p:cNvSpPr>
-          <p:nvPr>
-            <p:ph type="dt" sz="half" idx="10"/>
-          </p:nvPr>
-        </p:nvSpPr>
-        <p:spPr/>
-        <p:txBody>
-          <a:bodyPr/>
-          <a:lstStyle/>
-          <a:p>
-            <a:fld id="{B1259037-4653-634A-8C7E-33C2E296917B}" type="datetime1">
-              <a:rPr lang="en-US" smtClean="0"/>
-              <a:t>2/14/17</a:t>
-            </a:fld>
-            <a:endParaRPr lang="en-US"/>
-          </a:p>
-        </p:txBody>
-      </p:sp>
-      <p:sp>
-        <p:nvSpPr>
-          <p:cNvPr id="8" name="Footer Placeholder 7"/>
-          <p:cNvSpPr>
-            <a:spLocks noGrp="1"/>
-          </p:cNvSpPr>
-          <p:nvPr>
-            <p:ph type="ftr" sz="quarter" idx="11"/>
-          </p:nvPr>
-        </p:nvSpPr>
-        <p:spPr/>
-        <p:txBody>
-          <a:bodyPr/>
-          <a:lstStyle/>
-          <a:p>
-            <a:r>
-              <a:rPr lang="en-US" smtClean="0"/>
-              <a:t>Introduction to Operating Systems</a:t>
-            </a:r>
-            <a:endParaRPr lang="en-US"/>
-          </a:p>
-        </p:txBody>
-      </p:sp>
-      <p:sp>
-        <p:nvSpPr>
-          <p:cNvPr id="9" name="Slide Number Placeholder 8"/>
-          <p:cNvSpPr>
-            <a:spLocks noGrp="1"/>
-          </p:cNvSpPr>
-          <p:nvPr>
-            <p:ph type="sldNum" sz="quarter" idx="12"/>
-          </p:nvPr>
-        </p:nvSpPr>
-        <p:spPr/>
-        <p:txBody>
-          <a:bodyPr/>
-          <a:lstStyle/>
-          <a:p>
-            <a:fld id="{699C44C4-0FAD-8046-A5C4-05AB318FA424}" type="slidenum">
-              <a:rPr lang="en-US" smtClean="0"/>
-              <a:t>17</a:t>
-            </a:fld>
-            <a:endParaRPr lang="en-US"/>
-          </a:p>
-        </p:txBody>
-      </p:sp>
-    </p:spTree>
-    <p:extLst>
-      <p:ext uri="{BB962C8B-B14F-4D97-AF65-F5344CB8AC3E}">
-        <p14:creationId xmlns:p14="http://schemas.microsoft.com/office/powerpoint/2010/main" val="962690970"/>
-      </p:ext>
-    </p:extLst>
-  </p:cSld>
-  <p:clrMapOvr>
-    <a:masterClrMapping/>
-  </p:clrMapOvr>
-</p:sld>
-</file>
-
-<file path=ppt/slides/slide18.xml><?xml version="1.0" encoding="utf-8"?>
-<p:sld xmlns:a="http://schemas.openxmlformats.org/drawingml/2006/main" xmlns:r="http://schemas.openxmlformats.org/officeDocument/2006/relationships" xmlns:p="http://schemas.openxmlformats.org/presentationml/2006/main">
-  <p:cSld>
-    <p:spTree>
-      <p:nvGrpSpPr>
-        <p:cNvPr id="1" name=""/>
-        <p:cNvGrpSpPr/>
-        <p:nvPr/>
-      </p:nvGrpSpPr>
-      <p:grpSpPr>
-        <a:xfrm>
-          <a:off x="0" y="0"/>
-          <a:ext cx="0" cy="0"/>
-          <a:chOff x="0" y="0"/>
-          <a:chExt cx="0" cy="0"/>
-        </a:xfrm>
-      </p:grpSpPr>
-      <p:sp>
-        <p:nvSpPr>
-          <p:cNvPr id="2" name="Title 1"/>
-          <p:cNvSpPr>
-            <a:spLocks noGrp="1"/>
-          </p:cNvSpPr>
-          <p:nvPr>
-            <p:ph type="title"/>
-          </p:nvPr>
-        </p:nvSpPr>
-        <p:spPr/>
-        <p:txBody>
-          <a:bodyPr/>
-          <a:lstStyle/>
-          <a:p>
-            <a:r>
-              <a:rPr lang="en-US" dirty="0" smtClean="0"/>
-              <a:t>Resource Tracking</a:t>
-            </a:r>
-            <a:endParaRPr lang="en-US" dirty="0"/>
-          </a:p>
-        </p:txBody>
-      </p:sp>
-      <p:sp>
-        <p:nvSpPr>
-          <p:cNvPr id="3" name="Text Placeholder 2"/>
-          <p:cNvSpPr>
-            <a:spLocks noGrp="1"/>
-          </p:cNvSpPr>
-          <p:nvPr>
-            <p:ph type="body" idx="1"/>
-          </p:nvPr>
-        </p:nvSpPr>
-        <p:spPr/>
-        <p:txBody>
-          <a:bodyPr/>
-          <a:lstStyle/>
-          <a:p>
-            <a:pPr>
-              <a:lnSpc>
-                <a:spcPct val="100000"/>
-              </a:lnSpc>
-              <a:spcBef>
-                <a:spcPts val="0"/>
-              </a:spcBef>
-              <a:spcAft>
-                <a:spcPts val="0"/>
-              </a:spcAft>
-              <a:buClrTx/>
-              <a:buSzTx/>
-              <a:buFont typeface="Arial" charset="0"/>
-              <a:buChar char="•"/>
-            </a:pPr>
-            <a:r>
-              <a:rPr lang="en-US" dirty="0" smtClean="0"/>
-              <a:t>Managing scarce resources</a:t>
-            </a:r>
-          </a:p>
-          <a:p>
-            <a:pPr lvl="1">
-              <a:lnSpc>
-                <a:spcPct val="100000"/>
-              </a:lnSpc>
-              <a:spcBef>
-                <a:spcPts val="0"/>
-              </a:spcBef>
-              <a:spcAft>
-                <a:spcPts val="0"/>
-              </a:spcAft>
-              <a:buClrTx/>
-              <a:buFont typeface="Arial" charset="0"/>
-              <a:buChar char="•"/>
-            </a:pPr>
-            <a:r>
-              <a:rPr lang="en-US" dirty="0" smtClean="0"/>
-              <a:t>Memory</a:t>
-            </a:r>
-          </a:p>
-          <a:p>
-            <a:pPr lvl="1">
-              <a:lnSpc>
-                <a:spcPct val="100000"/>
-              </a:lnSpc>
-              <a:spcBef>
-                <a:spcPts val="0"/>
-              </a:spcBef>
-              <a:spcAft>
-                <a:spcPts val="0"/>
-              </a:spcAft>
-              <a:buClrTx/>
-              <a:buFont typeface="Arial" charset="0"/>
-              <a:buChar char="•"/>
-            </a:pPr>
-            <a:r>
-              <a:rPr lang="en-US" dirty="0" smtClean="0"/>
-              <a:t>CPU Time (Processing)</a:t>
-            </a:r>
-          </a:p>
-          <a:p>
-            <a:pPr lvl="1">
-              <a:lnSpc>
-                <a:spcPct val="100000"/>
-              </a:lnSpc>
-              <a:spcBef>
-                <a:spcPts val="0"/>
-              </a:spcBef>
-              <a:spcAft>
-                <a:spcPts val="0"/>
-              </a:spcAft>
-              <a:buClrTx/>
-              <a:buFont typeface="Arial" charset="0"/>
-              <a:buChar char="•"/>
-            </a:pPr>
-            <a:r>
-              <a:rPr lang="en-US" dirty="0" smtClean="0"/>
-              <a:t>Disk Space (Storage)</a:t>
-            </a:r>
-          </a:p>
-          <a:p>
-            <a:pPr lvl="1">
-              <a:lnSpc>
-                <a:spcPct val="100000"/>
-              </a:lnSpc>
-              <a:spcBef>
-                <a:spcPts val="0"/>
-              </a:spcBef>
-              <a:spcAft>
-                <a:spcPts val="0"/>
-              </a:spcAft>
-              <a:buClrTx/>
-              <a:buFont typeface="Arial" charset="0"/>
-              <a:buChar char="•"/>
-            </a:pPr>
-            <a:r>
-              <a:rPr lang="en-US" dirty="0" smtClean="0"/>
-              <a:t>Bandwidth (Communication)</a:t>
-            </a:r>
-            <a:endParaRPr lang="en-US" dirty="0"/>
-          </a:p>
-          <a:p>
-            <a:pPr>
-              <a:lnSpc>
-                <a:spcPct val="100000"/>
-              </a:lnSpc>
-              <a:spcBef>
-                <a:spcPts val="0"/>
-              </a:spcBef>
-              <a:spcAft>
-                <a:spcPts val="0"/>
-              </a:spcAft>
-              <a:buClrTx/>
-              <a:buSzTx/>
-              <a:buFont typeface="Arial" charset="0"/>
-              <a:buChar char="•"/>
-            </a:pPr>
-            <a:r>
-              <a:rPr lang="en-US" dirty="0" smtClean="0"/>
-              <a:t>Used to be a charge to your department</a:t>
-            </a:r>
-          </a:p>
-          <a:p>
-            <a:pPr>
-              <a:lnSpc>
-                <a:spcPct val="100000"/>
-              </a:lnSpc>
-              <a:spcBef>
-                <a:spcPts val="0"/>
-              </a:spcBef>
-              <a:spcAft>
-                <a:spcPts val="0"/>
-              </a:spcAft>
-              <a:buClrTx/>
-              <a:buSzTx/>
-              <a:buFont typeface="Arial" charset="0"/>
-              <a:buChar char="•"/>
-            </a:pPr>
-            <a:r>
-              <a:rPr lang="en-US" dirty="0" smtClean="0"/>
-              <a:t>Security implications?</a:t>
-            </a:r>
-          </a:p>
-          <a:p>
-            <a:pPr>
-              <a:lnSpc>
-                <a:spcPct val="100000"/>
-              </a:lnSpc>
-              <a:spcBef>
-                <a:spcPts val="0"/>
-              </a:spcBef>
-              <a:spcAft>
-                <a:spcPts val="0"/>
-              </a:spcAft>
-              <a:buClrTx/>
-              <a:buSzTx/>
-              <a:buFont typeface="Arial" charset="0"/>
-              <a:buChar char="•"/>
-            </a:pPr>
-            <a:endParaRPr lang="en-US" dirty="0"/>
-          </a:p>
-        </p:txBody>
-      </p:sp>
-    </p:spTree>
-    <p:extLst>
-      <p:ext uri="{BB962C8B-B14F-4D97-AF65-F5344CB8AC3E}">
-        <p14:creationId xmlns:p14="http://schemas.microsoft.com/office/powerpoint/2010/main" val="1577295793"/>
-      </p:ext>
-    </p:extLst>
-  </p:cSld>
-  <p:clrMapOvr>
-    <a:masterClrMapping/>
-  </p:clrMapOvr>
-  <p:transition spd="med"/>
-</p:sld>
-</file>
-
-<file path=ppt/slides/slide19.xml><?xml version="1.0" encoding="utf-8"?>
-<p:sld xmlns:a="http://schemas.openxmlformats.org/drawingml/2006/main" xmlns:r="http://schemas.openxmlformats.org/officeDocument/2006/relationships" xmlns:p="http://schemas.openxmlformats.org/presentationml/2006/main">
-  <p:cSld>
-    <p:spTree>
-      <p:nvGrpSpPr>
-        <p:cNvPr id="1" name=""/>
-        <p:cNvGrpSpPr/>
-        <p:nvPr/>
-      </p:nvGrpSpPr>
-      <p:grpSpPr>
-        <a:xfrm>
-          <a:off x="0" y="0"/>
-          <a:ext cx="0" cy="0"/>
-          <a:chOff x="0" y="0"/>
-          <a:chExt cx="0" cy="0"/>
-        </a:xfrm>
-      </p:grpSpPr>
-      <p:sp>
-        <p:nvSpPr>
-          <p:cNvPr id="2" name="Title 1"/>
-          <p:cNvSpPr>
-            <a:spLocks noGrp="1"/>
-          </p:cNvSpPr>
-          <p:nvPr>
-            <p:ph type="title"/>
-          </p:nvPr>
-        </p:nvSpPr>
-        <p:spPr/>
-        <p:txBody>
-          <a:bodyPr/>
-          <a:lstStyle/>
-          <a:p>
-            <a:r>
-              <a:rPr lang="en-US" dirty="0" smtClean="0"/>
-              <a:t>System Processes</a:t>
-            </a:r>
-            <a:endParaRPr lang="en-US" dirty="0"/>
-          </a:p>
-        </p:txBody>
-      </p:sp>
-      <p:sp>
-        <p:nvSpPr>
-          <p:cNvPr id="3" name="Text Placeholder 2"/>
-          <p:cNvSpPr>
-            <a:spLocks noGrp="1"/>
-          </p:cNvSpPr>
-          <p:nvPr>
-            <p:ph type="body" idx="1"/>
-          </p:nvPr>
-        </p:nvSpPr>
-        <p:spPr/>
-        <p:txBody>
-          <a:bodyPr/>
-          <a:lstStyle/>
-          <a:p>
-            <a:r>
-              <a:rPr lang="en-US" dirty="0" smtClean="0"/>
-              <a:t>An operating system is a collection of programs</a:t>
-            </a:r>
-          </a:p>
-          <a:p>
-            <a:r>
-              <a:rPr lang="en-US" dirty="0" smtClean="0"/>
-              <a:t>Bookkeeping</a:t>
-            </a:r>
-          </a:p>
-          <a:p>
-            <a:r>
-              <a:rPr lang="en-US" dirty="0" smtClean="0"/>
-              <a:t>Cleanup</a:t>
-            </a:r>
-          </a:p>
-          <a:p>
-            <a:r>
-              <a:rPr lang="en-US" dirty="0" smtClean="0"/>
-              <a:t>Resource Management</a:t>
-            </a:r>
-            <a:endParaRPr lang="en-US" dirty="0"/>
-          </a:p>
-        </p:txBody>
-      </p:sp>
-    </p:spTree>
-    <p:extLst>
-      <p:ext uri="{BB962C8B-B14F-4D97-AF65-F5344CB8AC3E}">
-        <p14:creationId xmlns:p14="http://schemas.microsoft.com/office/powerpoint/2010/main" val="927577276"/>
-      </p:ext>
-    </p:extLst>
-  </p:cSld>
-  <p:clrMapOvr>
-    <a:masterClrMapping/>
-  </p:clrMapOvr>
-  <p:transition spd="med"/>
-</p:sld>
-</file>
-
 <file path=ppt/slides/slide2.xml><?xml version="1.0" encoding="utf-8"?>
 <p:sld xmlns:a="http://schemas.openxmlformats.org/drawingml/2006/main" xmlns:r="http://schemas.openxmlformats.org/officeDocument/2006/relationships" xmlns:p="http://schemas.openxmlformats.org/presentationml/2006/main">
   <p:cSld>
@@ -6487,7 +7009,7 @@
           <a:p>
             <a:r>
               <a:rPr lang="en-US" dirty="0" smtClean="0"/>
-              <a:t>Kernel Services</a:t>
+              <a:t>The “Architecture” of an OS Kernel</a:t>
             </a:r>
             <a:endParaRPr lang="en-US" dirty="0"/>
           </a:p>
@@ -6510,52 +7032,41 @@
           <a:p>
             <a:r>
               <a:rPr lang="en-US" dirty="0" smtClean="0"/>
-              <a:t>System Processes</a:t>
-            </a:r>
-          </a:p>
-          <a:p>
-            <a:r>
-              <a:rPr lang="en-US" dirty="0" smtClean="0"/>
-              <a:t>System Call Interface</a:t>
-            </a:r>
-          </a:p>
-          <a:p>
-            <a:r>
-              <a:rPr lang="en-US" dirty="0" smtClean="0"/>
-              <a:t>Traps and Interrupts</a:t>
-            </a:r>
-          </a:p>
-          <a:p>
-            <a:r>
-              <a:rPr lang="en-US" dirty="0" smtClean="0"/>
-              <a:t>Memory Management</a:t>
-            </a:r>
-          </a:p>
-          <a:p>
-            <a:r>
-              <a:rPr lang="en-US" dirty="0" smtClean="0"/>
-              <a:t>Timing Services</a:t>
-            </a:r>
-          </a:p>
-          <a:p>
-            <a:r>
-              <a:rPr lang="en-US" dirty="0" smtClean="0"/>
-              <a:t>Resource Usage and Limits</a:t>
-            </a:r>
-          </a:p>
-          <a:p>
-            <a:r>
-              <a:rPr lang="en-US" dirty="0" smtClean="0"/>
-              <a:t>Tracing</a:t>
-            </a:r>
-          </a:p>
-          <a:p>
-            <a:pPr lvl="1"/>
-            <a:r>
-              <a:rPr lang="en-US" dirty="0" smtClean="0"/>
-              <a:t>Which we’ll discuss at length in the next section</a:t>
-            </a:r>
-            <a:endParaRPr lang="en-US" dirty="0" smtClean="0"/>
+              <a:t>What makes a building beautiful?</a:t>
+            </a:r>
+          </a:p>
+          <a:p>
+            <a:r>
+              <a:rPr lang="en-US" dirty="0" smtClean="0"/>
+              <a:t>What makes a building useful?</a:t>
+            </a:r>
+          </a:p>
+          <a:p>
+            <a:r>
+              <a:rPr lang="en-US" dirty="0" smtClean="0"/>
+              <a:t>Can a building be both?</a:t>
+            </a:r>
+          </a:p>
+          <a:p>
+            <a:r>
+              <a:rPr lang="en-US" dirty="0" smtClean="0"/>
+              <a:t>What makes software useful?</a:t>
+            </a:r>
+          </a:p>
+          <a:p>
+            <a:r>
+              <a:rPr lang="en-US" dirty="0" smtClean="0"/>
+              <a:t>Can software be beautiful?</a:t>
+            </a:r>
+          </a:p>
+          <a:p>
+            <a:r>
+              <a:rPr lang="en-US" dirty="0" smtClean="0"/>
+              <a:t>Can software be both beautiful and useful?</a:t>
+            </a:r>
+          </a:p>
+          <a:p>
+            <a:endParaRPr lang="en-US" dirty="0"/>
           </a:p>
         </p:txBody>
       </p:sp>
@@ -6574,7 +7085,7 @@
           <a:bodyPr/>
           <a:lstStyle/>
           <a:p>
-            <a:fld id="{F2F85883-78DF-6843-8ADC-5371C1884CF2}" type="datetime1">
+            <a:fld id="{49017221-95F1-A547-955D-7B046F2E09F0}" type="datetime1">
               <a:rPr lang="en-US" smtClean="0"/>
               <a:t>2/14/17</a:t>
             </a:fld>
@@ -6631,7 +7142,7 @@
     </p:spTree>
     <p:extLst>
       <p:ext uri="{BB962C8B-B14F-4D97-AF65-F5344CB8AC3E}">
-        <p14:creationId xmlns:p14="http://schemas.microsoft.com/office/powerpoint/2010/main" val="1296378508"/>
+        <p14:creationId xmlns:p14="http://schemas.microsoft.com/office/powerpoint/2010/main" val="1363394884"/>
       </p:ext>
     </p:extLst>
   </p:cSld>
@@ -6642,6 +7153,258 @@
 </file>
 
 <file path=ppt/slides/slide20.xml><?xml version="1.0" encoding="utf-8"?>
+<p:sld xmlns:a="http://schemas.openxmlformats.org/drawingml/2006/main" xmlns:r="http://schemas.openxmlformats.org/officeDocument/2006/relationships" xmlns:p="http://schemas.openxmlformats.org/presentationml/2006/main">
+  <p:cSld>
+    <p:spTree>
+      <p:nvGrpSpPr>
+        <p:cNvPr id="1" name=""/>
+        <p:cNvGrpSpPr/>
+        <p:nvPr/>
+      </p:nvGrpSpPr>
+      <p:grpSpPr>
+        <a:xfrm>
+          <a:off x="0" y="0"/>
+          <a:ext cx="0" cy="0"/>
+          <a:chOff x="0" y="0"/>
+          <a:chExt cx="0" cy="0"/>
+        </a:xfrm>
+      </p:grpSpPr>
+      <p:sp>
+        <p:nvSpPr>
+          <p:cNvPr id="10" name="Title 9"/>
+          <p:cNvSpPr>
+            <a:spLocks noGrp="1"/>
+          </p:cNvSpPr>
+          <p:nvPr>
+            <p:ph type="title"/>
+          </p:nvPr>
+        </p:nvSpPr>
+        <p:spPr/>
+        <p:txBody>
+          <a:bodyPr/>
+          <a:lstStyle/>
+          <a:p>
+            <a:r>
+              <a:rPr lang="en-US" dirty="0" smtClean="0"/>
+              <a:t>Why do we set the time?</a:t>
+            </a:r>
+            <a:endParaRPr lang="en-US" dirty="0"/>
+          </a:p>
+        </p:txBody>
+      </p:sp>
+      <p:sp>
+        <p:nvSpPr>
+          <p:cNvPr id="11" name="Content Placeholder 10"/>
+          <p:cNvSpPr>
+            <a:spLocks noGrp="1"/>
+          </p:cNvSpPr>
+          <p:nvPr>
+            <p:ph idx="1"/>
+          </p:nvPr>
+        </p:nvSpPr>
+        <p:spPr/>
+        <p:txBody>
+          <a:bodyPr/>
+          <a:lstStyle/>
+          <a:p>
+            <a:r>
+              <a:rPr lang="en-US" dirty="0" smtClean="0"/>
+              <a:t>Who can set the time?</a:t>
+            </a:r>
+          </a:p>
+          <a:p>
+            <a:r>
+              <a:rPr lang="en-US" dirty="0" smtClean="0"/>
+              <a:t>Why?</a:t>
+            </a:r>
+          </a:p>
+          <a:p>
+            <a:r>
+              <a:rPr lang="en-US" dirty="0" smtClean="0"/>
+              <a:t>How?</a:t>
+            </a:r>
+            <a:endParaRPr lang="en-US" dirty="0"/>
+          </a:p>
+        </p:txBody>
+      </p:sp>
+      <p:sp>
+        <p:nvSpPr>
+          <p:cNvPr id="7" name="Date Placeholder 6"/>
+          <p:cNvSpPr>
+            <a:spLocks noGrp="1"/>
+          </p:cNvSpPr>
+          <p:nvPr>
+            <p:ph type="dt" sz="half" idx="10"/>
+          </p:nvPr>
+        </p:nvSpPr>
+        <p:spPr/>
+        <p:txBody>
+          <a:bodyPr/>
+          <a:lstStyle/>
+          <a:p>
+            <a:fld id="{B1259037-4653-634A-8C7E-33C2E296917B}" type="datetime1">
+              <a:rPr lang="en-US" smtClean="0"/>
+              <a:t>2/14/17</a:t>
+            </a:fld>
+            <a:endParaRPr lang="en-US"/>
+          </a:p>
+        </p:txBody>
+      </p:sp>
+      <p:sp>
+        <p:nvSpPr>
+          <p:cNvPr id="8" name="Footer Placeholder 7"/>
+          <p:cNvSpPr>
+            <a:spLocks noGrp="1"/>
+          </p:cNvSpPr>
+          <p:nvPr>
+            <p:ph type="ftr" sz="quarter" idx="11"/>
+          </p:nvPr>
+        </p:nvSpPr>
+        <p:spPr/>
+        <p:txBody>
+          <a:bodyPr/>
+          <a:lstStyle/>
+          <a:p>
+            <a:r>
+              <a:rPr lang="en-US" smtClean="0"/>
+              <a:t>Introduction to Operating Systems</a:t>
+            </a:r>
+            <a:endParaRPr lang="en-US"/>
+          </a:p>
+        </p:txBody>
+      </p:sp>
+      <p:sp>
+        <p:nvSpPr>
+          <p:cNvPr id="9" name="Slide Number Placeholder 8"/>
+          <p:cNvSpPr>
+            <a:spLocks noGrp="1"/>
+          </p:cNvSpPr>
+          <p:nvPr>
+            <p:ph type="sldNum" sz="quarter" idx="12"/>
+          </p:nvPr>
+        </p:nvSpPr>
+        <p:spPr/>
+        <p:txBody>
+          <a:bodyPr/>
+          <a:lstStyle/>
+          <a:p>
+            <a:fld id="{699C44C4-0FAD-8046-A5C4-05AB318FA424}" type="slidenum">
+              <a:rPr lang="en-US" smtClean="0"/>
+              <a:t>20</a:t>
+            </a:fld>
+            <a:endParaRPr lang="en-US"/>
+          </a:p>
+        </p:txBody>
+      </p:sp>
+    </p:spTree>
+    <p:extLst>
+      <p:ext uri="{BB962C8B-B14F-4D97-AF65-F5344CB8AC3E}">
+        <p14:creationId xmlns:p14="http://schemas.microsoft.com/office/powerpoint/2010/main" val="962690970"/>
+      </p:ext>
+    </p:extLst>
+  </p:cSld>
+  <p:clrMapOvr>
+    <a:masterClrMapping/>
+  </p:clrMapOvr>
+</p:sld>
+</file>
+
+<file path=ppt/slides/slide21.xml><?xml version="1.0" encoding="utf-8"?>
+<p:sld xmlns:a="http://schemas.openxmlformats.org/drawingml/2006/main" xmlns:r="http://schemas.openxmlformats.org/officeDocument/2006/relationships" xmlns:p="http://schemas.openxmlformats.org/presentationml/2006/main">
+  <p:cSld>
+    <p:spTree>
+      <p:nvGrpSpPr>
+        <p:cNvPr id="1" name=""/>
+        <p:cNvGrpSpPr/>
+        <p:nvPr/>
+      </p:nvGrpSpPr>
+      <p:grpSpPr>
+        <a:xfrm>
+          <a:off x="0" y="0"/>
+          <a:ext cx="0" cy="0"/>
+          <a:chOff x="0" y="0"/>
+          <a:chExt cx="0" cy="0"/>
+        </a:xfrm>
+      </p:grpSpPr>
+      <p:sp>
+        <p:nvSpPr>
+          <p:cNvPr id="2" name="Title 1"/>
+          <p:cNvSpPr>
+            <a:spLocks noGrp="1"/>
+          </p:cNvSpPr>
+          <p:nvPr>
+            <p:ph type="title"/>
+          </p:nvPr>
+        </p:nvSpPr>
+        <p:spPr/>
+        <p:txBody>
+          <a:bodyPr/>
+          <a:lstStyle/>
+          <a:p>
+            <a:r>
+              <a:rPr lang="en-US" dirty="0" smtClean="0"/>
+              <a:t>System Processes</a:t>
+            </a:r>
+            <a:endParaRPr lang="en-US" dirty="0"/>
+          </a:p>
+        </p:txBody>
+      </p:sp>
+      <p:sp>
+        <p:nvSpPr>
+          <p:cNvPr id="3" name="Text Placeholder 2"/>
+          <p:cNvSpPr>
+            <a:spLocks noGrp="1"/>
+          </p:cNvSpPr>
+          <p:nvPr>
+            <p:ph type="body" idx="1"/>
+          </p:nvPr>
+        </p:nvSpPr>
+        <p:spPr/>
+        <p:txBody>
+          <a:bodyPr/>
+          <a:lstStyle/>
+          <a:p>
+            <a:r>
+              <a:rPr lang="en-US" dirty="0" smtClean="0"/>
+              <a:t>An operating system is a collection of programs</a:t>
+            </a:r>
+          </a:p>
+          <a:p>
+            <a:r>
+              <a:rPr lang="en-US" dirty="0" smtClean="0"/>
+              <a:t>Bookkeeping</a:t>
+            </a:r>
+          </a:p>
+          <a:p>
+            <a:r>
+              <a:rPr lang="en-US" dirty="0" smtClean="0"/>
+              <a:t>Cleanup</a:t>
+            </a:r>
+          </a:p>
+          <a:p>
+            <a:r>
+              <a:rPr lang="en-US" dirty="0" smtClean="0"/>
+              <a:t>Resource Management</a:t>
+            </a:r>
+            <a:endParaRPr lang="en-US" dirty="0"/>
+          </a:p>
+        </p:txBody>
+      </p:sp>
+    </p:spTree>
+    <p:extLst>
+      <p:ext uri="{BB962C8B-B14F-4D97-AF65-F5344CB8AC3E}">
+        <p14:creationId xmlns:p14="http://schemas.microsoft.com/office/powerpoint/2010/main" val="927577276"/>
+      </p:ext>
+    </p:extLst>
+  </p:cSld>
+  <p:clrMapOvr>
+    <a:masterClrMapping/>
+  </p:clrMapOvr>
+  <p:transition spd="med"/>
+</p:sld>
+</file>
+
+<file path=ppt/slides/slide22.xml><?xml version="1.0" encoding="utf-8"?>
 <p:sld xmlns:a="http://schemas.openxmlformats.org/drawingml/2006/main" xmlns:r="http://schemas.openxmlformats.org/officeDocument/2006/relationships" xmlns:p="http://schemas.openxmlformats.org/presentationml/2006/main">
   <p:cSld>
     <p:spTree>
@@ -7050,7 +7813,7 @@
 </p:sld>
 </file>
 
-<file path=ppt/slides/slide21.xml><?xml version="1.0" encoding="utf-8"?>
+<file path=ppt/slides/slide23.xml><?xml version="1.0" encoding="utf-8"?>
 <p:sld xmlns:a="http://schemas.openxmlformats.org/drawingml/2006/main" xmlns:r="http://schemas.openxmlformats.org/officeDocument/2006/relationships" xmlns:p="http://schemas.openxmlformats.org/presentationml/2006/main">
   <p:cSld>
     <p:spTree>
@@ -7119,7 +7882,239 @@
 </p:sld>
 </file>
 
-<file path=ppt/slides/slide22.xml><?xml version="1.0" encoding="utf-8"?>
+<file path=ppt/slides/slide24.xml><?xml version="1.0" encoding="utf-8"?>
+<p:sld xmlns:a="http://schemas.openxmlformats.org/drawingml/2006/main" xmlns:r="http://schemas.openxmlformats.org/officeDocument/2006/relationships" xmlns:p="http://schemas.openxmlformats.org/presentationml/2006/main">
+  <p:cSld>
+    <p:spTree>
+      <p:nvGrpSpPr>
+        <p:cNvPr id="1" name=""/>
+        <p:cNvGrpSpPr/>
+        <p:nvPr/>
+      </p:nvGrpSpPr>
+      <p:grpSpPr>
+        <a:xfrm>
+          <a:off x="0" y="0"/>
+          <a:ext cx="0" cy="0"/>
+          <a:chOff x="0" y="0"/>
+          <a:chExt cx="0" cy="0"/>
+        </a:xfrm>
+      </p:grpSpPr>
+      <p:sp>
+        <p:nvSpPr>
+          <p:cNvPr id="2" name="Title 1"/>
+          <p:cNvSpPr>
+            <a:spLocks noGrp="1"/>
+          </p:cNvSpPr>
+          <p:nvPr>
+            <p:ph type="title"/>
+          </p:nvPr>
+        </p:nvSpPr>
+        <p:spPr/>
+        <p:txBody>
+          <a:bodyPr/>
+          <a:lstStyle/>
+          <a:p>
+            <a:r>
+              <a:rPr lang="en-US" dirty="0" smtClean="0"/>
+              <a:t>Resource Tracking</a:t>
+            </a:r>
+            <a:endParaRPr lang="en-US" dirty="0"/>
+          </a:p>
+        </p:txBody>
+      </p:sp>
+      <p:sp>
+        <p:nvSpPr>
+          <p:cNvPr id="3" name="Text Placeholder 2"/>
+          <p:cNvSpPr>
+            <a:spLocks noGrp="1"/>
+          </p:cNvSpPr>
+          <p:nvPr>
+            <p:ph type="body" idx="1"/>
+          </p:nvPr>
+        </p:nvSpPr>
+        <p:spPr/>
+        <p:txBody>
+          <a:bodyPr/>
+          <a:lstStyle/>
+          <a:p>
+            <a:pPr>
+              <a:lnSpc>
+                <a:spcPct val="100000"/>
+              </a:lnSpc>
+              <a:spcBef>
+                <a:spcPts val="0"/>
+              </a:spcBef>
+              <a:spcAft>
+                <a:spcPts val="0"/>
+              </a:spcAft>
+              <a:buClrTx/>
+              <a:buSzTx/>
+              <a:buFont typeface="Arial" charset="0"/>
+              <a:buChar char="•"/>
+            </a:pPr>
+            <a:r>
+              <a:rPr lang="en-US" dirty="0" smtClean="0"/>
+              <a:t>Managing scarce resources</a:t>
+            </a:r>
+          </a:p>
+          <a:p>
+            <a:pPr lvl="1">
+              <a:lnSpc>
+                <a:spcPct val="100000"/>
+              </a:lnSpc>
+              <a:spcBef>
+                <a:spcPts val="0"/>
+              </a:spcBef>
+              <a:spcAft>
+                <a:spcPts val="0"/>
+              </a:spcAft>
+              <a:buClrTx/>
+              <a:buFont typeface="Arial" charset="0"/>
+              <a:buChar char="•"/>
+            </a:pPr>
+            <a:r>
+              <a:rPr lang="en-US" dirty="0" smtClean="0"/>
+              <a:t>Memory</a:t>
+            </a:r>
+          </a:p>
+          <a:p>
+            <a:pPr lvl="1">
+              <a:lnSpc>
+                <a:spcPct val="100000"/>
+              </a:lnSpc>
+              <a:spcBef>
+                <a:spcPts val="0"/>
+              </a:spcBef>
+              <a:spcAft>
+                <a:spcPts val="0"/>
+              </a:spcAft>
+              <a:buClrTx/>
+              <a:buFont typeface="Arial" charset="0"/>
+              <a:buChar char="•"/>
+            </a:pPr>
+            <a:r>
+              <a:rPr lang="en-US" dirty="0" smtClean="0"/>
+              <a:t>CPU Time (Processing)</a:t>
+            </a:r>
+          </a:p>
+          <a:p>
+            <a:pPr lvl="1">
+              <a:lnSpc>
+                <a:spcPct val="100000"/>
+              </a:lnSpc>
+              <a:spcBef>
+                <a:spcPts val="0"/>
+              </a:spcBef>
+              <a:spcAft>
+                <a:spcPts val="0"/>
+              </a:spcAft>
+              <a:buClrTx/>
+              <a:buFont typeface="Arial" charset="0"/>
+              <a:buChar char="•"/>
+            </a:pPr>
+            <a:r>
+              <a:rPr lang="en-US" dirty="0" smtClean="0"/>
+              <a:t>Disk Space (Storage)</a:t>
+            </a:r>
+          </a:p>
+          <a:p>
+            <a:pPr lvl="1">
+              <a:lnSpc>
+                <a:spcPct val="100000"/>
+              </a:lnSpc>
+              <a:spcBef>
+                <a:spcPts val="0"/>
+              </a:spcBef>
+              <a:spcAft>
+                <a:spcPts val="0"/>
+              </a:spcAft>
+              <a:buClrTx/>
+              <a:buFont typeface="Arial" charset="0"/>
+              <a:buChar char="•"/>
+            </a:pPr>
+            <a:r>
+              <a:rPr lang="en-US" dirty="0" smtClean="0"/>
+              <a:t>Bandwidth (Communication)</a:t>
+            </a:r>
+            <a:endParaRPr lang="en-US" dirty="0"/>
+          </a:p>
+          <a:p>
+            <a:pPr>
+              <a:lnSpc>
+                <a:spcPct val="100000"/>
+              </a:lnSpc>
+              <a:spcBef>
+                <a:spcPts val="0"/>
+              </a:spcBef>
+              <a:spcAft>
+                <a:spcPts val="0"/>
+              </a:spcAft>
+              <a:buClrTx/>
+              <a:buSzTx/>
+              <a:buFont typeface="Arial" charset="0"/>
+              <a:buChar char="•"/>
+            </a:pPr>
+            <a:r>
+              <a:rPr lang="en-US" dirty="0" smtClean="0"/>
+              <a:t>Used to be a charge to your department</a:t>
+            </a:r>
+          </a:p>
+          <a:p>
+            <a:pPr>
+              <a:lnSpc>
+                <a:spcPct val="100000"/>
+              </a:lnSpc>
+              <a:spcBef>
+                <a:spcPts val="0"/>
+              </a:spcBef>
+              <a:spcAft>
+                <a:spcPts val="0"/>
+              </a:spcAft>
+              <a:buClrTx/>
+              <a:buSzTx/>
+              <a:buFont typeface="Arial" charset="0"/>
+              <a:buChar char="•"/>
+            </a:pPr>
+            <a:r>
+              <a:rPr lang="en-US" dirty="0" smtClean="0"/>
+              <a:t>Security implications?</a:t>
+            </a:r>
+          </a:p>
+          <a:p>
+            <a:pPr>
+              <a:lnSpc>
+                <a:spcPct val="100000"/>
+              </a:lnSpc>
+              <a:spcBef>
+                <a:spcPts val="0"/>
+              </a:spcBef>
+              <a:spcAft>
+                <a:spcPts val="0"/>
+              </a:spcAft>
+              <a:buClrTx/>
+              <a:buSzTx/>
+              <a:buFont typeface="Arial" charset="0"/>
+              <a:buChar char="•"/>
+            </a:pPr>
+            <a:endParaRPr lang="en-US" dirty="0"/>
+          </a:p>
+        </p:txBody>
+      </p:sp>
+    </p:spTree>
+    <p:extLst>
+      <p:ext uri="{BB962C8B-B14F-4D97-AF65-F5344CB8AC3E}">
+        <p14:creationId xmlns:p14="http://schemas.microsoft.com/office/powerpoint/2010/main" val="1577295793"/>
+      </p:ext>
+    </p:extLst>
+  </p:cSld>
+  <p:clrMapOvr>
+    <a:masterClrMapping/>
+  </p:clrMapOvr>
+  <p:transition spd="med"/>
+</p:sld>
+</file>
+
+<file path=ppt/slides/slide25.xml><?xml version="1.0" encoding="utf-8"?>
 <p:sld xmlns:a="http://schemas.openxmlformats.org/drawingml/2006/main" xmlns:r="http://schemas.openxmlformats.org/officeDocument/2006/relationships" xmlns:p="http://schemas.openxmlformats.org/presentationml/2006/main">
   <p:cSld>
     <p:spTree>
@@ -7307,7 +8302,7 @@
 </p:sld>
 </file>
 
-<file path=ppt/slides/slide23.xml><?xml version="1.0" encoding="utf-8"?>
+<file path=ppt/slides/slide26.xml><?xml version="1.0" encoding="utf-8"?>
 <p:sld xmlns:a="http://schemas.openxmlformats.org/drawingml/2006/main" xmlns:r="http://schemas.openxmlformats.org/officeDocument/2006/relationships" xmlns:p="http://schemas.openxmlformats.org/presentationml/2006/main">
   <p:cSld>
     <p:spTree>
@@ -7410,7 +8405,7 @@
           <a:p>
             <a:fld id="{699C44C4-0FAD-8046-A5C4-05AB318FA424}" type="slidenum">
               <a:rPr lang="en-US" smtClean="0"/>
-              <a:t>23</a:t>
+              <a:t>26</a:t>
             </a:fld>
             <a:endParaRPr lang="en-US" dirty="0"/>
           </a:p>
@@ -7429,7 +8424,7 @@
 </p:sld>
 </file>
 
-<file path=ppt/slides/slide24.xml><?xml version="1.0" encoding="utf-8"?>
+<file path=ppt/slides/slide27.xml><?xml version="1.0" encoding="utf-8"?>
 <p:sld xmlns:a="http://schemas.openxmlformats.org/drawingml/2006/main" xmlns:r="http://schemas.openxmlformats.org/officeDocument/2006/relationships" xmlns:p="http://schemas.openxmlformats.org/presentationml/2006/main">
   <p:cSld>
     <p:spTree>
@@ -7528,7 +8523,7 @@
           <a:p>
             <a:fld id="{699C44C4-0FAD-8046-A5C4-05AB318FA424}" type="slidenum">
               <a:rPr lang="en-US" smtClean="0"/>
-              <a:t>24</a:t>
+              <a:t>27</a:t>
             </a:fld>
             <a:endParaRPr lang="en-US"/>
           </a:p>
@@ -7581,7 +8576,7 @@
           <a:p>
             <a:r>
               <a:rPr lang="en-US" dirty="0" smtClean="0"/>
-              <a:t>System Calls</a:t>
+              <a:t>The Well Crafted Operating System</a:t>
             </a:r>
             <a:endParaRPr lang="en-US" dirty="0"/>
           </a:p>
@@ -7602,27 +8597,285 @@
           <a:bodyPr/>
           <a:lstStyle/>
           <a:p>
-            <a:r>
-              <a:rPr lang="en-US" dirty="0" smtClean="0"/>
-              <a:t>The Operating System’s API</a:t>
-            </a:r>
-          </a:p>
-          <a:p>
-            <a:r>
-              <a:rPr lang="en-US" dirty="0" smtClean="0"/>
-              <a:t>Partially defined by POSIX</a:t>
-            </a:r>
-          </a:p>
-          <a:p>
-            <a:r>
-              <a:rPr lang="en-US" dirty="0" smtClean="0"/>
-              <a:t>Requests for service</a:t>
-            </a:r>
-          </a:p>
-          <a:p>
-            <a:r>
-              <a:rPr lang="en-US" dirty="0" smtClean="0"/>
-              <a:t>Mostly synchronous</a:t>
+            <a:pPr marL="0" marR="0" lvl="0" indent="0" defTabSz="914400" eaLnBrk="1" fontAlgn="auto" latinLnBrk="0" hangingPunct="1">
+              <a:lnSpc>
+                <a:spcPct val="100000"/>
+              </a:lnSpc>
+              <a:spcBef>
+                <a:spcPts val="0"/>
+              </a:spcBef>
+              <a:spcAft>
+                <a:spcPts val="0"/>
+              </a:spcAft>
+              <a:buClrTx/>
+              <a:buSzTx/>
+              <a:buFontTx/>
+              <a:buNone/>
+              <a:tabLst/>
+              <a:defRPr/>
+            </a:pPr>
+            <a:r>
+              <a:rPr lang="en-US" dirty="0" err="1" smtClean="0"/>
+              <a:t>Composable</a:t>
+            </a:r>
+            <a:endParaRPr lang="en-US" dirty="0" smtClean="0"/>
+          </a:p>
+          <a:p>
+            <a:pPr marL="0" marR="0" lvl="0" indent="0" defTabSz="914400" eaLnBrk="1" fontAlgn="auto" latinLnBrk="0" hangingPunct="1">
+              <a:lnSpc>
+                <a:spcPct val="100000"/>
+              </a:lnSpc>
+              <a:spcBef>
+                <a:spcPts val="0"/>
+              </a:spcBef>
+              <a:spcAft>
+                <a:spcPts val="0"/>
+              </a:spcAft>
+              <a:buClrTx/>
+              <a:buSzTx/>
+              <a:buFontTx/>
+              <a:buNone/>
+              <a:tabLst/>
+              <a:defRPr/>
+            </a:pPr>
+            <a:r>
+              <a:rPr lang="en-US" dirty="0"/>
+              <a:t>	</a:t>
+            </a:r>
+            <a:r>
+              <a:rPr lang="en-US" dirty="0" smtClean="0"/>
+              <a:t>Regular APIs that form a logical whole</a:t>
+            </a:r>
+          </a:p>
+          <a:p>
+            <a:pPr marL="0" marR="0" lvl="0" indent="0" defTabSz="914400" eaLnBrk="1" fontAlgn="auto" latinLnBrk="0" hangingPunct="1">
+              <a:lnSpc>
+                <a:spcPct val="100000"/>
+              </a:lnSpc>
+              <a:spcBef>
+                <a:spcPts val="0"/>
+              </a:spcBef>
+              <a:spcAft>
+                <a:spcPts val="0"/>
+              </a:spcAft>
+              <a:buClrTx/>
+              <a:buSzTx/>
+              <a:buFontTx/>
+              <a:buNone/>
+              <a:tabLst/>
+              <a:defRPr/>
+            </a:pPr>
+            <a:r>
+              <a:rPr lang="en-US" dirty="0"/>
+              <a:t>	</a:t>
+            </a:r>
+            <a:r>
+              <a:rPr lang="en-US" dirty="0" smtClean="0"/>
+              <a:t>Structures for data</a:t>
+            </a:r>
+          </a:p>
+          <a:p>
+            <a:pPr marL="0" marR="0" lvl="0" indent="0" defTabSz="914400" eaLnBrk="1" fontAlgn="auto" latinLnBrk="0" hangingPunct="1">
+              <a:lnSpc>
+                <a:spcPct val="100000"/>
+              </a:lnSpc>
+              <a:spcBef>
+                <a:spcPts val="0"/>
+              </a:spcBef>
+              <a:spcAft>
+                <a:spcPts val="0"/>
+              </a:spcAft>
+              <a:buClrTx/>
+              <a:buSzTx/>
+              <a:buFontTx/>
+              <a:buNone/>
+              <a:tabLst/>
+              <a:defRPr/>
+            </a:pPr>
+            <a:r>
+              <a:rPr lang="en-US" dirty="0"/>
+              <a:t>	</a:t>
+            </a:r>
+            <a:r>
+              <a:rPr lang="en-US" dirty="0" smtClean="0"/>
+              <a:t>Structures for functions</a:t>
+            </a:r>
+          </a:p>
+          <a:p>
+            <a:pPr marL="0" marR="0" lvl="0" indent="0" defTabSz="914400" eaLnBrk="1" fontAlgn="auto" latinLnBrk="0" hangingPunct="1">
+              <a:lnSpc>
+                <a:spcPct val="100000"/>
+              </a:lnSpc>
+              <a:spcBef>
+                <a:spcPts val="0"/>
+              </a:spcBef>
+              <a:spcAft>
+                <a:spcPts val="0"/>
+              </a:spcAft>
+              <a:buClrTx/>
+              <a:buSzTx/>
+              <a:buFontTx/>
+              <a:buNone/>
+              <a:tabLst/>
+              <a:defRPr/>
+            </a:pPr>
+            <a:r>
+              <a:rPr lang="en-US" dirty="0" smtClean="0"/>
+              <a:t>Tractable</a:t>
+            </a:r>
+          </a:p>
+          <a:p>
+            <a:pPr marL="0" marR="0" lvl="0" indent="0" defTabSz="914400" eaLnBrk="1" fontAlgn="auto" latinLnBrk="0" hangingPunct="1">
+              <a:lnSpc>
+                <a:spcPct val="100000"/>
+              </a:lnSpc>
+              <a:spcBef>
+                <a:spcPts val="0"/>
+              </a:spcBef>
+              <a:spcAft>
+                <a:spcPts val="0"/>
+              </a:spcAft>
+              <a:buClrTx/>
+              <a:buSzTx/>
+              <a:buFontTx/>
+              <a:buNone/>
+              <a:tabLst/>
+              <a:defRPr/>
+            </a:pPr>
+            <a:r>
+              <a:rPr lang="en-US" dirty="0" smtClean="0"/>
+              <a:t>	Functions that are not overly long</a:t>
+            </a:r>
+          </a:p>
+          <a:p>
+            <a:pPr marL="0" marR="0" lvl="0" indent="0" defTabSz="914400" eaLnBrk="1" fontAlgn="auto" latinLnBrk="0" hangingPunct="1">
+              <a:lnSpc>
+                <a:spcPct val="100000"/>
+              </a:lnSpc>
+              <a:spcBef>
+                <a:spcPts val="0"/>
+              </a:spcBef>
+              <a:spcAft>
+                <a:spcPts val="0"/>
+              </a:spcAft>
+              <a:buClrTx/>
+              <a:buSzTx/>
+              <a:buFontTx/>
+              <a:buNone/>
+              <a:tabLst/>
+              <a:defRPr/>
+            </a:pPr>
+            <a:r>
+              <a:rPr lang="en-US" dirty="0"/>
+              <a:t>	</a:t>
+            </a:r>
+            <a:r>
+              <a:rPr lang="en-US" dirty="0" smtClean="0"/>
+              <a:t>Structures that do not contain too much</a:t>
+            </a:r>
+          </a:p>
+          <a:p>
+            <a:pPr marL="0" marR="0" lvl="0" indent="0" defTabSz="914400" eaLnBrk="1" fontAlgn="auto" latinLnBrk="0" hangingPunct="1">
+              <a:lnSpc>
+                <a:spcPct val="100000"/>
+              </a:lnSpc>
+              <a:spcBef>
+                <a:spcPts val="0"/>
+              </a:spcBef>
+              <a:spcAft>
+                <a:spcPts val="0"/>
+              </a:spcAft>
+              <a:buClrTx/>
+              <a:buSzTx/>
+              <a:buFontTx/>
+              <a:buNone/>
+              <a:tabLst/>
+              <a:defRPr/>
+            </a:pPr>
+            <a:r>
+              <a:rPr lang="en-US" dirty="0"/>
+              <a:t>	</a:t>
+            </a:r>
+            <a:r>
+              <a:rPr lang="en-US" dirty="0" smtClean="0"/>
+              <a:t>Structures that do not proliferate too far</a:t>
+            </a:r>
+          </a:p>
+          <a:p>
+            <a:pPr marL="0" marR="0" lvl="0" indent="0" defTabSz="914400" eaLnBrk="1" fontAlgn="auto" latinLnBrk="0" hangingPunct="1">
+              <a:lnSpc>
+                <a:spcPct val="100000"/>
+              </a:lnSpc>
+              <a:spcBef>
+                <a:spcPts val="0"/>
+              </a:spcBef>
+              <a:spcAft>
+                <a:spcPts val="0"/>
+              </a:spcAft>
+              <a:buClrTx/>
+              <a:buSzTx/>
+              <a:buFontTx/>
+              <a:buNone/>
+              <a:tabLst/>
+              <a:defRPr/>
+            </a:pPr>
+            <a:r>
+              <a:rPr lang="en-US" dirty="0" smtClean="0"/>
+              <a:t>Extensible</a:t>
+            </a:r>
+          </a:p>
+          <a:p>
+            <a:pPr marL="0" marR="0" lvl="0" indent="0" defTabSz="914400" eaLnBrk="1" fontAlgn="auto" latinLnBrk="0" hangingPunct="1">
+              <a:lnSpc>
+                <a:spcPct val="100000"/>
+              </a:lnSpc>
+              <a:spcBef>
+                <a:spcPts val="0"/>
+              </a:spcBef>
+              <a:spcAft>
+                <a:spcPts val="0"/>
+              </a:spcAft>
+              <a:buClrTx/>
+              <a:buSzTx/>
+              <a:buFontTx/>
+              <a:buNone/>
+              <a:tabLst/>
+              <a:defRPr/>
+            </a:pPr>
+            <a:r>
+              <a:rPr lang="en-US" dirty="0"/>
+              <a:t>	</a:t>
+            </a:r>
+            <a:r>
+              <a:rPr lang="en-US" dirty="0" smtClean="0"/>
+              <a:t>Structures can change without undue surprise (POLA)</a:t>
+            </a:r>
+          </a:p>
+          <a:p>
+            <a:pPr marL="0" marR="0" lvl="0" indent="0" defTabSz="914400" eaLnBrk="1" fontAlgn="auto" latinLnBrk="0" hangingPunct="1">
+              <a:lnSpc>
+                <a:spcPct val="100000"/>
+              </a:lnSpc>
+              <a:spcBef>
+                <a:spcPts val="0"/>
+              </a:spcBef>
+              <a:spcAft>
+                <a:spcPts val="0"/>
+              </a:spcAft>
+              <a:buClrTx/>
+              <a:buSzTx/>
+              <a:buFontTx/>
+              <a:buNone/>
+              <a:tabLst/>
+              <a:defRPr/>
+            </a:pPr>
+            <a:r>
+              <a:rPr lang="en-US" dirty="0"/>
+              <a:t>	</a:t>
+            </a:r>
+            <a:r>
+              <a:rPr lang="en-US" dirty="0" smtClean="0"/>
+              <a:t>Users/Consumers are protected from too frequent changes</a:t>
             </a:r>
             <a:endParaRPr lang="en-US" dirty="0"/>
           </a:p>
@@ -7643,7 +8896,7 @@
           <a:bodyPr/>
           <a:lstStyle/>
           <a:p>
-            <a:fld id="{545C0006-7105-1E42-8E5E-ECC2AEB9F592}" type="datetime1">
+            <a:fld id="{49017221-95F1-A547-955D-7B046F2E09F0}" type="datetime1">
               <a:rPr lang="en-US" smtClean="0"/>
               <a:t>2/14/17</a:t>
             </a:fld>
@@ -7700,7 +8953,7 @@
     </p:spTree>
     <p:extLst>
       <p:ext uri="{BB962C8B-B14F-4D97-AF65-F5344CB8AC3E}">
-        <p14:creationId xmlns:p14="http://schemas.microsoft.com/office/powerpoint/2010/main" val="693958462"/>
+        <p14:creationId xmlns:p14="http://schemas.microsoft.com/office/powerpoint/2010/main" val="160540581"/>
       </p:ext>
     </p:extLst>
   </p:cSld>
@@ -7744,6 +8997,708 @@
           <a:p>
             <a:r>
               <a:rPr lang="en-US" dirty="0" smtClean="0"/>
+              <a:t>A </a:t>
+            </a:r>
+            <a:r>
+              <a:rPr lang="en-US" dirty="0" err="1" smtClean="0"/>
+              <a:t>composable</a:t>
+            </a:r>
+            <a:r>
+              <a:rPr lang="en-US" smtClean="0"/>
+              <a:t>, tractable, extensible </a:t>
+            </a:r>
+            <a:r>
+              <a:rPr lang="en-US" dirty="0" smtClean="0"/>
+              <a:t>API</a:t>
+            </a:r>
+            <a:endParaRPr lang="en-US" dirty="0"/>
+          </a:p>
+        </p:txBody>
+      </p:sp>
+      <p:sp>
+        <p:nvSpPr>
+          <p:cNvPr id="3" name="Content Placeholder 2"/>
+          <p:cNvSpPr>
+            <a:spLocks noGrp="1"/>
+          </p:cNvSpPr>
+          <p:nvPr>
+            <p:ph idx="1"/>
+          </p:nvPr>
+        </p:nvSpPr>
+        <p:spPr/>
+        <p:txBody>
+          <a:bodyPr>
+            <a:normAutofit/>
+          </a:bodyPr>
+          <a:lstStyle/>
+          <a:p>
+            <a:r>
+              <a:rPr lang="en-US" sz="3200" dirty="0" err="1" smtClean="0">
+                <a:latin typeface="Courier" charset="0"/>
+                <a:ea typeface="Courier" charset="0"/>
+                <a:cs typeface="Courier" charset="0"/>
+              </a:rPr>
+              <a:t>fd</a:t>
+            </a:r>
+            <a:r>
+              <a:rPr lang="en-US" sz="3200" dirty="0" smtClean="0">
+                <a:latin typeface="Courier" charset="0"/>
+                <a:ea typeface="Courier" charset="0"/>
+                <a:cs typeface="Courier" charset="0"/>
+              </a:rPr>
+              <a:t> = open(</a:t>
+            </a:r>
+            <a:r>
+              <a:rPr lang="mr-IN" sz="3200" dirty="0" smtClean="0">
+                <a:latin typeface="Courier" charset="0"/>
+                <a:ea typeface="Courier" charset="0"/>
+                <a:cs typeface="Courier" charset="0"/>
+              </a:rPr>
+              <a:t>…</a:t>
+            </a:r>
+            <a:r>
+              <a:rPr lang="en-US" sz="3200" dirty="0" smtClean="0">
+                <a:latin typeface="Courier" charset="0"/>
+                <a:ea typeface="Courier" charset="0"/>
+                <a:cs typeface="Courier" charset="0"/>
+              </a:rPr>
+              <a:t>)</a:t>
+            </a:r>
+          </a:p>
+          <a:p>
+            <a:r>
+              <a:rPr lang="en-US" sz="3200" dirty="0" smtClean="0">
+                <a:latin typeface="Courier" charset="0"/>
+                <a:ea typeface="Courier" charset="0"/>
+                <a:cs typeface="Courier" charset="0"/>
+              </a:rPr>
+              <a:t>close(</a:t>
+            </a:r>
+            <a:r>
+              <a:rPr lang="en-US" sz="3200" dirty="0" err="1" smtClean="0">
+                <a:latin typeface="Courier" charset="0"/>
+                <a:ea typeface="Courier" charset="0"/>
+                <a:cs typeface="Courier" charset="0"/>
+              </a:rPr>
+              <a:t>fd</a:t>
+            </a:r>
+            <a:r>
+              <a:rPr lang="en-US" sz="3200" dirty="0" smtClean="0">
+                <a:latin typeface="Courier" charset="0"/>
+                <a:ea typeface="Courier" charset="0"/>
+                <a:cs typeface="Courier" charset="0"/>
+              </a:rPr>
+              <a:t>)</a:t>
+            </a:r>
+          </a:p>
+          <a:p>
+            <a:r>
+              <a:rPr lang="en-US" sz="3200" dirty="0" smtClean="0">
+                <a:latin typeface="Courier" charset="0"/>
+                <a:ea typeface="Courier" charset="0"/>
+                <a:cs typeface="Courier" charset="0"/>
+              </a:rPr>
+              <a:t>read(</a:t>
+            </a:r>
+            <a:r>
+              <a:rPr lang="en-US" sz="3200" dirty="0" err="1" smtClean="0">
+                <a:latin typeface="Courier" charset="0"/>
+                <a:ea typeface="Courier" charset="0"/>
+                <a:cs typeface="Courier" charset="0"/>
+              </a:rPr>
+              <a:t>fd</a:t>
+            </a:r>
+            <a:r>
+              <a:rPr lang="en-US" sz="3200" dirty="0" smtClean="0">
+                <a:latin typeface="Courier" charset="0"/>
+                <a:ea typeface="Courier" charset="0"/>
+                <a:cs typeface="Courier" charset="0"/>
+              </a:rPr>
+              <a:t>, </a:t>
+            </a:r>
+            <a:r>
+              <a:rPr lang="mr-IN" sz="3200" dirty="0" smtClean="0">
+                <a:latin typeface="Courier" charset="0"/>
+                <a:ea typeface="Courier" charset="0"/>
+                <a:cs typeface="Courier" charset="0"/>
+              </a:rPr>
+              <a:t>…</a:t>
+            </a:r>
+            <a:r>
+              <a:rPr lang="en-US" sz="3200" dirty="0" smtClean="0">
+                <a:latin typeface="Courier" charset="0"/>
+                <a:ea typeface="Courier" charset="0"/>
+                <a:cs typeface="Courier" charset="0"/>
+              </a:rPr>
+              <a:t>)</a:t>
+            </a:r>
+          </a:p>
+          <a:p>
+            <a:r>
+              <a:rPr lang="en-US" sz="3200" dirty="0" smtClean="0">
+                <a:latin typeface="Courier" charset="0"/>
+                <a:ea typeface="Courier" charset="0"/>
+                <a:cs typeface="Courier" charset="0"/>
+              </a:rPr>
+              <a:t>write(</a:t>
+            </a:r>
+            <a:r>
+              <a:rPr lang="en-US" sz="3200" dirty="0" err="1" smtClean="0">
+                <a:latin typeface="Courier" charset="0"/>
+                <a:ea typeface="Courier" charset="0"/>
+                <a:cs typeface="Courier" charset="0"/>
+              </a:rPr>
+              <a:t>fd</a:t>
+            </a:r>
+            <a:r>
+              <a:rPr lang="en-US" sz="3200" dirty="0" smtClean="0">
+                <a:latin typeface="Courier" charset="0"/>
+                <a:ea typeface="Courier" charset="0"/>
+                <a:cs typeface="Courier" charset="0"/>
+              </a:rPr>
+              <a:t>, </a:t>
+            </a:r>
+            <a:r>
+              <a:rPr lang="mr-IN" sz="3200" dirty="0" smtClean="0">
+                <a:latin typeface="Courier" charset="0"/>
+                <a:ea typeface="Courier" charset="0"/>
+                <a:cs typeface="Courier" charset="0"/>
+              </a:rPr>
+              <a:t>…</a:t>
+            </a:r>
+            <a:r>
+              <a:rPr lang="en-US" sz="3200" dirty="0" smtClean="0">
+                <a:latin typeface="Courier" charset="0"/>
+                <a:ea typeface="Courier" charset="0"/>
+                <a:cs typeface="Courier" charset="0"/>
+              </a:rPr>
+              <a:t>)</a:t>
+            </a:r>
+          </a:p>
+          <a:p>
+            <a:r>
+              <a:rPr lang="en-US" sz="3200" dirty="0" err="1" smtClean="0">
+                <a:latin typeface="Courier" charset="0"/>
+                <a:ea typeface="Courier" charset="0"/>
+                <a:cs typeface="Courier" charset="0"/>
+              </a:rPr>
+              <a:t>ioctl</a:t>
+            </a:r>
+            <a:r>
+              <a:rPr lang="en-US" sz="3200" dirty="0" smtClean="0">
+                <a:latin typeface="Courier" charset="0"/>
+                <a:ea typeface="Courier" charset="0"/>
+                <a:cs typeface="Courier" charset="0"/>
+              </a:rPr>
+              <a:t>(</a:t>
+            </a:r>
+            <a:r>
+              <a:rPr lang="en-US" sz="3200" dirty="0" err="1" smtClean="0">
+                <a:latin typeface="Courier" charset="0"/>
+                <a:ea typeface="Courier" charset="0"/>
+                <a:cs typeface="Courier" charset="0"/>
+              </a:rPr>
+              <a:t>fd</a:t>
+            </a:r>
+            <a:r>
+              <a:rPr lang="en-US" sz="3200" dirty="0" smtClean="0">
+                <a:latin typeface="Courier" charset="0"/>
+                <a:ea typeface="Courier" charset="0"/>
+                <a:cs typeface="Courier" charset="0"/>
+              </a:rPr>
+              <a:t>, </a:t>
+            </a:r>
+            <a:r>
+              <a:rPr lang="mr-IN" sz="3200" dirty="0" smtClean="0">
+                <a:latin typeface="Courier" charset="0"/>
+                <a:ea typeface="Courier" charset="0"/>
+                <a:cs typeface="Courier" charset="0"/>
+              </a:rPr>
+              <a:t>…</a:t>
+            </a:r>
+            <a:r>
+              <a:rPr lang="en-US" sz="3200" dirty="0" smtClean="0">
+                <a:latin typeface="Courier" charset="0"/>
+                <a:ea typeface="Courier" charset="0"/>
+                <a:cs typeface="Courier" charset="0"/>
+              </a:rPr>
+              <a:t>)</a:t>
+            </a:r>
+            <a:endParaRPr lang="en-US" sz="3200" dirty="0">
+              <a:latin typeface="Courier" charset="0"/>
+              <a:ea typeface="Courier" charset="0"/>
+              <a:cs typeface="Courier" charset="0"/>
+            </a:endParaRPr>
+          </a:p>
+        </p:txBody>
+      </p:sp>
+      <p:sp>
+        <p:nvSpPr>
+          <p:cNvPr id="4" name="Date Placeholder 3"/>
+          <p:cNvSpPr>
+            <a:spLocks noGrp="1"/>
+          </p:cNvSpPr>
+          <p:nvPr>
+            <p:ph type="dt" sz="half" idx="10"/>
+          </p:nvPr>
+        </p:nvSpPr>
+        <p:spPr/>
+        <p:txBody>
+          <a:bodyPr/>
+          <a:lstStyle/>
+          <a:p>
+            <a:fld id="{49017221-95F1-A547-955D-7B046F2E09F0}" type="datetime1">
+              <a:rPr lang="en-US" smtClean="0"/>
+              <a:t>2/14/17</a:t>
+            </a:fld>
+            <a:endParaRPr lang="en-US"/>
+          </a:p>
+        </p:txBody>
+      </p:sp>
+      <p:sp>
+        <p:nvSpPr>
+          <p:cNvPr id="5" name="Footer Placeholder 4"/>
+          <p:cNvSpPr>
+            <a:spLocks noGrp="1"/>
+          </p:cNvSpPr>
+          <p:nvPr>
+            <p:ph type="ftr" sz="quarter" idx="11"/>
+          </p:nvPr>
+        </p:nvSpPr>
+        <p:spPr/>
+        <p:txBody>
+          <a:bodyPr/>
+          <a:lstStyle/>
+          <a:p>
+            <a:r>
+              <a:rPr lang="en-US" smtClean="0"/>
+              <a:t>Introduction to Operating Systems</a:t>
+            </a:r>
+            <a:endParaRPr lang="en-US" dirty="0"/>
+          </a:p>
+        </p:txBody>
+      </p:sp>
+      <p:sp>
+        <p:nvSpPr>
+          <p:cNvPr id="6" name="Slide Number Placeholder 5"/>
+          <p:cNvSpPr>
+            <a:spLocks noGrp="1"/>
+          </p:cNvSpPr>
+          <p:nvPr>
+            <p:ph type="sldNum" sz="quarter" idx="12"/>
+          </p:nvPr>
+        </p:nvSpPr>
+        <p:spPr/>
+        <p:txBody>
+          <a:bodyPr/>
+          <a:lstStyle/>
+          <a:p>
+            <a:fld id="{699C44C4-0FAD-8046-A5C4-05AB318FA424}" type="slidenum">
+              <a:rPr lang="en-US" smtClean="0"/>
+              <a:t>4</a:t>
+            </a:fld>
+            <a:endParaRPr lang="en-US"/>
+          </a:p>
+        </p:txBody>
+      </p:sp>
+    </p:spTree>
+    <p:extLst>
+      <p:ext uri="{BB962C8B-B14F-4D97-AF65-F5344CB8AC3E}">
+        <p14:creationId xmlns:p14="http://schemas.microsoft.com/office/powerpoint/2010/main" val="763546961"/>
+      </p:ext>
+    </p:extLst>
+  </p:cSld>
+  <p:clrMapOvr>
+    <a:masterClrMapping/>
+  </p:clrMapOvr>
+</p:sld>
+</file>
+
+<file path=ppt/slides/slide5.xml><?xml version="1.0" encoding="utf-8"?>
+<p:sld xmlns:a="http://schemas.openxmlformats.org/drawingml/2006/main" xmlns:r="http://schemas.openxmlformats.org/officeDocument/2006/relationships" xmlns:p="http://schemas.openxmlformats.org/presentationml/2006/main">
+  <p:cSld>
+    <p:spTree>
+      <p:nvGrpSpPr>
+        <p:cNvPr id="1" name=""/>
+        <p:cNvGrpSpPr/>
+        <p:nvPr/>
+      </p:nvGrpSpPr>
+      <p:grpSpPr>
+        <a:xfrm>
+          <a:off x="0" y="0"/>
+          <a:ext cx="0" cy="0"/>
+          <a:chOff x="0" y="0"/>
+          <a:chExt cx="0" cy="0"/>
+        </a:xfrm>
+      </p:grpSpPr>
+      <p:sp>
+        <p:nvSpPr>
+          <p:cNvPr id="2" name="Title 1"/>
+          <p:cNvSpPr>
+            <a:spLocks noGrp="1"/>
+          </p:cNvSpPr>
+          <p:nvPr>
+            <p:ph type="title"/>
+          </p:nvPr>
+        </p:nvSpPr>
+        <p:spPr/>
+        <p:txBody>
+          <a:bodyPr/>
+          <a:lstStyle/>
+          <a:p>
+            <a:r>
+              <a:rPr lang="en-US" dirty="0" smtClean="0"/>
+              <a:t>Kernel Services</a:t>
+            </a:r>
+            <a:endParaRPr lang="en-US" dirty="0"/>
+          </a:p>
+        </p:txBody>
+      </p:sp>
+      <p:sp>
+        <p:nvSpPr>
+          <p:cNvPr id="3" name="Content Placeholder 2"/>
+          <p:cNvSpPr>
+            <a:spLocks noGrp="1"/>
+          </p:cNvSpPr>
+          <p:nvPr>
+            <p:ph idx="1"/>
+          </p:nvPr>
+        </p:nvSpPr>
+        <p:spPr/>
+        <p:txBody>
+          <a:bodyPr/>
+          <a:lstStyle/>
+          <a:p>
+            <a:r>
+              <a:rPr lang="en-US" dirty="0" smtClean="0"/>
+              <a:t>System Processes</a:t>
+            </a:r>
+          </a:p>
+          <a:p>
+            <a:r>
+              <a:rPr lang="en-US" dirty="0" smtClean="0"/>
+              <a:t>System Call Interface</a:t>
+            </a:r>
+          </a:p>
+          <a:p>
+            <a:r>
+              <a:rPr lang="en-US" dirty="0" smtClean="0"/>
+              <a:t>Traps and Interrupts</a:t>
+            </a:r>
+          </a:p>
+          <a:p>
+            <a:r>
+              <a:rPr lang="en-US" dirty="0" smtClean="0"/>
+              <a:t>Memory Management</a:t>
+            </a:r>
+          </a:p>
+          <a:p>
+            <a:r>
+              <a:rPr lang="en-US" dirty="0" smtClean="0"/>
+              <a:t>Timing Services</a:t>
+            </a:r>
+          </a:p>
+          <a:p>
+            <a:r>
+              <a:rPr lang="en-US" dirty="0" smtClean="0"/>
+              <a:t>Resource Usage and Limits</a:t>
+            </a:r>
+          </a:p>
+          <a:p>
+            <a:r>
+              <a:rPr lang="en-US" dirty="0" smtClean="0"/>
+              <a:t>Tracing</a:t>
+            </a:r>
+          </a:p>
+          <a:p>
+            <a:pPr lvl="1"/>
+            <a:r>
+              <a:rPr lang="en-US" dirty="0" smtClean="0"/>
+              <a:t>Which we’ll discuss at length in the next section</a:t>
+            </a:r>
+            <a:endParaRPr lang="en-US" dirty="0" smtClean="0"/>
+          </a:p>
+        </p:txBody>
+      </p:sp>
+      <p:sp>
+        <p:nvSpPr>
+          <p:cNvPr id="4" name="Date Placeholder 3"/>
+          <p:cNvSpPr>
+            <a:spLocks noGrp="1"/>
+          </p:cNvSpPr>
+          <p:nvPr>
+            <p:ph type="dt" sz="half" idx="10"/>
+          </p:nvPr>
+        </p:nvSpPr>
+        <p:spPr/>
+        <p:txBody>
+          <a:bodyPr/>
+          <a:lstStyle/>
+          <a:p>
+            <a:fld id="{F2F85883-78DF-6843-8ADC-5371C1884CF2}" type="datetime1">
+              <a:rPr lang="en-US" smtClean="0"/>
+              <a:t>2/14/17</a:t>
+            </a:fld>
+            <a:endParaRPr lang="en-US"/>
+          </a:p>
+        </p:txBody>
+      </p:sp>
+      <p:sp>
+        <p:nvSpPr>
+          <p:cNvPr id="5" name="Footer Placeholder 4"/>
+          <p:cNvSpPr>
+            <a:spLocks noGrp="1"/>
+          </p:cNvSpPr>
+          <p:nvPr>
+            <p:ph type="ftr" sz="quarter" idx="11"/>
+          </p:nvPr>
+        </p:nvSpPr>
+        <p:spPr/>
+        <p:txBody>
+          <a:bodyPr/>
+          <a:lstStyle/>
+          <a:p>
+            <a:r>
+              <a:rPr lang="en-US" smtClean="0"/>
+              <a:t>Introduction to Operating Systems</a:t>
+            </a:r>
+            <a:endParaRPr lang="en-US" dirty="0"/>
+          </a:p>
+        </p:txBody>
+      </p:sp>
+      <p:sp>
+        <p:nvSpPr>
+          <p:cNvPr id="6" name="Slide Number Placeholder 5"/>
+          <p:cNvSpPr>
+            <a:spLocks noGrp="1"/>
+          </p:cNvSpPr>
+          <p:nvPr>
+            <p:ph type="sldNum" sz="quarter" idx="12"/>
+          </p:nvPr>
+        </p:nvSpPr>
+        <p:spPr/>
+        <p:txBody>
+          <a:bodyPr/>
+          <a:lstStyle/>
+          <a:p>
+            <a:fld id="{699C44C4-0FAD-8046-A5C4-05AB318FA424}" type="slidenum">
+              <a:rPr lang="en-US" smtClean="0"/>
+              <a:t>5</a:t>
+            </a:fld>
+            <a:endParaRPr lang="en-US"/>
+          </a:p>
+        </p:txBody>
+      </p:sp>
+    </p:spTree>
+    <p:extLst>
+      <p:ext uri="{BB962C8B-B14F-4D97-AF65-F5344CB8AC3E}">
+        <p14:creationId xmlns:p14="http://schemas.microsoft.com/office/powerpoint/2010/main" val="1296378508"/>
+      </p:ext>
+    </p:extLst>
+  </p:cSld>
+  <p:clrMapOvr>
+    <a:masterClrMapping/>
+  </p:clrMapOvr>
+</p:sld>
+</file>
+
+<file path=ppt/slides/slide6.xml><?xml version="1.0" encoding="utf-8"?>
+<p:sld xmlns:a="http://schemas.openxmlformats.org/drawingml/2006/main" xmlns:r="http://schemas.openxmlformats.org/officeDocument/2006/relationships" xmlns:p="http://schemas.openxmlformats.org/presentationml/2006/main">
+  <p:cSld>
+    <p:spTree>
+      <p:nvGrpSpPr>
+        <p:cNvPr id="1" name=""/>
+        <p:cNvGrpSpPr/>
+        <p:nvPr/>
+      </p:nvGrpSpPr>
+      <p:grpSpPr>
+        <a:xfrm>
+          <a:off x="0" y="0"/>
+          <a:ext cx="0" cy="0"/>
+          <a:chOff x="0" y="0"/>
+          <a:chExt cx="0" cy="0"/>
+        </a:xfrm>
+      </p:grpSpPr>
+      <p:sp>
+        <p:nvSpPr>
+          <p:cNvPr id="2" name="Title 1"/>
+          <p:cNvSpPr>
+            <a:spLocks noGrp="1"/>
+          </p:cNvSpPr>
+          <p:nvPr>
+            <p:ph type="title"/>
+          </p:nvPr>
+        </p:nvSpPr>
+        <p:spPr/>
+        <p:txBody>
+          <a:bodyPr/>
+          <a:lstStyle/>
+          <a:p>
+            <a:r>
+              <a:rPr lang="en-US" dirty="0" smtClean="0"/>
+              <a:t>System Calls</a:t>
+            </a:r>
+            <a:endParaRPr lang="en-US" dirty="0"/>
+          </a:p>
+        </p:txBody>
+      </p:sp>
+      <p:sp>
+        <p:nvSpPr>
+          <p:cNvPr id="3" name="Content Placeholder 2"/>
+          <p:cNvSpPr>
+            <a:spLocks noGrp="1"/>
+          </p:cNvSpPr>
+          <p:nvPr>
+            <p:ph idx="1"/>
+          </p:nvPr>
+        </p:nvSpPr>
+        <p:spPr/>
+        <p:txBody>
+          <a:bodyPr/>
+          <a:lstStyle/>
+          <a:p>
+            <a:r>
+              <a:rPr lang="en-US" dirty="0" smtClean="0"/>
+              <a:t>The Operating System’s API</a:t>
+            </a:r>
+          </a:p>
+          <a:p>
+            <a:r>
+              <a:rPr lang="en-US" dirty="0" smtClean="0"/>
+              <a:t>Partially defined by POSIX</a:t>
+            </a:r>
+          </a:p>
+          <a:p>
+            <a:r>
+              <a:rPr lang="en-US" dirty="0" smtClean="0"/>
+              <a:t>Requests for service</a:t>
+            </a:r>
+          </a:p>
+          <a:p>
+            <a:r>
+              <a:rPr lang="en-US" dirty="0" smtClean="0"/>
+              <a:t>Mostly synchronous</a:t>
+            </a:r>
+            <a:endParaRPr lang="en-US" dirty="0"/>
+          </a:p>
+        </p:txBody>
+      </p:sp>
+      <p:sp>
+        <p:nvSpPr>
+          <p:cNvPr id="4" name="Date Placeholder 3"/>
+          <p:cNvSpPr>
+            <a:spLocks noGrp="1"/>
+          </p:cNvSpPr>
+          <p:nvPr>
+            <p:ph type="dt" sz="half" idx="10"/>
+          </p:nvPr>
+        </p:nvSpPr>
+        <p:spPr/>
+        <p:txBody>
+          <a:bodyPr/>
+          <a:lstStyle/>
+          <a:p>
+            <a:fld id="{545C0006-7105-1E42-8E5E-ECC2AEB9F592}" type="datetime1">
+              <a:rPr lang="en-US" smtClean="0"/>
+              <a:t>2/14/17</a:t>
+            </a:fld>
+            <a:endParaRPr lang="en-US"/>
+          </a:p>
+        </p:txBody>
+      </p:sp>
+      <p:sp>
+        <p:nvSpPr>
+          <p:cNvPr id="5" name="Footer Placeholder 4"/>
+          <p:cNvSpPr>
+            <a:spLocks noGrp="1"/>
+          </p:cNvSpPr>
+          <p:nvPr>
+            <p:ph type="ftr" sz="quarter" idx="11"/>
+          </p:nvPr>
+        </p:nvSpPr>
+        <p:spPr/>
+        <p:txBody>
+          <a:bodyPr/>
+          <a:lstStyle/>
+          <a:p>
+            <a:r>
+              <a:rPr lang="en-US" smtClean="0"/>
+              <a:t>Introduction to Operating Systems</a:t>
+            </a:r>
+            <a:endParaRPr lang="en-US" dirty="0"/>
+          </a:p>
+        </p:txBody>
+      </p:sp>
+      <p:sp>
+        <p:nvSpPr>
+          <p:cNvPr id="6" name="Slide Number Placeholder 5"/>
+          <p:cNvSpPr>
+            <a:spLocks noGrp="1"/>
+          </p:cNvSpPr>
+          <p:nvPr>
+            <p:ph type="sldNum" sz="quarter" idx="12"/>
+          </p:nvPr>
+        </p:nvSpPr>
+        <p:spPr/>
+        <p:txBody>
+          <a:bodyPr/>
+          <a:lstStyle/>
+          <a:p>
+            <a:fld id="{699C44C4-0FAD-8046-A5C4-05AB318FA424}" type="slidenum">
+              <a:rPr lang="en-US" smtClean="0"/>
+              <a:t>6</a:t>
+            </a:fld>
+            <a:endParaRPr lang="en-US"/>
+          </a:p>
+        </p:txBody>
+      </p:sp>
+    </p:spTree>
+    <p:extLst>
+      <p:ext uri="{BB962C8B-B14F-4D97-AF65-F5344CB8AC3E}">
+        <p14:creationId xmlns:p14="http://schemas.microsoft.com/office/powerpoint/2010/main" val="693958462"/>
+      </p:ext>
+    </p:extLst>
+  </p:cSld>
+  <p:clrMapOvr>
+    <a:masterClrMapping/>
+  </p:clrMapOvr>
+</p:sld>
+</file>
+
+<file path=ppt/slides/slide7.xml><?xml version="1.0" encoding="utf-8"?>
+<p:sld xmlns:a="http://schemas.openxmlformats.org/drawingml/2006/main" xmlns:r="http://schemas.openxmlformats.org/officeDocument/2006/relationships" xmlns:p="http://schemas.openxmlformats.org/presentationml/2006/main">
+  <p:cSld>
+    <p:spTree>
+      <p:nvGrpSpPr>
+        <p:cNvPr id="1" name=""/>
+        <p:cNvGrpSpPr/>
+        <p:nvPr/>
+      </p:nvGrpSpPr>
+      <p:grpSpPr>
+        <a:xfrm>
+          <a:off x="0" y="0"/>
+          <a:ext cx="0" cy="0"/>
+          <a:chOff x="0" y="0"/>
+          <a:chExt cx="0" cy="0"/>
+        </a:xfrm>
+      </p:grpSpPr>
+      <p:sp>
+        <p:nvSpPr>
+          <p:cNvPr id="2" name="Title 1"/>
+          <p:cNvSpPr>
+            <a:spLocks noGrp="1"/>
+          </p:cNvSpPr>
+          <p:nvPr>
+            <p:ph type="title"/>
+          </p:nvPr>
+        </p:nvSpPr>
+        <p:spPr/>
+        <p:txBody>
+          <a:bodyPr/>
+          <a:lstStyle/>
+          <a:p>
+            <a:r>
+              <a:rPr lang="en-US" dirty="0" smtClean="0"/>
               <a:t>System calls</a:t>
             </a:r>
             <a:endParaRPr lang="en-US" dirty="0"/>
@@ -8008,7 +9963,7 @@
           <a:p>
             <a:fld id="{4451A708-1483-F44A-AC56-12F69CC7793D}" type="slidenum">
               <a:rPr lang="en-US" smtClean="0"/>
-              <a:t>4</a:t>
+              <a:t>7</a:t>
             </a:fld>
             <a:endParaRPr lang="en-US"/>
           </a:p>
@@ -8725,7 +10680,7 @@
 </p:sld>
 </file>
 
-<file path=ppt/slides/slide5.xml><?xml version="1.0" encoding="utf-8"?>
+<file path=ppt/slides/slide8.xml><?xml version="1.0" encoding="utf-8"?>
 <p:sld xmlns:a="http://schemas.openxmlformats.org/drawingml/2006/main" xmlns:r="http://schemas.openxmlformats.org/officeDocument/2006/relationships" xmlns:p="http://schemas.openxmlformats.org/presentationml/2006/main">
   <p:cSld>
     <p:spTree>
@@ -9080,7 +11035,7 @@
           <a:p>
             <a:fld id="{4451A708-1483-F44A-AC56-12F69CC7793D}" type="slidenum">
               <a:rPr lang="en-US" smtClean="0"/>
-              <a:t>5</a:t>
+              <a:t>8</a:t>
             </a:fld>
             <a:endParaRPr lang="en-US"/>
           </a:p>
@@ -9578,7 +11533,7 @@
 </p:sld>
 </file>
 
-<file path=ppt/slides/slide6.xml><?xml version="1.0" encoding="utf-8"?>
+<file path=ppt/slides/slide9.xml><?xml version="1.0" encoding="utf-8"?>
 <p:sld xmlns:a="http://schemas.openxmlformats.org/drawingml/2006/main" xmlns:r="http://schemas.openxmlformats.org/officeDocument/2006/relationships" xmlns:p="http://schemas.openxmlformats.org/presentationml/2006/main">
   <p:cSld>
     <p:spTree>
@@ -9894,7 +11849,7 @@
           <a:p>
             <a:fld id="{4451A708-1483-F44A-AC56-12F69CC7793D}" type="slidenum">
               <a:rPr lang="en-US" smtClean="0"/>
-              <a:t>6</a:t>
+              <a:t>9</a:t>
             </a:fld>
             <a:endParaRPr lang="en-US"/>
           </a:p>
@@ -10425,1009 +12380,6 @@
       </p:par>
     </p:tnLst>
   </p:timing>
-</p:sld>
-</file>
-
-<file path=ppt/slides/slide7.xml><?xml version="1.0" encoding="utf-8"?>
-<p:sld xmlns:a="http://schemas.openxmlformats.org/drawingml/2006/main" xmlns:r="http://schemas.openxmlformats.org/officeDocument/2006/relationships" xmlns:p="http://schemas.openxmlformats.org/presentationml/2006/main">
-  <p:cSld>
-    <p:spTree>
-      <p:nvGrpSpPr>
-        <p:cNvPr id="1" name=""/>
-        <p:cNvGrpSpPr/>
-        <p:nvPr/>
-      </p:nvGrpSpPr>
-      <p:grpSpPr>
-        <a:xfrm>
-          <a:off x="0" y="0"/>
-          <a:ext cx="0" cy="0"/>
-          <a:chOff x="0" y="0"/>
-          <a:chExt cx="0" cy="0"/>
-        </a:xfrm>
-      </p:grpSpPr>
-      <p:sp>
-        <p:nvSpPr>
-          <p:cNvPr id="6" name="Title 5"/>
-          <p:cNvSpPr>
-            <a:spLocks noGrp="1"/>
-          </p:cNvSpPr>
-          <p:nvPr>
-            <p:ph type="title"/>
-          </p:nvPr>
-        </p:nvSpPr>
-        <p:spPr/>
-        <p:txBody>
-          <a:bodyPr>
-            <a:normAutofit/>
-          </a:bodyPr>
-          <a:lstStyle/>
-          <a:p>
-            <a:r>
-              <a:rPr lang="en-US" dirty="0" smtClean="0"/>
-              <a:t>System-call invocation</a:t>
-            </a:r>
-            <a:endParaRPr lang="en-US" dirty="0"/>
-          </a:p>
-        </p:txBody>
-      </p:sp>
-      <p:pic>
-        <p:nvPicPr>
-          <p:cNvPr id="9" name="Content Placeholder 8"/>
-          <p:cNvPicPr>
-            <a:picLocks noGrp="1" noChangeAspect="1"/>
-          </p:cNvPicPr>
-          <p:nvPr>
-            <p:ph sz="half" idx="1"/>
-          </p:nvPr>
-        </p:nvPicPr>
-        <p:blipFill>
-          <a:blip r:embed="rId2">
-            <a:extLst>
-              <a:ext uri="{28A0092B-C50C-407E-A947-70E740481C1C}">
-                <a14:useLocalDpi xmlns:a14="http://schemas.microsoft.com/office/drawing/2010/main" val="0"/>
-              </a:ext>
-            </a:extLst>
-          </a:blip>
-          <a:stretch>
-            <a:fillRect/>
-          </a:stretch>
-        </p:blipFill>
-        <p:spPr>
-          <a:xfrm>
-            <a:off x="2152651" y="1352551"/>
-            <a:ext cx="3460777" cy="5003800"/>
-          </a:xfrm>
-        </p:spPr>
-      </p:pic>
-      <p:sp>
-        <p:nvSpPr>
-          <p:cNvPr id="8" name="Content Placeholder 7"/>
-          <p:cNvSpPr>
-            <a:spLocks noGrp="1"/>
-          </p:cNvSpPr>
-          <p:nvPr>
-            <p:ph sz="half" idx="2"/>
-          </p:nvPr>
-        </p:nvSpPr>
-        <p:spPr>
-          <a:xfrm>
-            <a:off x="5876926" y="1352551"/>
-            <a:ext cx="4162425" cy="5003800"/>
-          </a:xfrm>
-        </p:spPr>
-        <p:txBody>
-          <a:bodyPr>
-            <a:normAutofit/>
-          </a:bodyPr>
-          <a:lstStyle/>
-          <a:p>
-            <a:r>
-              <a:rPr lang="en-US" dirty="0" err="1" smtClean="0">
-                <a:latin typeface="Source Code Pro" charset="0"/>
-                <a:ea typeface="Source Code Pro" charset="0"/>
-                <a:cs typeface="Source Code Pro" charset="0"/>
-              </a:rPr>
-              <a:t>libc</a:t>
-            </a:r>
-            <a:r>
-              <a:rPr lang="en-US" dirty="0" smtClean="0"/>
-              <a:t> system-call stubs provide linkable symbols</a:t>
-            </a:r>
-          </a:p>
-          <a:p>
-            <a:r>
-              <a:rPr lang="en-US" dirty="0"/>
-              <a:t>I</a:t>
-            </a:r>
-            <a:r>
-              <a:rPr lang="en-US" dirty="0" smtClean="0"/>
-              <a:t>nline system-call instructions or dynamic implementations</a:t>
-            </a:r>
-          </a:p>
-          <a:p>
-            <a:pPr lvl="1"/>
-            <a:r>
-              <a:rPr lang="en-US" dirty="0" smtClean="0"/>
-              <a:t>Linux </a:t>
-            </a:r>
-            <a:r>
-              <a:rPr lang="en-US" dirty="0" err="1" smtClean="0">
-                <a:latin typeface="Source Code Pro" charset="0"/>
-                <a:ea typeface="Source Code Pro" charset="0"/>
-                <a:cs typeface="Source Code Pro" charset="0"/>
-              </a:rPr>
-              <a:t>vdso</a:t>
-            </a:r>
-            <a:endParaRPr lang="en-US" dirty="0" smtClean="0">
-              <a:latin typeface="Source Code Pro" charset="0"/>
-              <a:ea typeface="Source Code Pro" charset="0"/>
-              <a:cs typeface="Source Code Pro" charset="0"/>
-            </a:endParaRPr>
-          </a:p>
-          <a:p>
-            <a:pPr lvl="1"/>
-            <a:r>
-              <a:rPr lang="en-US" dirty="0" smtClean="0"/>
-              <a:t>Xen </a:t>
-            </a:r>
-            <a:r>
-              <a:rPr lang="en-US" b="1" dirty="0" err="1" smtClean="0"/>
-              <a:t>hypercall</a:t>
-            </a:r>
-            <a:r>
-              <a:rPr lang="en-US" b="1" dirty="0" smtClean="0"/>
-              <a:t> page</a:t>
-            </a:r>
-          </a:p>
-          <a:p>
-            <a:r>
-              <a:rPr lang="en-US" b="1" dirty="0"/>
-              <a:t>M</a:t>
-            </a:r>
-            <a:r>
-              <a:rPr lang="en-US" b="1" dirty="0" smtClean="0"/>
-              <a:t>achine-dependent trap vector</a:t>
-            </a:r>
-          </a:p>
-          <a:p>
-            <a:r>
-              <a:rPr lang="en-US" b="1" dirty="0" smtClean="0"/>
-              <a:t>Machine-independent </a:t>
-            </a:r>
-            <a:r>
-              <a:rPr lang="en-US" dirty="0" smtClean="0"/>
-              <a:t>function</a:t>
-            </a:r>
-            <a:r>
-              <a:rPr lang="en-US" b="1" dirty="0" smtClean="0"/>
-              <a:t>  </a:t>
-            </a:r>
-            <a:r>
-              <a:rPr lang="en-US" dirty="0" err="1" smtClean="0">
-                <a:latin typeface="Source Code Pro" charset="0"/>
-                <a:ea typeface="Source Code Pro" charset="0"/>
-                <a:cs typeface="Source Code Pro" charset="0"/>
-              </a:rPr>
-              <a:t>syscall</a:t>
-            </a:r>
-            <a:r>
-              <a:rPr lang="en-US" dirty="0" smtClean="0">
-                <a:latin typeface="Source Code Pro" charset="0"/>
-                <a:ea typeface="Source Code Pro" charset="0"/>
-                <a:cs typeface="Source Code Pro" charset="0"/>
-              </a:rPr>
-              <a:t>()</a:t>
-            </a:r>
-            <a:endParaRPr lang="en-US" dirty="0" smtClean="0"/>
-          </a:p>
-          <a:p>
-            <a:pPr lvl="1"/>
-            <a:r>
-              <a:rPr lang="en-US" dirty="0" smtClean="0"/>
-              <a:t>Prologue (e.g., breakpoints, tracing)</a:t>
-            </a:r>
-          </a:p>
-          <a:p>
-            <a:pPr lvl="1"/>
-            <a:r>
-              <a:rPr lang="en-US" dirty="0" smtClean="0"/>
-              <a:t>Actual service invoked</a:t>
-            </a:r>
-          </a:p>
-          <a:p>
-            <a:pPr lvl="1"/>
-            <a:r>
-              <a:rPr lang="en-US" dirty="0"/>
-              <a:t>E</a:t>
-            </a:r>
-            <a:r>
-              <a:rPr lang="en-US" dirty="0" smtClean="0"/>
-              <a:t>pilogue (e.g., tracing, signal delivery)</a:t>
-            </a:r>
-          </a:p>
-        </p:txBody>
-      </p:sp>
-      <p:sp>
-        <p:nvSpPr>
-          <p:cNvPr id="4" name="Footer Placeholder 3"/>
-          <p:cNvSpPr>
-            <a:spLocks noGrp="1"/>
-          </p:cNvSpPr>
-          <p:nvPr>
-            <p:ph type="ftr" sz="quarter" idx="11"/>
-          </p:nvPr>
-        </p:nvSpPr>
-        <p:spPr/>
-        <p:txBody>
-          <a:bodyPr/>
-          <a:lstStyle/>
-          <a:p>
-            <a:r>
-              <a:rPr lang="en-US" smtClean="0"/>
-              <a:t>Introduction to Operating Systems</a:t>
-            </a:r>
-            <a:endParaRPr lang="en-US"/>
-          </a:p>
-        </p:txBody>
-      </p:sp>
-      <p:sp>
-        <p:nvSpPr>
-          <p:cNvPr id="5" name="Slide Number Placeholder 4"/>
-          <p:cNvSpPr>
-            <a:spLocks noGrp="1"/>
-          </p:cNvSpPr>
-          <p:nvPr>
-            <p:ph type="sldNum" sz="quarter" idx="12"/>
-          </p:nvPr>
-        </p:nvSpPr>
-        <p:spPr/>
-        <p:txBody>
-          <a:bodyPr/>
-          <a:lstStyle/>
-          <a:p>
-            <a:fld id="{4451A708-1483-F44A-AC56-12F69CC7793D}" type="slidenum">
-              <a:rPr lang="en-US" smtClean="0"/>
-              <a:t>7</a:t>
-            </a:fld>
-            <a:endParaRPr lang="en-US"/>
-          </a:p>
-        </p:txBody>
-      </p:sp>
-      <p:sp>
-        <p:nvSpPr>
-          <p:cNvPr id="2" name="Date Placeholder 1"/>
-          <p:cNvSpPr>
-            <a:spLocks noGrp="1"/>
-          </p:cNvSpPr>
-          <p:nvPr>
-            <p:ph type="dt" sz="half" idx="10"/>
-          </p:nvPr>
-        </p:nvSpPr>
-        <p:spPr/>
-        <p:txBody>
-          <a:bodyPr/>
-          <a:lstStyle/>
-          <a:p>
-            <a:fld id="{83EF77C3-B9D2-1444-80EE-9F36EF754064}" type="datetime1">
-              <a:rPr lang="en-US" smtClean="0"/>
-              <a:t>2/14/17</a:t>
-            </a:fld>
-            <a:endParaRPr lang="en-US" dirty="0"/>
-          </a:p>
-        </p:txBody>
-      </p:sp>
-    </p:spTree>
-    <p:extLst>
-      <p:ext uri="{BB962C8B-B14F-4D97-AF65-F5344CB8AC3E}">
-        <p14:creationId xmlns:p14="http://schemas.microsoft.com/office/powerpoint/2010/main" val="1393733580"/>
-      </p:ext>
-    </p:extLst>
-  </p:cSld>
-  <p:clrMapOvr>
-    <a:masterClrMapping/>
-  </p:clrMapOvr>
-  <p:timing>
-    <p:tnLst>
-      <p:par>
-        <p:cTn id="1" dur="indefinite" restart="never" nodeType="tmRoot">
-          <p:childTnLst>
-            <p:seq concurrent="1" nextAc="seek">
-              <p:cTn id="2" dur="indefinite" nodeType="mainSeq">
-                <p:childTnLst>
-                  <p:par>
-                    <p:cTn id="3" fill="hold">
-                      <p:stCondLst>
-                        <p:cond delay="indefinite"/>
-                      </p:stCondLst>
-                      <p:childTnLst>
-                        <p:par>
-                          <p:cTn id="4" fill="hold">
-                            <p:stCondLst>
-                              <p:cond delay="0"/>
-                            </p:stCondLst>
-                            <p:childTnLst>
-                              <p:par>
-                                <p:cTn id="5" presetID="1" presetClass="entr" presetSubtype="0" fill="hold" nodeType="clickEffect">
-                                  <p:stCondLst>
-                                    <p:cond delay="0"/>
-                                  </p:stCondLst>
-                                  <p:childTnLst>
-                                    <p:set>
-                                      <p:cBhvr>
-                                        <p:cTn id="6" dur="1" fill="hold">
-                                          <p:stCondLst>
-                                            <p:cond delay="0"/>
-                                          </p:stCondLst>
-                                        </p:cTn>
-                                        <p:tgtEl>
-                                          <p:spTgt spid="8">
-                                            <p:txEl>
-                                              <p:pRg st="0" end="0"/>
-                                            </p:txEl>
-                                          </p:spTgt>
-                                        </p:tgtEl>
-                                        <p:attrNameLst>
-                                          <p:attrName>style.visibility</p:attrName>
-                                        </p:attrNameLst>
-                                      </p:cBhvr>
-                                      <p:to>
-                                        <p:strVal val="visible"/>
-                                      </p:to>
-                                    </p:set>
-                                  </p:childTnLst>
-                                </p:cTn>
-                              </p:par>
-                            </p:childTnLst>
-                          </p:cTn>
-                        </p:par>
-                      </p:childTnLst>
-                    </p:cTn>
-                  </p:par>
-                  <p:par>
-                    <p:cTn id="7" fill="hold">
-                      <p:stCondLst>
-                        <p:cond delay="indefinite"/>
-                      </p:stCondLst>
-                      <p:childTnLst>
-                        <p:par>
-                          <p:cTn id="8" fill="hold">
-                            <p:stCondLst>
-                              <p:cond delay="0"/>
-                            </p:stCondLst>
-                            <p:childTnLst>
-                              <p:par>
-                                <p:cTn id="9" presetID="1" presetClass="entr" presetSubtype="0" fill="hold" nodeType="clickEffect">
-                                  <p:stCondLst>
-                                    <p:cond delay="0"/>
-                                  </p:stCondLst>
-                                  <p:childTnLst>
-                                    <p:set>
-                                      <p:cBhvr>
-                                        <p:cTn id="10" dur="1" fill="hold">
-                                          <p:stCondLst>
-                                            <p:cond delay="0"/>
-                                          </p:stCondLst>
-                                        </p:cTn>
-                                        <p:tgtEl>
-                                          <p:spTgt spid="8">
-                                            <p:txEl>
-                                              <p:pRg st="1" end="1"/>
-                                            </p:txEl>
-                                          </p:spTgt>
-                                        </p:tgtEl>
-                                        <p:attrNameLst>
-                                          <p:attrName>style.visibility</p:attrName>
-                                        </p:attrNameLst>
-                                      </p:cBhvr>
-                                      <p:to>
-                                        <p:strVal val="visible"/>
-                                      </p:to>
-                                    </p:set>
-                                  </p:childTnLst>
-                                </p:cTn>
-                              </p:par>
-                              <p:par>
-                                <p:cTn id="11" presetID="1" presetClass="entr" presetSubtype="0" fill="hold" nodeType="withEffect">
-                                  <p:stCondLst>
-                                    <p:cond delay="0"/>
-                                  </p:stCondLst>
-                                  <p:childTnLst>
-                                    <p:set>
-                                      <p:cBhvr>
-                                        <p:cTn id="12" dur="1" fill="hold">
-                                          <p:stCondLst>
-                                            <p:cond delay="0"/>
-                                          </p:stCondLst>
-                                        </p:cTn>
-                                        <p:tgtEl>
-                                          <p:spTgt spid="8">
-                                            <p:txEl>
-                                              <p:pRg st="2" end="2"/>
-                                            </p:txEl>
-                                          </p:spTgt>
-                                        </p:tgtEl>
-                                        <p:attrNameLst>
-                                          <p:attrName>style.visibility</p:attrName>
-                                        </p:attrNameLst>
-                                      </p:cBhvr>
-                                      <p:to>
-                                        <p:strVal val="visible"/>
-                                      </p:to>
-                                    </p:set>
-                                  </p:childTnLst>
-                                </p:cTn>
-                              </p:par>
-                              <p:par>
-                                <p:cTn id="13" presetID="1" presetClass="entr" presetSubtype="0" fill="hold" nodeType="withEffect">
-                                  <p:stCondLst>
-                                    <p:cond delay="0"/>
-                                  </p:stCondLst>
-                                  <p:childTnLst>
-                                    <p:set>
-                                      <p:cBhvr>
-                                        <p:cTn id="14" dur="1" fill="hold">
-                                          <p:stCondLst>
-                                            <p:cond delay="0"/>
-                                          </p:stCondLst>
-                                        </p:cTn>
-                                        <p:tgtEl>
-                                          <p:spTgt spid="8">
-                                            <p:txEl>
-                                              <p:pRg st="3" end="3"/>
-                                            </p:txEl>
-                                          </p:spTgt>
-                                        </p:tgtEl>
-                                        <p:attrNameLst>
-                                          <p:attrName>style.visibility</p:attrName>
-                                        </p:attrNameLst>
-                                      </p:cBhvr>
-                                      <p:to>
-                                        <p:strVal val="visible"/>
-                                      </p:to>
-                                    </p:set>
-                                  </p:childTnLst>
-                                </p:cTn>
-                              </p:par>
-                            </p:childTnLst>
-                          </p:cTn>
-                        </p:par>
-                      </p:childTnLst>
-                    </p:cTn>
-                  </p:par>
-                  <p:par>
-                    <p:cTn id="15" fill="hold">
-                      <p:stCondLst>
-                        <p:cond delay="indefinite"/>
-                      </p:stCondLst>
-                      <p:childTnLst>
-                        <p:par>
-                          <p:cTn id="16" fill="hold">
-                            <p:stCondLst>
-                              <p:cond delay="0"/>
-                            </p:stCondLst>
-                            <p:childTnLst>
-                              <p:par>
-                                <p:cTn id="17" presetID="1" presetClass="entr" presetSubtype="0" fill="hold" nodeType="clickEffect">
-                                  <p:stCondLst>
-                                    <p:cond delay="0"/>
-                                  </p:stCondLst>
-                                  <p:childTnLst>
-                                    <p:set>
-                                      <p:cBhvr>
-                                        <p:cTn id="18" dur="1" fill="hold">
-                                          <p:stCondLst>
-                                            <p:cond delay="0"/>
-                                          </p:stCondLst>
-                                        </p:cTn>
-                                        <p:tgtEl>
-                                          <p:spTgt spid="8">
-                                            <p:txEl>
-                                              <p:pRg st="4" end="4"/>
-                                            </p:txEl>
-                                          </p:spTgt>
-                                        </p:tgtEl>
-                                        <p:attrNameLst>
-                                          <p:attrName>style.visibility</p:attrName>
-                                        </p:attrNameLst>
-                                      </p:cBhvr>
-                                      <p:to>
-                                        <p:strVal val="visible"/>
-                                      </p:to>
-                                    </p:set>
-                                  </p:childTnLst>
-                                </p:cTn>
-                              </p:par>
-                            </p:childTnLst>
-                          </p:cTn>
-                        </p:par>
-                      </p:childTnLst>
-                    </p:cTn>
-                  </p:par>
-                  <p:par>
-                    <p:cTn id="19" fill="hold">
-                      <p:stCondLst>
-                        <p:cond delay="indefinite"/>
-                      </p:stCondLst>
-                      <p:childTnLst>
-                        <p:par>
-                          <p:cTn id="20" fill="hold">
-                            <p:stCondLst>
-                              <p:cond delay="0"/>
-                            </p:stCondLst>
-                            <p:childTnLst>
-                              <p:par>
-                                <p:cTn id="21" presetID="1" presetClass="entr" presetSubtype="0" fill="hold" nodeType="clickEffect">
-                                  <p:stCondLst>
-                                    <p:cond delay="0"/>
-                                  </p:stCondLst>
-                                  <p:childTnLst>
-                                    <p:set>
-                                      <p:cBhvr>
-                                        <p:cTn id="22" dur="1" fill="hold">
-                                          <p:stCondLst>
-                                            <p:cond delay="0"/>
-                                          </p:stCondLst>
-                                        </p:cTn>
-                                        <p:tgtEl>
-                                          <p:spTgt spid="8">
-                                            <p:txEl>
-                                              <p:pRg st="5" end="5"/>
-                                            </p:txEl>
-                                          </p:spTgt>
-                                        </p:tgtEl>
-                                        <p:attrNameLst>
-                                          <p:attrName>style.visibility</p:attrName>
-                                        </p:attrNameLst>
-                                      </p:cBhvr>
-                                      <p:to>
-                                        <p:strVal val="visible"/>
-                                      </p:to>
-                                    </p:set>
-                                  </p:childTnLst>
-                                </p:cTn>
-                              </p:par>
-                              <p:par>
-                                <p:cTn id="23" presetID="1" presetClass="entr" presetSubtype="0" fill="hold" nodeType="withEffect">
-                                  <p:stCondLst>
-                                    <p:cond delay="0"/>
-                                  </p:stCondLst>
-                                  <p:childTnLst>
-                                    <p:set>
-                                      <p:cBhvr>
-                                        <p:cTn id="24" dur="1" fill="hold">
-                                          <p:stCondLst>
-                                            <p:cond delay="0"/>
-                                          </p:stCondLst>
-                                        </p:cTn>
-                                        <p:tgtEl>
-                                          <p:spTgt spid="8">
-                                            <p:txEl>
-                                              <p:pRg st="6" end="6"/>
-                                            </p:txEl>
-                                          </p:spTgt>
-                                        </p:tgtEl>
-                                        <p:attrNameLst>
-                                          <p:attrName>style.visibility</p:attrName>
-                                        </p:attrNameLst>
-                                      </p:cBhvr>
-                                      <p:to>
-                                        <p:strVal val="visible"/>
-                                      </p:to>
-                                    </p:set>
-                                  </p:childTnLst>
-                                </p:cTn>
-                              </p:par>
-                              <p:par>
-                                <p:cTn id="25" presetID="1" presetClass="entr" presetSubtype="0" fill="hold" nodeType="withEffect">
-                                  <p:stCondLst>
-                                    <p:cond delay="0"/>
-                                  </p:stCondLst>
-                                  <p:childTnLst>
-                                    <p:set>
-                                      <p:cBhvr>
-                                        <p:cTn id="26" dur="1" fill="hold">
-                                          <p:stCondLst>
-                                            <p:cond delay="0"/>
-                                          </p:stCondLst>
-                                        </p:cTn>
-                                        <p:tgtEl>
-                                          <p:spTgt spid="8">
-                                            <p:txEl>
-                                              <p:pRg st="7" end="7"/>
-                                            </p:txEl>
-                                          </p:spTgt>
-                                        </p:tgtEl>
-                                        <p:attrNameLst>
-                                          <p:attrName>style.visibility</p:attrName>
-                                        </p:attrNameLst>
-                                      </p:cBhvr>
-                                      <p:to>
-                                        <p:strVal val="visible"/>
-                                      </p:to>
-                                    </p:set>
-                                  </p:childTnLst>
-                                </p:cTn>
-                              </p:par>
-                              <p:par>
-                                <p:cTn id="27" presetID="1" presetClass="entr" presetSubtype="0" fill="hold" nodeType="withEffect">
-                                  <p:stCondLst>
-                                    <p:cond delay="0"/>
-                                  </p:stCondLst>
-                                  <p:childTnLst>
-                                    <p:set>
-                                      <p:cBhvr>
-                                        <p:cTn id="28" dur="1" fill="hold">
-                                          <p:stCondLst>
-                                            <p:cond delay="0"/>
-                                          </p:stCondLst>
-                                        </p:cTn>
-                                        <p:tgtEl>
-                                          <p:spTgt spid="8">
-                                            <p:txEl>
-                                              <p:pRg st="8" end="8"/>
-                                            </p:txEl>
-                                          </p:spTgt>
-                                        </p:tgtEl>
-                                        <p:attrNameLst>
-                                          <p:attrName>style.visibility</p:attrName>
-                                        </p:attrNameLst>
-                                      </p:cBhvr>
-                                      <p:to>
-                                        <p:strVal val="visible"/>
-                                      </p:to>
-                                    </p:set>
-                                  </p:childTnLst>
-                                </p:cTn>
-                              </p:par>
-                            </p:childTnLst>
-                          </p:cTn>
-                        </p:par>
-                      </p:childTnLst>
-                    </p:cTn>
-                  </p:par>
-                </p:childTnLst>
-              </p:cTn>
-              <p:prevCondLst>
-                <p:cond evt="onPrev" delay="0">
-                  <p:tgtEl>
-                    <p:sldTgt/>
-                  </p:tgtEl>
-                </p:cond>
-              </p:prevCondLst>
-              <p:nextCondLst>
-                <p:cond evt="onNext" delay="0">
-                  <p:tgtEl>
-                    <p:sldTgt/>
-                  </p:tgtEl>
-                </p:cond>
-              </p:nextCondLst>
-            </p:seq>
-          </p:childTnLst>
-        </p:cTn>
-      </p:par>
-    </p:tnLst>
-  </p:timing>
-</p:sld>
-</file>
-
-<file path=ppt/slides/slide8.xml><?xml version="1.0" encoding="utf-8"?>
-<p:sld xmlns:a="http://schemas.openxmlformats.org/drawingml/2006/main" xmlns:r="http://schemas.openxmlformats.org/officeDocument/2006/relationships" xmlns:p="http://schemas.openxmlformats.org/presentationml/2006/main">
-  <p:cSld>
-    <p:spTree>
-      <p:nvGrpSpPr>
-        <p:cNvPr id="1" name=""/>
-        <p:cNvGrpSpPr/>
-        <p:nvPr/>
-      </p:nvGrpSpPr>
-      <p:grpSpPr>
-        <a:xfrm>
-          <a:off x="0" y="0"/>
-          <a:ext cx="0" cy="0"/>
-          <a:chOff x="0" y="0"/>
-          <a:chExt cx="0" cy="0"/>
-        </a:xfrm>
-      </p:grpSpPr>
-      <p:sp>
-        <p:nvSpPr>
-          <p:cNvPr id="2" name="Title 1"/>
-          <p:cNvSpPr>
-            <a:spLocks noGrp="1"/>
-          </p:cNvSpPr>
-          <p:nvPr>
-            <p:ph type="title"/>
-          </p:nvPr>
-        </p:nvSpPr>
-        <p:spPr/>
-        <p:txBody>
-          <a:bodyPr/>
-          <a:lstStyle/>
-          <a:p>
-            <a:r>
-              <a:rPr lang="en-US" dirty="0" smtClean="0"/>
-              <a:t>Reading a File</a:t>
-            </a:r>
-            <a:endParaRPr lang="en-US" dirty="0"/>
-          </a:p>
-        </p:txBody>
-      </p:sp>
-      <p:sp>
-        <p:nvSpPr>
-          <p:cNvPr id="3" name="Content Placeholder 2"/>
-          <p:cNvSpPr>
-            <a:spLocks noGrp="1"/>
-          </p:cNvSpPr>
-          <p:nvPr>
-            <p:ph idx="1"/>
-          </p:nvPr>
-        </p:nvSpPr>
-        <p:spPr/>
-        <p:txBody>
-          <a:bodyPr/>
-          <a:lstStyle/>
-          <a:p>
-            <a:pPr marL="457200" indent="-457200">
-              <a:buFont typeface="+mj-lt"/>
-              <a:buAutoNum type="arabicPeriod"/>
-            </a:pPr>
-            <a:r>
-              <a:rPr lang="en-US" dirty="0" smtClean="0"/>
-              <a:t>open()</a:t>
-            </a:r>
-          </a:p>
-          <a:p>
-            <a:pPr marL="457200" indent="-457200">
-              <a:buFont typeface="+mj-lt"/>
-              <a:buAutoNum type="arabicPeriod"/>
-            </a:pPr>
-            <a:r>
-              <a:rPr lang="en-US" dirty="0" smtClean="0"/>
-              <a:t>read()</a:t>
-            </a:r>
-          </a:p>
-          <a:p>
-            <a:pPr marL="457200" indent="-457200">
-              <a:buFont typeface="+mj-lt"/>
-              <a:buAutoNum type="arabicPeriod"/>
-            </a:pPr>
-            <a:r>
-              <a:rPr lang="en-US" dirty="0" smtClean="0"/>
-              <a:t>close()</a:t>
-            </a:r>
-          </a:p>
-        </p:txBody>
-      </p:sp>
-      <p:sp>
-        <p:nvSpPr>
-          <p:cNvPr id="4" name="Date Placeholder 3"/>
-          <p:cNvSpPr>
-            <a:spLocks noGrp="1"/>
-          </p:cNvSpPr>
-          <p:nvPr>
-            <p:ph type="dt" sz="half" idx="10"/>
-          </p:nvPr>
-        </p:nvSpPr>
-        <p:spPr/>
-        <p:txBody>
-          <a:bodyPr/>
-          <a:lstStyle/>
-          <a:p>
-            <a:fld id="{B587B557-3419-484A-8754-ACE5FA5F372A}" type="datetime1">
-              <a:rPr lang="en-US" smtClean="0"/>
-              <a:t>2/14/17</a:t>
-            </a:fld>
-            <a:endParaRPr lang="en-US"/>
-          </a:p>
-        </p:txBody>
-      </p:sp>
-      <p:sp>
-        <p:nvSpPr>
-          <p:cNvPr id="5" name="Footer Placeholder 4"/>
-          <p:cNvSpPr>
-            <a:spLocks noGrp="1"/>
-          </p:cNvSpPr>
-          <p:nvPr>
-            <p:ph type="ftr" sz="quarter" idx="11"/>
-          </p:nvPr>
-        </p:nvSpPr>
-        <p:spPr/>
-        <p:txBody>
-          <a:bodyPr/>
-          <a:lstStyle/>
-          <a:p>
-            <a:r>
-              <a:rPr lang="en-US" smtClean="0"/>
-              <a:t>Introduction to Operating Systems</a:t>
-            </a:r>
-            <a:endParaRPr lang="en-US" dirty="0"/>
-          </a:p>
-        </p:txBody>
-      </p:sp>
-      <p:sp>
-        <p:nvSpPr>
-          <p:cNvPr id="6" name="Slide Number Placeholder 5"/>
-          <p:cNvSpPr>
-            <a:spLocks noGrp="1"/>
-          </p:cNvSpPr>
-          <p:nvPr>
-            <p:ph type="sldNum" sz="quarter" idx="12"/>
-          </p:nvPr>
-        </p:nvSpPr>
-        <p:spPr/>
-        <p:txBody>
-          <a:bodyPr/>
-          <a:lstStyle/>
-          <a:p>
-            <a:fld id="{699C44C4-0FAD-8046-A5C4-05AB318FA424}" type="slidenum">
-              <a:rPr lang="en-US" smtClean="0"/>
-              <a:t>8</a:t>
-            </a:fld>
-            <a:endParaRPr lang="en-US"/>
-          </a:p>
-        </p:txBody>
-      </p:sp>
-    </p:spTree>
-    <p:extLst>
-      <p:ext uri="{BB962C8B-B14F-4D97-AF65-F5344CB8AC3E}">
-        <p14:creationId xmlns:p14="http://schemas.microsoft.com/office/powerpoint/2010/main" val="233612583"/>
-      </p:ext>
-    </p:extLst>
-  </p:cSld>
-  <p:clrMapOvr>
-    <a:masterClrMapping/>
-  </p:clrMapOvr>
-</p:sld>
-</file>
-
-<file path=ppt/slides/slide9.xml><?xml version="1.0" encoding="utf-8"?>
-<p:sld xmlns:a="http://schemas.openxmlformats.org/drawingml/2006/main" xmlns:r="http://schemas.openxmlformats.org/officeDocument/2006/relationships" xmlns:p="http://schemas.openxmlformats.org/presentationml/2006/main">
-  <p:cSld>
-    <p:spTree>
-      <p:nvGrpSpPr>
-        <p:cNvPr id="1" name=""/>
-        <p:cNvGrpSpPr/>
-        <p:nvPr/>
-      </p:nvGrpSpPr>
-      <p:grpSpPr>
-        <a:xfrm>
-          <a:off x="0" y="0"/>
-          <a:ext cx="0" cy="0"/>
-          <a:chOff x="0" y="0"/>
-          <a:chExt cx="0" cy="0"/>
-        </a:xfrm>
-      </p:grpSpPr>
-      <p:sp>
-        <p:nvSpPr>
-          <p:cNvPr id="2" name="Title 1"/>
-          <p:cNvSpPr>
-            <a:spLocks noGrp="1"/>
-          </p:cNvSpPr>
-          <p:nvPr>
-            <p:ph type="title"/>
-          </p:nvPr>
-        </p:nvSpPr>
-        <p:spPr/>
-        <p:txBody>
-          <a:bodyPr/>
-          <a:lstStyle/>
-          <a:p>
-            <a:r>
-              <a:rPr lang="en-US" dirty="0" smtClean="0"/>
-              <a:t>Looking at read()</a:t>
-            </a:r>
-            <a:endParaRPr lang="en-US" dirty="0"/>
-          </a:p>
-        </p:txBody>
-      </p:sp>
-      <p:sp>
-        <p:nvSpPr>
-          <p:cNvPr id="3" name="Content Placeholder 2"/>
-          <p:cNvSpPr>
-            <a:spLocks noGrp="1"/>
-          </p:cNvSpPr>
-          <p:nvPr>
-            <p:ph idx="1"/>
-          </p:nvPr>
-        </p:nvSpPr>
-        <p:spPr/>
-        <p:txBody>
-          <a:bodyPr/>
-          <a:lstStyle/>
-          <a:p>
-            <a:r>
-              <a:rPr lang="en-US" dirty="0" smtClean="0"/>
-              <a:t>How do we get into the kernel?</a:t>
-            </a:r>
-          </a:p>
-          <a:p>
-            <a:r>
-              <a:rPr lang="en-US" dirty="0" smtClean="0"/>
-              <a:t>How do we get out of the kernel?</a:t>
-            </a:r>
-          </a:p>
-          <a:p>
-            <a:endParaRPr lang="en-US" dirty="0" smtClean="0"/>
-          </a:p>
-        </p:txBody>
-      </p:sp>
-      <p:sp>
-        <p:nvSpPr>
-          <p:cNvPr id="4" name="Date Placeholder 3"/>
-          <p:cNvSpPr>
-            <a:spLocks noGrp="1"/>
-          </p:cNvSpPr>
-          <p:nvPr>
-            <p:ph type="dt" sz="half" idx="10"/>
-          </p:nvPr>
-        </p:nvSpPr>
-        <p:spPr/>
-        <p:txBody>
-          <a:bodyPr/>
-          <a:lstStyle/>
-          <a:p>
-            <a:fld id="{F9C7E722-6D52-F848-8DF6-96E061F4DC0F}" type="datetime1">
-              <a:rPr lang="en-US" smtClean="0"/>
-              <a:t>2/14/17</a:t>
-            </a:fld>
-            <a:endParaRPr lang="en-US"/>
-          </a:p>
-        </p:txBody>
-      </p:sp>
-      <p:sp>
-        <p:nvSpPr>
-          <p:cNvPr id="5" name="Footer Placeholder 4"/>
-          <p:cNvSpPr>
-            <a:spLocks noGrp="1"/>
-          </p:cNvSpPr>
-          <p:nvPr>
-            <p:ph type="ftr" sz="quarter" idx="11"/>
-          </p:nvPr>
-        </p:nvSpPr>
-        <p:spPr/>
-        <p:txBody>
-          <a:bodyPr/>
-          <a:lstStyle/>
-          <a:p>
-            <a:r>
-              <a:rPr lang="en-US" smtClean="0"/>
-              <a:t>Introduction to Operating Systems</a:t>
-            </a:r>
-            <a:endParaRPr lang="en-US" dirty="0"/>
-          </a:p>
-        </p:txBody>
-      </p:sp>
-      <p:sp>
-        <p:nvSpPr>
-          <p:cNvPr id="6" name="Slide Number Placeholder 5"/>
-          <p:cNvSpPr>
-            <a:spLocks noGrp="1"/>
-          </p:cNvSpPr>
-          <p:nvPr>
-            <p:ph type="sldNum" sz="quarter" idx="12"/>
-          </p:nvPr>
-        </p:nvSpPr>
-        <p:spPr/>
-        <p:txBody>
-          <a:bodyPr/>
-          <a:lstStyle/>
-          <a:p>
-            <a:fld id="{699C44C4-0FAD-8046-A5C4-05AB318FA424}" type="slidenum">
-              <a:rPr lang="en-US" smtClean="0"/>
-              <a:t>9</a:t>
-            </a:fld>
-            <a:endParaRPr lang="en-US"/>
-          </a:p>
-        </p:txBody>
-      </p:sp>
-    </p:spTree>
-    <p:extLst>
-      <p:ext uri="{BB962C8B-B14F-4D97-AF65-F5344CB8AC3E}">
-        <p14:creationId xmlns:p14="http://schemas.microsoft.com/office/powerpoint/2010/main" val="1716288803"/>
-      </p:ext>
-    </p:extLst>
-  </p:cSld>
-  <p:clrMapOvr>
-    <a:masterClrMapping/>
-  </p:clrMapOvr>
 </p:sld>
 </file>
 

</xml_diff>